<commit_message>
slide deck adding code for CNN training
</commit_message>
<xml_diff>
--- a/Homework-aAlphaBio.pptx
+++ b/Homework-aAlphaBio.pptx
@@ -280,7 +280,7 @@
           <a:p>
             <a:fld id="{A99D5239-F08C-4643-B440-E380AF94EFE9}" type="datetimeFigureOut">
               <a:rPr lang="en-US" smtClean="0"/>
-              <a:t>4/29/24</a:t>
+              <a:t>5/1/24</a:t>
             </a:fld>
             <a:endParaRPr lang="en-US"/>
           </a:p>
@@ -478,7 +478,7 @@
           <a:p>
             <a:fld id="{A99D5239-F08C-4643-B440-E380AF94EFE9}" type="datetimeFigureOut">
               <a:rPr lang="en-US" smtClean="0"/>
-              <a:t>4/29/24</a:t>
+              <a:t>5/1/24</a:t>
             </a:fld>
             <a:endParaRPr lang="en-US"/>
           </a:p>
@@ -686,7 +686,7 @@
           <a:p>
             <a:fld id="{A99D5239-F08C-4643-B440-E380AF94EFE9}" type="datetimeFigureOut">
               <a:rPr lang="en-US" smtClean="0"/>
-              <a:t>4/29/24</a:t>
+              <a:t>5/1/24</a:t>
             </a:fld>
             <a:endParaRPr lang="en-US"/>
           </a:p>
@@ -884,7 +884,7 @@
           <a:p>
             <a:fld id="{A99D5239-F08C-4643-B440-E380AF94EFE9}" type="datetimeFigureOut">
               <a:rPr lang="en-US" smtClean="0"/>
-              <a:t>4/29/24</a:t>
+              <a:t>5/1/24</a:t>
             </a:fld>
             <a:endParaRPr lang="en-US"/>
           </a:p>
@@ -1159,7 +1159,7 @@
           <a:p>
             <a:fld id="{A99D5239-F08C-4643-B440-E380AF94EFE9}" type="datetimeFigureOut">
               <a:rPr lang="en-US" smtClean="0"/>
-              <a:t>4/29/24</a:t>
+              <a:t>5/1/24</a:t>
             </a:fld>
             <a:endParaRPr lang="en-US"/>
           </a:p>
@@ -1424,7 +1424,7 @@
           <a:p>
             <a:fld id="{A99D5239-F08C-4643-B440-E380AF94EFE9}" type="datetimeFigureOut">
               <a:rPr lang="en-US" smtClean="0"/>
-              <a:t>4/29/24</a:t>
+              <a:t>5/1/24</a:t>
             </a:fld>
             <a:endParaRPr lang="en-US"/>
           </a:p>
@@ -1836,7 +1836,7 @@
           <a:p>
             <a:fld id="{A99D5239-F08C-4643-B440-E380AF94EFE9}" type="datetimeFigureOut">
               <a:rPr lang="en-US" smtClean="0"/>
-              <a:t>4/29/24</a:t>
+              <a:t>5/1/24</a:t>
             </a:fld>
             <a:endParaRPr lang="en-US"/>
           </a:p>
@@ -1977,7 +1977,7 @@
           <a:p>
             <a:fld id="{A99D5239-F08C-4643-B440-E380AF94EFE9}" type="datetimeFigureOut">
               <a:rPr lang="en-US" smtClean="0"/>
-              <a:t>4/29/24</a:t>
+              <a:t>5/1/24</a:t>
             </a:fld>
             <a:endParaRPr lang="en-US"/>
           </a:p>
@@ -2090,7 +2090,7 @@
           <a:p>
             <a:fld id="{A99D5239-F08C-4643-B440-E380AF94EFE9}" type="datetimeFigureOut">
               <a:rPr lang="en-US" smtClean="0"/>
-              <a:t>4/29/24</a:t>
+              <a:t>5/1/24</a:t>
             </a:fld>
             <a:endParaRPr lang="en-US"/>
           </a:p>
@@ -2401,7 +2401,7 @@
           <a:p>
             <a:fld id="{A99D5239-F08C-4643-B440-E380AF94EFE9}" type="datetimeFigureOut">
               <a:rPr lang="en-US" smtClean="0"/>
-              <a:t>4/29/24</a:t>
+              <a:t>5/1/24</a:t>
             </a:fld>
             <a:endParaRPr lang="en-US"/>
           </a:p>
@@ -2689,7 +2689,7 @@
           <a:p>
             <a:fld id="{A99D5239-F08C-4643-B440-E380AF94EFE9}" type="datetimeFigureOut">
               <a:rPr lang="en-US" smtClean="0"/>
-              <a:t>4/29/24</a:t>
+              <a:t>5/1/24</a:t>
             </a:fld>
             <a:endParaRPr lang="en-US"/>
           </a:p>
@@ -2930,7 +2930,7 @@
           <a:p>
             <a:fld id="{A99D5239-F08C-4643-B440-E380AF94EFE9}" type="datetimeFigureOut">
               <a:rPr lang="en-US" smtClean="0"/>
-              <a:t>4/29/24</a:t>
+              <a:t>5/1/24</a:t>
             </a:fld>
             <a:endParaRPr lang="en-US"/>
           </a:p>
@@ -3377,15 +3377,7 @@
           <a:p>
             <a:r>
               <a:rPr lang="en-US" dirty="0"/>
-              <a:t>a-</a:t>
-            </a:r>
-            <a:r>
-              <a:rPr lang="en-US" dirty="0" err="1"/>
-              <a:t>alphaBio</a:t>
-            </a:r>
-            <a:r>
-              <a:rPr lang="en-US" dirty="0"/>
-              <a:t> Homework</a:t>
+              <a:t>A-Alpha Bio Homework</a:t>
             </a:r>
           </a:p>
         </p:txBody>
@@ -17782,10 +17774,14 @@
               <a:buChar char="•"/>
             </a:pPr>
             <a:r>
+              <a:rPr lang="en-US" dirty="0"/>
+              <a:t>A</a:t>
+            </a:r>
+            <a:r>
               <a:rPr lang="en-US" b="0" dirty="0">
                 <a:effectLst/>
               </a:rPr>
-              <a:t>a-Alpha-Bio:</a:t>
+              <a:t>-Alpha Bio:</a:t>
             </a:r>
           </a:p>
           <a:p>
@@ -17918,7 +17914,15 @@
             </a:r>
             <a:r>
               <a:rPr lang="en-US" dirty="0"/>
-              <a:t> repo for this homework’s code: TODO (2 repos) </a:t>
+              <a:t> repo for this homework’s code: </a:t>
+            </a:r>
+            <a:r>
+              <a:rPr lang="en-US" dirty="0">
+                <a:solidFill>
+                  <a:srgbClr val="FF0000"/>
+                </a:solidFill>
+              </a:rPr>
+              <a:t>TODO (2 repos) </a:t>
             </a:r>
             <a:r>
               <a:rPr lang="en-US" dirty="0">
@@ -19211,7 +19215,7 @@
         <p:spPr>
           <a:xfrm>
             <a:off x="140127" y="221836"/>
-            <a:ext cx="776175" cy="461665"/>
+            <a:ext cx="3165995" cy="461665"/>
           </a:xfrm>
           <a:prstGeom prst="rect">
             <a:avLst/>
@@ -19226,7 +19230,7 @@
           <a:p>
             <a:r>
               <a:rPr lang="en-US" sz="2400" dirty="0"/>
-              <a:t>Plan</a:t>
+              <a:t>Plan for model training</a:t>
             </a:r>
           </a:p>
         </p:txBody>
@@ -19245,8 +19249,8 @@
         </p:nvSpPr>
         <p:spPr>
           <a:xfrm>
-            <a:off x="381663" y="946205"/>
-            <a:ext cx="4206594" cy="5078313"/>
+            <a:off x="381662" y="726854"/>
+            <a:ext cx="4206594" cy="5909310"/>
           </a:xfrm>
           <a:prstGeom prst="rect">
             <a:avLst/>
@@ -19265,7 +19269,7 @@
             </a:pPr>
             <a:r>
               <a:rPr lang="en-US" dirty="0"/>
-              <a:t>Train with a three simple models </a:t>
+              <a:t>Three MLP-based models </a:t>
             </a:r>
           </a:p>
           <a:p>
@@ -19317,14 +19321,40 @@
               <a:buFont typeface="Arial" panose="020B0604020202020204" pitchFamily="34" charset="0"/>
               <a:buChar char="•"/>
             </a:pPr>
-            <a:endParaRPr lang="en-US" dirty="0"/>
-          </a:p>
-          <a:p>
-            <a:pPr marL="285750" indent="-285750">
+            <a:r>
+              <a:rPr lang="en-US" dirty="0"/>
+              <a:t>CNN</a:t>
+            </a:r>
+          </a:p>
+          <a:p>
+            <a:pPr marL="742950" lvl="1" indent="-285750">
               <a:buFont typeface="Arial" panose="020B0604020202020204" pitchFamily="34" charset="0"/>
               <a:buChar char="•"/>
             </a:pPr>
-            <a:endParaRPr lang="en-US" dirty="0"/>
+            <a:r>
+              <a:rPr lang="en-US" dirty="0"/>
+              <a:t>binary encode aa residue tokens</a:t>
+            </a:r>
+          </a:p>
+          <a:p>
+            <a:pPr marL="742950" lvl="1" indent="-285750">
+              <a:buFont typeface="Arial" panose="020B0604020202020204" pitchFamily="34" charset="0"/>
+              <a:buChar char="•"/>
+            </a:pPr>
+            <a:r>
+              <a:rPr lang="en-US" dirty="0"/>
+              <a:t>reshape into 46x46 monochrome image</a:t>
+            </a:r>
+          </a:p>
+          <a:p>
+            <a:pPr marL="742950" lvl="1" indent="-285750">
+              <a:buFont typeface="Arial" panose="020B0604020202020204" pitchFamily="34" charset="0"/>
+              <a:buChar char="•"/>
+            </a:pPr>
+            <a:r>
+              <a:rPr lang="en-US" dirty="0"/>
+              <a:t>single-stack CNN model</a:t>
+            </a:r>
           </a:p>
           <a:p>
             <a:endParaRPr lang="en-US" dirty="0"/>
@@ -19473,8 +19503,8 @@
         </p:blipFill>
         <p:spPr>
           <a:xfrm>
-            <a:off x="4981185" y="3301053"/>
-            <a:ext cx="4698772" cy="1502796"/>
+            <a:off x="5167306" y="4159472"/>
+            <a:ext cx="3602098" cy="1152050"/>
           </a:xfrm>
           <a:prstGeom prst="rect">
             <a:avLst/>
@@ -19510,8 +19540,8 @@
         </p:blipFill>
         <p:spPr>
           <a:xfrm>
-            <a:off x="4981185" y="4986918"/>
-            <a:ext cx="4435765" cy="1585391"/>
+            <a:off x="5167306" y="5482491"/>
+            <a:ext cx="3602098" cy="1287429"/>
           </a:xfrm>
           <a:prstGeom prst="rect">
             <a:avLst/>
@@ -19609,8 +19639,8 @@
         </p:nvSpPr>
         <p:spPr>
           <a:xfrm>
-            <a:off x="9679957" y="3867785"/>
-            <a:ext cx="1225400" cy="369332"/>
+            <a:off x="8769404" y="4550831"/>
+            <a:ext cx="2191626" cy="369332"/>
           </a:xfrm>
           <a:prstGeom prst="rect">
             <a:avLst/>
@@ -19625,7 +19655,7 @@
           <a:p>
             <a:r>
               <a:rPr lang="en-US" dirty="0"/>
-              <a:t>BERT MLM</a:t>
+              <a:t>BERT pre-train, MLM</a:t>
             </a:r>
           </a:p>
         </p:txBody>
@@ -19644,7 +19674,7 @@
         </p:nvSpPr>
         <p:spPr>
           <a:xfrm>
-            <a:off x="9394071" y="5594726"/>
+            <a:off x="8769404" y="5941539"/>
             <a:ext cx="1614929" cy="369332"/>
           </a:xfrm>
           <a:prstGeom prst="rect">
@@ -19730,6 +19760,71 @@
           </a:prstGeom>
         </p:spPr>
       </p:pic>
+      <p:pic>
+        <p:nvPicPr>
+          <p:cNvPr id="14" name="Picture 13">
+            <a:extLst>
+              <a:ext uri="{FF2B5EF4-FFF2-40B4-BE49-F238E27FC236}">
+                <a16:creationId xmlns:a16="http://schemas.microsoft.com/office/drawing/2014/main" id="{77D2AD9E-3301-393F-2422-49D7276C572D}"/>
+              </a:ext>
+            </a:extLst>
+          </p:cNvPr>
+          <p:cNvPicPr>
+            <a:picLocks noChangeAspect="1"/>
+          </p:cNvPicPr>
+          <p:nvPr/>
+        </p:nvPicPr>
+        <p:blipFill>
+          <a:blip r:embed="rId7"/>
+          <a:stretch>
+            <a:fillRect/>
+          </a:stretch>
+        </p:blipFill>
+        <p:spPr>
+          <a:xfrm>
+            <a:off x="5218843" y="2564467"/>
+            <a:ext cx="1070708" cy="1312481"/>
+          </a:xfrm>
+          <a:prstGeom prst="rect">
+            <a:avLst/>
+          </a:prstGeom>
+        </p:spPr>
+      </p:pic>
+      <p:sp>
+        <p:nvSpPr>
+          <p:cNvPr id="15" name="TextBox 14">
+            <a:extLst>
+              <a:ext uri="{FF2B5EF4-FFF2-40B4-BE49-F238E27FC236}">
+                <a16:creationId xmlns:a16="http://schemas.microsoft.com/office/drawing/2014/main" id="{A3E7B4E8-E1CB-D47B-2037-5A1C5650A36B}"/>
+              </a:ext>
+            </a:extLst>
+          </p:cNvPr>
+          <p:cNvSpPr txBox="1"/>
+          <p:nvPr/>
+        </p:nvSpPr>
+        <p:spPr>
+          <a:xfrm>
+            <a:off x="6316574" y="3091614"/>
+            <a:ext cx="671979" cy="369332"/>
+          </a:xfrm>
+          <a:prstGeom prst="rect">
+            <a:avLst/>
+          </a:prstGeom>
+          <a:noFill/>
+        </p:spPr>
+        <p:txBody>
+          <a:bodyPr wrap="none" rtlCol="0">
+            <a:spAutoFit/>
+          </a:bodyPr>
+          <a:lstStyle/>
+          <a:p>
+            <a:r>
+              <a:rPr lang="en-US" dirty="0"/>
+              <a:t>CNN</a:t>
+            </a:r>
+          </a:p>
+        </p:txBody>
+      </p:sp>
     </p:spTree>
     <p:extLst>
       <p:ext uri="{BB962C8B-B14F-4D97-AF65-F5344CB8AC3E}">
@@ -19810,14 +19905,14 @@
           <p:nvPr>
             <p:extLst>
               <p:ext uri="{D42A27DB-BD31-4B8C-83A1-F6EECF244321}">
-                <p14:modId xmlns:p14="http://schemas.microsoft.com/office/powerpoint/2010/main" val="3129220810"/>
+                <p14:modId xmlns:p14="http://schemas.microsoft.com/office/powerpoint/2010/main" val="3732987322"/>
               </p:ext>
             </p:extLst>
           </p:nvPr>
         </p:nvGraphicFramePr>
         <p:xfrm>
-          <a:off x="1510121" y="1092008"/>
-          <a:ext cx="7921072" cy="3538983"/>
+          <a:off x="1962405" y="826537"/>
+          <a:ext cx="8081086" cy="4044552"/>
         </p:xfrm>
         <a:graphic>
           <a:graphicData uri="http://schemas.openxmlformats.org/drawingml/2006/table">
@@ -19826,7 +19921,7 @@
                 <a:tableStyleId>{5C22544A-7EE6-4342-B048-85BDC9FD1C3A}</a:tableStyleId>
               </a:tblPr>
               <a:tblGrid>
-                <a:gridCol w="1770450">
+                <a:gridCol w="1930464">
                   <a:extLst>
                     <a:ext uri="{9D8B030D-6E8A-4147-A177-3AD203B41FA5}">
                       <a16:colId xmlns:a16="http://schemas.microsoft.com/office/drawing/2014/main" val="1065848917"/>
@@ -20160,6 +20255,70 @@
                     <a:p>
                       <a:r>
                         <a:rPr lang="en-US" dirty="0"/>
+                        <a:t>CNN (MNIST-like)</a:t>
+                      </a:r>
+                    </a:p>
+                  </a:txBody>
+                  <a:tcPr anchor="ctr"/>
+                </a:tc>
+                <a:tc>
+                  <a:txBody>
+                    <a:bodyPr/>
+                    <a:lstStyle/>
+                    <a:p>
+                      <a:pPr algn="ctr"/>
+                      <a:endParaRPr lang="en-US" dirty="0"/>
+                    </a:p>
+                  </a:txBody>
+                  <a:tcPr anchor="ctr"/>
+                </a:tc>
+                <a:tc>
+                  <a:txBody>
+                    <a:bodyPr/>
+                    <a:lstStyle/>
+                    <a:p>
+                      <a:pPr algn="ctr"/>
+                      <a:endParaRPr lang="en-US" dirty="0"/>
+                    </a:p>
+                  </a:txBody>
+                  <a:tcPr anchor="ctr"/>
+                </a:tc>
+                <a:tc>
+                  <a:txBody>
+                    <a:bodyPr/>
+                    <a:lstStyle/>
+                    <a:p>
+                      <a:pPr algn="ctr"/>
+                      <a:endParaRPr lang="en-US" dirty="0"/>
+                    </a:p>
+                  </a:txBody>
+                  <a:tcPr anchor="ctr"/>
+                </a:tc>
+                <a:tc>
+                  <a:txBody>
+                    <a:bodyPr/>
+                    <a:lstStyle/>
+                    <a:p>
+                      <a:pPr algn="ctr"/>
+                      <a:endParaRPr lang="en-US" dirty="0"/>
+                    </a:p>
+                  </a:txBody>
+                  <a:tcPr anchor="ctr"/>
+                </a:tc>
+                <a:extLst>
+                  <a:ext uri="{0D108BD9-81ED-4DB2-BD59-A6C34878D82A}">
+                    <a16:rowId xmlns:a16="http://schemas.microsoft.com/office/drawing/2014/main" val="1232718432"/>
+                  </a:ext>
+                </a:extLst>
+              </a:tr>
+              <a:tr h="505569">
+                <a:tc>
+                  <a:txBody>
+                    <a:bodyPr/>
+                    <a:lstStyle/>
+                    <a:p>
+                      <a:r>
+                        <a:rPr lang="en-US" dirty="0"/>
                         <a:t>BERT (naive) </a:t>
                       </a:r>
                       <a:r>
@@ -21255,6 +21414,361 @@
           <a:chExt cx="0" cy="0"/>
         </a:xfrm>
       </p:grpSpPr>
+      <p:grpSp>
+        <p:nvGrpSpPr>
+          <p:cNvPr id="8" name="Group 7">
+            <a:extLst>
+              <a:ext uri="{FF2B5EF4-FFF2-40B4-BE49-F238E27FC236}">
+                <a16:creationId xmlns:a16="http://schemas.microsoft.com/office/drawing/2014/main" id="{C0434CF7-A283-2E47-7026-4A512CD8547A}"/>
+              </a:ext>
+            </a:extLst>
+          </p:cNvPr>
+          <p:cNvGrpSpPr/>
+          <p:nvPr/>
+        </p:nvGrpSpPr>
+        <p:grpSpPr>
+          <a:xfrm>
+            <a:off x="2745265" y="1617784"/>
+            <a:ext cx="1984997" cy="2242039"/>
+            <a:chOff x="2745265" y="1617784"/>
+            <a:chExt cx="1984997" cy="2242039"/>
+          </a:xfrm>
+        </p:grpSpPr>
+        <p:sp>
+          <p:nvSpPr>
+            <p:cNvPr id="2" name="Rectangle 1">
+              <a:extLst>
+                <a:ext uri="{FF2B5EF4-FFF2-40B4-BE49-F238E27FC236}">
+                  <a16:creationId xmlns:a16="http://schemas.microsoft.com/office/drawing/2014/main" id="{C9EC799C-6315-6FBC-44EF-B3BA08648387}"/>
+                </a:ext>
+              </a:extLst>
+            </p:cNvPr>
+            <p:cNvSpPr/>
+            <p:nvPr/>
+          </p:nvSpPr>
+          <p:spPr>
+            <a:xfrm>
+              <a:off x="3209931" y="1617784"/>
+              <a:ext cx="197399" cy="2242039"/>
+            </a:xfrm>
+            <a:prstGeom prst="rect">
+              <a:avLst/>
+            </a:prstGeom>
+            <a:solidFill>
+              <a:schemeClr val="accent4">
+                <a:alpha val="58000"/>
+              </a:schemeClr>
+            </a:solidFill>
+            <a:ln>
+              <a:solidFill>
+                <a:schemeClr val="bg2">
+                  <a:lumMod val="50000"/>
+                </a:schemeClr>
+              </a:solidFill>
+            </a:ln>
+          </p:spPr>
+          <p:style>
+            <a:lnRef idx="2">
+              <a:schemeClr val="accent1">
+                <a:shade val="15000"/>
+              </a:schemeClr>
+            </a:lnRef>
+            <a:fillRef idx="1">
+              <a:schemeClr val="accent1"/>
+            </a:fillRef>
+            <a:effectRef idx="0">
+              <a:schemeClr val="accent1"/>
+            </a:effectRef>
+            <a:fontRef idx="minor">
+              <a:schemeClr val="lt1"/>
+            </a:fontRef>
+          </p:style>
+          <p:txBody>
+            <a:bodyPr rtlCol="0" anchor="ctr"/>
+            <a:lstStyle/>
+            <a:p>
+              <a:pPr algn="ctr"/>
+              <a:endParaRPr lang="en-US" dirty="0"/>
+            </a:p>
+          </p:txBody>
+        </p:sp>
+        <p:sp>
+          <p:nvSpPr>
+            <p:cNvPr id="3" name="Rectangle 2">
+              <a:extLst>
+                <a:ext uri="{FF2B5EF4-FFF2-40B4-BE49-F238E27FC236}">
+                  <a16:creationId xmlns:a16="http://schemas.microsoft.com/office/drawing/2014/main" id="{AB378311-44E7-5FD4-4420-3DEE1468F9D1}"/>
+                </a:ext>
+              </a:extLst>
+            </p:cNvPr>
+            <p:cNvSpPr/>
+            <p:nvPr/>
+          </p:nvSpPr>
+          <p:spPr>
+            <a:xfrm>
+              <a:off x="3453921" y="1922476"/>
+              <a:ext cx="197403" cy="1699955"/>
+            </a:xfrm>
+            <a:prstGeom prst="rect">
+              <a:avLst/>
+            </a:prstGeom>
+            <a:solidFill>
+              <a:schemeClr val="accent4">
+                <a:alpha val="58000"/>
+              </a:schemeClr>
+            </a:solidFill>
+            <a:ln>
+              <a:solidFill>
+                <a:schemeClr val="bg2">
+                  <a:lumMod val="50000"/>
+                </a:schemeClr>
+              </a:solidFill>
+            </a:ln>
+          </p:spPr>
+          <p:style>
+            <a:lnRef idx="2">
+              <a:schemeClr val="accent1">
+                <a:shade val="15000"/>
+              </a:schemeClr>
+            </a:lnRef>
+            <a:fillRef idx="1">
+              <a:schemeClr val="accent1"/>
+            </a:fillRef>
+            <a:effectRef idx="0">
+              <a:schemeClr val="accent1"/>
+            </a:effectRef>
+            <a:fontRef idx="minor">
+              <a:schemeClr val="lt1"/>
+            </a:fontRef>
+          </p:style>
+          <p:txBody>
+            <a:bodyPr rtlCol="0" anchor="ctr"/>
+            <a:lstStyle/>
+            <a:p>
+              <a:pPr algn="ctr"/>
+              <a:endParaRPr lang="en-US" dirty="0"/>
+            </a:p>
+          </p:txBody>
+        </p:sp>
+        <p:sp>
+          <p:nvSpPr>
+            <p:cNvPr id="4" name="Rectangle 3">
+              <a:extLst>
+                <a:ext uri="{FF2B5EF4-FFF2-40B4-BE49-F238E27FC236}">
+                  <a16:creationId xmlns:a16="http://schemas.microsoft.com/office/drawing/2014/main" id="{72785462-D7F0-1C23-6249-BBFEDB767315}"/>
+                </a:ext>
+              </a:extLst>
+            </p:cNvPr>
+            <p:cNvSpPr/>
+            <p:nvPr/>
+          </p:nvSpPr>
+          <p:spPr>
+            <a:xfrm>
+              <a:off x="3697915" y="2291753"/>
+              <a:ext cx="197403" cy="1137247"/>
+            </a:xfrm>
+            <a:prstGeom prst="rect">
+              <a:avLst/>
+            </a:prstGeom>
+            <a:solidFill>
+              <a:schemeClr val="accent4">
+                <a:alpha val="58000"/>
+              </a:schemeClr>
+            </a:solidFill>
+            <a:ln>
+              <a:solidFill>
+                <a:schemeClr val="bg2">
+                  <a:lumMod val="50000"/>
+                </a:schemeClr>
+              </a:solidFill>
+            </a:ln>
+          </p:spPr>
+          <p:style>
+            <a:lnRef idx="2">
+              <a:schemeClr val="accent1">
+                <a:shade val="15000"/>
+              </a:schemeClr>
+            </a:lnRef>
+            <a:fillRef idx="1">
+              <a:schemeClr val="accent1"/>
+            </a:fillRef>
+            <a:effectRef idx="0">
+              <a:schemeClr val="accent1"/>
+            </a:effectRef>
+            <a:fontRef idx="minor">
+              <a:schemeClr val="lt1"/>
+            </a:fontRef>
+          </p:style>
+          <p:txBody>
+            <a:bodyPr rtlCol="0" anchor="ctr"/>
+            <a:lstStyle/>
+            <a:p>
+              <a:pPr algn="ctr"/>
+              <a:endParaRPr lang="en-US" dirty="0"/>
+            </a:p>
+          </p:txBody>
+        </p:sp>
+        <p:sp>
+          <p:nvSpPr>
+            <p:cNvPr id="5" name="Rectangle 4">
+              <a:extLst>
+                <a:ext uri="{FF2B5EF4-FFF2-40B4-BE49-F238E27FC236}">
+                  <a16:creationId xmlns:a16="http://schemas.microsoft.com/office/drawing/2014/main" id="{D41DC3D8-6B18-B938-F6DA-7AACCD2512A5}"/>
+                </a:ext>
+              </a:extLst>
+            </p:cNvPr>
+            <p:cNvSpPr/>
+            <p:nvPr/>
+          </p:nvSpPr>
+          <p:spPr>
+            <a:xfrm>
+              <a:off x="3933117" y="2537937"/>
+              <a:ext cx="197403" cy="600915"/>
+            </a:xfrm>
+            <a:prstGeom prst="rect">
+              <a:avLst/>
+            </a:prstGeom>
+            <a:solidFill>
+              <a:schemeClr val="accent4">
+                <a:alpha val="58000"/>
+              </a:schemeClr>
+            </a:solidFill>
+            <a:ln>
+              <a:solidFill>
+                <a:schemeClr val="bg2">
+                  <a:lumMod val="50000"/>
+                </a:schemeClr>
+              </a:solidFill>
+            </a:ln>
+          </p:spPr>
+          <p:style>
+            <a:lnRef idx="2">
+              <a:schemeClr val="accent1">
+                <a:shade val="15000"/>
+              </a:schemeClr>
+            </a:lnRef>
+            <a:fillRef idx="1">
+              <a:schemeClr val="accent1"/>
+            </a:fillRef>
+            <a:effectRef idx="0">
+              <a:schemeClr val="accent1"/>
+            </a:effectRef>
+            <a:fontRef idx="minor">
+              <a:schemeClr val="lt1"/>
+            </a:fontRef>
+          </p:style>
+          <p:txBody>
+            <a:bodyPr rtlCol="0" anchor="ctr"/>
+            <a:lstStyle/>
+            <a:p>
+              <a:pPr algn="ctr"/>
+              <a:endParaRPr lang="en-US" dirty="0"/>
+            </a:p>
+          </p:txBody>
+        </p:sp>
+        <p:sp>
+          <p:nvSpPr>
+            <p:cNvPr id="6" name="Rectangle 5">
+              <a:extLst>
+                <a:ext uri="{FF2B5EF4-FFF2-40B4-BE49-F238E27FC236}">
+                  <a16:creationId xmlns:a16="http://schemas.microsoft.com/office/drawing/2014/main" id="{213F8196-0439-8F97-2D90-4868A8C14AA2}"/>
+                </a:ext>
+              </a:extLst>
+            </p:cNvPr>
+            <p:cNvSpPr/>
+            <p:nvPr/>
+          </p:nvSpPr>
+          <p:spPr>
+            <a:xfrm rot="16200000">
+              <a:off x="4414016" y="2567630"/>
+              <a:ext cx="75369" cy="557123"/>
+            </a:xfrm>
+            <a:prstGeom prst="rect">
+              <a:avLst/>
+            </a:prstGeom>
+            <a:solidFill>
+              <a:schemeClr val="accent4">
+                <a:alpha val="58000"/>
+              </a:schemeClr>
+            </a:solidFill>
+            <a:ln>
+              <a:solidFill>
+                <a:schemeClr val="bg2">
+                  <a:lumMod val="50000"/>
+                </a:schemeClr>
+              </a:solidFill>
+            </a:ln>
+          </p:spPr>
+          <p:style>
+            <a:lnRef idx="2">
+              <a:schemeClr val="accent1">
+                <a:shade val="15000"/>
+              </a:schemeClr>
+            </a:lnRef>
+            <a:fillRef idx="1">
+              <a:schemeClr val="accent1"/>
+            </a:fillRef>
+            <a:effectRef idx="0">
+              <a:schemeClr val="accent1"/>
+            </a:effectRef>
+            <a:fontRef idx="minor">
+              <a:schemeClr val="lt1"/>
+            </a:fontRef>
+          </p:style>
+          <p:txBody>
+            <a:bodyPr rtlCol="0" anchor="ctr"/>
+            <a:lstStyle/>
+            <a:p>
+              <a:pPr algn="ctr"/>
+              <a:endParaRPr lang="en-US" dirty="0"/>
+            </a:p>
+          </p:txBody>
+        </p:sp>
+        <p:cxnSp>
+          <p:nvCxnSpPr>
+            <p:cNvPr id="7" name="Straight Arrow Connector 6">
+              <a:extLst>
+                <a:ext uri="{FF2B5EF4-FFF2-40B4-BE49-F238E27FC236}">
+                  <a16:creationId xmlns:a16="http://schemas.microsoft.com/office/drawing/2014/main" id="{B3A6D2FF-2DEC-C6E9-6E86-3A584BF35F7A}"/>
+                </a:ext>
+              </a:extLst>
+            </p:cNvPr>
+            <p:cNvCxnSpPr>
+              <a:cxnSpLocks/>
+            </p:cNvCxnSpPr>
+            <p:nvPr/>
+          </p:nvCxnSpPr>
+          <p:spPr>
+            <a:xfrm>
+              <a:off x="2745265" y="2808507"/>
+              <a:ext cx="391112" cy="0"/>
+            </a:xfrm>
+            <a:prstGeom prst="straightConnector1">
+              <a:avLst/>
+            </a:prstGeom>
+            <a:ln>
+              <a:solidFill>
+                <a:schemeClr val="tx1"/>
+              </a:solidFill>
+              <a:tailEnd type="triangle"/>
+            </a:ln>
+          </p:spPr>
+          <p:style>
+            <a:lnRef idx="2">
+              <a:schemeClr val="accent1"/>
+            </a:lnRef>
+            <a:fillRef idx="0">
+              <a:schemeClr val="accent1"/>
+            </a:fillRef>
+            <a:effectRef idx="1">
+              <a:schemeClr val="accent1"/>
+            </a:effectRef>
+            <a:fontRef idx="minor">
+              <a:schemeClr val="tx1"/>
+            </a:fontRef>
+          </p:style>
+        </p:cxnSp>
+      </p:grpSp>
     </p:spTree>
     <p:extLst>
       <p:ext uri="{BB962C8B-B14F-4D97-AF65-F5344CB8AC3E}">

</xml_diff>

<commit_message>
misc changes slide deck
</commit_message>
<xml_diff>
--- a/Homework-aAlphaBio.pptx
+++ b/Homework-aAlphaBio.pptx
@@ -10,11 +10,11 @@
     <p:sldId id="325" r:id="rId4"/>
     <p:sldId id="328" r:id="rId5"/>
     <p:sldId id="333" r:id="rId6"/>
-    <p:sldId id="334" r:id="rId7"/>
-    <p:sldId id="257" r:id="rId8"/>
-    <p:sldId id="258" r:id="rId9"/>
-    <p:sldId id="335" r:id="rId10"/>
-    <p:sldId id="336" r:id="rId11"/>
+    <p:sldId id="336" r:id="rId7"/>
+    <p:sldId id="334" r:id="rId8"/>
+    <p:sldId id="257" r:id="rId9"/>
+    <p:sldId id="258" r:id="rId10"/>
+    <p:sldId id="335" r:id="rId11"/>
     <p:sldId id="337" r:id="rId12"/>
     <p:sldId id="330" r:id="rId13"/>
     <p:sldId id="329" r:id="rId14"/>
@@ -3447,10 +3447,365 @@
           <a:chExt cx="0" cy="0"/>
         </a:xfrm>
       </p:grpSpPr>
+      <p:grpSp>
+        <p:nvGrpSpPr>
+          <p:cNvPr id="8" name="Group 7">
+            <a:extLst>
+              <a:ext uri="{FF2B5EF4-FFF2-40B4-BE49-F238E27FC236}">
+                <a16:creationId xmlns:a16="http://schemas.microsoft.com/office/drawing/2014/main" id="{C0434CF7-A283-2E47-7026-4A512CD8547A}"/>
+              </a:ext>
+            </a:extLst>
+          </p:cNvPr>
+          <p:cNvGrpSpPr/>
+          <p:nvPr/>
+        </p:nvGrpSpPr>
+        <p:grpSpPr>
+          <a:xfrm>
+            <a:off x="2745265" y="1617784"/>
+            <a:ext cx="1984997" cy="2242039"/>
+            <a:chOff x="2745265" y="1617784"/>
+            <a:chExt cx="1984997" cy="2242039"/>
+          </a:xfrm>
+        </p:grpSpPr>
+        <p:sp>
+          <p:nvSpPr>
+            <p:cNvPr id="2" name="Rectangle 1">
+              <a:extLst>
+                <a:ext uri="{FF2B5EF4-FFF2-40B4-BE49-F238E27FC236}">
+                  <a16:creationId xmlns:a16="http://schemas.microsoft.com/office/drawing/2014/main" id="{C9EC799C-6315-6FBC-44EF-B3BA08648387}"/>
+                </a:ext>
+              </a:extLst>
+            </p:cNvPr>
+            <p:cNvSpPr/>
+            <p:nvPr/>
+          </p:nvSpPr>
+          <p:spPr>
+            <a:xfrm>
+              <a:off x="3209931" y="1617784"/>
+              <a:ext cx="197399" cy="2242039"/>
+            </a:xfrm>
+            <a:prstGeom prst="rect">
+              <a:avLst/>
+            </a:prstGeom>
+            <a:solidFill>
+              <a:schemeClr val="accent4">
+                <a:alpha val="58000"/>
+              </a:schemeClr>
+            </a:solidFill>
+            <a:ln>
+              <a:solidFill>
+                <a:schemeClr val="bg2">
+                  <a:lumMod val="50000"/>
+                </a:schemeClr>
+              </a:solidFill>
+            </a:ln>
+          </p:spPr>
+          <p:style>
+            <a:lnRef idx="2">
+              <a:schemeClr val="accent1">
+                <a:shade val="15000"/>
+              </a:schemeClr>
+            </a:lnRef>
+            <a:fillRef idx="1">
+              <a:schemeClr val="accent1"/>
+            </a:fillRef>
+            <a:effectRef idx="0">
+              <a:schemeClr val="accent1"/>
+            </a:effectRef>
+            <a:fontRef idx="minor">
+              <a:schemeClr val="lt1"/>
+            </a:fontRef>
+          </p:style>
+          <p:txBody>
+            <a:bodyPr rtlCol="0" anchor="ctr"/>
+            <a:lstStyle/>
+            <a:p>
+              <a:pPr algn="ctr"/>
+              <a:endParaRPr lang="en-US" dirty="0"/>
+            </a:p>
+          </p:txBody>
+        </p:sp>
+        <p:sp>
+          <p:nvSpPr>
+            <p:cNvPr id="3" name="Rectangle 2">
+              <a:extLst>
+                <a:ext uri="{FF2B5EF4-FFF2-40B4-BE49-F238E27FC236}">
+                  <a16:creationId xmlns:a16="http://schemas.microsoft.com/office/drawing/2014/main" id="{AB378311-44E7-5FD4-4420-3DEE1468F9D1}"/>
+                </a:ext>
+              </a:extLst>
+            </p:cNvPr>
+            <p:cNvSpPr/>
+            <p:nvPr/>
+          </p:nvSpPr>
+          <p:spPr>
+            <a:xfrm>
+              <a:off x="3453921" y="1922476"/>
+              <a:ext cx="197403" cy="1699955"/>
+            </a:xfrm>
+            <a:prstGeom prst="rect">
+              <a:avLst/>
+            </a:prstGeom>
+            <a:solidFill>
+              <a:schemeClr val="accent4">
+                <a:alpha val="58000"/>
+              </a:schemeClr>
+            </a:solidFill>
+            <a:ln>
+              <a:solidFill>
+                <a:schemeClr val="bg2">
+                  <a:lumMod val="50000"/>
+                </a:schemeClr>
+              </a:solidFill>
+            </a:ln>
+          </p:spPr>
+          <p:style>
+            <a:lnRef idx="2">
+              <a:schemeClr val="accent1">
+                <a:shade val="15000"/>
+              </a:schemeClr>
+            </a:lnRef>
+            <a:fillRef idx="1">
+              <a:schemeClr val="accent1"/>
+            </a:fillRef>
+            <a:effectRef idx="0">
+              <a:schemeClr val="accent1"/>
+            </a:effectRef>
+            <a:fontRef idx="minor">
+              <a:schemeClr val="lt1"/>
+            </a:fontRef>
+          </p:style>
+          <p:txBody>
+            <a:bodyPr rtlCol="0" anchor="ctr"/>
+            <a:lstStyle/>
+            <a:p>
+              <a:pPr algn="ctr"/>
+              <a:endParaRPr lang="en-US" dirty="0"/>
+            </a:p>
+          </p:txBody>
+        </p:sp>
+        <p:sp>
+          <p:nvSpPr>
+            <p:cNvPr id="4" name="Rectangle 3">
+              <a:extLst>
+                <a:ext uri="{FF2B5EF4-FFF2-40B4-BE49-F238E27FC236}">
+                  <a16:creationId xmlns:a16="http://schemas.microsoft.com/office/drawing/2014/main" id="{72785462-D7F0-1C23-6249-BBFEDB767315}"/>
+                </a:ext>
+              </a:extLst>
+            </p:cNvPr>
+            <p:cNvSpPr/>
+            <p:nvPr/>
+          </p:nvSpPr>
+          <p:spPr>
+            <a:xfrm>
+              <a:off x="3697915" y="2291753"/>
+              <a:ext cx="197403" cy="1137247"/>
+            </a:xfrm>
+            <a:prstGeom prst="rect">
+              <a:avLst/>
+            </a:prstGeom>
+            <a:solidFill>
+              <a:schemeClr val="accent4">
+                <a:alpha val="58000"/>
+              </a:schemeClr>
+            </a:solidFill>
+            <a:ln>
+              <a:solidFill>
+                <a:schemeClr val="bg2">
+                  <a:lumMod val="50000"/>
+                </a:schemeClr>
+              </a:solidFill>
+            </a:ln>
+          </p:spPr>
+          <p:style>
+            <a:lnRef idx="2">
+              <a:schemeClr val="accent1">
+                <a:shade val="15000"/>
+              </a:schemeClr>
+            </a:lnRef>
+            <a:fillRef idx="1">
+              <a:schemeClr val="accent1"/>
+            </a:fillRef>
+            <a:effectRef idx="0">
+              <a:schemeClr val="accent1"/>
+            </a:effectRef>
+            <a:fontRef idx="minor">
+              <a:schemeClr val="lt1"/>
+            </a:fontRef>
+          </p:style>
+          <p:txBody>
+            <a:bodyPr rtlCol="0" anchor="ctr"/>
+            <a:lstStyle/>
+            <a:p>
+              <a:pPr algn="ctr"/>
+              <a:endParaRPr lang="en-US" dirty="0"/>
+            </a:p>
+          </p:txBody>
+        </p:sp>
+        <p:sp>
+          <p:nvSpPr>
+            <p:cNvPr id="5" name="Rectangle 4">
+              <a:extLst>
+                <a:ext uri="{FF2B5EF4-FFF2-40B4-BE49-F238E27FC236}">
+                  <a16:creationId xmlns:a16="http://schemas.microsoft.com/office/drawing/2014/main" id="{D41DC3D8-6B18-B938-F6DA-7AACCD2512A5}"/>
+                </a:ext>
+              </a:extLst>
+            </p:cNvPr>
+            <p:cNvSpPr/>
+            <p:nvPr/>
+          </p:nvSpPr>
+          <p:spPr>
+            <a:xfrm>
+              <a:off x="3933117" y="2537937"/>
+              <a:ext cx="197403" cy="600915"/>
+            </a:xfrm>
+            <a:prstGeom prst="rect">
+              <a:avLst/>
+            </a:prstGeom>
+            <a:solidFill>
+              <a:schemeClr val="accent4">
+                <a:alpha val="58000"/>
+              </a:schemeClr>
+            </a:solidFill>
+            <a:ln>
+              <a:solidFill>
+                <a:schemeClr val="bg2">
+                  <a:lumMod val="50000"/>
+                </a:schemeClr>
+              </a:solidFill>
+            </a:ln>
+          </p:spPr>
+          <p:style>
+            <a:lnRef idx="2">
+              <a:schemeClr val="accent1">
+                <a:shade val="15000"/>
+              </a:schemeClr>
+            </a:lnRef>
+            <a:fillRef idx="1">
+              <a:schemeClr val="accent1"/>
+            </a:fillRef>
+            <a:effectRef idx="0">
+              <a:schemeClr val="accent1"/>
+            </a:effectRef>
+            <a:fontRef idx="minor">
+              <a:schemeClr val="lt1"/>
+            </a:fontRef>
+          </p:style>
+          <p:txBody>
+            <a:bodyPr rtlCol="0" anchor="ctr"/>
+            <a:lstStyle/>
+            <a:p>
+              <a:pPr algn="ctr"/>
+              <a:endParaRPr lang="en-US" dirty="0"/>
+            </a:p>
+          </p:txBody>
+        </p:sp>
+        <p:sp>
+          <p:nvSpPr>
+            <p:cNvPr id="6" name="Rectangle 5">
+              <a:extLst>
+                <a:ext uri="{FF2B5EF4-FFF2-40B4-BE49-F238E27FC236}">
+                  <a16:creationId xmlns:a16="http://schemas.microsoft.com/office/drawing/2014/main" id="{213F8196-0439-8F97-2D90-4868A8C14AA2}"/>
+                </a:ext>
+              </a:extLst>
+            </p:cNvPr>
+            <p:cNvSpPr/>
+            <p:nvPr/>
+          </p:nvSpPr>
+          <p:spPr>
+            <a:xfrm rot="16200000">
+              <a:off x="4414016" y="2567630"/>
+              <a:ext cx="75369" cy="557123"/>
+            </a:xfrm>
+            <a:prstGeom prst="rect">
+              <a:avLst/>
+            </a:prstGeom>
+            <a:solidFill>
+              <a:schemeClr val="accent4">
+                <a:alpha val="58000"/>
+              </a:schemeClr>
+            </a:solidFill>
+            <a:ln>
+              <a:solidFill>
+                <a:schemeClr val="bg2">
+                  <a:lumMod val="50000"/>
+                </a:schemeClr>
+              </a:solidFill>
+            </a:ln>
+          </p:spPr>
+          <p:style>
+            <a:lnRef idx="2">
+              <a:schemeClr val="accent1">
+                <a:shade val="15000"/>
+              </a:schemeClr>
+            </a:lnRef>
+            <a:fillRef idx="1">
+              <a:schemeClr val="accent1"/>
+            </a:fillRef>
+            <a:effectRef idx="0">
+              <a:schemeClr val="accent1"/>
+            </a:effectRef>
+            <a:fontRef idx="minor">
+              <a:schemeClr val="lt1"/>
+            </a:fontRef>
+          </p:style>
+          <p:txBody>
+            <a:bodyPr rtlCol="0" anchor="ctr"/>
+            <a:lstStyle/>
+            <a:p>
+              <a:pPr algn="ctr"/>
+              <a:endParaRPr lang="en-US" dirty="0"/>
+            </a:p>
+          </p:txBody>
+        </p:sp>
+        <p:cxnSp>
+          <p:nvCxnSpPr>
+            <p:cNvPr id="7" name="Straight Arrow Connector 6">
+              <a:extLst>
+                <a:ext uri="{FF2B5EF4-FFF2-40B4-BE49-F238E27FC236}">
+                  <a16:creationId xmlns:a16="http://schemas.microsoft.com/office/drawing/2014/main" id="{B3A6D2FF-2DEC-C6E9-6E86-3A584BF35F7A}"/>
+                </a:ext>
+              </a:extLst>
+            </p:cNvPr>
+            <p:cNvCxnSpPr>
+              <a:cxnSpLocks/>
+            </p:cNvCxnSpPr>
+            <p:nvPr/>
+          </p:nvCxnSpPr>
+          <p:spPr>
+            <a:xfrm>
+              <a:off x="2745265" y="2808507"/>
+              <a:ext cx="391112" cy="0"/>
+            </a:xfrm>
+            <a:prstGeom prst="straightConnector1">
+              <a:avLst/>
+            </a:prstGeom>
+            <a:ln>
+              <a:solidFill>
+                <a:schemeClr val="tx1"/>
+              </a:solidFill>
+              <a:tailEnd type="triangle"/>
+            </a:ln>
+          </p:spPr>
+          <p:style>
+            <a:lnRef idx="2">
+              <a:schemeClr val="accent1"/>
+            </a:lnRef>
+            <a:fillRef idx="0">
+              <a:schemeClr val="accent1"/>
+            </a:fillRef>
+            <a:effectRef idx="1">
+              <a:schemeClr val="accent1"/>
+            </a:effectRef>
+            <a:fontRef idx="minor">
+              <a:schemeClr val="tx1"/>
+            </a:fontRef>
+          </p:style>
+        </p:cxnSp>
+      </p:grpSp>
     </p:spTree>
     <p:extLst>
       <p:ext uri="{BB962C8B-B14F-4D97-AF65-F5344CB8AC3E}">
-        <p14:creationId xmlns:p14="http://schemas.microsoft.com/office/powerpoint/2010/main" val="658684484"/>
+        <p14:creationId xmlns:p14="http://schemas.microsoft.com/office/powerpoint/2010/main" val="1146156093"/>
       </p:ext>
     </p:extLst>
   </p:cSld>
@@ -19214,7 +19569,7 @@
         </p:nvSpPr>
         <p:spPr>
           <a:xfrm>
-            <a:off x="140127" y="221836"/>
+            <a:off x="0" y="42099"/>
             <a:ext cx="3165995" cy="461665"/>
           </a:xfrm>
           <a:prstGeom prst="rect">
@@ -19503,7 +19858,7 @@
         </p:blipFill>
         <p:spPr>
           <a:xfrm>
-            <a:off x="5167306" y="4159472"/>
+            <a:off x="6289551" y="3900819"/>
             <a:ext cx="3602098" cy="1152050"/>
           </a:xfrm>
           <a:prstGeom prst="rect">
@@ -19540,7 +19895,7 @@
         </p:blipFill>
         <p:spPr>
           <a:xfrm>
-            <a:off x="5167306" y="5482491"/>
+            <a:off x="6289551" y="5223838"/>
             <a:ext cx="3602098" cy="1287429"/>
           </a:xfrm>
           <a:prstGeom prst="rect">
@@ -19639,7 +19994,7 @@
         </p:nvSpPr>
         <p:spPr>
           <a:xfrm>
-            <a:off x="8769404" y="4550831"/>
+            <a:off x="9891649" y="4292178"/>
             <a:ext cx="2191626" cy="369332"/>
           </a:xfrm>
           <a:prstGeom prst="rect">
@@ -19674,7 +20029,7 @@
         </p:nvSpPr>
         <p:spPr>
           <a:xfrm>
-            <a:off x="8769404" y="5941539"/>
+            <a:off x="9891649" y="5682886"/>
             <a:ext cx="1614929" cy="369332"/>
           </a:xfrm>
           <a:prstGeom prst="rect">
@@ -19839,6 +20194,614 @@
 </file>
 
 <file path=ppt/slides/slide6.xml><?xml version="1.0" encoding="utf-8"?>
+<p:sld xmlns:a="http://schemas.openxmlformats.org/drawingml/2006/main" xmlns:r="http://schemas.openxmlformats.org/officeDocument/2006/relationships" xmlns:p="http://schemas.openxmlformats.org/presentationml/2006/main">
+  <p:cSld>
+    <p:spTree>
+      <p:nvGrpSpPr>
+        <p:cNvPr id="1" name=""/>
+        <p:cNvGrpSpPr/>
+        <p:nvPr/>
+      </p:nvGrpSpPr>
+      <p:grpSpPr>
+        <a:xfrm>
+          <a:off x="0" y="0"/>
+          <a:ext cx="0" cy="0"/>
+          <a:chOff x="0" y="0"/>
+          <a:chExt cx="0" cy="0"/>
+        </a:xfrm>
+      </p:grpSpPr>
+      <p:pic>
+        <p:nvPicPr>
+          <p:cNvPr id="2" name="Picture 1">
+            <a:extLst>
+              <a:ext uri="{FF2B5EF4-FFF2-40B4-BE49-F238E27FC236}">
+                <a16:creationId xmlns:a16="http://schemas.microsoft.com/office/drawing/2014/main" id="{13D72AEF-BCEE-0137-2692-6CE2806A8BD0}"/>
+              </a:ext>
+            </a:extLst>
+          </p:cNvPr>
+          <p:cNvPicPr>
+            <a:picLocks noChangeAspect="1"/>
+          </p:cNvPicPr>
+          <p:nvPr/>
+        </p:nvPicPr>
+        <p:blipFill>
+          <a:blip r:embed="rId2"/>
+          <a:stretch>
+            <a:fillRect/>
+          </a:stretch>
+        </p:blipFill>
+        <p:spPr>
+          <a:xfrm>
+            <a:off x="1389780" y="3615546"/>
+            <a:ext cx="2651352" cy="2638605"/>
+          </a:xfrm>
+          <a:prstGeom prst="rect">
+            <a:avLst/>
+          </a:prstGeom>
+        </p:spPr>
+      </p:pic>
+      <p:sp>
+        <p:nvSpPr>
+          <p:cNvPr id="3" name="TextBox 2">
+            <a:extLst>
+              <a:ext uri="{FF2B5EF4-FFF2-40B4-BE49-F238E27FC236}">
+                <a16:creationId xmlns:a16="http://schemas.microsoft.com/office/drawing/2014/main" id="{E9FDD25F-6501-8CA5-89EF-C711D6688400}"/>
+              </a:ext>
+            </a:extLst>
+          </p:cNvPr>
+          <p:cNvSpPr txBox="1"/>
+          <p:nvPr/>
+        </p:nvSpPr>
+        <p:spPr>
+          <a:xfrm>
+            <a:off x="1389781" y="992038"/>
+            <a:ext cx="5728491" cy="369332"/>
+          </a:xfrm>
+          <a:prstGeom prst="rect">
+            <a:avLst/>
+          </a:prstGeom>
+          <a:noFill/>
+        </p:spPr>
+        <p:txBody>
+          <a:bodyPr wrap="none" rtlCol="0">
+            <a:spAutoFit/>
+          </a:bodyPr>
+          <a:lstStyle/>
+          <a:p>
+            <a:r>
+              <a:rPr lang="en-US" dirty="0"/>
+              <a:t>aa sequence: </a:t>
+            </a:r>
+            <a:r>
+              <a:rPr lang="en-US" b="0" i="0" dirty="0">
+                <a:effectLst/>
+              </a:rPr>
+              <a:t> ['CLS', 'Q', 'V', 'Q', 'L', 'V', ‘Q, …, ‘PAD’, ‘PAD’]</a:t>
+            </a:r>
+            <a:endParaRPr lang="en-US" dirty="0"/>
+          </a:p>
+        </p:txBody>
+      </p:sp>
+      <p:sp>
+        <p:nvSpPr>
+          <p:cNvPr id="5" name="TextBox 4">
+            <a:extLst>
+              <a:ext uri="{FF2B5EF4-FFF2-40B4-BE49-F238E27FC236}">
+                <a16:creationId xmlns:a16="http://schemas.microsoft.com/office/drawing/2014/main" id="{155D5DCD-DEEC-39C6-6802-35236D434F1B}"/>
+              </a:ext>
+            </a:extLst>
+          </p:cNvPr>
+          <p:cNvSpPr txBox="1"/>
+          <p:nvPr/>
+        </p:nvSpPr>
+        <p:spPr>
+          <a:xfrm>
+            <a:off x="1389781" y="1683491"/>
+            <a:ext cx="4653838" cy="369332"/>
+          </a:xfrm>
+          <a:prstGeom prst="rect">
+            <a:avLst/>
+          </a:prstGeom>
+          <a:noFill/>
+        </p:spPr>
+        <p:txBody>
+          <a:bodyPr wrap="none" rtlCol="0">
+            <a:spAutoFit/>
+          </a:bodyPr>
+          <a:lstStyle/>
+          <a:p>
+            <a:r>
+              <a:rPr lang="en-US" dirty="0"/>
+              <a:t>encoded: </a:t>
+            </a:r>
+            <a:r>
+              <a:rPr lang="en-US" b="0" i="0" dirty="0">
+                <a:effectLst/>
+              </a:rPr>
+              <a:t>[ 0, 14, 18, 14, 10, 18, 14, …, 23, 23]</a:t>
+            </a:r>
+            <a:endParaRPr lang="en-US" dirty="0"/>
+          </a:p>
+        </p:txBody>
+      </p:sp>
+      <p:sp>
+        <p:nvSpPr>
+          <p:cNvPr id="6" name="TextBox 5">
+            <a:extLst>
+              <a:ext uri="{FF2B5EF4-FFF2-40B4-BE49-F238E27FC236}">
+                <a16:creationId xmlns:a16="http://schemas.microsoft.com/office/drawing/2014/main" id="{0FBB4CDD-25CA-0CF2-05D8-0166E2F0CA55}"/>
+              </a:ext>
+            </a:extLst>
+          </p:cNvPr>
+          <p:cNvSpPr txBox="1"/>
+          <p:nvPr/>
+        </p:nvSpPr>
+        <p:spPr>
+          <a:xfrm>
+            <a:off x="1389781" y="2374219"/>
+            <a:ext cx="8807924" cy="369332"/>
+          </a:xfrm>
+          <a:prstGeom prst="rect">
+            <a:avLst/>
+          </a:prstGeom>
+          <a:noFill/>
+        </p:spPr>
+        <p:txBody>
+          <a:bodyPr wrap="none" rtlCol="0">
+            <a:spAutoFit/>
+          </a:bodyPr>
+          <a:lstStyle/>
+          <a:p>
+            <a:r>
+              <a:rPr lang="en-US" b="0" i="0" dirty="0">
+                <a:effectLst/>
+              </a:rPr>
+              <a:t>binary: [000000000000110100010010000011010000010000…]    (using 8-bits per token)</a:t>
+            </a:r>
+            <a:endParaRPr lang="en-US" dirty="0"/>
+          </a:p>
+        </p:txBody>
+      </p:sp>
+      <p:sp>
+        <p:nvSpPr>
+          <p:cNvPr id="7" name="TextBox 6">
+            <a:extLst>
+              <a:ext uri="{FF2B5EF4-FFF2-40B4-BE49-F238E27FC236}">
+                <a16:creationId xmlns:a16="http://schemas.microsoft.com/office/drawing/2014/main" id="{B46F76B6-E938-FE65-CE90-2F5BDE5886EB}"/>
+              </a:ext>
+            </a:extLst>
+          </p:cNvPr>
+          <p:cNvSpPr txBox="1"/>
+          <p:nvPr/>
+        </p:nvSpPr>
+        <p:spPr>
+          <a:xfrm>
+            <a:off x="148753" y="101886"/>
+            <a:ext cx="6100453" cy="461665"/>
+          </a:xfrm>
+          <a:prstGeom prst="rect">
+            <a:avLst/>
+          </a:prstGeom>
+          <a:noFill/>
+        </p:spPr>
+        <p:txBody>
+          <a:bodyPr wrap="none" rtlCol="0">
+            <a:spAutoFit/>
+          </a:bodyPr>
+          <a:lstStyle/>
+          <a:p>
+            <a:r>
+              <a:rPr lang="en-US" sz="2400" dirty="0"/>
+              <a:t>Treat the </a:t>
+            </a:r>
+            <a:r>
+              <a:rPr lang="en-US" sz="2400" dirty="0" err="1"/>
+              <a:t>scFv</a:t>
+            </a:r>
+            <a:r>
+              <a:rPr lang="en-US" sz="2400" dirty="0"/>
+              <a:t> aa sequences as a B&amp;W image</a:t>
+            </a:r>
+          </a:p>
+        </p:txBody>
+      </p:sp>
+      <p:cxnSp>
+        <p:nvCxnSpPr>
+          <p:cNvPr id="9" name="Curved Connector 8">
+            <a:extLst>
+              <a:ext uri="{FF2B5EF4-FFF2-40B4-BE49-F238E27FC236}">
+                <a16:creationId xmlns:a16="http://schemas.microsoft.com/office/drawing/2014/main" id="{82820658-53FA-DD3B-39DC-7302B329DA04}"/>
+              </a:ext>
+            </a:extLst>
+          </p:cNvPr>
+          <p:cNvCxnSpPr>
+            <a:cxnSpLocks/>
+            <a:stCxn id="3" idx="1"/>
+            <a:endCxn id="5" idx="1"/>
+          </p:cNvCxnSpPr>
+          <p:nvPr/>
+        </p:nvCxnSpPr>
+        <p:spPr>
+          <a:xfrm rot="10800000" flipV="1">
+            <a:off x="1389781" y="1176703"/>
+            <a:ext cx="12700" cy="691453"/>
+          </a:xfrm>
+          <a:prstGeom prst="curvedConnector3">
+            <a:avLst>
+              <a:gd name="adj1" fmla="val 1800000"/>
+            </a:avLst>
+          </a:prstGeom>
+          <a:ln>
+            <a:tailEnd type="triangle" w="lg" len="lg"/>
+          </a:ln>
+        </p:spPr>
+        <p:style>
+          <a:lnRef idx="2">
+            <a:schemeClr val="accent1"/>
+          </a:lnRef>
+          <a:fillRef idx="0">
+            <a:schemeClr val="accent1"/>
+          </a:fillRef>
+          <a:effectRef idx="1">
+            <a:schemeClr val="accent1"/>
+          </a:effectRef>
+          <a:fontRef idx="minor">
+            <a:schemeClr val="tx1"/>
+          </a:fontRef>
+        </p:style>
+      </p:cxnSp>
+      <p:cxnSp>
+        <p:nvCxnSpPr>
+          <p:cNvPr id="11" name="Curved Connector 10">
+            <a:extLst>
+              <a:ext uri="{FF2B5EF4-FFF2-40B4-BE49-F238E27FC236}">
+                <a16:creationId xmlns:a16="http://schemas.microsoft.com/office/drawing/2014/main" id="{75342AFA-FBFA-F9AD-8AC3-B9BAB0848A16}"/>
+              </a:ext>
+            </a:extLst>
+          </p:cNvPr>
+          <p:cNvCxnSpPr>
+            <a:cxnSpLocks/>
+            <a:stCxn id="5" idx="1"/>
+            <a:endCxn id="6" idx="1"/>
+          </p:cNvCxnSpPr>
+          <p:nvPr/>
+        </p:nvCxnSpPr>
+        <p:spPr>
+          <a:xfrm rot="10800000" flipV="1">
+            <a:off x="1389781" y="1868157"/>
+            <a:ext cx="12700" cy="690728"/>
+          </a:xfrm>
+          <a:prstGeom prst="curvedConnector3">
+            <a:avLst>
+              <a:gd name="adj1" fmla="val 1800000"/>
+            </a:avLst>
+          </a:prstGeom>
+          <a:ln>
+            <a:tailEnd type="triangle" w="lg" len="lg"/>
+          </a:ln>
+        </p:spPr>
+        <p:style>
+          <a:lnRef idx="2">
+            <a:schemeClr val="accent1"/>
+          </a:lnRef>
+          <a:fillRef idx="0">
+            <a:schemeClr val="accent1"/>
+          </a:fillRef>
+          <a:effectRef idx="1">
+            <a:schemeClr val="accent1"/>
+          </a:effectRef>
+          <a:fontRef idx="minor">
+            <a:schemeClr val="tx1"/>
+          </a:fontRef>
+        </p:style>
+      </p:cxnSp>
+      <p:sp>
+        <p:nvSpPr>
+          <p:cNvPr id="15" name="TextBox 14">
+            <a:extLst>
+              <a:ext uri="{FF2B5EF4-FFF2-40B4-BE49-F238E27FC236}">
+                <a16:creationId xmlns:a16="http://schemas.microsoft.com/office/drawing/2014/main" id="{49C96ADA-8EDD-82DB-6425-07FC116B3FCD}"/>
+              </a:ext>
+            </a:extLst>
+          </p:cNvPr>
+          <p:cNvSpPr txBox="1"/>
+          <p:nvPr/>
+        </p:nvSpPr>
+        <p:spPr>
+          <a:xfrm>
+            <a:off x="7737231" y="981985"/>
+            <a:ext cx="2356479" cy="369332"/>
+          </a:xfrm>
+          <a:prstGeom prst="rect">
+            <a:avLst/>
+          </a:prstGeom>
+          <a:noFill/>
+        </p:spPr>
+        <p:txBody>
+          <a:bodyPr wrap="none" rtlCol="0">
+            <a:spAutoFit/>
+          </a:bodyPr>
+          <a:lstStyle/>
+          <a:p>
+            <a:r>
+              <a:rPr lang="en-US" dirty="0"/>
+              <a:t>(use </a:t>
+            </a:r>
+            <a:r>
+              <a:rPr lang="en-US" dirty="0" err="1"/>
+              <a:t>block_size</a:t>
+            </a:r>
+            <a:r>
+              <a:rPr lang="en-US" dirty="0"/>
+              <a:t> = 265)</a:t>
+            </a:r>
+          </a:p>
+        </p:txBody>
+      </p:sp>
+      <p:cxnSp>
+        <p:nvCxnSpPr>
+          <p:cNvPr id="20" name="Straight Arrow Connector 19">
+            <a:extLst>
+              <a:ext uri="{FF2B5EF4-FFF2-40B4-BE49-F238E27FC236}">
+                <a16:creationId xmlns:a16="http://schemas.microsoft.com/office/drawing/2014/main" id="{33F2553E-D858-87E9-D35A-54F54488FDCF}"/>
+              </a:ext>
+            </a:extLst>
+          </p:cNvPr>
+          <p:cNvCxnSpPr>
+            <a:cxnSpLocks/>
+            <a:endCxn id="2" idx="0"/>
+          </p:cNvCxnSpPr>
+          <p:nvPr/>
+        </p:nvCxnSpPr>
+        <p:spPr>
+          <a:xfrm>
+            <a:off x="2715456" y="2811916"/>
+            <a:ext cx="0" cy="803630"/>
+          </a:xfrm>
+          <a:prstGeom prst="straightConnector1">
+            <a:avLst/>
+          </a:prstGeom>
+          <a:ln>
+            <a:tailEnd type="triangle"/>
+          </a:ln>
+        </p:spPr>
+        <p:style>
+          <a:lnRef idx="2">
+            <a:schemeClr val="accent1"/>
+          </a:lnRef>
+          <a:fillRef idx="0">
+            <a:schemeClr val="accent1"/>
+          </a:fillRef>
+          <a:effectRef idx="1">
+            <a:schemeClr val="accent1"/>
+          </a:effectRef>
+          <a:fontRef idx="minor">
+            <a:schemeClr val="tx1"/>
+          </a:fontRef>
+        </p:style>
+      </p:cxnSp>
+      <p:sp>
+        <p:nvSpPr>
+          <p:cNvPr id="24" name="TextBox 23">
+            <a:extLst>
+              <a:ext uri="{FF2B5EF4-FFF2-40B4-BE49-F238E27FC236}">
+                <a16:creationId xmlns:a16="http://schemas.microsoft.com/office/drawing/2014/main" id="{B26A3E11-8473-4A37-4C69-7B241757DAF2}"/>
+              </a:ext>
+            </a:extLst>
+          </p:cNvPr>
+          <p:cNvSpPr txBox="1"/>
+          <p:nvPr/>
+        </p:nvSpPr>
+        <p:spPr>
+          <a:xfrm>
+            <a:off x="2759635" y="3011480"/>
+            <a:ext cx="5017527" cy="369332"/>
+          </a:xfrm>
+          <a:prstGeom prst="rect">
+            <a:avLst/>
+          </a:prstGeom>
+          <a:noFill/>
+        </p:spPr>
+        <p:txBody>
+          <a:bodyPr wrap="none" rtlCol="0">
+            <a:spAutoFit/>
+          </a:bodyPr>
+          <a:lstStyle/>
+          <a:p>
+            <a:r>
+              <a:rPr lang="en-US" dirty="0"/>
+              <a:t>reshape: (1,46,46) </a:t>
+            </a:r>
+            <a:r>
+              <a:rPr lang="en-US" sz="1400" dirty="0"/>
+              <a:t>(first, trim off trailing 4 bits from above)</a:t>
+            </a:r>
+          </a:p>
+        </p:txBody>
+      </p:sp>
+      <p:sp>
+        <p:nvSpPr>
+          <p:cNvPr id="25" name="TextBox 24">
+            <a:extLst>
+              <a:ext uri="{FF2B5EF4-FFF2-40B4-BE49-F238E27FC236}">
+                <a16:creationId xmlns:a16="http://schemas.microsoft.com/office/drawing/2014/main" id="{8A84EC52-354B-6026-AE1F-4CC252F95C53}"/>
+              </a:ext>
+            </a:extLst>
+          </p:cNvPr>
+          <p:cNvSpPr txBox="1"/>
+          <p:nvPr/>
+        </p:nvSpPr>
+        <p:spPr>
+          <a:xfrm>
+            <a:off x="7118272" y="5495565"/>
+            <a:ext cx="4779706" cy="1169551"/>
+          </a:xfrm>
+          <a:prstGeom prst="rect">
+            <a:avLst/>
+          </a:prstGeom>
+          <a:noFill/>
+        </p:spPr>
+        <p:txBody>
+          <a:bodyPr wrap="none" rtlCol="0">
+            <a:spAutoFit/>
+          </a:bodyPr>
+          <a:lstStyle/>
+          <a:p>
+            <a:r>
+              <a:rPr lang="en-US" sz="1400" dirty="0"/>
+              <a:t>stretch goals? </a:t>
+            </a:r>
+          </a:p>
+          <a:p>
+            <a:pPr marL="285750" indent="-285750">
+              <a:buFont typeface="Arial" panose="020B0604020202020204" pitchFamily="34" charset="0"/>
+              <a:buChar char="•"/>
+            </a:pPr>
+            <a:r>
+              <a:rPr lang="en-US" sz="1400" dirty="0"/>
+              <a:t>add some inductive bias:</a:t>
+            </a:r>
+          </a:p>
+          <a:p>
+            <a:pPr marL="742950" lvl="1" indent="-285750">
+              <a:buFont typeface="Arial" panose="020B0604020202020204" pitchFamily="34" charset="0"/>
+              <a:buChar char="•"/>
+            </a:pPr>
+            <a:r>
+              <a:rPr lang="en-US" sz="1400" dirty="0"/>
+              <a:t>add 2</a:t>
+            </a:r>
+            <a:r>
+              <a:rPr lang="en-US" sz="1400" baseline="30000" dirty="0"/>
+              <a:t>nd</a:t>
+            </a:r>
+            <a:r>
+              <a:rPr lang="en-US" sz="1400" dirty="0"/>
+              <a:t> channel for variability in aa sequence</a:t>
+            </a:r>
+          </a:p>
+          <a:p>
+            <a:pPr marL="742950" lvl="1" indent="-285750">
+              <a:buFont typeface="Arial" panose="020B0604020202020204" pitchFamily="34" charset="0"/>
+              <a:buChar char="•"/>
+            </a:pPr>
+            <a:r>
+              <a:rPr lang="en-US" sz="1400" dirty="0"/>
+              <a:t>add 3</a:t>
+            </a:r>
+            <a:r>
+              <a:rPr lang="en-US" sz="1400" baseline="30000" dirty="0"/>
+              <a:t>rd</a:t>
+            </a:r>
+            <a:r>
+              <a:rPr lang="en-US" sz="1400" dirty="0"/>
+              <a:t> channel for aa groups (polar, </a:t>
+            </a:r>
+            <a:r>
+              <a:rPr lang="en-US" sz="1400" dirty="0" err="1"/>
+              <a:t>hyrdophobic</a:t>
+            </a:r>
+            <a:r>
+              <a:rPr lang="en-US" sz="1400" dirty="0"/>
+              <a:t>)</a:t>
+            </a:r>
+          </a:p>
+          <a:p>
+            <a:pPr marL="285750" indent="-285750">
+              <a:buFont typeface="Arial" panose="020B0604020202020204" pitchFamily="34" charset="0"/>
+              <a:buChar char="•"/>
+            </a:pPr>
+            <a:r>
+              <a:rPr lang="en-US" sz="1400" dirty="0"/>
+              <a:t>Try vision-transformer on these images?</a:t>
+            </a:r>
+          </a:p>
+        </p:txBody>
+      </p:sp>
+      <p:sp>
+        <p:nvSpPr>
+          <p:cNvPr id="26" name="TextBox 25">
+            <a:extLst>
+              <a:ext uri="{FF2B5EF4-FFF2-40B4-BE49-F238E27FC236}">
+                <a16:creationId xmlns:a16="http://schemas.microsoft.com/office/drawing/2014/main" id="{6C423AA7-8846-61D8-5D84-61D9DFC52729}"/>
+              </a:ext>
+            </a:extLst>
+          </p:cNvPr>
+          <p:cNvSpPr txBox="1"/>
+          <p:nvPr/>
+        </p:nvSpPr>
+        <p:spPr>
+          <a:xfrm>
+            <a:off x="4114800" y="4114450"/>
+            <a:ext cx="4105676" cy="369332"/>
+          </a:xfrm>
+          <a:prstGeom prst="rect">
+            <a:avLst/>
+          </a:prstGeom>
+          <a:noFill/>
+        </p:spPr>
+        <p:txBody>
+          <a:bodyPr wrap="none" rtlCol="0">
+            <a:spAutoFit/>
+          </a:bodyPr>
+          <a:lstStyle/>
+          <a:p>
+            <a:r>
+              <a:rPr lang="en-US" dirty="0"/>
+              <a:t>CNN regression model on these images</a:t>
+            </a:r>
+          </a:p>
+        </p:txBody>
+      </p:sp>
+      <p:sp>
+        <p:nvSpPr>
+          <p:cNvPr id="27" name="TextBox 26">
+            <a:extLst>
+              <a:ext uri="{FF2B5EF4-FFF2-40B4-BE49-F238E27FC236}">
+                <a16:creationId xmlns:a16="http://schemas.microsoft.com/office/drawing/2014/main" id="{6A7A9A3B-870D-C756-01C3-8F6EAA0F260B}"/>
+              </a:ext>
+            </a:extLst>
+          </p:cNvPr>
+          <p:cNvSpPr txBox="1"/>
+          <p:nvPr/>
+        </p:nvSpPr>
+        <p:spPr>
+          <a:xfrm>
+            <a:off x="4114800" y="4483782"/>
+            <a:ext cx="7480574" cy="307777"/>
+          </a:xfrm>
+          <a:prstGeom prst="rect">
+            <a:avLst/>
+          </a:prstGeom>
+          <a:noFill/>
+        </p:spPr>
+        <p:txBody>
+          <a:bodyPr wrap="none" rtlCol="0">
+            <a:spAutoFit/>
+          </a:bodyPr>
+          <a:lstStyle/>
+          <a:p>
+            <a:r>
+              <a:rPr lang="en-US" sz="1400" dirty="0"/>
+              <a:t>(since any two images differs by at most a few bits, this is a bit of a needle-in-haystack problem)</a:t>
+            </a:r>
+          </a:p>
+        </p:txBody>
+      </p:sp>
+    </p:spTree>
+    <p:extLst>
+      <p:ext uri="{BB962C8B-B14F-4D97-AF65-F5344CB8AC3E}">
+        <p14:creationId xmlns:p14="http://schemas.microsoft.com/office/powerpoint/2010/main" val="658684484"/>
+      </p:ext>
+    </p:extLst>
+  </p:cSld>
+  <p:clrMapOvr>
+    <a:masterClrMapping/>
+  </p:clrMapOvr>
+</p:sld>
+</file>
+
+<file path=ppt/slides/slide7.xml><?xml version="1.0" encoding="utf-8"?>
 <p:sld xmlns:a="http://schemas.openxmlformats.org/drawingml/2006/main" xmlns:r="http://schemas.openxmlformats.org/officeDocument/2006/relationships" xmlns:p="http://schemas.openxmlformats.org/presentationml/2006/main">
   <p:cSld>
     <p:spTree>
@@ -20606,7 +21569,7 @@
 </p:sld>
 </file>
 
-<file path=ppt/slides/slide7.xml><?xml version="1.0" encoding="utf-8"?>
+<file path=ppt/slides/slide8.xml><?xml version="1.0" encoding="utf-8"?>
 <p:sld xmlns:a="http://schemas.openxmlformats.org/drawingml/2006/main" xmlns:r="http://schemas.openxmlformats.org/officeDocument/2006/relationships" xmlns:p="http://schemas.openxmlformats.org/presentationml/2006/main">
   <p:cSld>
     <p:spTree>
@@ -21009,7 +21972,7 @@
 </p:sld>
 </file>
 
-<file path=ppt/slides/slide8.xml><?xml version="1.0" encoding="utf-8"?>
+<file path=ppt/slides/slide9.xml><?xml version="1.0" encoding="utf-8"?>
 <p:sld xmlns:a="http://schemas.openxmlformats.org/drawingml/2006/main" xmlns:r="http://schemas.openxmlformats.org/officeDocument/2006/relationships" xmlns:p="http://schemas.openxmlformats.org/presentationml/2006/main">
   <p:cSld>
     <p:spTree>
@@ -21388,391 +22351,6 @@
     <p:extLst>
       <p:ext uri="{BB962C8B-B14F-4D97-AF65-F5344CB8AC3E}">
         <p14:creationId xmlns:p14="http://schemas.microsoft.com/office/powerpoint/2010/main" val="3339313360"/>
-      </p:ext>
-    </p:extLst>
-  </p:cSld>
-  <p:clrMapOvr>
-    <a:masterClrMapping/>
-  </p:clrMapOvr>
-</p:sld>
-</file>
-
-<file path=ppt/slides/slide9.xml><?xml version="1.0" encoding="utf-8"?>
-<p:sld xmlns:a="http://schemas.openxmlformats.org/drawingml/2006/main" xmlns:r="http://schemas.openxmlformats.org/officeDocument/2006/relationships" xmlns:p="http://schemas.openxmlformats.org/presentationml/2006/main">
-  <p:cSld>
-    <p:spTree>
-      <p:nvGrpSpPr>
-        <p:cNvPr id="1" name=""/>
-        <p:cNvGrpSpPr/>
-        <p:nvPr/>
-      </p:nvGrpSpPr>
-      <p:grpSpPr>
-        <a:xfrm>
-          <a:off x="0" y="0"/>
-          <a:ext cx="0" cy="0"/>
-          <a:chOff x="0" y="0"/>
-          <a:chExt cx="0" cy="0"/>
-        </a:xfrm>
-      </p:grpSpPr>
-      <p:grpSp>
-        <p:nvGrpSpPr>
-          <p:cNvPr id="8" name="Group 7">
-            <a:extLst>
-              <a:ext uri="{FF2B5EF4-FFF2-40B4-BE49-F238E27FC236}">
-                <a16:creationId xmlns:a16="http://schemas.microsoft.com/office/drawing/2014/main" id="{C0434CF7-A283-2E47-7026-4A512CD8547A}"/>
-              </a:ext>
-            </a:extLst>
-          </p:cNvPr>
-          <p:cNvGrpSpPr/>
-          <p:nvPr/>
-        </p:nvGrpSpPr>
-        <p:grpSpPr>
-          <a:xfrm>
-            <a:off x="2745265" y="1617784"/>
-            <a:ext cx="1984997" cy="2242039"/>
-            <a:chOff x="2745265" y="1617784"/>
-            <a:chExt cx="1984997" cy="2242039"/>
-          </a:xfrm>
-        </p:grpSpPr>
-        <p:sp>
-          <p:nvSpPr>
-            <p:cNvPr id="2" name="Rectangle 1">
-              <a:extLst>
-                <a:ext uri="{FF2B5EF4-FFF2-40B4-BE49-F238E27FC236}">
-                  <a16:creationId xmlns:a16="http://schemas.microsoft.com/office/drawing/2014/main" id="{C9EC799C-6315-6FBC-44EF-B3BA08648387}"/>
-                </a:ext>
-              </a:extLst>
-            </p:cNvPr>
-            <p:cNvSpPr/>
-            <p:nvPr/>
-          </p:nvSpPr>
-          <p:spPr>
-            <a:xfrm>
-              <a:off x="3209931" y="1617784"/>
-              <a:ext cx="197399" cy="2242039"/>
-            </a:xfrm>
-            <a:prstGeom prst="rect">
-              <a:avLst/>
-            </a:prstGeom>
-            <a:solidFill>
-              <a:schemeClr val="accent4">
-                <a:alpha val="58000"/>
-              </a:schemeClr>
-            </a:solidFill>
-            <a:ln>
-              <a:solidFill>
-                <a:schemeClr val="bg2">
-                  <a:lumMod val="50000"/>
-                </a:schemeClr>
-              </a:solidFill>
-            </a:ln>
-          </p:spPr>
-          <p:style>
-            <a:lnRef idx="2">
-              <a:schemeClr val="accent1">
-                <a:shade val="15000"/>
-              </a:schemeClr>
-            </a:lnRef>
-            <a:fillRef idx="1">
-              <a:schemeClr val="accent1"/>
-            </a:fillRef>
-            <a:effectRef idx="0">
-              <a:schemeClr val="accent1"/>
-            </a:effectRef>
-            <a:fontRef idx="minor">
-              <a:schemeClr val="lt1"/>
-            </a:fontRef>
-          </p:style>
-          <p:txBody>
-            <a:bodyPr rtlCol="0" anchor="ctr"/>
-            <a:lstStyle/>
-            <a:p>
-              <a:pPr algn="ctr"/>
-              <a:endParaRPr lang="en-US" dirty="0"/>
-            </a:p>
-          </p:txBody>
-        </p:sp>
-        <p:sp>
-          <p:nvSpPr>
-            <p:cNvPr id="3" name="Rectangle 2">
-              <a:extLst>
-                <a:ext uri="{FF2B5EF4-FFF2-40B4-BE49-F238E27FC236}">
-                  <a16:creationId xmlns:a16="http://schemas.microsoft.com/office/drawing/2014/main" id="{AB378311-44E7-5FD4-4420-3DEE1468F9D1}"/>
-                </a:ext>
-              </a:extLst>
-            </p:cNvPr>
-            <p:cNvSpPr/>
-            <p:nvPr/>
-          </p:nvSpPr>
-          <p:spPr>
-            <a:xfrm>
-              <a:off x="3453921" y="1922476"/>
-              <a:ext cx="197403" cy="1699955"/>
-            </a:xfrm>
-            <a:prstGeom prst="rect">
-              <a:avLst/>
-            </a:prstGeom>
-            <a:solidFill>
-              <a:schemeClr val="accent4">
-                <a:alpha val="58000"/>
-              </a:schemeClr>
-            </a:solidFill>
-            <a:ln>
-              <a:solidFill>
-                <a:schemeClr val="bg2">
-                  <a:lumMod val="50000"/>
-                </a:schemeClr>
-              </a:solidFill>
-            </a:ln>
-          </p:spPr>
-          <p:style>
-            <a:lnRef idx="2">
-              <a:schemeClr val="accent1">
-                <a:shade val="15000"/>
-              </a:schemeClr>
-            </a:lnRef>
-            <a:fillRef idx="1">
-              <a:schemeClr val="accent1"/>
-            </a:fillRef>
-            <a:effectRef idx="0">
-              <a:schemeClr val="accent1"/>
-            </a:effectRef>
-            <a:fontRef idx="minor">
-              <a:schemeClr val="lt1"/>
-            </a:fontRef>
-          </p:style>
-          <p:txBody>
-            <a:bodyPr rtlCol="0" anchor="ctr"/>
-            <a:lstStyle/>
-            <a:p>
-              <a:pPr algn="ctr"/>
-              <a:endParaRPr lang="en-US" dirty="0"/>
-            </a:p>
-          </p:txBody>
-        </p:sp>
-        <p:sp>
-          <p:nvSpPr>
-            <p:cNvPr id="4" name="Rectangle 3">
-              <a:extLst>
-                <a:ext uri="{FF2B5EF4-FFF2-40B4-BE49-F238E27FC236}">
-                  <a16:creationId xmlns:a16="http://schemas.microsoft.com/office/drawing/2014/main" id="{72785462-D7F0-1C23-6249-BBFEDB767315}"/>
-                </a:ext>
-              </a:extLst>
-            </p:cNvPr>
-            <p:cNvSpPr/>
-            <p:nvPr/>
-          </p:nvSpPr>
-          <p:spPr>
-            <a:xfrm>
-              <a:off x="3697915" y="2291753"/>
-              <a:ext cx="197403" cy="1137247"/>
-            </a:xfrm>
-            <a:prstGeom prst="rect">
-              <a:avLst/>
-            </a:prstGeom>
-            <a:solidFill>
-              <a:schemeClr val="accent4">
-                <a:alpha val="58000"/>
-              </a:schemeClr>
-            </a:solidFill>
-            <a:ln>
-              <a:solidFill>
-                <a:schemeClr val="bg2">
-                  <a:lumMod val="50000"/>
-                </a:schemeClr>
-              </a:solidFill>
-            </a:ln>
-          </p:spPr>
-          <p:style>
-            <a:lnRef idx="2">
-              <a:schemeClr val="accent1">
-                <a:shade val="15000"/>
-              </a:schemeClr>
-            </a:lnRef>
-            <a:fillRef idx="1">
-              <a:schemeClr val="accent1"/>
-            </a:fillRef>
-            <a:effectRef idx="0">
-              <a:schemeClr val="accent1"/>
-            </a:effectRef>
-            <a:fontRef idx="minor">
-              <a:schemeClr val="lt1"/>
-            </a:fontRef>
-          </p:style>
-          <p:txBody>
-            <a:bodyPr rtlCol="0" anchor="ctr"/>
-            <a:lstStyle/>
-            <a:p>
-              <a:pPr algn="ctr"/>
-              <a:endParaRPr lang="en-US" dirty="0"/>
-            </a:p>
-          </p:txBody>
-        </p:sp>
-        <p:sp>
-          <p:nvSpPr>
-            <p:cNvPr id="5" name="Rectangle 4">
-              <a:extLst>
-                <a:ext uri="{FF2B5EF4-FFF2-40B4-BE49-F238E27FC236}">
-                  <a16:creationId xmlns:a16="http://schemas.microsoft.com/office/drawing/2014/main" id="{D41DC3D8-6B18-B938-F6DA-7AACCD2512A5}"/>
-                </a:ext>
-              </a:extLst>
-            </p:cNvPr>
-            <p:cNvSpPr/>
-            <p:nvPr/>
-          </p:nvSpPr>
-          <p:spPr>
-            <a:xfrm>
-              <a:off x="3933117" y="2537937"/>
-              <a:ext cx="197403" cy="600915"/>
-            </a:xfrm>
-            <a:prstGeom prst="rect">
-              <a:avLst/>
-            </a:prstGeom>
-            <a:solidFill>
-              <a:schemeClr val="accent4">
-                <a:alpha val="58000"/>
-              </a:schemeClr>
-            </a:solidFill>
-            <a:ln>
-              <a:solidFill>
-                <a:schemeClr val="bg2">
-                  <a:lumMod val="50000"/>
-                </a:schemeClr>
-              </a:solidFill>
-            </a:ln>
-          </p:spPr>
-          <p:style>
-            <a:lnRef idx="2">
-              <a:schemeClr val="accent1">
-                <a:shade val="15000"/>
-              </a:schemeClr>
-            </a:lnRef>
-            <a:fillRef idx="1">
-              <a:schemeClr val="accent1"/>
-            </a:fillRef>
-            <a:effectRef idx="0">
-              <a:schemeClr val="accent1"/>
-            </a:effectRef>
-            <a:fontRef idx="minor">
-              <a:schemeClr val="lt1"/>
-            </a:fontRef>
-          </p:style>
-          <p:txBody>
-            <a:bodyPr rtlCol="0" anchor="ctr"/>
-            <a:lstStyle/>
-            <a:p>
-              <a:pPr algn="ctr"/>
-              <a:endParaRPr lang="en-US" dirty="0"/>
-            </a:p>
-          </p:txBody>
-        </p:sp>
-        <p:sp>
-          <p:nvSpPr>
-            <p:cNvPr id="6" name="Rectangle 5">
-              <a:extLst>
-                <a:ext uri="{FF2B5EF4-FFF2-40B4-BE49-F238E27FC236}">
-                  <a16:creationId xmlns:a16="http://schemas.microsoft.com/office/drawing/2014/main" id="{213F8196-0439-8F97-2D90-4868A8C14AA2}"/>
-                </a:ext>
-              </a:extLst>
-            </p:cNvPr>
-            <p:cNvSpPr/>
-            <p:nvPr/>
-          </p:nvSpPr>
-          <p:spPr>
-            <a:xfrm rot="16200000">
-              <a:off x="4414016" y="2567630"/>
-              <a:ext cx="75369" cy="557123"/>
-            </a:xfrm>
-            <a:prstGeom prst="rect">
-              <a:avLst/>
-            </a:prstGeom>
-            <a:solidFill>
-              <a:schemeClr val="accent4">
-                <a:alpha val="58000"/>
-              </a:schemeClr>
-            </a:solidFill>
-            <a:ln>
-              <a:solidFill>
-                <a:schemeClr val="bg2">
-                  <a:lumMod val="50000"/>
-                </a:schemeClr>
-              </a:solidFill>
-            </a:ln>
-          </p:spPr>
-          <p:style>
-            <a:lnRef idx="2">
-              <a:schemeClr val="accent1">
-                <a:shade val="15000"/>
-              </a:schemeClr>
-            </a:lnRef>
-            <a:fillRef idx="1">
-              <a:schemeClr val="accent1"/>
-            </a:fillRef>
-            <a:effectRef idx="0">
-              <a:schemeClr val="accent1"/>
-            </a:effectRef>
-            <a:fontRef idx="minor">
-              <a:schemeClr val="lt1"/>
-            </a:fontRef>
-          </p:style>
-          <p:txBody>
-            <a:bodyPr rtlCol="0" anchor="ctr"/>
-            <a:lstStyle/>
-            <a:p>
-              <a:pPr algn="ctr"/>
-              <a:endParaRPr lang="en-US" dirty="0"/>
-            </a:p>
-          </p:txBody>
-        </p:sp>
-        <p:cxnSp>
-          <p:nvCxnSpPr>
-            <p:cNvPr id="7" name="Straight Arrow Connector 6">
-              <a:extLst>
-                <a:ext uri="{FF2B5EF4-FFF2-40B4-BE49-F238E27FC236}">
-                  <a16:creationId xmlns:a16="http://schemas.microsoft.com/office/drawing/2014/main" id="{B3A6D2FF-2DEC-C6E9-6E86-3A584BF35F7A}"/>
-                </a:ext>
-              </a:extLst>
-            </p:cNvPr>
-            <p:cNvCxnSpPr>
-              <a:cxnSpLocks/>
-            </p:cNvCxnSpPr>
-            <p:nvPr/>
-          </p:nvCxnSpPr>
-          <p:spPr>
-            <a:xfrm>
-              <a:off x="2745265" y="2808507"/>
-              <a:ext cx="391112" cy="0"/>
-            </a:xfrm>
-            <a:prstGeom prst="straightConnector1">
-              <a:avLst/>
-            </a:prstGeom>
-            <a:ln>
-              <a:solidFill>
-                <a:schemeClr val="tx1"/>
-              </a:solidFill>
-              <a:tailEnd type="triangle"/>
-            </a:ln>
-          </p:spPr>
-          <p:style>
-            <a:lnRef idx="2">
-              <a:schemeClr val="accent1"/>
-            </a:lnRef>
-            <a:fillRef idx="0">
-              <a:schemeClr val="accent1"/>
-            </a:fillRef>
-            <a:effectRef idx="1">
-              <a:schemeClr val="accent1"/>
-            </a:effectRef>
-            <a:fontRef idx="minor">
-              <a:schemeClr val="tx1"/>
-            </a:fontRef>
-          </p:style>
-        </p:cxnSp>
-      </p:grpSp>
-    </p:spTree>
-    <p:extLst>
-      <p:ext uri="{BB962C8B-B14F-4D97-AF65-F5344CB8AC3E}">
-        <p14:creationId xmlns:p14="http://schemas.microsoft.com/office/powerpoint/2010/main" val="1146156093"/>
       </p:ext>
     </p:extLst>
   </p:cSld>

</xml_diff>

<commit_message>
adding vision transformer model and supporting code
</commit_message>
<xml_diff>
--- a/Homework-aAlphaBio.pptx
+++ b/Homework-aAlphaBio.pptx
@@ -6,11 +6,11 @@
   </p:sldMasterIdLst>
   <p:sldIdLst>
     <p:sldId id="326" r:id="rId2"/>
-    <p:sldId id="320" r:id="rId3"/>
-    <p:sldId id="325" r:id="rId4"/>
-    <p:sldId id="328" r:id="rId5"/>
-    <p:sldId id="333" r:id="rId6"/>
-    <p:sldId id="336" r:id="rId7"/>
+    <p:sldId id="325" r:id="rId3"/>
+    <p:sldId id="328" r:id="rId4"/>
+    <p:sldId id="333" r:id="rId5"/>
+    <p:sldId id="336" r:id="rId6"/>
+    <p:sldId id="320" r:id="rId7"/>
     <p:sldId id="334" r:id="rId8"/>
     <p:sldId id="257" r:id="rId9"/>
     <p:sldId id="258" r:id="rId10"/>
@@ -17943,7 +17943,7 @@
           <p:cNvPr id="2" name="TextBox 1">
             <a:extLst>
               <a:ext uri="{FF2B5EF4-FFF2-40B4-BE49-F238E27FC236}">
-                <a16:creationId xmlns:a16="http://schemas.microsoft.com/office/drawing/2014/main" id="{A6B8D544-62FB-BED5-1F3D-8DE1F9A51DC3}"/>
+                <a16:creationId xmlns:a16="http://schemas.microsoft.com/office/drawing/2014/main" id="{E758D5CD-18BF-EE2E-47E2-E832CEE7988E}"/>
               </a:ext>
             </a:extLst>
           </p:cNvPr>
@@ -17953,7 +17953,7 @@
         <p:spPr>
           <a:xfrm>
             <a:off x="140127" y="221836"/>
-            <a:ext cx="4721421" cy="461665"/>
+            <a:ext cx="2440476" cy="461665"/>
           </a:xfrm>
           <a:prstGeom prst="rect">
             <a:avLst/>
@@ -17968,7 +17968,7 @@
           <a:p>
             <a:r>
               <a:rPr lang="en-US" sz="2400" dirty="0"/>
-              <a:t>Relevant literature, code, and data</a:t>
+              <a:t>Data set analysis</a:t>
             </a:r>
           </a:p>
         </p:txBody>
@@ -17978,7 +17978,7 @@
           <p:cNvPr id="3" name="TextBox 2">
             <a:extLst>
               <a:ext uri="{FF2B5EF4-FFF2-40B4-BE49-F238E27FC236}">
-                <a16:creationId xmlns:a16="http://schemas.microsoft.com/office/drawing/2014/main" id="{9750003C-8501-0DA4-F28D-311FF3F150A4}"/>
+                <a16:creationId xmlns:a16="http://schemas.microsoft.com/office/drawing/2014/main" id="{D8B95F42-7908-E503-6060-6100B97ECD43}"/>
               </a:ext>
             </a:extLst>
           </p:cNvPr>
@@ -17987,8 +17987,8 @@
         </p:nvSpPr>
         <p:spPr>
           <a:xfrm>
-            <a:off x="774013" y="886174"/>
-            <a:ext cx="9574610" cy="5909310"/>
+            <a:off x="986118" y="941294"/>
+            <a:ext cx="3857659" cy="923330"/>
           </a:xfrm>
           <a:prstGeom prst="rect">
             <a:avLst/>
@@ -17996,7 +17996,7 @@
           <a:noFill/>
         </p:spPr>
         <p:txBody>
-          <a:bodyPr wrap="square" rtlCol="0">
+          <a:bodyPr wrap="none" rtlCol="0">
             <a:spAutoFit/>
           </a:bodyPr>
           <a:lstStyle/>
@@ -18007,22 +18007,18 @@
             </a:pPr>
             <a:r>
               <a:rPr lang="en-US" dirty="0"/>
-              <a:t>BERT : </a:t>
-            </a:r>
-            <a:r>
-              <a:rPr lang="en-US" dirty="0">
-                <a:hlinkClick r:id="rId2"/>
-              </a:rPr>
-              <a:t>https://aclanthology.org/N19-1423.pdf</a:t>
-            </a:r>
-            <a:endParaRPr lang="en-US" dirty="0"/>
+              <a:t>nans</a:t>
+            </a:r>
           </a:p>
           <a:p>
             <a:pPr marL="285750" indent="-285750">
               <a:buFont typeface="Arial" panose="020B0604020202020204" pitchFamily="34" charset="0"/>
               <a:buChar char="•"/>
             </a:pPr>
-            <a:endParaRPr lang="en-US" dirty="0"/>
+            <a:r>
+              <a:rPr lang="en-US" dirty="0"/>
+              <a:t>dups</a:t>
+            </a:r>
           </a:p>
           <a:p>
             <a:pPr marL="285750" indent="-285750">
@@ -18030,276 +18026,16 @@
               <a:buChar char="•"/>
             </a:pPr>
             <a:r>
-              <a:rPr lang="en-US" dirty="0" err="1"/>
-              <a:t>ProteinBERT</a:t>
-            </a:r>
-            <a:r>
               <a:rPr lang="en-US" dirty="0"/>
-              <a:t> : </a:t>
-            </a:r>
-            <a:r>
-              <a:rPr lang="en-US" dirty="0">
-                <a:hlinkClick r:id="rId3"/>
-              </a:rPr>
-              <a:t>https://doi.org/10.1093/bioinformatics/btac020</a:t>
-            </a:r>
-            <a:endParaRPr lang="en-US" dirty="0"/>
-          </a:p>
-          <a:p>
-            <a:endParaRPr lang="en-US" dirty="0"/>
-          </a:p>
-          <a:p>
-            <a:pPr marL="285750" indent="-285750">
-              <a:buFont typeface="Arial" panose="020B0604020202020204" pitchFamily="34" charset="0"/>
-              <a:buChar char="•"/>
-            </a:pPr>
-            <a:r>
-              <a:rPr lang="en-US" dirty="0"/>
-              <a:t>Code partially taken from:</a:t>
-            </a:r>
-          </a:p>
-          <a:p>
-            <a:pPr marL="742950" lvl="1" indent="-285750">
-              <a:buFont typeface="Arial" panose="020B0604020202020204" pitchFamily="34" charset="0"/>
-              <a:buChar char="•"/>
-            </a:pPr>
-            <a:r>
-              <a:rPr lang="en-US" dirty="0"/>
-              <a:t>Barney Hill : </a:t>
-            </a:r>
-            <a:r>
-              <a:rPr lang="en-US" b="0" dirty="0">
-                <a:effectLst/>
-                <a:hlinkClick r:id="rId4"/>
-              </a:rPr>
-              <a:t>https://github.com/barneyhill/minBERT</a:t>
-            </a:r>
-            <a:endParaRPr lang="en-US" b="0" dirty="0">
-              <a:effectLst/>
-            </a:endParaRPr>
-          </a:p>
-          <a:p>
-            <a:pPr marL="742950" lvl="1" indent="-285750">
-              <a:buFont typeface="Arial" panose="020B0604020202020204" pitchFamily="34" charset="0"/>
-              <a:buChar char="•"/>
-            </a:pPr>
-            <a:r>
-              <a:rPr lang="en-US" dirty="0"/>
-              <a:t>Andrej </a:t>
-            </a:r>
-            <a:r>
-              <a:rPr lang="en-US" dirty="0" err="1"/>
-              <a:t>Karpathy</a:t>
-            </a:r>
-            <a:r>
-              <a:rPr lang="en-US" dirty="0"/>
-              <a:t>: </a:t>
-            </a:r>
-            <a:r>
-              <a:rPr lang="en-US" b="0" dirty="0">
-                <a:effectLst/>
-                <a:hlinkClick r:id="rId5"/>
-              </a:rPr>
-              <a:t>https://github.com/karpathy/minGPT</a:t>
-            </a:r>
-            <a:endParaRPr lang="en-US" b="0" dirty="0">
-              <a:effectLst/>
-            </a:endParaRPr>
-          </a:p>
-          <a:p>
-            <a:pPr marL="742950" lvl="1" indent="-285750">
-              <a:buFont typeface="Arial" panose="020B0604020202020204" pitchFamily="34" charset="0"/>
-              <a:buChar char="•"/>
-            </a:pPr>
-            <a:r>
-              <a:rPr lang="en-US" dirty="0"/>
-              <a:t>my Table Transformer code (from real-estate automated valuation model development)</a:t>
-            </a:r>
-          </a:p>
-          <a:p>
-            <a:pPr marL="742950" lvl="1" indent="-285750">
-              <a:buFont typeface="Arial" panose="020B0604020202020204" pitchFamily="34" charset="0"/>
-              <a:buChar char="•"/>
-            </a:pPr>
-            <a:endParaRPr lang="en-US" dirty="0"/>
-          </a:p>
-          <a:p>
-            <a:pPr marL="285750" indent="-285750">
-              <a:buFont typeface="Arial" panose="020B0604020202020204" pitchFamily="34" charset="0"/>
-              <a:buChar char="•"/>
-            </a:pPr>
-            <a:r>
-              <a:rPr lang="en-US" dirty="0"/>
-              <a:t>A</a:t>
-            </a:r>
-            <a:r>
-              <a:rPr lang="en-US" b="0" dirty="0">
-                <a:effectLst/>
-              </a:rPr>
-              <a:t>-Alpha Bio:</a:t>
-            </a:r>
-          </a:p>
-          <a:p>
-            <a:pPr marL="742950" lvl="1" indent="-285750">
-              <a:buFont typeface="Arial" panose="020B0604020202020204" pitchFamily="34" charset="0"/>
-              <a:buChar char="•"/>
-            </a:pPr>
-            <a:r>
-              <a:rPr lang="en-US" dirty="0"/>
-              <a:t>Nature Comm: </a:t>
-            </a:r>
-            <a:r>
-              <a:rPr lang="en-US" dirty="0">
-                <a:hlinkClick r:id="rId6"/>
-              </a:rPr>
-              <a:t>http://biorxiv.org/lookup/doi/10.1101/2022.10.07.502662</a:t>
-            </a:r>
-            <a:endParaRPr lang="en-US" dirty="0"/>
-          </a:p>
-          <a:p>
-            <a:pPr marL="742950" lvl="1" indent="-285750">
-              <a:buFont typeface="Arial" panose="020B0604020202020204" pitchFamily="34" charset="0"/>
-              <a:buChar char="•"/>
-            </a:pPr>
-            <a:r>
-              <a:rPr lang="en-US" dirty="0"/>
-              <a:t>Nature: </a:t>
-            </a:r>
-            <a:r>
-              <a:rPr lang="en-US" dirty="0">
-                <a:hlinkClick r:id="rId7"/>
-              </a:rPr>
-              <a:t>https://www.nature.com/articles/s41597-022-01779-4</a:t>
-            </a:r>
-            <a:endParaRPr lang="en-US" dirty="0"/>
-          </a:p>
-          <a:p>
-            <a:pPr marL="742950" lvl="1" indent="-285750">
-              <a:buFont typeface="Arial" panose="020B0604020202020204" pitchFamily="34" charset="0"/>
-              <a:buChar char="•"/>
-            </a:pPr>
-            <a:r>
-              <a:rPr lang="en-US" dirty="0" err="1"/>
-              <a:t>scFv</a:t>
-            </a:r>
-            <a:r>
-              <a:rPr lang="en-US" dirty="0"/>
-              <a:t> Datasets: </a:t>
-            </a:r>
-            <a:r>
-              <a:rPr lang="en-US" dirty="0">
-                <a:hlinkClick r:id="rId8"/>
-              </a:rPr>
-              <a:t>https://github.com/mit-ll/AlphaSeq_Antibody_Dataset.git</a:t>
-            </a:r>
-            <a:endParaRPr lang="en-US" b="0" dirty="0">
-              <a:effectLst/>
-            </a:endParaRPr>
-          </a:p>
-          <a:p>
-            <a:pPr marL="742950" lvl="1" indent="-285750">
-              <a:buFont typeface="Arial" panose="020B0604020202020204" pitchFamily="34" charset="0"/>
-              <a:buChar char="•"/>
-            </a:pPr>
-            <a:endParaRPr lang="en-US" dirty="0"/>
-          </a:p>
-          <a:p>
-            <a:pPr marL="285750" indent="-285750">
-              <a:buFont typeface="Arial" panose="020B0604020202020204" pitchFamily="34" charset="0"/>
-              <a:buChar char="•"/>
-            </a:pPr>
-            <a:r>
-              <a:rPr lang="en-US" b="0" dirty="0">
-                <a:effectLst/>
-              </a:rPr>
-              <a:t>Observed Antibody Space :  </a:t>
-            </a:r>
-          </a:p>
-          <a:p>
-            <a:pPr marL="742950" lvl="1" indent="-285750">
-              <a:buFont typeface="Arial" panose="020B0604020202020204" pitchFamily="34" charset="0"/>
-              <a:buChar char="•"/>
-            </a:pPr>
-            <a:r>
-              <a:rPr lang="en-US" b="0" dirty="0">
-                <a:effectLst/>
-                <a:hlinkClick r:id="rId9"/>
-              </a:rPr>
-              <a:t>https://doi.org/10.4049/jimmunol.1800708</a:t>
-            </a:r>
-            <a:endParaRPr lang="en-US" b="0" dirty="0">
-              <a:effectLst/>
-            </a:endParaRPr>
-          </a:p>
-          <a:p>
-            <a:pPr marL="742950" lvl="1" indent="-285750">
-              <a:buFont typeface="Arial" panose="020B0604020202020204" pitchFamily="34" charset="0"/>
-              <a:buChar char="•"/>
-            </a:pPr>
-            <a:r>
-              <a:rPr lang="en-US" b="0" dirty="0">
-                <a:effectLst/>
-                <a:hlinkClick r:id="rId10"/>
-              </a:rPr>
-              <a:t>https://opig.stats.ox.ac.uk/webapps/oas/</a:t>
-            </a:r>
-            <a:endParaRPr lang="en-US" b="0" dirty="0">
-              <a:effectLst/>
-            </a:endParaRPr>
-          </a:p>
-          <a:p>
-            <a:pPr marL="742950" lvl="1" indent="-285750">
-              <a:buFont typeface="Arial" panose="020B0604020202020204" pitchFamily="34" charset="0"/>
-              <a:buChar char="•"/>
-            </a:pPr>
-            <a:endParaRPr lang="en-US" dirty="0"/>
-          </a:p>
-          <a:p>
-            <a:pPr marL="285750" indent="-285750">
-              <a:buFont typeface="Arial" panose="020B0604020202020204" pitchFamily="34" charset="0"/>
-              <a:buChar char="•"/>
-            </a:pPr>
-            <a:r>
-              <a:rPr lang="en-US" dirty="0"/>
-              <a:t>My </a:t>
-            </a:r>
-            <a:r>
-              <a:rPr lang="en-US" dirty="0" err="1"/>
-              <a:t>Github</a:t>
-            </a:r>
-            <a:r>
-              <a:rPr lang="en-US" dirty="0"/>
-              <a:t> repo for this homework’s code: </a:t>
-            </a:r>
-            <a:r>
-              <a:rPr lang="en-US" dirty="0">
-                <a:solidFill>
-                  <a:srgbClr val="FF0000"/>
-                </a:solidFill>
-              </a:rPr>
-              <a:t>TODO (2 repos) </a:t>
-            </a:r>
-            <a:r>
-              <a:rPr lang="en-US" dirty="0">
-                <a:hlinkClick r:id="rId11"/>
-              </a:rPr>
-              <a:t>https://github.com/planaria158/BERT.git</a:t>
-            </a:r>
-            <a:endParaRPr lang="en-US" dirty="0"/>
-          </a:p>
-          <a:p>
-            <a:pPr marL="285750" indent="-285750">
-              <a:buFont typeface="Arial" panose="020B0604020202020204" pitchFamily="34" charset="0"/>
-              <a:buChar char="•"/>
-            </a:pPr>
-            <a:endParaRPr lang="en-US" dirty="0"/>
+              <a:t>distribution of binding affinity data</a:t>
+            </a:r>
           </a:p>
         </p:txBody>
       </p:sp>
     </p:spTree>
     <p:extLst>
       <p:ext uri="{BB962C8B-B14F-4D97-AF65-F5344CB8AC3E}">
-        <p14:creationId xmlns:p14="http://schemas.microsoft.com/office/powerpoint/2010/main" val="1592508389"/>
+        <p14:creationId xmlns:p14="http://schemas.microsoft.com/office/powerpoint/2010/main" val="2470448845"/>
       </p:ext>
     </p:extLst>
   </p:cSld>
@@ -19330,130 +19066,6 @@
           <p:cNvPr id="3" name="TextBox 2">
             <a:extLst>
               <a:ext uri="{FF2B5EF4-FFF2-40B4-BE49-F238E27FC236}">
-                <a16:creationId xmlns:a16="http://schemas.microsoft.com/office/drawing/2014/main" id="{D8B95F42-7908-E503-6060-6100B97ECD43}"/>
-              </a:ext>
-            </a:extLst>
-          </p:cNvPr>
-          <p:cNvSpPr txBox="1"/>
-          <p:nvPr/>
-        </p:nvSpPr>
-        <p:spPr>
-          <a:xfrm>
-            <a:off x="986118" y="941294"/>
-            <a:ext cx="3857659" cy="923330"/>
-          </a:xfrm>
-          <a:prstGeom prst="rect">
-            <a:avLst/>
-          </a:prstGeom>
-          <a:noFill/>
-        </p:spPr>
-        <p:txBody>
-          <a:bodyPr wrap="none" rtlCol="0">
-            <a:spAutoFit/>
-          </a:bodyPr>
-          <a:lstStyle/>
-          <a:p>
-            <a:pPr marL="285750" indent="-285750">
-              <a:buFont typeface="Arial" panose="020B0604020202020204" pitchFamily="34" charset="0"/>
-              <a:buChar char="•"/>
-            </a:pPr>
-            <a:r>
-              <a:rPr lang="en-US" dirty="0"/>
-              <a:t>nans</a:t>
-            </a:r>
-          </a:p>
-          <a:p>
-            <a:pPr marL="285750" indent="-285750">
-              <a:buFont typeface="Arial" panose="020B0604020202020204" pitchFamily="34" charset="0"/>
-              <a:buChar char="•"/>
-            </a:pPr>
-            <a:r>
-              <a:rPr lang="en-US" dirty="0"/>
-              <a:t>dups</a:t>
-            </a:r>
-          </a:p>
-          <a:p>
-            <a:pPr marL="285750" indent="-285750">
-              <a:buFont typeface="Arial" panose="020B0604020202020204" pitchFamily="34" charset="0"/>
-              <a:buChar char="•"/>
-            </a:pPr>
-            <a:r>
-              <a:rPr lang="en-US" dirty="0"/>
-              <a:t>distribution of binding affinity data</a:t>
-            </a:r>
-          </a:p>
-        </p:txBody>
-      </p:sp>
-    </p:spTree>
-    <p:extLst>
-      <p:ext uri="{BB962C8B-B14F-4D97-AF65-F5344CB8AC3E}">
-        <p14:creationId xmlns:p14="http://schemas.microsoft.com/office/powerpoint/2010/main" val="2470448845"/>
-      </p:ext>
-    </p:extLst>
-  </p:cSld>
-  <p:clrMapOvr>
-    <a:masterClrMapping/>
-  </p:clrMapOvr>
-</p:sld>
-</file>
-
-<file path=ppt/slides/slide4.xml><?xml version="1.0" encoding="utf-8"?>
-<p:sld xmlns:a="http://schemas.openxmlformats.org/drawingml/2006/main" xmlns:r="http://schemas.openxmlformats.org/officeDocument/2006/relationships" xmlns:p="http://schemas.openxmlformats.org/presentationml/2006/main">
-  <p:cSld>
-    <p:spTree>
-      <p:nvGrpSpPr>
-        <p:cNvPr id="1" name=""/>
-        <p:cNvGrpSpPr/>
-        <p:nvPr/>
-      </p:nvGrpSpPr>
-      <p:grpSpPr>
-        <a:xfrm>
-          <a:off x="0" y="0"/>
-          <a:ext cx="0" cy="0"/>
-          <a:chOff x="0" y="0"/>
-          <a:chExt cx="0" cy="0"/>
-        </a:xfrm>
-      </p:grpSpPr>
-      <p:sp>
-        <p:nvSpPr>
-          <p:cNvPr id="2" name="TextBox 1">
-            <a:extLst>
-              <a:ext uri="{FF2B5EF4-FFF2-40B4-BE49-F238E27FC236}">
-                <a16:creationId xmlns:a16="http://schemas.microsoft.com/office/drawing/2014/main" id="{E758D5CD-18BF-EE2E-47E2-E832CEE7988E}"/>
-              </a:ext>
-            </a:extLst>
-          </p:cNvPr>
-          <p:cNvSpPr txBox="1"/>
-          <p:nvPr/>
-        </p:nvSpPr>
-        <p:spPr>
-          <a:xfrm>
-            <a:off x="140127" y="221836"/>
-            <a:ext cx="2440476" cy="461665"/>
-          </a:xfrm>
-          <a:prstGeom prst="rect">
-            <a:avLst/>
-          </a:prstGeom>
-          <a:noFill/>
-        </p:spPr>
-        <p:txBody>
-          <a:bodyPr wrap="none" rtlCol="0">
-            <a:spAutoFit/>
-          </a:bodyPr>
-          <a:lstStyle/>
-          <a:p>
-            <a:r>
-              <a:rPr lang="en-US" sz="2400" dirty="0"/>
-              <a:t>Data set analysis</a:t>
-            </a:r>
-          </a:p>
-        </p:txBody>
-      </p:sp>
-      <p:sp>
-        <p:nvSpPr>
-          <p:cNvPr id="3" name="TextBox 2">
-            <a:extLst>
-              <a:ext uri="{FF2B5EF4-FFF2-40B4-BE49-F238E27FC236}">
                 <a16:creationId xmlns:a16="http://schemas.microsoft.com/office/drawing/2014/main" id="{7E599AD6-DD1F-452C-E83F-FF0E0FAF05B1}"/>
               </a:ext>
             </a:extLst>
@@ -19538,7 +19150,7 @@
 </p:sld>
 </file>
 
-<file path=ppt/slides/slide5.xml><?xml version="1.0" encoding="utf-8"?>
+<file path=ppt/slides/slide4.xml><?xml version="1.0" encoding="utf-8"?>
 <p:sld xmlns:a="http://schemas.openxmlformats.org/drawingml/2006/main" xmlns:r="http://schemas.openxmlformats.org/officeDocument/2006/relationships" xmlns:p="http://schemas.openxmlformats.org/presentationml/2006/main">
   <p:cSld>
     <p:spTree>
@@ -20193,7 +19805,7 @@
 </p:sld>
 </file>
 
-<file path=ppt/slides/slide6.xml><?xml version="1.0" encoding="utf-8"?>
+<file path=ppt/slides/slide5.xml><?xml version="1.0" encoding="utf-8"?>
 <p:sld xmlns:a="http://schemas.openxmlformats.org/drawingml/2006/main" xmlns:r="http://schemas.openxmlformats.org/officeDocument/2006/relationships" xmlns:p="http://schemas.openxmlformats.org/presentationml/2006/main">
   <p:cSld>
     <p:spTree>
@@ -20792,6 +20404,429 @@
     <p:extLst>
       <p:ext uri="{BB962C8B-B14F-4D97-AF65-F5344CB8AC3E}">
         <p14:creationId xmlns:p14="http://schemas.microsoft.com/office/powerpoint/2010/main" val="658684484"/>
+      </p:ext>
+    </p:extLst>
+  </p:cSld>
+  <p:clrMapOvr>
+    <a:masterClrMapping/>
+  </p:clrMapOvr>
+</p:sld>
+</file>
+
+<file path=ppt/slides/slide6.xml><?xml version="1.0" encoding="utf-8"?>
+<p:sld xmlns:a="http://schemas.openxmlformats.org/drawingml/2006/main" xmlns:r="http://schemas.openxmlformats.org/officeDocument/2006/relationships" xmlns:p="http://schemas.openxmlformats.org/presentationml/2006/main">
+  <p:cSld>
+    <p:spTree>
+      <p:nvGrpSpPr>
+        <p:cNvPr id="1" name=""/>
+        <p:cNvGrpSpPr/>
+        <p:nvPr/>
+      </p:nvGrpSpPr>
+      <p:grpSpPr>
+        <a:xfrm>
+          <a:off x="0" y="0"/>
+          <a:ext cx="0" cy="0"/>
+          <a:chOff x="0" y="0"/>
+          <a:chExt cx="0" cy="0"/>
+        </a:xfrm>
+      </p:grpSpPr>
+      <p:sp>
+        <p:nvSpPr>
+          <p:cNvPr id="2" name="TextBox 1">
+            <a:extLst>
+              <a:ext uri="{FF2B5EF4-FFF2-40B4-BE49-F238E27FC236}">
+                <a16:creationId xmlns:a16="http://schemas.microsoft.com/office/drawing/2014/main" id="{A6B8D544-62FB-BED5-1F3D-8DE1F9A51DC3}"/>
+              </a:ext>
+            </a:extLst>
+          </p:cNvPr>
+          <p:cNvSpPr txBox="1"/>
+          <p:nvPr/>
+        </p:nvSpPr>
+        <p:spPr>
+          <a:xfrm>
+            <a:off x="140127" y="221836"/>
+            <a:ext cx="6376297" cy="461665"/>
+          </a:xfrm>
+          <a:prstGeom prst="rect">
+            <a:avLst/>
+          </a:prstGeom>
+          <a:noFill/>
+        </p:spPr>
+        <p:txBody>
+          <a:bodyPr wrap="none" rtlCol="0">
+            <a:spAutoFit/>
+          </a:bodyPr>
+          <a:lstStyle/>
+          <a:p>
+            <a:r>
+              <a:rPr lang="en-US" sz="2400" dirty="0"/>
+              <a:t>BERT Stuff:   Relevant literature, code, and data</a:t>
+            </a:r>
+          </a:p>
+        </p:txBody>
+      </p:sp>
+      <p:sp>
+        <p:nvSpPr>
+          <p:cNvPr id="3" name="TextBox 2">
+            <a:extLst>
+              <a:ext uri="{FF2B5EF4-FFF2-40B4-BE49-F238E27FC236}">
+                <a16:creationId xmlns:a16="http://schemas.microsoft.com/office/drawing/2014/main" id="{9750003C-8501-0DA4-F28D-311FF3F150A4}"/>
+              </a:ext>
+            </a:extLst>
+          </p:cNvPr>
+          <p:cNvSpPr txBox="1"/>
+          <p:nvPr/>
+        </p:nvSpPr>
+        <p:spPr>
+          <a:xfrm>
+            <a:off x="765387" y="1291616"/>
+            <a:ext cx="9574610" cy="5016758"/>
+          </a:xfrm>
+          <a:prstGeom prst="rect">
+            <a:avLst/>
+          </a:prstGeom>
+          <a:noFill/>
+        </p:spPr>
+        <p:txBody>
+          <a:bodyPr wrap="square" rtlCol="0">
+            <a:spAutoFit/>
+          </a:bodyPr>
+          <a:lstStyle/>
+          <a:p>
+            <a:pPr marL="285750" indent="-285750">
+              <a:buFont typeface="Arial" panose="020B0604020202020204" pitchFamily="34" charset="0"/>
+              <a:buChar char="•"/>
+            </a:pPr>
+            <a:r>
+              <a:rPr lang="en-US" sz="1600" dirty="0"/>
+              <a:t>BERT : </a:t>
+            </a:r>
+            <a:r>
+              <a:rPr lang="en-US" sz="1600" dirty="0">
+                <a:hlinkClick r:id="rId2"/>
+              </a:rPr>
+              <a:t>https://aclanthology.org/N19-1423.pdf</a:t>
+            </a:r>
+            <a:endParaRPr lang="en-US" sz="1600" dirty="0"/>
+          </a:p>
+          <a:p>
+            <a:pPr marL="285750" indent="-285750">
+              <a:buFont typeface="Arial" panose="020B0604020202020204" pitchFamily="34" charset="0"/>
+              <a:buChar char="•"/>
+            </a:pPr>
+            <a:endParaRPr lang="en-US" sz="1600" dirty="0"/>
+          </a:p>
+          <a:p>
+            <a:pPr marL="285750" indent="-285750">
+              <a:buFont typeface="Arial" panose="020B0604020202020204" pitchFamily="34" charset="0"/>
+              <a:buChar char="•"/>
+            </a:pPr>
+            <a:r>
+              <a:rPr lang="en-US" sz="1600" dirty="0" err="1"/>
+              <a:t>ProteinBERT</a:t>
+            </a:r>
+            <a:r>
+              <a:rPr lang="en-US" sz="1600" dirty="0"/>
+              <a:t> : </a:t>
+            </a:r>
+            <a:r>
+              <a:rPr lang="en-US" sz="1600" dirty="0">
+                <a:hlinkClick r:id="rId3"/>
+              </a:rPr>
+              <a:t>https://doi.org/10.1093/bioinformatics/btac020</a:t>
+            </a:r>
+            <a:endParaRPr lang="en-US" sz="1600" dirty="0"/>
+          </a:p>
+          <a:p>
+            <a:endParaRPr lang="en-US" sz="1600" dirty="0"/>
+          </a:p>
+          <a:p>
+            <a:pPr marL="285750" indent="-285750">
+              <a:buFont typeface="Arial" panose="020B0604020202020204" pitchFamily="34" charset="0"/>
+              <a:buChar char="•"/>
+            </a:pPr>
+            <a:r>
+              <a:rPr lang="en-US" sz="1600" dirty="0"/>
+              <a:t>Code partially taken from:</a:t>
+            </a:r>
+          </a:p>
+          <a:p>
+            <a:pPr marL="742950" lvl="1" indent="-285750">
+              <a:buFont typeface="Arial" panose="020B0604020202020204" pitchFamily="34" charset="0"/>
+              <a:buChar char="•"/>
+            </a:pPr>
+            <a:r>
+              <a:rPr lang="en-US" sz="1600" dirty="0"/>
+              <a:t>Barney Hill : </a:t>
+            </a:r>
+            <a:r>
+              <a:rPr lang="en-US" sz="1600" b="0" dirty="0">
+                <a:effectLst/>
+                <a:hlinkClick r:id="rId4"/>
+              </a:rPr>
+              <a:t>https://github.com/barneyhill/minBERT</a:t>
+            </a:r>
+            <a:endParaRPr lang="en-US" sz="1600" b="0" dirty="0">
+              <a:effectLst/>
+            </a:endParaRPr>
+          </a:p>
+          <a:p>
+            <a:pPr marL="742950" lvl="1" indent="-285750">
+              <a:buFont typeface="Arial" panose="020B0604020202020204" pitchFamily="34" charset="0"/>
+              <a:buChar char="•"/>
+            </a:pPr>
+            <a:r>
+              <a:rPr lang="en-US" sz="1600" dirty="0"/>
+              <a:t>Andrej </a:t>
+            </a:r>
+            <a:r>
+              <a:rPr lang="en-US" sz="1600" dirty="0" err="1"/>
+              <a:t>Karpathy</a:t>
+            </a:r>
+            <a:r>
+              <a:rPr lang="en-US" sz="1600" dirty="0"/>
+              <a:t>: </a:t>
+            </a:r>
+            <a:r>
+              <a:rPr lang="en-US" sz="1600" b="0" dirty="0">
+                <a:effectLst/>
+                <a:hlinkClick r:id="rId5"/>
+              </a:rPr>
+              <a:t>https://github.com/karpathy/minGPT</a:t>
+            </a:r>
+            <a:endParaRPr lang="en-US" sz="1600" b="0" dirty="0">
+              <a:effectLst/>
+            </a:endParaRPr>
+          </a:p>
+          <a:p>
+            <a:pPr marL="742950" lvl="1" indent="-285750">
+              <a:buFont typeface="Arial" panose="020B0604020202020204" pitchFamily="34" charset="0"/>
+              <a:buChar char="•"/>
+            </a:pPr>
+            <a:r>
+              <a:rPr lang="en-US" sz="1600" dirty="0"/>
+              <a:t>my Table Transformer code (from real-estate automated valuation model development)</a:t>
+            </a:r>
+          </a:p>
+          <a:p>
+            <a:pPr marL="742950" lvl="1" indent="-285750">
+              <a:buFont typeface="Arial" panose="020B0604020202020204" pitchFamily="34" charset="0"/>
+              <a:buChar char="•"/>
+            </a:pPr>
+            <a:endParaRPr lang="en-US" sz="1600" dirty="0"/>
+          </a:p>
+          <a:p>
+            <a:pPr marL="285750" indent="-285750">
+              <a:buFont typeface="Arial" panose="020B0604020202020204" pitchFamily="34" charset="0"/>
+              <a:buChar char="•"/>
+            </a:pPr>
+            <a:r>
+              <a:rPr lang="en-US" sz="1600" dirty="0"/>
+              <a:t>A</a:t>
+            </a:r>
+            <a:r>
+              <a:rPr lang="en-US" sz="1600" b="0" dirty="0">
+                <a:effectLst/>
+              </a:rPr>
+              <a:t>-Alpha Bio:</a:t>
+            </a:r>
+          </a:p>
+          <a:p>
+            <a:pPr marL="742950" lvl="1" indent="-285750">
+              <a:buFont typeface="Arial" panose="020B0604020202020204" pitchFamily="34" charset="0"/>
+              <a:buChar char="•"/>
+            </a:pPr>
+            <a:r>
+              <a:rPr lang="en-US" sz="1600" dirty="0"/>
+              <a:t>Nature Comm: </a:t>
+            </a:r>
+            <a:r>
+              <a:rPr lang="en-US" sz="1600" dirty="0">
+                <a:hlinkClick r:id="rId6"/>
+              </a:rPr>
+              <a:t>http://biorxiv.org/lookup/doi/10.1101/2022.10.07.502662</a:t>
+            </a:r>
+            <a:endParaRPr lang="en-US" sz="1600" dirty="0"/>
+          </a:p>
+          <a:p>
+            <a:pPr marL="742950" lvl="1" indent="-285750">
+              <a:buFont typeface="Arial" panose="020B0604020202020204" pitchFamily="34" charset="0"/>
+              <a:buChar char="•"/>
+            </a:pPr>
+            <a:r>
+              <a:rPr lang="en-US" sz="1600" dirty="0"/>
+              <a:t>Nature: </a:t>
+            </a:r>
+            <a:r>
+              <a:rPr lang="en-US" sz="1600" dirty="0">
+                <a:hlinkClick r:id="rId7"/>
+              </a:rPr>
+              <a:t>https://www.nature.com/articles/s41597-022-01779-4</a:t>
+            </a:r>
+            <a:endParaRPr lang="en-US" sz="1600" dirty="0"/>
+          </a:p>
+          <a:p>
+            <a:pPr marL="742950" lvl="1" indent="-285750">
+              <a:buFont typeface="Arial" panose="020B0604020202020204" pitchFamily="34" charset="0"/>
+              <a:buChar char="•"/>
+            </a:pPr>
+            <a:r>
+              <a:rPr lang="en-US" sz="1600" dirty="0" err="1"/>
+              <a:t>scFv</a:t>
+            </a:r>
+            <a:r>
+              <a:rPr lang="en-US" sz="1600" dirty="0"/>
+              <a:t> Datasets: </a:t>
+            </a:r>
+            <a:r>
+              <a:rPr lang="en-US" sz="1600" dirty="0">
+                <a:hlinkClick r:id="rId8"/>
+              </a:rPr>
+              <a:t>https://github.com/mit-ll/AlphaSeq_Antibody_Dataset.git</a:t>
+            </a:r>
+            <a:endParaRPr lang="en-US" sz="1600" b="0" dirty="0">
+              <a:effectLst/>
+            </a:endParaRPr>
+          </a:p>
+          <a:p>
+            <a:pPr marL="742950" lvl="1" indent="-285750">
+              <a:buFont typeface="Arial" panose="020B0604020202020204" pitchFamily="34" charset="0"/>
+              <a:buChar char="•"/>
+            </a:pPr>
+            <a:endParaRPr lang="en-US" sz="1600" dirty="0"/>
+          </a:p>
+          <a:p>
+            <a:pPr marL="285750" indent="-285750">
+              <a:buFont typeface="Arial" panose="020B0604020202020204" pitchFamily="34" charset="0"/>
+              <a:buChar char="•"/>
+            </a:pPr>
+            <a:r>
+              <a:rPr lang="en-US" sz="1600" b="0" dirty="0">
+                <a:effectLst/>
+              </a:rPr>
+              <a:t>Observed Antibody Space :  </a:t>
+            </a:r>
+          </a:p>
+          <a:p>
+            <a:pPr marL="742950" lvl="1" indent="-285750">
+              <a:buFont typeface="Arial" panose="020B0604020202020204" pitchFamily="34" charset="0"/>
+              <a:buChar char="•"/>
+            </a:pPr>
+            <a:r>
+              <a:rPr lang="en-US" sz="1600" b="0" dirty="0">
+                <a:effectLst/>
+                <a:hlinkClick r:id="rId9"/>
+              </a:rPr>
+              <a:t>https://doi.org/10.4049/jimmunol.1800708</a:t>
+            </a:r>
+            <a:endParaRPr lang="en-US" sz="1600" b="0" dirty="0">
+              <a:effectLst/>
+            </a:endParaRPr>
+          </a:p>
+          <a:p>
+            <a:pPr marL="742950" lvl="1" indent="-285750">
+              <a:buFont typeface="Arial" panose="020B0604020202020204" pitchFamily="34" charset="0"/>
+              <a:buChar char="•"/>
+            </a:pPr>
+            <a:r>
+              <a:rPr lang="en-US" sz="1600" b="0" dirty="0">
+                <a:effectLst/>
+                <a:hlinkClick r:id="rId10"/>
+              </a:rPr>
+              <a:t>https://opig.stats.ox.ac.uk/webapps/oas/</a:t>
+            </a:r>
+            <a:endParaRPr lang="en-US" sz="1600" b="0" dirty="0">
+              <a:effectLst/>
+            </a:endParaRPr>
+          </a:p>
+          <a:p>
+            <a:pPr marL="742950" lvl="1" indent="-285750">
+              <a:buFont typeface="Arial" panose="020B0604020202020204" pitchFamily="34" charset="0"/>
+              <a:buChar char="•"/>
+            </a:pPr>
+            <a:endParaRPr lang="en-US" sz="1600" dirty="0"/>
+          </a:p>
+          <a:p>
+            <a:pPr marL="285750" indent="-285750">
+              <a:buFont typeface="Arial" panose="020B0604020202020204" pitchFamily="34" charset="0"/>
+              <a:buChar char="•"/>
+            </a:pPr>
+            <a:r>
+              <a:rPr lang="en-US" sz="1600" dirty="0"/>
+              <a:t>My </a:t>
+            </a:r>
+            <a:r>
+              <a:rPr lang="en-US" sz="1600" dirty="0" err="1"/>
+              <a:t>Github</a:t>
+            </a:r>
+            <a:r>
+              <a:rPr lang="en-US" sz="1600" dirty="0"/>
+              <a:t> repo for this homework’s code: </a:t>
+            </a:r>
+            <a:r>
+              <a:rPr lang="en-US" sz="1600" dirty="0">
+                <a:solidFill>
+                  <a:srgbClr val="FF0000"/>
+                </a:solidFill>
+              </a:rPr>
+              <a:t>TODO (2 repos) </a:t>
+            </a:r>
+            <a:r>
+              <a:rPr lang="en-US" sz="1600" dirty="0">
+                <a:hlinkClick r:id="rId11"/>
+              </a:rPr>
+              <a:t>https://github.com/planaria158/BERT.git</a:t>
+            </a:r>
+            <a:endParaRPr lang="en-US" sz="1600" dirty="0"/>
+          </a:p>
+          <a:p>
+            <a:pPr marL="285750" indent="-285750">
+              <a:buFont typeface="Arial" panose="020B0604020202020204" pitchFamily="34" charset="0"/>
+              <a:buChar char="•"/>
+            </a:pPr>
+            <a:endParaRPr lang="en-US" sz="1600" dirty="0"/>
+          </a:p>
+        </p:txBody>
+      </p:sp>
+      <p:sp>
+        <p:nvSpPr>
+          <p:cNvPr id="5" name="TextBox 4">
+            <a:extLst>
+              <a:ext uri="{FF2B5EF4-FFF2-40B4-BE49-F238E27FC236}">
+                <a16:creationId xmlns:a16="http://schemas.microsoft.com/office/drawing/2014/main" id="{00DEACF3-1DAE-F38C-6985-089A5766A04C}"/>
+              </a:ext>
+            </a:extLst>
+          </p:cNvPr>
+          <p:cNvSpPr txBox="1"/>
+          <p:nvPr/>
+        </p:nvSpPr>
+        <p:spPr>
+          <a:xfrm>
+            <a:off x="140127" y="679781"/>
+            <a:ext cx="9369296" cy="307777"/>
+          </a:xfrm>
+          <a:prstGeom prst="rect">
+            <a:avLst/>
+          </a:prstGeom>
+          <a:noFill/>
+        </p:spPr>
+        <p:txBody>
+          <a:bodyPr wrap="none" rtlCol="0">
+            <a:spAutoFit/>
+          </a:bodyPr>
+          <a:lstStyle/>
+          <a:p>
+            <a:r>
+              <a:rPr lang="en-US" sz="1400" dirty="0"/>
+              <a:t>Note: I did most of the BERT coding/testing in the 2 weeks before my call with Adrian (i.e. before getting the HW problem)</a:t>
+            </a:r>
+          </a:p>
+        </p:txBody>
+      </p:sp>
+    </p:spTree>
+    <p:extLst>
+      <p:ext uri="{BB962C8B-B14F-4D97-AF65-F5344CB8AC3E}">
+        <p14:creationId xmlns:p14="http://schemas.microsoft.com/office/powerpoint/2010/main" val="1592508389"/>
       </p:ext>
     </p:extLst>
   </p:cSld>

</xml_diff>

<commit_message>
training vit on clean2 dataset made clean3 dataset slide deck updates
</commit_message>
<xml_diff>
--- a/Homework-aAlphaBio.pptx
+++ b/Homework-aAlphaBio.pptx
@@ -14,21 +14,22 @@
     <p:sldId id="336" r:id="rId8"/>
     <p:sldId id="320" r:id="rId9"/>
     <p:sldId id="334" r:id="rId10"/>
-    <p:sldId id="257" r:id="rId11"/>
-    <p:sldId id="258" r:id="rId12"/>
-    <p:sldId id="335" r:id="rId13"/>
-    <p:sldId id="337" r:id="rId14"/>
-    <p:sldId id="330" r:id="rId15"/>
-    <p:sldId id="329" r:id="rId16"/>
-    <p:sldId id="331" r:id="rId17"/>
-    <p:sldId id="318" r:id="rId18"/>
-    <p:sldId id="321" r:id="rId19"/>
-    <p:sldId id="259" r:id="rId20"/>
-    <p:sldId id="322" r:id="rId21"/>
-    <p:sldId id="260" r:id="rId22"/>
-    <p:sldId id="324" r:id="rId23"/>
-    <p:sldId id="261" r:id="rId24"/>
-    <p:sldId id="323" r:id="rId25"/>
+    <p:sldId id="340" r:id="rId11"/>
+    <p:sldId id="257" r:id="rId12"/>
+    <p:sldId id="258" r:id="rId13"/>
+    <p:sldId id="335" r:id="rId14"/>
+    <p:sldId id="337" r:id="rId15"/>
+    <p:sldId id="330" r:id="rId16"/>
+    <p:sldId id="329" r:id="rId17"/>
+    <p:sldId id="331" r:id="rId18"/>
+    <p:sldId id="318" r:id="rId19"/>
+    <p:sldId id="321" r:id="rId20"/>
+    <p:sldId id="259" r:id="rId21"/>
+    <p:sldId id="322" r:id="rId22"/>
+    <p:sldId id="260" r:id="rId23"/>
+    <p:sldId id="324" r:id="rId24"/>
+    <p:sldId id="261" r:id="rId25"/>
+    <p:sldId id="323" r:id="rId26"/>
   </p:sldIdLst>
   <p:sldSz cx="12192000" cy="6858000"/>
   <p:notesSz cx="6858000" cy="9144000"/>
@@ -3451,6 +3452,706 @@
       </p:grpSpPr>
       <p:sp>
         <p:nvSpPr>
+          <p:cNvPr id="2" name="TextBox 1">
+            <a:extLst>
+              <a:ext uri="{FF2B5EF4-FFF2-40B4-BE49-F238E27FC236}">
+                <a16:creationId xmlns:a16="http://schemas.microsoft.com/office/drawing/2014/main" id="{D7B699E5-6A91-D5D4-A6B0-C71C42589BC8}"/>
+              </a:ext>
+            </a:extLst>
+          </p:cNvPr>
+          <p:cNvSpPr txBox="1"/>
+          <p:nvPr/>
+        </p:nvSpPr>
+        <p:spPr>
+          <a:xfrm>
+            <a:off x="140127" y="221836"/>
+            <a:ext cx="3558346" cy="461665"/>
+          </a:xfrm>
+          <a:prstGeom prst="rect">
+            <a:avLst/>
+          </a:prstGeom>
+          <a:noFill/>
+        </p:spPr>
+        <p:txBody>
+          <a:bodyPr wrap="none" rtlCol="0">
+            <a:spAutoFit/>
+          </a:bodyPr>
+          <a:lstStyle/>
+          <a:p>
+            <a:r>
+              <a:rPr lang="en-US" sz="2400" dirty="0"/>
+              <a:t>Results:  Dataset Clean-2</a:t>
+            </a:r>
+          </a:p>
+        </p:txBody>
+      </p:sp>
+      <p:graphicFrame>
+        <p:nvGraphicFramePr>
+          <p:cNvPr id="3" name="Table 2">
+            <a:extLst>
+              <a:ext uri="{FF2B5EF4-FFF2-40B4-BE49-F238E27FC236}">
+                <a16:creationId xmlns:a16="http://schemas.microsoft.com/office/drawing/2014/main" id="{06968A34-6E02-9A89-9D28-711A65FA6A49}"/>
+              </a:ext>
+            </a:extLst>
+          </p:cNvPr>
+          <p:cNvGraphicFramePr>
+            <a:graphicFrameLocks noGrp="1"/>
+          </p:cNvGraphicFramePr>
+          <p:nvPr>
+            <p:extLst>
+              <p:ext uri="{D42A27DB-BD31-4B8C-83A1-F6EECF244321}">
+                <p14:modId xmlns:p14="http://schemas.microsoft.com/office/powerpoint/2010/main" val="1768969518"/>
+              </p:ext>
+            </p:extLst>
+          </p:nvPr>
+        </p:nvGraphicFramePr>
+        <p:xfrm>
+          <a:off x="1729491" y="1086528"/>
+          <a:ext cx="8484186" cy="3167925"/>
+        </p:xfrm>
+        <a:graphic>
+          <a:graphicData uri="http://schemas.openxmlformats.org/drawingml/2006/table">
+            <a:tbl>
+              <a:tblPr firstRow="1" bandRow="1">
+                <a:tableStyleId>{5C22544A-7EE6-4342-B048-85BDC9FD1C3A}</a:tableStyleId>
+              </a:tblPr>
+              <a:tblGrid>
+                <a:gridCol w="1662524">
+                  <a:extLst>
+                    <a:ext uri="{9D8B030D-6E8A-4147-A177-3AD203B41FA5}">
+                      <a16:colId xmlns:a16="http://schemas.microsoft.com/office/drawing/2014/main" val="1065848917"/>
+                    </a:ext>
+                  </a:extLst>
+                </a:gridCol>
+                <a:gridCol w="1087495">
+                  <a:extLst>
+                    <a:ext uri="{9D8B030D-6E8A-4147-A177-3AD203B41FA5}">
+                      <a16:colId xmlns:a16="http://schemas.microsoft.com/office/drawing/2014/main" val="873310604"/>
+                    </a:ext>
+                  </a:extLst>
+                </a:gridCol>
+                <a:gridCol w="1160010">
+                  <a:extLst>
+                    <a:ext uri="{9D8B030D-6E8A-4147-A177-3AD203B41FA5}">
+                      <a16:colId xmlns:a16="http://schemas.microsoft.com/office/drawing/2014/main" val="3981708244"/>
+                    </a:ext>
+                  </a:extLst>
+                </a:gridCol>
+                <a:gridCol w="1524719">
+                  <a:extLst>
+                    <a:ext uri="{9D8B030D-6E8A-4147-A177-3AD203B41FA5}">
+                      <a16:colId xmlns:a16="http://schemas.microsoft.com/office/drawing/2014/main" val="1135465181"/>
+                    </a:ext>
+                  </a:extLst>
+                </a:gridCol>
+                <a:gridCol w="1524719">
+                  <a:extLst>
+                    <a:ext uri="{9D8B030D-6E8A-4147-A177-3AD203B41FA5}">
+                      <a16:colId xmlns:a16="http://schemas.microsoft.com/office/drawing/2014/main" val="91865083"/>
+                    </a:ext>
+                  </a:extLst>
+                </a:gridCol>
+                <a:gridCol w="1524719">
+                  <a:extLst>
+                    <a:ext uri="{9D8B030D-6E8A-4147-A177-3AD203B41FA5}">
+                      <a16:colId xmlns:a16="http://schemas.microsoft.com/office/drawing/2014/main" val="2256753199"/>
+                    </a:ext>
+                  </a:extLst>
+                </a:gridCol>
+              </a:tblGrid>
+              <a:tr h="505569">
+                <a:tc>
+                  <a:txBody>
+                    <a:bodyPr/>
+                    <a:lstStyle/>
+                    <a:p>
+                      <a:pPr algn="ctr"/>
+                      <a:r>
+                        <a:rPr lang="en-US" dirty="0"/>
+                        <a:t>Model</a:t>
+                      </a:r>
+                    </a:p>
+                  </a:txBody>
+                  <a:tcPr anchor="ctr"/>
+                </a:tc>
+                <a:tc>
+                  <a:txBody>
+                    <a:bodyPr/>
+                    <a:lstStyle/>
+                    <a:p>
+                      <a:pPr algn="ctr"/>
+                      <a:r>
+                        <a:rPr lang="en-US" dirty="0"/>
+                        <a:t>Train Loss</a:t>
+                      </a:r>
+                    </a:p>
+                  </a:txBody>
+                  <a:tcPr anchor="ctr"/>
+                </a:tc>
+                <a:tc>
+                  <a:txBody>
+                    <a:bodyPr/>
+                    <a:lstStyle/>
+                    <a:p>
+                      <a:pPr algn="ctr"/>
+                      <a:r>
+                        <a:rPr lang="en-US" dirty="0"/>
+                        <a:t>Valid. Loss</a:t>
+                      </a:r>
+                    </a:p>
+                  </a:txBody>
+                  <a:tcPr anchor="ctr"/>
+                </a:tc>
+                <a:tc>
+                  <a:txBody>
+                    <a:bodyPr/>
+                    <a:lstStyle/>
+                    <a:p>
+                      <a:pPr algn="ctr"/>
+                      <a:r>
+                        <a:rPr lang="en-US" dirty="0"/>
+                        <a:t>Epochs</a:t>
+                      </a:r>
+                    </a:p>
+                  </a:txBody>
+                  <a:tcPr anchor="ctr"/>
+                </a:tc>
+                <a:tc>
+                  <a:txBody>
+                    <a:bodyPr/>
+                    <a:lstStyle/>
+                    <a:p>
+                      <a:pPr algn="ctr"/>
+                      <a:r>
+                        <a:rPr lang="en-US" dirty="0"/>
+                        <a:t>RMSD</a:t>
+                      </a:r>
+                    </a:p>
+                    <a:p>
+                      <a:pPr algn="ctr"/>
+                      <a:r>
+                        <a:rPr lang="en-US" dirty="0"/>
+                        <a:t>(valid set)</a:t>
+                      </a:r>
+                    </a:p>
+                  </a:txBody>
+                  <a:tcPr anchor="ctr"/>
+                </a:tc>
+                <a:tc>
+                  <a:txBody>
+                    <a:bodyPr/>
+                    <a:lstStyle/>
+                    <a:p>
+                      <a:pPr algn="ctr"/>
+                      <a:r>
+                        <a:rPr lang="en-US" dirty="0"/>
+                        <a:t>Comment</a:t>
+                      </a:r>
+                    </a:p>
+                  </a:txBody>
+                  <a:tcPr anchor="ctr"/>
+                </a:tc>
+                <a:extLst>
+                  <a:ext uri="{0D108BD9-81ED-4DB2-BD59-A6C34878D82A}">
+                    <a16:rowId xmlns:a16="http://schemas.microsoft.com/office/drawing/2014/main" val="1617347897"/>
+                  </a:ext>
+                </a:extLst>
+              </a:tr>
+              <a:tr h="505569">
+                <a:tc>
+                  <a:txBody>
+                    <a:bodyPr/>
+                    <a:lstStyle/>
+                    <a:p>
+                      <a:r>
+                        <a:rPr lang="en-US" dirty="0"/>
+                        <a:t>residual MLP</a:t>
+                      </a:r>
+                    </a:p>
+                  </a:txBody>
+                  <a:tcPr anchor="ctr"/>
+                </a:tc>
+                <a:tc>
+                  <a:txBody>
+                    <a:bodyPr/>
+                    <a:lstStyle/>
+                    <a:p>
+                      <a:pPr algn="ctr"/>
+                      <a:endParaRPr lang="en-US" dirty="0"/>
+                    </a:p>
+                  </a:txBody>
+                  <a:tcPr anchor="ctr"/>
+                </a:tc>
+                <a:tc>
+                  <a:txBody>
+                    <a:bodyPr/>
+                    <a:lstStyle/>
+                    <a:p>
+                      <a:pPr algn="ctr"/>
+                      <a:endParaRPr lang="en-US" dirty="0"/>
+                    </a:p>
+                  </a:txBody>
+                  <a:tcPr anchor="ctr"/>
+                </a:tc>
+                <a:tc>
+                  <a:txBody>
+                    <a:bodyPr/>
+                    <a:lstStyle/>
+                    <a:p>
+                      <a:pPr algn="ctr"/>
+                      <a:endParaRPr lang="en-US" dirty="0"/>
+                    </a:p>
+                  </a:txBody>
+                  <a:tcPr anchor="ctr"/>
+                </a:tc>
+                <a:tc>
+                  <a:txBody>
+                    <a:bodyPr/>
+                    <a:lstStyle/>
+                    <a:p>
+                      <a:pPr algn="ctr"/>
+                      <a:endParaRPr lang="en-US" dirty="0"/>
+                    </a:p>
+                  </a:txBody>
+                  <a:tcPr anchor="ctr"/>
+                </a:tc>
+                <a:tc>
+                  <a:txBody>
+                    <a:bodyPr/>
+                    <a:lstStyle/>
+                    <a:p>
+                      <a:pPr algn="ctr"/>
+                      <a:endParaRPr lang="en-US" dirty="0"/>
+                    </a:p>
+                  </a:txBody>
+                  <a:tcPr anchor="ctr"/>
+                </a:tc>
+                <a:extLst>
+                  <a:ext uri="{0D108BD9-81ED-4DB2-BD59-A6C34878D82A}">
+                    <a16:rowId xmlns:a16="http://schemas.microsoft.com/office/drawing/2014/main" val="3248717932"/>
+                  </a:ext>
+                </a:extLst>
+              </a:tr>
+              <a:tr h="505569">
+                <a:tc>
+                  <a:txBody>
+                    <a:bodyPr/>
+                    <a:lstStyle/>
+                    <a:p>
+                      <a:r>
+                        <a:rPr lang="en-US" dirty="0"/>
+                        <a:t>VIT</a:t>
+                      </a:r>
+                    </a:p>
+                  </a:txBody>
+                  <a:tcPr anchor="ctr"/>
+                </a:tc>
+                <a:tc>
+                  <a:txBody>
+                    <a:bodyPr/>
+                    <a:lstStyle/>
+                    <a:p>
+                      <a:pPr algn="ctr"/>
+                      <a:r>
+                        <a:rPr lang="en-US" dirty="0"/>
+                        <a:t>0.26</a:t>
+                      </a:r>
+                    </a:p>
+                  </a:txBody>
+                  <a:tcPr anchor="ctr"/>
+                </a:tc>
+                <a:tc>
+                  <a:txBody>
+                    <a:bodyPr/>
+                    <a:lstStyle/>
+                    <a:p>
+                      <a:pPr algn="ctr"/>
+                      <a:r>
+                        <a:rPr lang="en-US" dirty="0"/>
+                        <a:t>0.32</a:t>
+                      </a:r>
+                    </a:p>
+                  </a:txBody>
+                  <a:tcPr anchor="ctr"/>
+                </a:tc>
+                <a:tc>
+                  <a:txBody>
+                    <a:bodyPr/>
+                    <a:lstStyle/>
+                    <a:p>
+                      <a:pPr algn="ctr"/>
+                      <a:r>
+                        <a:rPr lang="en-US"/>
+                        <a:t>860</a:t>
+                      </a:r>
+                      <a:endParaRPr lang="en-US" dirty="0"/>
+                    </a:p>
+                  </a:txBody>
+                  <a:tcPr anchor="ctr"/>
+                </a:tc>
+                <a:tc>
+                  <a:txBody>
+                    <a:bodyPr/>
+                    <a:lstStyle/>
+                    <a:p>
+                      <a:pPr algn="ctr"/>
+                      <a:endParaRPr lang="en-US" dirty="0"/>
+                    </a:p>
+                  </a:txBody>
+                  <a:tcPr anchor="ctr"/>
+                </a:tc>
+                <a:tc>
+                  <a:txBody>
+                    <a:bodyPr/>
+                    <a:lstStyle/>
+                    <a:p>
+                      <a:pPr algn="ctr"/>
+                      <a:endParaRPr lang="en-US" dirty="0"/>
+                    </a:p>
+                  </a:txBody>
+                  <a:tcPr anchor="ctr"/>
+                </a:tc>
+                <a:extLst>
+                  <a:ext uri="{0D108BD9-81ED-4DB2-BD59-A6C34878D82A}">
+                    <a16:rowId xmlns:a16="http://schemas.microsoft.com/office/drawing/2014/main" val="1232718432"/>
+                  </a:ext>
+                </a:extLst>
+              </a:tr>
+              <a:tr h="505569">
+                <a:tc>
+                  <a:txBody>
+                    <a:bodyPr/>
+                    <a:lstStyle/>
+                    <a:p>
+                      <a:r>
+                        <a:rPr lang="en-US" dirty="0"/>
+                        <a:t>BERT (naive) </a:t>
+                      </a:r>
+                      <a:r>
+                        <a:rPr lang="en-US" baseline="30000" dirty="0"/>
+                        <a:t>1</a:t>
+                      </a:r>
+                    </a:p>
+                  </a:txBody>
+                  <a:tcPr anchor="ctr"/>
+                </a:tc>
+                <a:tc>
+                  <a:txBody>
+                    <a:bodyPr/>
+                    <a:lstStyle/>
+                    <a:p>
+                      <a:pPr algn="ctr"/>
+                      <a:endParaRPr lang="en-US" dirty="0"/>
+                    </a:p>
+                  </a:txBody>
+                  <a:tcPr anchor="ctr"/>
+                </a:tc>
+                <a:tc>
+                  <a:txBody>
+                    <a:bodyPr/>
+                    <a:lstStyle/>
+                    <a:p>
+                      <a:pPr algn="ctr"/>
+                      <a:endParaRPr lang="en-US" dirty="0"/>
+                    </a:p>
+                  </a:txBody>
+                  <a:tcPr anchor="ctr"/>
+                </a:tc>
+                <a:tc>
+                  <a:txBody>
+                    <a:bodyPr/>
+                    <a:lstStyle/>
+                    <a:p>
+                      <a:pPr algn="ctr"/>
+                      <a:endParaRPr lang="en-US" dirty="0"/>
+                    </a:p>
+                  </a:txBody>
+                  <a:tcPr anchor="ctr"/>
+                </a:tc>
+                <a:tc>
+                  <a:txBody>
+                    <a:bodyPr/>
+                    <a:lstStyle/>
+                    <a:p>
+                      <a:pPr algn="ctr"/>
+                      <a:endParaRPr lang="en-US" dirty="0"/>
+                    </a:p>
+                  </a:txBody>
+                  <a:tcPr anchor="ctr"/>
+                </a:tc>
+                <a:tc>
+                  <a:txBody>
+                    <a:bodyPr/>
+                    <a:lstStyle/>
+                    <a:p>
+                      <a:pPr algn="ctr"/>
+                      <a:endParaRPr lang="en-US" dirty="0"/>
+                    </a:p>
+                  </a:txBody>
+                  <a:tcPr anchor="ctr"/>
+                </a:tc>
+                <a:extLst>
+                  <a:ext uri="{0D108BD9-81ED-4DB2-BD59-A6C34878D82A}">
+                    <a16:rowId xmlns:a16="http://schemas.microsoft.com/office/drawing/2014/main" val="461321389"/>
+                  </a:ext>
+                </a:extLst>
+              </a:tr>
+              <a:tr h="505569">
+                <a:tc rowSpan="2">
+                  <a:txBody>
+                    <a:bodyPr/>
+                    <a:lstStyle/>
+                    <a:p>
+                      <a:r>
+                        <a:rPr lang="en-US" dirty="0"/>
+                        <a:t>BERT (full) </a:t>
+                      </a:r>
+                      <a:r>
+                        <a:rPr lang="en-US" baseline="30000" dirty="0"/>
+                        <a:t>2</a:t>
+                      </a:r>
+                    </a:p>
+                  </a:txBody>
+                  <a:tcPr anchor="ctr"/>
+                </a:tc>
+                <a:tc>
+                  <a:txBody>
+                    <a:bodyPr/>
+                    <a:lstStyle/>
+                    <a:p>
+                      <a:pPr algn="ctr"/>
+                      <a:endParaRPr lang="en-US" dirty="0"/>
+                    </a:p>
+                  </a:txBody>
+                  <a:tcPr anchor="ctr"/>
+                </a:tc>
+                <a:tc>
+                  <a:txBody>
+                    <a:bodyPr/>
+                    <a:lstStyle/>
+                    <a:p>
+                      <a:pPr algn="ctr"/>
+                      <a:endParaRPr lang="en-US"/>
+                    </a:p>
+                  </a:txBody>
+                  <a:tcPr anchor="ctr"/>
+                </a:tc>
+                <a:tc>
+                  <a:txBody>
+                    <a:bodyPr/>
+                    <a:lstStyle/>
+                    <a:p>
+                      <a:pPr algn="ctr"/>
+                      <a:endParaRPr lang="en-US"/>
+                    </a:p>
+                  </a:txBody>
+                  <a:tcPr anchor="ctr"/>
+                </a:tc>
+                <a:tc>
+                  <a:txBody>
+                    <a:bodyPr/>
+                    <a:lstStyle/>
+                    <a:p>
+                      <a:pPr algn="ctr"/>
+                      <a:endParaRPr lang="en-US"/>
+                    </a:p>
+                  </a:txBody>
+                  <a:tcPr anchor="ctr"/>
+                </a:tc>
+                <a:tc>
+                  <a:txBody>
+                    <a:bodyPr/>
+                    <a:lstStyle/>
+                    <a:p>
+                      <a:pPr algn="ctr"/>
+                      <a:r>
+                        <a:rPr lang="en-US" dirty="0"/>
+                        <a:t>pre-train</a:t>
+                      </a:r>
+                    </a:p>
+                  </a:txBody>
+                  <a:tcPr anchor="ctr"/>
+                </a:tc>
+                <a:extLst>
+                  <a:ext uri="{0D108BD9-81ED-4DB2-BD59-A6C34878D82A}">
+                    <a16:rowId xmlns:a16="http://schemas.microsoft.com/office/drawing/2014/main" val="4051566852"/>
+                  </a:ext>
+                </a:extLst>
+              </a:tr>
+              <a:tr h="505569">
+                <a:tc vMerge="1">
+                  <a:txBody>
+                    <a:bodyPr/>
+                    <a:lstStyle/>
+                    <a:p>
+                      <a:endParaRPr lang="en-US" baseline="30000" dirty="0"/>
+                    </a:p>
+                  </a:txBody>
+                  <a:tcPr/>
+                </a:tc>
+                <a:tc>
+                  <a:txBody>
+                    <a:bodyPr/>
+                    <a:lstStyle/>
+                    <a:p>
+                      <a:pPr algn="ctr"/>
+                      <a:endParaRPr lang="en-US"/>
+                    </a:p>
+                  </a:txBody>
+                  <a:tcPr anchor="ctr"/>
+                </a:tc>
+                <a:tc>
+                  <a:txBody>
+                    <a:bodyPr/>
+                    <a:lstStyle/>
+                    <a:p>
+                      <a:pPr algn="ctr"/>
+                      <a:endParaRPr lang="en-US"/>
+                    </a:p>
+                  </a:txBody>
+                  <a:tcPr anchor="ctr"/>
+                </a:tc>
+                <a:tc>
+                  <a:txBody>
+                    <a:bodyPr/>
+                    <a:lstStyle/>
+                    <a:p>
+                      <a:pPr algn="ctr"/>
+                      <a:endParaRPr lang="en-US"/>
+                    </a:p>
+                  </a:txBody>
+                  <a:tcPr anchor="ctr"/>
+                </a:tc>
+                <a:tc>
+                  <a:txBody>
+                    <a:bodyPr/>
+                    <a:lstStyle/>
+                    <a:p>
+                      <a:pPr algn="ctr"/>
+                      <a:endParaRPr lang="en-US" dirty="0"/>
+                    </a:p>
+                  </a:txBody>
+                  <a:tcPr anchor="ctr"/>
+                </a:tc>
+                <a:tc>
+                  <a:txBody>
+                    <a:bodyPr/>
+                    <a:lstStyle/>
+                    <a:p>
+                      <a:pPr algn="ctr"/>
+                      <a:r>
+                        <a:rPr lang="en-US" dirty="0"/>
+                        <a:t>fine-tune</a:t>
+                      </a:r>
+                    </a:p>
+                  </a:txBody>
+                  <a:tcPr anchor="ctr"/>
+                </a:tc>
+                <a:extLst>
+                  <a:ext uri="{0D108BD9-81ED-4DB2-BD59-A6C34878D82A}">
+                    <a16:rowId xmlns:a16="http://schemas.microsoft.com/office/drawing/2014/main" val="3788428899"/>
+                  </a:ext>
+                </a:extLst>
+              </a:tr>
+            </a:tbl>
+          </a:graphicData>
+        </a:graphic>
+      </p:graphicFrame>
+      <p:sp>
+        <p:nvSpPr>
+          <p:cNvPr id="4" name="TextBox 3">
+            <a:extLst>
+              <a:ext uri="{FF2B5EF4-FFF2-40B4-BE49-F238E27FC236}">
+                <a16:creationId xmlns:a16="http://schemas.microsoft.com/office/drawing/2014/main" id="{00DD7777-9BF6-823F-4376-3C2BB81EAC9C}"/>
+              </a:ext>
+            </a:extLst>
+          </p:cNvPr>
+          <p:cNvSpPr txBox="1"/>
+          <p:nvPr/>
+        </p:nvSpPr>
+        <p:spPr>
+          <a:xfrm>
+            <a:off x="389614" y="5534108"/>
+            <a:ext cx="8333435" cy="646331"/>
+          </a:xfrm>
+          <a:prstGeom prst="rect">
+            <a:avLst/>
+          </a:prstGeom>
+          <a:noFill/>
+        </p:spPr>
+        <p:txBody>
+          <a:bodyPr wrap="none" rtlCol="0">
+            <a:spAutoFit/>
+          </a:bodyPr>
+          <a:lstStyle/>
+          <a:p>
+            <a:pPr marL="342900" indent="-342900">
+              <a:buAutoNum type="arabicPeriod"/>
+            </a:pPr>
+            <a:r>
+              <a:rPr lang="en-US" dirty="0"/>
+              <a:t>Train the fine-tune BERT model from scratch (no pre-training) on </a:t>
+            </a:r>
+            <a:r>
+              <a:rPr lang="en-US" dirty="0" err="1"/>
+              <a:t>scFV</a:t>
+            </a:r>
+            <a:r>
+              <a:rPr lang="en-US" dirty="0"/>
+              <a:t> train data</a:t>
+            </a:r>
+          </a:p>
+          <a:p>
+            <a:pPr marL="342900" indent="-342900">
+              <a:buAutoNum type="arabicPeriod"/>
+            </a:pPr>
+            <a:r>
+              <a:rPr lang="en-US" dirty="0"/>
+              <a:t>Pre-train BERT on OAS dataset, then fine-tune on </a:t>
+            </a:r>
+            <a:r>
+              <a:rPr lang="en-US" dirty="0" err="1"/>
+              <a:t>scFv</a:t>
+            </a:r>
+            <a:r>
+              <a:rPr lang="en-US" dirty="0"/>
+              <a:t> train data</a:t>
+            </a:r>
+          </a:p>
+        </p:txBody>
+      </p:sp>
+    </p:spTree>
+    <p:extLst>
+      <p:ext uri="{BB962C8B-B14F-4D97-AF65-F5344CB8AC3E}">
+        <p14:creationId xmlns:p14="http://schemas.microsoft.com/office/powerpoint/2010/main" val="1303042645"/>
+      </p:ext>
+    </p:extLst>
+  </p:cSld>
+  <p:clrMapOvr>
+    <a:masterClrMapping/>
+  </p:clrMapOvr>
+</p:sld>
+</file>
+
+<file path=ppt/slides/slide11.xml><?xml version="1.0" encoding="utf-8"?>
+<p:sld xmlns:a="http://schemas.openxmlformats.org/drawingml/2006/main" xmlns:r="http://schemas.openxmlformats.org/officeDocument/2006/relationships" xmlns:p="http://schemas.openxmlformats.org/presentationml/2006/main">
+  <p:cSld>
+    <p:spTree>
+      <p:nvGrpSpPr>
+        <p:cNvPr id="1" name=""/>
+        <p:cNvGrpSpPr/>
+        <p:nvPr/>
+      </p:nvGrpSpPr>
+      <p:grpSpPr>
+        <a:xfrm>
+          <a:off x="0" y="0"/>
+          <a:ext cx="0" cy="0"/>
+          <a:chOff x="0" y="0"/>
+          <a:chExt cx="0" cy="0"/>
+        </a:xfrm>
+      </p:grpSpPr>
+      <p:sp>
+        <p:nvSpPr>
           <p:cNvPr id="3" name="TextBox 2">
             <a:extLst>
               <a:ext uri="{FF2B5EF4-FFF2-40B4-BE49-F238E27FC236}">
@@ -3835,7 +4536,7 @@
 </p:sld>
 </file>
 
-<file path=ppt/slides/slide11.xml><?xml version="1.0" encoding="utf-8"?>
+<file path=ppt/slides/slide12.xml><?xml version="1.0" encoding="utf-8"?>
 <p:sld xmlns:a="http://schemas.openxmlformats.org/drawingml/2006/main" xmlns:r="http://schemas.openxmlformats.org/officeDocument/2006/relationships" xmlns:p="http://schemas.openxmlformats.org/presentationml/2006/main">
   <p:cSld>
     <p:spTree>
@@ -4223,7 +4924,7 @@
 </p:sld>
 </file>
 
-<file path=ppt/slides/slide12.xml><?xml version="1.0" encoding="utf-8"?>
+<file path=ppt/slides/slide13.xml><?xml version="1.0" encoding="utf-8"?>
 <p:sld xmlns:a="http://schemas.openxmlformats.org/drawingml/2006/main" xmlns:r="http://schemas.openxmlformats.org/officeDocument/2006/relationships" xmlns:p="http://schemas.openxmlformats.org/presentationml/2006/main">
   <p:cSld>
     <p:spTree>
@@ -4608,7 +5309,7 @@
 </p:sld>
 </file>
 
-<file path=ppt/slides/slide13.xml><?xml version="1.0" encoding="utf-8"?>
+<file path=ppt/slides/slide14.xml><?xml version="1.0" encoding="utf-8"?>
 <p:sld xmlns:a="http://schemas.openxmlformats.org/drawingml/2006/main" xmlns:r="http://schemas.openxmlformats.org/officeDocument/2006/relationships" xmlns:p="http://schemas.openxmlformats.org/presentationml/2006/main">
   <p:cSld>
     <p:spTree>
@@ -6299,7 +7000,7 @@
 </p:sld>
 </file>
 
-<file path=ppt/slides/slide14.xml><?xml version="1.0" encoding="utf-8"?>
+<file path=ppt/slides/slide15.xml><?xml version="1.0" encoding="utf-8"?>
 <p:sld xmlns:a="http://schemas.openxmlformats.org/drawingml/2006/main" xmlns:r="http://schemas.openxmlformats.org/officeDocument/2006/relationships" xmlns:p="http://schemas.openxmlformats.org/presentationml/2006/main">
   <p:cSld>
     <p:spTree>
@@ -6978,7 +7679,7 @@
 </p:sld>
 </file>
 
-<file path=ppt/slides/slide15.xml><?xml version="1.0" encoding="utf-8"?>
+<file path=ppt/slides/slide16.xml><?xml version="1.0" encoding="utf-8"?>
 <p:sld xmlns:a="http://schemas.openxmlformats.org/drawingml/2006/main" xmlns:r="http://schemas.openxmlformats.org/officeDocument/2006/relationships" xmlns:p="http://schemas.openxmlformats.org/presentationml/2006/main">
   <p:cSld>
     <p:spTree>
@@ -8206,7 +8907,7 @@
 </p:sld>
 </file>
 
-<file path=ppt/slides/slide16.xml><?xml version="1.0" encoding="utf-8"?>
+<file path=ppt/slides/slide17.xml><?xml version="1.0" encoding="utf-8"?>
 <p:sld xmlns:a="http://schemas.openxmlformats.org/drawingml/2006/main" xmlns:r="http://schemas.openxmlformats.org/officeDocument/2006/relationships" xmlns:p="http://schemas.openxmlformats.org/presentationml/2006/main">
   <p:cSld>
     <p:spTree>
@@ -11029,7 +11730,7 @@
 </p:sld>
 </file>
 
-<file path=ppt/slides/slide17.xml><?xml version="1.0" encoding="utf-8"?>
+<file path=ppt/slides/slide18.xml><?xml version="1.0" encoding="utf-8"?>
 <p:sld xmlns:a="http://schemas.openxmlformats.org/drawingml/2006/main" xmlns:r="http://schemas.openxmlformats.org/officeDocument/2006/relationships" xmlns:p="http://schemas.openxmlformats.org/presentationml/2006/main">
   <p:cSld>
     <p:spTree>
@@ -14977,7 +15678,7 @@
 </p:sld>
 </file>
 
-<file path=ppt/slides/slide18.xml><?xml version="1.0" encoding="utf-8"?>
+<file path=ppt/slides/slide19.xml><?xml version="1.0" encoding="utf-8"?>
 <p:sld xmlns:a="http://schemas.openxmlformats.org/drawingml/2006/main" xmlns:r="http://schemas.openxmlformats.org/officeDocument/2006/relationships" xmlns:p="http://schemas.openxmlformats.org/presentationml/2006/main">
   <p:cSld>
     <p:spTree>
@@ -17992,204 +18693,6 @@
 </p:sld>
 </file>
 
-<file path=ppt/slides/slide19.xml><?xml version="1.0" encoding="utf-8"?>
-<p:sld xmlns:a="http://schemas.openxmlformats.org/drawingml/2006/main" xmlns:r="http://schemas.openxmlformats.org/officeDocument/2006/relationships" xmlns:p="http://schemas.openxmlformats.org/presentationml/2006/main">
-  <p:cSld>
-    <p:spTree>
-      <p:nvGrpSpPr>
-        <p:cNvPr id="1" name=""/>
-        <p:cNvGrpSpPr/>
-        <p:nvPr/>
-      </p:nvGrpSpPr>
-      <p:grpSpPr>
-        <a:xfrm>
-          <a:off x="0" y="0"/>
-          <a:ext cx="0" cy="0"/>
-          <a:chOff x="0" y="0"/>
-          <a:chExt cx="0" cy="0"/>
-        </a:xfrm>
-      </p:grpSpPr>
-      <p:sp>
-        <p:nvSpPr>
-          <p:cNvPr id="2" name="TextBox 1">
-            <a:extLst>
-              <a:ext uri="{FF2B5EF4-FFF2-40B4-BE49-F238E27FC236}">
-                <a16:creationId xmlns:a16="http://schemas.microsoft.com/office/drawing/2014/main" id="{173364C4-CB84-A1D3-F6F3-AC3B3E94681F}"/>
-              </a:ext>
-            </a:extLst>
-          </p:cNvPr>
-          <p:cNvSpPr txBox="1"/>
-          <p:nvPr/>
-        </p:nvSpPr>
-        <p:spPr>
-          <a:xfrm>
-            <a:off x="933090" y="1100040"/>
-            <a:ext cx="10325819" cy="2308324"/>
-          </a:xfrm>
-          <a:prstGeom prst="rect">
-            <a:avLst/>
-          </a:prstGeom>
-          <a:noFill/>
-        </p:spPr>
-        <p:txBody>
-          <a:bodyPr wrap="square" rtlCol="0">
-            <a:spAutoFit/>
-          </a:bodyPr>
-          <a:lstStyle/>
-          <a:p>
-            <a:r>
-              <a:rPr lang="en-US" dirty="0"/>
-              <a:t>Position embedding:</a:t>
-            </a:r>
-          </a:p>
-          <a:p>
-            <a:pPr marL="342900" indent="-342900">
-              <a:buFont typeface="+mj-lt"/>
-              <a:buAutoNum type="arabicPeriod"/>
-            </a:pPr>
-            <a:r>
-              <a:rPr lang="en-US" dirty="0"/>
-              <a:t>Use absolute position determined from each specific aa sequence?</a:t>
-            </a:r>
-          </a:p>
-          <a:p>
-            <a:pPr marL="342900" indent="-342900">
-              <a:buFont typeface="+mj-lt"/>
-              <a:buAutoNum type="arabicPeriod"/>
-            </a:pPr>
-            <a:endParaRPr lang="en-US" dirty="0"/>
-          </a:p>
-          <a:p>
-            <a:pPr marL="342900" indent="-342900">
-              <a:buFont typeface="+mj-lt"/>
-              <a:buAutoNum type="arabicPeriod"/>
-            </a:pPr>
-            <a:r>
-              <a:rPr lang="en-US" dirty="0"/>
-              <a:t>Or, the absolute position in the entire human light chain? </a:t>
-            </a:r>
-          </a:p>
-          <a:p>
-            <a:pPr marL="742950" lvl="1" indent="-285750">
-              <a:buFont typeface="Arial" panose="020B0604020202020204" pitchFamily="34" charset="0"/>
-              <a:buChar char="•"/>
-            </a:pPr>
-            <a:r>
-              <a:rPr lang="en-US" dirty="0"/>
-              <a:t>makes more sense but not sure how I can get this information or if it changes for different antibody types (</a:t>
-            </a:r>
-            <a:r>
-              <a:rPr lang="en-US" dirty="0" err="1"/>
-              <a:t>ie</a:t>
-            </a:r>
-            <a:r>
-              <a:rPr lang="en-US" dirty="0"/>
-              <a:t>. IgG, IgA, </a:t>
-            </a:r>
-            <a:r>
-              <a:rPr lang="en-US" dirty="0" err="1"/>
-              <a:t>etc</a:t>
-            </a:r>
-            <a:r>
-              <a:rPr lang="en-US" dirty="0"/>
-              <a:t>)</a:t>
-            </a:r>
-          </a:p>
-          <a:p>
-            <a:pPr marL="742950" lvl="1" indent="-285750">
-              <a:buFont typeface="Arial" panose="020B0604020202020204" pitchFamily="34" charset="0"/>
-              <a:buChar char="•"/>
-            </a:pPr>
-            <a:r>
-              <a:rPr lang="en-US" dirty="0"/>
-              <a:t>There is no absolute light chain length for human IgG abs.  A few different chains have slightly different lengths.  Absolute alignment with reference light chains is probably not practical.</a:t>
-            </a:r>
-          </a:p>
-        </p:txBody>
-      </p:sp>
-      <p:sp>
-        <p:nvSpPr>
-          <p:cNvPr id="3" name="TextBox 2">
-            <a:extLst>
-              <a:ext uri="{FF2B5EF4-FFF2-40B4-BE49-F238E27FC236}">
-                <a16:creationId xmlns:a16="http://schemas.microsoft.com/office/drawing/2014/main" id="{86DCB64A-0BD4-1C80-7F06-5E42F0FEC3C4}"/>
-              </a:ext>
-            </a:extLst>
-          </p:cNvPr>
-          <p:cNvSpPr txBox="1"/>
-          <p:nvPr/>
-        </p:nvSpPr>
-        <p:spPr>
-          <a:xfrm>
-            <a:off x="219456" y="192024"/>
-            <a:ext cx="6630918" cy="461665"/>
-          </a:xfrm>
-          <a:prstGeom prst="rect">
-            <a:avLst/>
-          </a:prstGeom>
-          <a:noFill/>
-        </p:spPr>
-        <p:txBody>
-          <a:bodyPr wrap="none" rtlCol="0">
-            <a:spAutoFit/>
-          </a:bodyPr>
-          <a:lstStyle/>
-          <a:p>
-            <a:r>
-              <a:rPr lang="en-US" sz="2400" dirty="0"/>
-              <a:t>Issue(s) I have not resolved to my satisfaction yet</a:t>
-            </a:r>
-          </a:p>
-        </p:txBody>
-      </p:sp>
-      <p:sp>
-        <p:nvSpPr>
-          <p:cNvPr id="4" name="TextBox 3">
-            <a:extLst>
-              <a:ext uri="{FF2B5EF4-FFF2-40B4-BE49-F238E27FC236}">
-                <a16:creationId xmlns:a16="http://schemas.microsoft.com/office/drawing/2014/main" id="{F743C41F-EB12-14F8-5B10-D2C9FEE59C1B}"/>
-              </a:ext>
-            </a:extLst>
-          </p:cNvPr>
-          <p:cNvSpPr txBox="1"/>
-          <p:nvPr/>
-        </p:nvSpPr>
-        <p:spPr>
-          <a:xfrm>
-            <a:off x="630936" y="4233672"/>
-            <a:ext cx="2885342" cy="369332"/>
-          </a:xfrm>
-          <a:prstGeom prst="rect">
-            <a:avLst/>
-          </a:prstGeom>
-          <a:noFill/>
-        </p:spPr>
-        <p:txBody>
-          <a:bodyPr wrap="none" rtlCol="0">
-            <a:spAutoFit/>
-          </a:bodyPr>
-          <a:lstStyle/>
-          <a:p>
-            <a:r>
-              <a:rPr lang="en-US" dirty="0"/>
-              <a:t>I’ll pre-train using option #1</a:t>
-            </a:r>
-          </a:p>
-        </p:txBody>
-      </p:sp>
-    </p:spTree>
-    <p:extLst>
-      <p:ext uri="{BB962C8B-B14F-4D97-AF65-F5344CB8AC3E}">
-        <p14:creationId xmlns:p14="http://schemas.microsoft.com/office/powerpoint/2010/main" val="1802993917"/>
-      </p:ext>
-    </p:extLst>
-  </p:cSld>
-  <p:clrMapOvr>
-    <a:masterClrMapping/>
-  </p:clrMapOvr>
-</p:sld>
-</file>
-
 <file path=ppt/slides/slide2.xml><?xml version="1.0" encoding="utf-8"?>
 <p:sld xmlns:a="http://schemas.openxmlformats.org/drawingml/2006/main" xmlns:r="http://schemas.openxmlformats.org/officeDocument/2006/relationships" xmlns:p="http://schemas.openxmlformats.org/presentationml/2006/main">
   <p:cSld>
@@ -18591,6 +19094,204 @@
           <p:cNvPr id="2" name="TextBox 1">
             <a:extLst>
               <a:ext uri="{FF2B5EF4-FFF2-40B4-BE49-F238E27FC236}">
+                <a16:creationId xmlns:a16="http://schemas.microsoft.com/office/drawing/2014/main" id="{173364C4-CB84-A1D3-F6F3-AC3B3E94681F}"/>
+              </a:ext>
+            </a:extLst>
+          </p:cNvPr>
+          <p:cNvSpPr txBox="1"/>
+          <p:nvPr/>
+        </p:nvSpPr>
+        <p:spPr>
+          <a:xfrm>
+            <a:off x="933090" y="1100040"/>
+            <a:ext cx="10325819" cy="2308324"/>
+          </a:xfrm>
+          <a:prstGeom prst="rect">
+            <a:avLst/>
+          </a:prstGeom>
+          <a:noFill/>
+        </p:spPr>
+        <p:txBody>
+          <a:bodyPr wrap="square" rtlCol="0">
+            <a:spAutoFit/>
+          </a:bodyPr>
+          <a:lstStyle/>
+          <a:p>
+            <a:r>
+              <a:rPr lang="en-US" dirty="0"/>
+              <a:t>Position embedding:</a:t>
+            </a:r>
+          </a:p>
+          <a:p>
+            <a:pPr marL="342900" indent="-342900">
+              <a:buFont typeface="+mj-lt"/>
+              <a:buAutoNum type="arabicPeriod"/>
+            </a:pPr>
+            <a:r>
+              <a:rPr lang="en-US" dirty="0"/>
+              <a:t>Use absolute position determined from each specific aa sequence?</a:t>
+            </a:r>
+          </a:p>
+          <a:p>
+            <a:pPr marL="342900" indent="-342900">
+              <a:buFont typeface="+mj-lt"/>
+              <a:buAutoNum type="arabicPeriod"/>
+            </a:pPr>
+            <a:endParaRPr lang="en-US" dirty="0"/>
+          </a:p>
+          <a:p>
+            <a:pPr marL="342900" indent="-342900">
+              <a:buFont typeface="+mj-lt"/>
+              <a:buAutoNum type="arabicPeriod"/>
+            </a:pPr>
+            <a:r>
+              <a:rPr lang="en-US" dirty="0"/>
+              <a:t>Or, the absolute position in the entire human light chain? </a:t>
+            </a:r>
+          </a:p>
+          <a:p>
+            <a:pPr marL="742950" lvl="1" indent="-285750">
+              <a:buFont typeface="Arial" panose="020B0604020202020204" pitchFamily="34" charset="0"/>
+              <a:buChar char="•"/>
+            </a:pPr>
+            <a:r>
+              <a:rPr lang="en-US" dirty="0"/>
+              <a:t>makes more sense but not sure how I can get this information or if it changes for different antibody types (</a:t>
+            </a:r>
+            <a:r>
+              <a:rPr lang="en-US" dirty="0" err="1"/>
+              <a:t>ie</a:t>
+            </a:r>
+            <a:r>
+              <a:rPr lang="en-US" dirty="0"/>
+              <a:t>. IgG, IgA, </a:t>
+            </a:r>
+            <a:r>
+              <a:rPr lang="en-US" dirty="0" err="1"/>
+              <a:t>etc</a:t>
+            </a:r>
+            <a:r>
+              <a:rPr lang="en-US" dirty="0"/>
+              <a:t>)</a:t>
+            </a:r>
+          </a:p>
+          <a:p>
+            <a:pPr marL="742950" lvl="1" indent="-285750">
+              <a:buFont typeface="Arial" panose="020B0604020202020204" pitchFamily="34" charset="0"/>
+              <a:buChar char="•"/>
+            </a:pPr>
+            <a:r>
+              <a:rPr lang="en-US" dirty="0"/>
+              <a:t>There is no absolute light chain length for human IgG abs.  A few different chains have slightly different lengths.  Absolute alignment with reference light chains is probably not practical.</a:t>
+            </a:r>
+          </a:p>
+        </p:txBody>
+      </p:sp>
+      <p:sp>
+        <p:nvSpPr>
+          <p:cNvPr id="3" name="TextBox 2">
+            <a:extLst>
+              <a:ext uri="{FF2B5EF4-FFF2-40B4-BE49-F238E27FC236}">
+                <a16:creationId xmlns:a16="http://schemas.microsoft.com/office/drawing/2014/main" id="{86DCB64A-0BD4-1C80-7F06-5E42F0FEC3C4}"/>
+              </a:ext>
+            </a:extLst>
+          </p:cNvPr>
+          <p:cNvSpPr txBox="1"/>
+          <p:nvPr/>
+        </p:nvSpPr>
+        <p:spPr>
+          <a:xfrm>
+            <a:off x="219456" y="192024"/>
+            <a:ext cx="6630918" cy="461665"/>
+          </a:xfrm>
+          <a:prstGeom prst="rect">
+            <a:avLst/>
+          </a:prstGeom>
+          <a:noFill/>
+        </p:spPr>
+        <p:txBody>
+          <a:bodyPr wrap="none" rtlCol="0">
+            <a:spAutoFit/>
+          </a:bodyPr>
+          <a:lstStyle/>
+          <a:p>
+            <a:r>
+              <a:rPr lang="en-US" sz="2400" dirty="0"/>
+              <a:t>Issue(s) I have not resolved to my satisfaction yet</a:t>
+            </a:r>
+          </a:p>
+        </p:txBody>
+      </p:sp>
+      <p:sp>
+        <p:nvSpPr>
+          <p:cNvPr id="4" name="TextBox 3">
+            <a:extLst>
+              <a:ext uri="{FF2B5EF4-FFF2-40B4-BE49-F238E27FC236}">
+                <a16:creationId xmlns:a16="http://schemas.microsoft.com/office/drawing/2014/main" id="{F743C41F-EB12-14F8-5B10-D2C9FEE59C1B}"/>
+              </a:ext>
+            </a:extLst>
+          </p:cNvPr>
+          <p:cNvSpPr txBox="1"/>
+          <p:nvPr/>
+        </p:nvSpPr>
+        <p:spPr>
+          <a:xfrm>
+            <a:off x="630936" y="4233672"/>
+            <a:ext cx="2885342" cy="369332"/>
+          </a:xfrm>
+          <a:prstGeom prst="rect">
+            <a:avLst/>
+          </a:prstGeom>
+          <a:noFill/>
+        </p:spPr>
+        <p:txBody>
+          <a:bodyPr wrap="none" rtlCol="0">
+            <a:spAutoFit/>
+          </a:bodyPr>
+          <a:lstStyle/>
+          <a:p>
+            <a:r>
+              <a:rPr lang="en-US" dirty="0"/>
+              <a:t>I’ll pre-train using option #1</a:t>
+            </a:r>
+          </a:p>
+        </p:txBody>
+      </p:sp>
+    </p:spTree>
+    <p:extLst>
+      <p:ext uri="{BB962C8B-B14F-4D97-AF65-F5344CB8AC3E}">
+        <p14:creationId xmlns:p14="http://schemas.microsoft.com/office/powerpoint/2010/main" val="1802993917"/>
+      </p:ext>
+    </p:extLst>
+  </p:cSld>
+  <p:clrMapOvr>
+    <a:masterClrMapping/>
+  </p:clrMapOvr>
+</p:sld>
+</file>
+
+<file path=ppt/slides/slide21.xml><?xml version="1.0" encoding="utf-8"?>
+<p:sld xmlns:a="http://schemas.openxmlformats.org/drawingml/2006/main" xmlns:r="http://schemas.openxmlformats.org/officeDocument/2006/relationships" xmlns:p="http://schemas.openxmlformats.org/presentationml/2006/main">
+  <p:cSld>
+    <p:spTree>
+      <p:nvGrpSpPr>
+        <p:cNvPr id="1" name=""/>
+        <p:cNvGrpSpPr/>
+        <p:nvPr/>
+      </p:nvGrpSpPr>
+      <p:grpSpPr>
+        <a:xfrm>
+          <a:off x="0" y="0"/>
+          <a:ext cx="0" cy="0"/>
+          <a:chOff x="0" y="0"/>
+          <a:chExt cx="0" cy="0"/>
+        </a:xfrm>
+      </p:grpSpPr>
+      <p:sp>
+        <p:nvSpPr>
+          <p:cNvPr id="2" name="TextBox 1">
+            <a:extLst>
+              <a:ext uri="{FF2B5EF4-FFF2-40B4-BE49-F238E27FC236}">
                 <a16:creationId xmlns:a16="http://schemas.microsoft.com/office/drawing/2014/main" id="{F1009346-0A06-C618-B97B-16F018B30694}"/>
               </a:ext>
             </a:extLst>
@@ -18906,7 +19607,7 @@
 </p:sld>
 </file>
 
-<file path=ppt/slides/slide21.xml><?xml version="1.0" encoding="utf-8"?>
+<file path=ppt/slides/slide22.xml><?xml version="1.0" encoding="utf-8"?>
 <p:sld xmlns:a="http://schemas.openxmlformats.org/drawingml/2006/main" xmlns:r="http://schemas.openxmlformats.org/officeDocument/2006/relationships" xmlns:p="http://schemas.openxmlformats.org/presentationml/2006/main">
   <p:cSld>
     <p:spTree>
@@ -19093,7 +19794,7 @@
 </p:sld>
 </file>
 
-<file path=ppt/slides/slide22.xml><?xml version="1.0" encoding="utf-8"?>
+<file path=ppt/slides/slide23.xml><?xml version="1.0" encoding="utf-8"?>
 <p:sld xmlns:a="http://schemas.openxmlformats.org/drawingml/2006/main" xmlns:r="http://schemas.openxmlformats.org/officeDocument/2006/relationships" xmlns:p="http://schemas.openxmlformats.org/presentationml/2006/main">
   <p:cSld>
     <p:spTree>
@@ -19645,7 +20346,7 @@
 </p:sld>
 </file>
 
-<file path=ppt/slides/slide23.xml><?xml version="1.0" encoding="utf-8"?>
+<file path=ppt/slides/slide24.xml><?xml version="1.0" encoding="utf-8"?>
 <p:sld xmlns:a="http://schemas.openxmlformats.org/drawingml/2006/main" xmlns:r="http://schemas.openxmlformats.org/officeDocument/2006/relationships" xmlns:p="http://schemas.openxmlformats.org/presentationml/2006/main">
   <p:cSld>
     <p:spTree>
@@ -19953,7 +20654,7 @@
 </p:sld>
 </file>
 
-<file path=ppt/slides/slide24.xml><?xml version="1.0" encoding="utf-8"?>
+<file path=ppt/slides/slide25.xml><?xml version="1.0" encoding="utf-8"?>
 <p:sld xmlns:a="http://schemas.openxmlformats.org/drawingml/2006/main" xmlns:r="http://schemas.openxmlformats.org/officeDocument/2006/relationships" xmlns:p="http://schemas.openxmlformats.org/presentationml/2006/main">
   <p:cSld>
     <p:spTree>
@@ -20212,9 +20913,9 @@
           <p:nvPr/>
         </p:nvSpPr>
         <p:spPr>
-          <a:xfrm rot="3425923">
-            <a:off x="3184486" y="3975387"/>
-            <a:ext cx="326415" cy="2305605"/>
+          <a:xfrm rot="3143533">
+            <a:off x="3147459" y="3942365"/>
+            <a:ext cx="297297" cy="2905664"/>
           </a:xfrm>
           <a:prstGeom prst="rightBrace">
             <a:avLst/>
@@ -20440,7 +21141,7 @@
         <p:spPr>
           <a:xfrm>
             <a:off x="5037826" y="5365630"/>
-            <a:ext cx="5996898" cy="369332"/>
+            <a:ext cx="5326138" cy="369332"/>
           </a:xfrm>
           <a:prstGeom prst="rect">
             <a:avLst/>
@@ -20455,7 +21156,7 @@
           <a:p>
             <a:r>
               <a:rPr lang="en-US" dirty="0"/>
-              <a:t>Data points in this region should be considered for removal</a:t>
+              <a:t>Data in this region should be considered for removal</a:t>
             </a:r>
           </a:p>
         </p:txBody>
@@ -20476,9 +21177,9 @@
           <p:nvPr/>
         </p:nvCxnSpPr>
         <p:spPr>
-          <a:xfrm flipH="1" flipV="1">
-            <a:off x="3519577" y="5296619"/>
-            <a:ext cx="1518249" cy="253677"/>
+          <a:xfrm flipH="1">
+            <a:off x="3485072" y="5550296"/>
+            <a:ext cx="1552754" cy="0"/>
           </a:xfrm>
           <a:prstGeom prst="straightConnector1">
             <a:avLst/>
@@ -20696,7 +21397,7 @@
         </p:nvSpPr>
         <p:spPr>
           <a:xfrm>
-            <a:off x="933805" y="3411581"/>
+            <a:off x="933805" y="2950039"/>
             <a:ext cx="9486903" cy="1477328"/>
           </a:xfrm>
           <a:prstGeom prst="rect">
@@ -20820,7 +21521,7 @@
         </p:nvSpPr>
         <p:spPr>
           <a:xfrm>
-            <a:off x="586596" y="3042249"/>
+            <a:off x="586596" y="2580707"/>
             <a:ext cx="978153" cy="369332"/>
           </a:xfrm>
           <a:prstGeom prst="rect">
@@ -20841,36 +21542,6 @@
           </a:p>
         </p:txBody>
       </p:sp>
-      <p:pic>
-        <p:nvPicPr>
-          <p:cNvPr id="8" name="Picture 7">
-            <a:extLst>
-              <a:ext uri="{FF2B5EF4-FFF2-40B4-BE49-F238E27FC236}">
-                <a16:creationId xmlns:a16="http://schemas.microsoft.com/office/drawing/2014/main" id="{AE83AF95-EFB8-D9AC-6769-E9A67E57C14B}"/>
-              </a:ext>
-            </a:extLst>
-          </p:cNvPr>
-          <p:cNvPicPr>
-            <a:picLocks noChangeAspect="1"/>
-          </p:cNvPicPr>
-          <p:nvPr/>
-        </p:nvPicPr>
-        <p:blipFill>
-          <a:blip r:embed="rId2"/>
-          <a:stretch>
-            <a:fillRect/>
-          </a:stretch>
-        </p:blipFill>
-        <p:spPr>
-          <a:xfrm>
-            <a:off x="7593043" y="4490202"/>
-            <a:ext cx="3026075" cy="2223039"/>
-          </a:xfrm>
-          <a:prstGeom prst="rect">
-            <a:avLst/>
-          </a:prstGeom>
-        </p:spPr>
-      </p:pic>
       <p:sp>
         <p:nvSpPr>
           <p:cNvPr id="9" name="TextBox 8">
@@ -20901,7 +21572,7 @@
           <a:p>
             <a:r>
               <a:rPr lang="en-US" dirty="0"/>
-              <a:t>Clean-2 dataset</a:t>
+              <a:t>Clean-3 dataset</a:t>
             </a:r>
           </a:p>
         </p:txBody>
@@ -20921,7 +21592,7 @@
           <p:nvPr/>
         </p:nvPicPr>
         <p:blipFill>
-          <a:blip r:embed="rId3"/>
+          <a:blip r:embed="rId2"/>
           <a:stretch>
             <a:fillRect/>
           </a:stretch>
@@ -20971,6 +21642,170 @@
           </a:p>
         </p:txBody>
       </p:sp>
+      <p:sp>
+        <p:nvSpPr>
+          <p:cNvPr id="12" name="TextBox 11">
+            <a:extLst>
+              <a:ext uri="{FF2B5EF4-FFF2-40B4-BE49-F238E27FC236}">
+                <a16:creationId xmlns:a16="http://schemas.microsoft.com/office/drawing/2014/main" id="{4379C880-87A8-E4F0-3029-8D5A6116FAEB}"/>
+              </a:ext>
+            </a:extLst>
+          </p:cNvPr>
+          <p:cNvSpPr txBox="1"/>
+          <p:nvPr/>
+        </p:nvSpPr>
+        <p:spPr>
+          <a:xfrm>
+            <a:off x="598097" y="4792386"/>
+            <a:ext cx="978153" cy="369332"/>
+          </a:xfrm>
+          <a:prstGeom prst="rect">
+            <a:avLst/>
+          </a:prstGeom>
+          <a:noFill/>
+        </p:spPr>
+        <p:txBody>
+          <a:bodyPr wrap="none" rtlCol="0">
+            <a:spAutoFit/>
+          </a:bodyPr>
+          <a:lstStyle/>
+          <a:p>
+            <a:r>
+              <a:rPr lang="en-US" dirty="0"/>
+              <a:t>Clean-3</a:t>
+            </a:r>
+          </a:p>
+        </p:txBody>
+      </p:sp>
+      <p:sp>
+        <p:nvSpPr>
+          <p:cNvPr id="13" name="TextBox 12">
+            <a:extLst>
+              <a:ext uri="{FF2B5EF4-FFF2-40B4-BE49-F238E27FC236}">
+                <a16:creationId xmlns:a16="http://schemas.microsoft.com/office/drawing/2014/main" id="{593741C5-6171-594F-EF0C-3540745BA613}"/>
+              </a:ext>
+            </a:extLst>
+          </p:cNvPr>
+          <p:cNvSpPr txBox="1"/>
+          <p:nvPr/>
+        </p:nvSpPr>
+        <p:spPr>
+          <a:xfrm>
+            <a:off x="933805" y="5161718"/>
+            <a:ext cx="6467660" cy="1200329"/>
+          </a:xfrm>
+          <a:prstGeom prst="rect">
+            <a:avLst/>
+          </a:prstGeom>
+          <a:noFill/>
+        </p:spPr>
+        <p:txBody>
+          <a:bodyPr wrap="square">
+            <a:spAutoFit/>
+          </a:bodyPr>
+          <a:lstStyle/>
+          <a:p>
+            <a:pPr marL="285750" indent="-285750">
+              <a:buFont typeface="Arial" panose="020B0604020202020204" pitchFamily="34" charset="0"/>
+              <a:buChar char="•"/>
+            </a:pPr>
+            <a:r>
+              <a:rPr lang="en-US" dirty="0"/>
+              <a:t>remove NANs, duplicates, and use mean </a:t>
+            </a:r>
+            <a:r>
+              <a:rPr lang="en-US" dirty="0" err="1"/>
+              <a:t>Kd</a:t>
+            </a:r>
+            <a:r>
+              <a:rPr lang="en-US" dirty="0"/>
+              <a:t> for duplicates</a:t>
+            </a:r>
+          </a:p>
+          <a:p>
+            <a:pPr marL="285750" indent="-285750">
+              <a:buFont typeface="Arial" panose="020B0604020202020204" pitchFamily="34" charset="0"/>
+              <a:buChar char="•"/>
+            </a:pPr>
+            <a:r>
+              <a:rPr lang="en-US" sz="1800" b="0" dirty="0">
+                <a:effectLst/>
+              </a:rPr>
+              <a:t>remove all rows with </a:t>
+            </a:r>
+            <a:r>
+              <a:rPr lang="en-US" sz="1800" b="0" dirty="0" err="1">
+                <a:effectLst/>
+              </a:rPr>
+              <a:t>q_value</a:t>
+            </a:r>
+            <a:r>
+              <a:rPr lang="en-US" sz="1800" b="0" dirty="0">
+                <a:effectLst/>
+              </a:rPr>
+              <a:t> &gt; 0.05 (9302 rows remain)</a:t>
+            </a:r>
+          </a:p>
+          <a:p>
+            <a:pPr marL="285750" indent="-285750">
+              <a:buFont typeface="Arial" panose="020B0604020202020204" pitchFamily="34" charset="0"/>
+              <a:buChar char="•"/>
+            </a:pPr>
+            <a:r>
+              <a:rPr lang="en-US" dirty="0"/>
+              <a:t>90/10 split: train(8325), </a:t>
+            </a:r>
+            <a:r>
+              <a:rPr lang="en-US" dirty="0" err="1"/>
+              <a:t>val</a:t>
+            </a:r>
+            <a:r>
+              <a:rPr lang="en-US" dirty="0"/>
+              <a:t>(925)</a:t>
+            </a:r>
+            <a:endParaRPr lang="en-US" sz="1800" b="0" dirty="0">
+              <a:effectLst/>
+            </a:endParaRPr>
+          </a:p>
+          <a:p>
+            <a:pPr marL="285750" indent="-285750">
+              <a:buFont typeface="Arial" panose="020B0604020202020204" pitchFamily="34" charset="0"/>
+              <a:buChar char="•"/>
+            </a:pPr>
+            <a:endParaRPr lang="en-US" dirty="0"/>
+          </a:p>
+        </p:txBody>
+      </p:sp>
+      <p:pic>
+        <p:nvPicPr>
+          <p:cNvPr id="14" name="Picture 13">
+            <a:extLst>
+              <a:ext uri="{FF2B5EF4-FFF2-40B4-BE49-F238E27FC236}">
+                <a16:creationId xmlns:a16="http://schemas.microsoft.com/office/drawing/2014/main" id="{B6B8555E-543F-42E6-240A-282609C1AB30}"/>
+              </a:ext>
+            </a:extLst>
+          </p:cNvPr>
+          <p:cNvPicPr>
+            <a:picLocks noChangeAspect="1"/>
+          </p:cNvPicPr>
+          <p:nvPr/>
+        </p:nvPicPr>
+        <p:blipFill>
+          <a:blip r:embed="rId3"/>
+          <a:stretch>
+            <a:fillRect/>
+          </a:stretch>
+        </p:blipFill>
+        <p:spPr>
+          <a:xfrm>
+            <a:off x="8009387" y="4684541"/>
+            <a:ext cx="2955537" cy="2154682"/>
+          </a:xfrm>
+          <a:prstGeom prst="rect">
+            <a:avLst/>
+          </a:prstGeom>
+        </p:spPr>
+      </p:pic>
     </p:spTree>
     <p:extLst>
       <p:ext uri="{BB962C8B-B14F-4D97-AF65-F5344CB8AC3E}">
@@ -21177,10 +22012,9 @@
               <a:buChar char="•"/>
             </a:pPr>
             <a:r>
-              <a:rPr lang="en-US"/>
+              <a:rPr lang="en-US" dirty="0"/>
               <a:t>Early stopping</a:t>
             </a:r>
-            <a:endParaRPr lang="en-US" dirty="0"/>
           </a:p>
           <a:p>
             <a:pPr marL="285750" indent="-285750">
@@ -22848,7 +23682,7 @@
         <p:spPr>
           <a:xfrm>
             <a:off x="140127" y="221836"/>
-            <a:ext cx="1180516" cy="461665"/>
+            <a:ext cx="3535199" cy="461665"/>
           </a:xfrm>
           <a:prstGeom prst="rect">
             <a:avLst/>
@@ -22863,7 +23697,7 @@
           <a:p>
             <a:r>
               <a:rPr lang="en-US" sz="2400" dirty="0"/>
-              <a:t>Results</a:t>
+              <a:t>Results:  Dataset Clean-1</a:t>
             </a:r>
           </a:p>
         </p:txBody>
@@ -22883,14 +23717,14 @@
           <p:nvPr>
             <p:extLst>
               <p:ext uri="{D42A27DB-BD31-4B8C-83A1-F6EECF244321}">
-                <p14:modId xmlns:p14="http://schemas.microsoft.com/office/powerpoint/2010/main" val="1437116497"/>
+                <p14:modId xmlns:p14="http://schemas.microsoft.com/office/powerpoint/2010/main" val="3726838997"/>
               </p:ext>
             </p:extLst>
           </p:nvPr>
         </p:nvGraphicFramePr>
         <p:xfrm>
-          <a:off x="1729491" y="800657"/>
-          <a:ext cx="8484185" cy="4044552"/>
+          <a:off x="1155168" y="1019273"/>
+          <a:ext cx="8556704" cy="4179063"/>
         </p:xfrm>
         <a:graphic>
           <a:graphicData uri="http://schemas.openxmlformats.org/drawingml/2006/table">
@@ -22899,35 +23733,42 @@
                 <a:tableStyleId>{5C22544A-7EE6-4342-B048-85BDC9FD1C3A}</a:tableStyleId>
               </a:tblPr>
               <a:tblGrid>
-                <a:gridCol w="2026759">
+                <a:gridCol w="1552639">
                   <a:extLst>
                     <a:ext uri="{9D8B030D-6E8A-4147-A177-3AD203B41FA5}">
                       <a16:colId xmlns:a16="http://schemas.microsoft.com/office/drawing/2014/main" val="1065848917"/>
                     </a:ext>
                   </a:extLst>
                 </a:gridCol>
-                <a:gridCol w="1325749">
+                <a:gridCol w="1355182">
                   <a:extLst>
                     <a:ext uri="{9D8B030D-6E8A-4147-A177-3AD203B41FA5}">
                       <a16:colId xmlns:a16="http://schemas.microsoft.com/office/drawing/2014/main" val="873310604"/>
                     </a:ext>
                   </a:extLst>
                 </a:gridCol>
-                <a:gridCol w="1414151">
+                <a:gridCol w="1445547">
                   <a:extLst>
                     <a:ext uri="{9D8B030D-6E8A-4147-A177-3AD203B41FA5}">
                       <a16:colId xmlns:a16="http://schemas.microsoft.com/office/drawing/2014/main" val="3981708244"/>
                     </a:ext>
                   </a:extLst>
                 </a:gridCol>
-                <a:gridCol w="1858763">
+                <a:gridCol w="1070391">
                   <a:extLst>
                     <a:ext uri="{9D8B030D-6E8A-4147-A177-3AD203B41FA5}">
                       <a16:colId xmlns:a16="http://schemas.microsoft.com/office/drawing/2014/main" val="1135465181"/>
                     </a:ext>
                   </a:extLst>
                 </a:gridCol>
-                <a:gridCol w="1858763">
+                <a:gridCol w="1232916">
+                  <a:extLst>
+                    <a:ext uri="{9D8B030D-6E8A-4147-A177-3AD203B41FA5}">
+                      <a16:colId xmlns:a16="http://schemas.microsoft.com/office/drawing/2014/main" val="784973340"/>
+                    </a:ext>
+                  </a:extLst>
+                </a:gridCol>
+                <a:gridCol w="1900029">
                   <a:extLst>
                     <a:ext uri="{9D8B030D-6E8A-4147-A177-3AD203B41FA5}">
                       <a16:colId xmlns:a16="http://schemas.microsoft.com/office/drawing/2014/main" val="2256753199"/>
@@ -22948,7 +23789,7 @@
                       </a:r>
                     </a:p>
                   </a:txBody>
-                  <a:tcPr/>
+                  <a:tcPr anchor="ctr"/>
                 </a:tc>
                 <a:tc>
                   <a:txBody>
@@ -22962,7 +23803,7 @@
                       </a:r>
                     </a:p>
                   </a:txBody>
-                  <a:tcPr/>
+                  <a:tcPr anchor="ctr"/>
                 </a:tc>
                 <a:tc>
                   <a:txBody>
@@ -22976,7 +23817,7 @@
                       </a:r>
                     </a:p>
                   </a:txBody>
-                  <a:tcPr/>
+                  <a:tcPr anchor="ctr"/>
                 </a:tc>
                 <a:tc>
                   <a:txBody>
@@ -22990,7 +23831,28 @@
                       </a:r>
                     </a:p>
                   </a:txBody>
-                  <a:tcPr/>
+                  <a:tcPr anchor="ctr"/>
+                </a:tc>
+                <a:tc>
+                  <a:txBody>
+                    <a:bodyPr/>
+                    <a:lstStyle/>
+                    <a:p>
+                      <a:pPr algn="ctr"/>
+                      <a:r>
+                        <a:rPr lang="en-US" dirty="0"/>
+                        <a:t>RMSD </a:t>
+                      </a:r>
+                    </a:p>
+                    <a:p>
+                      <a:pPr algn="ctr"/>
+                      <a:r>
+                        <a:rPr lang="en-US" dirty="0"/>
+                        <a:t>(valid set)</a:t>
+                      </a:r>
+                    </a:p>
+                  </a:txBody>
+                  <a:tcPr anchor="ctr"/>
                 </a:tc>
                 <a:tc>
                   <a:txBody>
@@ -23004,7 +23866,7 @@
                       </a:r>
                     </a:p>
                   </a:txBody>
-                  <a:tcPr/>
+                  <a:tcPr anchor="ctr"/>
                 </a:tc>
                 <a:extLst>
                   <a:ext uri="{0D108BD9-81ED-4DB2-BD59-A6C34878D82A}">
@@ -23062,7 +23924,21 @@
                       <a:pPr algn="ctr"/>
                       <a:r>
                         <a:rPr lang="en-US" dirty="0"/>
-                        <a:t>10,000</a:t>
+                        <a:t>10K</a:t>
+                      </a:r>
+                    </a:p>
+                  </a:txBody>
+                  <a:tcPr anchor="ctr"/>
+                </a:tc>
+                <a:tc>
+                  <a:txBody>
+                    <a:bodyPr/>
+                    <a:lstStyle/>
+                    <a:p>
+                      <a:pPr algn="ctr"/>
+                      <a:r>
+                        <a:rPr lang="en-US" dirty="0"/>
+                        <a:t>1.08</a:t>
                       </a:r>
                     </a:p>
                   </a:txBody>
@@ -23135,7 +24011,7 @@
                       <a:pPr algn="ctr"/>
                       <a:r>
                         <a:rPr lang="en-US" dirty="0"/>
-                        <a:t>10,000</a:t>
+                        <a:t>10K</a:t>
                       </a:r>
                     </a:p>
                   </a:txBody>
@@ -23147,7 +24023,21 @@
                     <a:lstStyle/>
                     <a:p>
                       <a:pPr algn="ctr"/>
-                      <a:endParaRPr lang="en-US"/>
+                      <a:r>
+                        <a:rPr lang="en-US" dirty="0"/>
+                        <a:t>1.06</a:t>
+                      </a:r>
+                    </a:p>
+                  </a:txBody>
+                  <a:tcPr anchor="ctr"/>
+                </a:tc>
+                <a:tc>
+                  <a:txBody>
+                    <a:bodyPr/>
+                    <a:lstStyle/>
+                    <a:p>
+                      <a:pPr algn="ctr"/>
+                      <a:endParaRPr lang="en-US" dirty="0"/>
                     </a:p>
                   </a:txBody>
                   <a:tcPr anchor="ctr"/>
@@ -23178,18 +24068,10 @@
                     <a:lstStyle/>
                     <a:p>
                       <a:pPr algn="ctr"/>
-                      <a:endParaRPr lang="en-US" dirty="0"/>
-                    </a:p>
-                  </a:txBody>
-                  <a:tcPr anchor="ctr"/>
-                </a:tc>
-                <a:tc>
-                  <a:txBody>
-                    <a:bodyPr/>
-                    <a:lstStyle/>
-                    <a:p>
-                      <a:pPr algn="ctr"/>
-                      <a:endParaRPr lang="en-US" dirty="0"/>
+                      <a:r>
+                        <a:rPr lang="en-US" dirty="0"/>
+                        <a:t>0.24</a:t>
+                      </a:r>
                     </a:p>
                   </a:txBody>
                   <a:tcPr anchor="ctr"/>
@@ -23202,7 +24084,35 @@
                       <a:pPr algn="ctr"/>
                       <a:r>
                         <a:rPr lang="en-US" dirty="0"/>
-                        <a:t>10,000</a:t>
+                        <a:t>0.30</a:t>
+                      </a:r>
+                    </a:p>
+                  </a:txBody>
+                  <a:tcPr anchor="ctr"/>
+                </a:tc>
+                <a:tc>
+                  <a:txBody>
+                    <a:bodyPr/>
+                    <a:lstStyle/>
+                    <a:p>
+                      <a:pPr algn="ctr"/>
+                      <a:r>
+                        <a:rPr lang="en-US" dirty="0"/>
+                        <a:t>10K</a:t>
+                      </a:r>
+                    </a:p>
+                  </a:txBody>
+                  <a:tcPr anchor="ctr"/>
+                </a:tc>
+                <a:tc>
+                  <a:txBody>
+                    <a:bodyPr/>
+                    <a:lstStyle/>
+                    <a:p>
+                      <a:pPr algn="ctr"/>
+                      <a:r>
+                        <a:rPr lang="en-US" dirty="0"/>
+                        <a:t>1.05</a:t>
                       </a:r>
                     </a:p>
                   </a:txBody>
@@ -23245,7 +24155,10 @@
                     <a:lstStyle/>
                     <a:p>
                       <a:pPr algn="ctr"/>
-                      <a:endParaRPr lang="en-US" dirty="0"/>
+                      <a:r>
+                        <a:rPr lang="en-US" dirty="0"/>
+                        <a:t>0.28</a:t>
+                      </a:r>
                     </a:p>
                   </a:txBody>
                   <a:tcPr anchor="ctr"/>
@@ -23256,7 +24169,10 @@
                     <a:lstStyle/>
                     <a:p>
                       <a:pPr algn="ctr"/>
-                      <a:endParaRPr lang="en-US" dirty="0"/>
+                      <a:r>
+                        <a:rPr lang="en-US" dirty="0"/>
+                        <a:t>0.34</a:t>
+                      </a:r>
                     </a:p>
                   </a:txBody>
                   <a:tcPr anchor="ctr"/>
@@ -23267,7 +24183,24 @@
                     <a:lstStyle/>
                     <a:p>
                       <a:pPr algn="ctr"/>
-                      <a:endParaRPr lang="en-US" dirty="0"/>
+                      <a:r>
+                        <a:rPr lang="en-US" dirty="0"/>
+                        <a:t>1250</a:t>
+                      </a:r>
+                    </a:p>
+                  </a:txBody>
+                  <a:tcPr anchor="ctr"/>
+                </a:tc>
+                <a:tc>
+                  <a:txBody>
+                    <a:bodyPr/>
+                    <a:lstStyle/>
+                    <a:p>
+                      <a:pPr algn="ctr"/>
+                      <a:r>
+                        <a:rPr lang="en-US" dirty="0"/>
+                        <a:t>1.02</a:t>
+                      </a:r>
                     </a:p>
                   </a:txBody>
                   <a:tcPr anchor="ctr"/>
@@ -23355,6 +24288,17 @@
                     <a:lstStyle/>
                     <a:p>
                       <a:pPr algn="ctr"/>
+                      <a:endParaRPr lang="en-US" dirty="0"/>
+                    </a:p>
+                  </a:txBody>
+                  <a:tcPr anchor="ctr"/>
+                </a:tc>
+                <a:tc>
+                  <a:txBody>
+                    <a:bodyPr/>
+                    <a:lstStyle/>
+                    <a:p>
+                      <a:pPr algn="ctr"/>
                       <a:r>
                         <a:rPr lang="en-US" dirty="0"/>
                         <a:t>strong overfitting</a:t>
@@ -23394,6 +24338,17 @@
                     <a:p>
                       <a:pPr algn="ctr"/>
                       <a:endParaRPr lang="en-US" dirty="0"/>
+                    </a:p>
+                  </a:txBody>
+                  <a:tcPr anchor="ctr"/>
+                </a:tc>
+                <a:tc>
+                  <a:txBody>
+                    <a:bodyPr/>
+                    <a:lstStyle/>
+                    <a:p>
+                      <a:pPr algn="ctr"/>
+                      <a:endParaRPr lang="en-US"/>
                     </a:p>
                   </a:txBody>
                   <a:tcPr anchor="ctr"/>
@@ -23480,6 +24435,17 @@
                     <a:p>
                       <a:pPr algn="ctr"/>
                       <a:endParaRPr lang="en-US"/>
+                    </a:p>
+                  </a:txBody>
+                  <a:tcPr anchor="ctr"/>
+                </a:tc>
+                <a:tc>
+                  <a:txBody>
+                    <a:bodyPr/>
+                    <a:lstStyle/>
+                    <a:p>
+                      <a:pPr algn="ctr"/>
+                      <a:endParaRPr lang="en-US" dirty="0"/>
                     </a:p>
                   </a:txBody>
                   <a:tcPr anchor="ctr"/>

</xml_diff>

<commit_message>
slide deck organized the inference results better
</commit_message>
<xml_diff>
--- a/Homework-aAlphaBio.pptx
+++ b/Homework-aAlphaBio.pptx
@@ -23716,7 +23716,7 @@
           <p:nvPr>
             <p:extLst>
               <p:ext uri="{D42A27DB-BD31-4B8C-83A1-F6EECF244321}">
-                <p14:modId xmlns:p14="http://schemas.microsoft.com/office/powerpoint/2010/main" val="3726838997"/>
+                <p14:modId xmlns:p14="http://schemas.microsoft.com/office/powerpoint/2010/main" val="1561107242"/>
               </p:ext>
             </p:extLst>
           </p:nvPr>
@@ -24336,7 +24336,10 @@
                     <a:lstStyle/>
                     <a:p>
                       <a:pPr algn="ctr"/>
-                      <a:endParaRPr lang="en-US" dirty="0"/>
+                      <a:r>
+                        <a:rPr lang="en-US" dirty="0"/>
+                        <a:t>0.34</a:t>
+                      </a:r>
                     </a:p>
                   </a:txBody>
                   <a:tcPr anchor="ctr"/>
@@ -24347,7 +24350,10 @@
                     <a:lstStyle/>
                     <a:p>
                       <a:pPr algn="ctr"/>
-                      <a:endParaRPr lang="en-US"/>
+                      <a:r>
+                        <a:rPr lang="en-US" dirty="0"/>
+                        <a:t>0.33</a:t>
+                      </a:r>
                     </a:p>
                   </a:txBody>
                   <a:tcPr anchor="ctr"/>
@@ -24358,7 +24364,14 @@
                     <a:lstStyle/>
                     <a:p>
                       <a:pPr algn="ctr"/>
-                      <a:endParaRPr lang="en-US"/>
+                      <a:r>
+                        <a:rPr lang="en-US" dirty="0"/>
+                        <a:t>10 </a:t>
+                      </a:r>
+                      <a:r>
+                        <a:rPr lang="en-US" baseline="30000" dirty="0"/>
+                        <a:t>3</a:t>
+                      </a:r>
                     </a:p>
                   </a:txBody>
                   <a:tcPr anchor="ctr"/>
@@ -24369,7 +24382,11 @@
                     <a:lstStyle/>
                     <a:p>
                       <a:pPr algn="ctr"/>
-                      <a:endParaRPr lang="en-US"/>
+                      <a:r>
+                        <a:rPr lang="en-US" dirty="0" err="1"/>
+                        <a:t>na</a:t>
+                      </a:r>
+                      <a:endParaRPr lang="en-US" dirty="0"/>
                     </a:p>
                   </a:txBody>
                   <a:tcPr anchor="ctr"/>
@@ -24488,7 +24505,7 @@
         <p:spPr>
           <a:xfrm>
             <a:off x="389614" y="5534108"/>
-            <a:ext cx="8333435" cy="646331"/>
+            <a:ext cx="8333435" cy="923330"/>
           </a:xfrm>
           <a:prstGeom prst="rect">
             <a:avLst/>
@@ -24533,6 +24550,22 @@
               <a:rPr lang="en-US" dirty="0"/>
               <a:t> train data</a:t>
             </a:r>
+          </a:p>
+          <a:p>
+            <a:pPr marL="342900" indent="-342900">
+              <a:buAutoNum type="arabicPeriod"/>
+            </a:pPr>
+            <a:r>
+              <a:rPr lang="en-US" dirty="0"/>
+              <a:t>OAS dataset is </a:t>
+            </a:r>
+            <a:r>
+              <a:rPr lang="en-US" b="0" dirty="0">
+                <a:effectLst/>
+              </a:rPr>
+              <a:t>18061315 rows.</a:t>
+            </a:r>
+            <a:endParaRPr lang="en-US" dirty="0"/>
           </a:p>
         </p:txBody>
       </p:sp>

</xml_diff>

<commit_message>
moving files about slide deck
</commit_message>
<xml_diff>
--- a/Homework-aAlphaBio.pptx
+++ b/Homework-aAlphaBio.pptx
@@ -11,25 +11,27 @@
     <p:sldId id="338" r:id="rId5"/>
     <p:sldId id="339" r:id="rId6"/>
     <p:sldId id="333" r:id="rId7"/>
-    <p:sldId id="336" r:id="rId8"/>
-    <p:sldId id="320" r:id="rId9"/>
-    <p:sldId id="334" r:id="rId10"/>
-    <p:sldId id="340" r:id="rId11"/>
-    <p:sldId id="257" r:id="rId12"/>
-    <p:sldId id="258" r:id="rId13"/>
-    <p:sldId id="335" r:id="rId14"/>
-    <p:sldId id="337" r:id="rId15"/>
-    <p:sldId id="330" r:id="rId16"/>
-    <p:sldId id="329" r:id="rId17"/>
-    <p:sldId id="331" r:id="rId18"/>
-    <p:sldId id="318" r:id="rId19"/>
-    <p:sldId id="321" r:id="rId20"/>
-    <p:sldId id="259" r:id="rId21"/>
-    <p:sldId id="322" r:id="rId22"/>
-    <p:sldId id="260" r:id="rId23"/>
-    <p:sldId id="324" r:id="rId24"/>
-    <p:sldId id="261" r:id="rId25"/>
-    <p:sldId id="323" r:id="rId26"/>
+    <p:sldId id="342" r:id="rId8"/>
+    <p:sldId id="336" r:id="rId9"/>
+    <p:sldId id="320" r:id="rId10"/>
+    <p:sldId id="334" r:id="rId11"/>
+    <p:sldId id="340" r:id="rId12"/>
+    <p:sldId id="341" r:id="rId13"/>
+    <p:sldId id="257" r:id="rId14"/>
+    <p:sldId id="258" r:id="rId15"/>
+    <p:sldId id="335" r:id="rId16"/>
+    <p:sldId id="337" r:id="rId17"/>
+    <p:sldId id="330" r:id="rId18"/>
+    <p:sldId id="329" r:id="rId19"/>
+    <p:sldId id="331" r:id="rId20"/>
+    <p:sldId id="318" r:id="rId21"/>
+    <p:sldId id="321" r:id="rId22"/>
+    <p:sldId id="259" r:id="rId23"/>
+    <p:sldId id="322" r:id="rId24"/>
+    <p:sldId id="260" r:id="rId25"/>
+    <p:sldId id="324" r:id="rId26"/>
+    <p:sldId id="261" r:id="rId27"/>
+    <p:sldId id="323" r:id="rId28"/>
   </p:sldIdLst>
   <p:sldSz cx="12192000" cy="6858000"/>
   <p:notesSz cx="6858000" cy="9144000"/>
@@ -3465,7 +3467,7 @@
         <p:spPr>
           <a:xfrm>
             <a:off x="140127" y="221836"/>
-            <a:ext cx="3558346" cy="461665"/>
+            <a:ext cx="3535199" cy="461665"/>
           </a:xfrm>
           <a:prstGeom prst="rect">
             <a:avLst/>
@@ -3480,7 +3482,7 @@
           <a:p>
             <a:r>
               <a:rPr lang="en-US" sz="2400" dirty="0"/>
-              <a:t>Results:  Dataset Clean-2</a:t>
+              <a:t>Results:  Dataset Clean-1</a:t>
             </a:r>
           </a:p>
         </p:txBody>
@@ -3500,7 +3502,940 @@
           <p:nvPr>
             <p:extLst>
               <p:ext uri="{D42A27DB-BD31-4B8C-83A1-F6EECF244321}">
-                <p14:modId xmlns:p14="http://schemas.microsoft.com/office/powerpoint/2010/main" val="1768969518"/>
+                <p14:modId xmlns:p14="http://schemas.microsoft.com/office/powerpoint/2010/main" val="1561107242"/>
+              </p:ext>
+            </p:extLst>
+          </p:nvPr>
+        </p:nvGraphicFramePr>
+        <p:xfrm>
+          <a:off x="1155168" y="1019273"/>
+          <a:ext cx="8556704" cy="4179063"/>
+        </p:xfrm>
+        <a:graphic>
+          <a:graphicData uri="http://schemas.openxmlformats.org/drawingml/2006/table">
+            <a:tbl>
+              <a:tblPr firstRow="1" bandRow="1">
+                <a:tableStyleId>{5C22544A-7EE6-4342-B048-85BDC9FD1C3A}</a:tableStyleId>
+              </a:tblPr>
+              <a:tblGrid>
+                <a:gridCol w="1552639">
+                  <a:extLst>
+                    <a:ext uri="{9D8B030D-6E8A-4147-A177-3AD203B41FA5}">
+                      <a16:colId xmlns:a16="http://schemas.microsoft.com/office/drawing/2014/main" val="1065848917"/>
+                    </a:ext>
+                  </a:extLst>
+                </a:gridCol>
+                <a:gridCol w="1355182">
+                  <a:extLst>
+                    <a:ext uri="{9D8B030D-6E8A-4147-A177-3AD203B41FA5}">
+                      <a16:colId xmlns:a16="http://schemas.microsoft.com/office/drawing/2014/main" val="873310604"/>
+                    </a:ext>
+                  </a:extLst>
+                </a:gridCol>
+                <a:gridCol w="1445547">
+                  <a:extLst>
+                    <a:ext uri="{9D8B030D-6E8A-4147-A177-3AD203B41FA5}">
+                      <a16:colId xmlns:a16="http://schemas.microsoft.com/office/drawing/2014/main" val="3981708244"/>
+                    </a:ext>
+                  </a:extLst>
+                </a:gridCol>
+                <a:gridCol w="1070391">
+                  <a:extLst>
+                    <a:ext uri="{9D8B030D-6E8A-4147-A177-3AD203B41FA5}">
+                      <a16:colId xmlns:a16="http://schemas.microsoft.com/office/drawing/2014/main" val="1135465181"/>
+                    </a:ext>
+                  </a:extLst>
+                </a:gridCol>
+                <a:gridCol w="1232916">
+                  <a:extLst>
+                    <a:ext uri="{9D8B030D-6E8A-4147-A177-3AD203B41FA5}">
+                      <a16:colId xmlns:a16="http://schemas.microsoft.com/office/drawing/2014/main" val="784973340"/>
+                    </a:ext>
+                  </a:extLst>
+                </a:gridCol>
+                <a:gridCol w="1900029">
+                  <a:extLst>
+                    <a:ext uri="{9D8B030D-6E8A-4147-A177-3AD203B41FA5}">
+                      <a16:colId xmlns:a16="http://schemas.microsoft.com/office/drawing/2014/main" val="2256753199"/>
+                    </a:ext>
+                  </a:extLst>
+                </a:gridCol>
+              </a:tblGrid>
+              <a:tr h="505569">
+                <a:tc>
+                  <a:txBody>
+                    <a:bodyPr/>
+                    <a:lstStyle/>
+                    <a:p>
+                      <a:pPr algn="ctr"/>
+                      <a:r>
+                        <a:rPr lang="en-US" dirty="0"/>
+                        <a:t>Model</a:t>
+                      </a:r>
+                    </a:p>
+                  </a:txBody>
+                  <a:tcPr anchor="ctr"/>
+                </a:tc>
+                <a:tc>
+                  <a:txBody>
+                    <a:bodyPr/>
+                    <a:lstStyle/>
+                    <a:p>
+                      <a:pPr algn="ctr"/>
+                      <a:r>
+                        <a:rPr lang="en-US" dirty="0"/>
+                        <a:t>Train Loss</a:t>
+                      </a:r>
+                    </a:p>
+                  </a:txBody>
+                  <a:tcPr anchor="ctr"/>
+                </a:tc>
+                <a:tc>
+                  <a:txBody>
+                    <a:bodyPr/>
+                    <a:lstStyle/>
+                    <a:p>
+                      <a:pPr algn="ctr"/>
+                      <a:r>
+                        <a:rPr lang="en-US" dirty="0"/>
+                        <a:t>Valid. Loss</a:t>
+                      </a:r>
+                    </a:p>
+                  </a:txBody>
+                  <a:tcPr anchor="ctr"/>
+                </a:tc>
+                <a:tc>
+                  <a:txBody>
+                    <a:bodyPr/>
+                    <a:lstStyle/>
+                    <a:p>
+                      <a:pPr algn="ctr"/>
+                      <a:r>
+                        <a:rPr lang="en-US" dirty="0"/>
+                        <a:t>Epochs</a:t>
+                      </a:r>
+                    </a:p>
+                  </a:txBody>
+                  <a:tcPr anchor="ctr"/>
+                </a:tc>
+                <a:tc>
+                  <a:txBody>
+                    <a:bodyPr/>
+                    <a:lstStyle/>
+                    <a:p>
+                      <a:pPr algn="ctr"/>
+                      <a:r>
+                        <a:rPr lang="en-US" dirty="0"/>
+                        <a:t>RMSD </a:t>
+                      </a:r>
+                    </a:p>
+                    <a:p>
+                      <a:pPr algn="ctr"/>
+                      <a:r>
+                        <a:rPr lang="en-US" dirty="0"/>
+                        <a:t>(valid set)</a:t>
+                      </a:r>
+                    </a:p>
+                  </a:txBody>
+                  <a:tcPr anchor="ctr"/>
+                </a:tc>
+                <a:tc>
+                  <a:txBody>
+                    <a:bodyPr/>
+                    <a:lstStyle/>
+                    <a:p>
+                      <a:pPr algn="ctr"/>
+                      <a:r>
+                        <a:rPr lang="en-US" dirty="0"/>
+                        <a:t>Comment</a:t>
+                      </a:r>
+                    </a:p>
+                  </a:txBody>
+                  <a:tcPr anchor="ctr"/>
+                </a:tc>
+                <a:extLst>
+                  <a:ext uri="{0D108BD9-81ED-4DB2-BD59-A6C34878D82A}">
+                    <a16:rowId xmlns:a16="http://schemas.microsoft.com/office/drawing/2014/main" val="1617347897"/>
+                  </a:ext>
+                </a:extLst>
+              </a:tr>
+              <a:tr h="505569">
+                <a:tc>
+                  <a:txBody>
+                    <a:bodyPr/>
+                    <a:lstStyle/>
+                    <a:p>
+                      <a:r>
+                        <a:rPr lang="en-US" dirty="0"/>
+                        <a:t>MLP</a:t>
+                      </a:r>
+                    </a:p>
+                  </a:txBody>
+                  <a:tcPr anchor="ctr"/>
+                </a:tc>
+                <a:tc>
+                  <a:txBody>
+                    <a:bodyPr/>
+                    <a:lstStyle/>
+                    <a:p>
+                      <a:pPr algn="ctr"/>
+                      <a:r>
+                        <a:rPr lang="en-US" dirty="0"/>
+                        <a:t>0.23</a:t>
+                      </a:r>
+                    </a:p>
+                  </a:txBody>
+                  <a:tcPr anchor="ctr"/>
+                </a:tc>
+                <a:tc>
+                  <a:txBody>
+                    <a:bodyPr/>
+                    <a:lstStyle/>
+                    <a:p>
+                      <a:pPr algn="ctr"/>
+                      <a:r>
+                        <a:rPr lang="en-US" dirty="0"/>
+                        <a:t>0.31</a:t>
+                      </a:r>
+                    </a:p>
+                  </a:txBody>
+                  <a:tcPr anchor="ctr"/>
+                </a:tc>
+                <a:tc>
+                  <a:txBody>
+                    <a:bodyPr/>
+                    <a:lstStyle/>
+                    <a:p>
+                      <a:pPr algn="ctr"/>
+                      <a:r>
+                        <a:rPr lang="en-US" dirty="0"/>
+                        <a:t>10K</a:t>
+                      </a:r>
+                    </a:p>
+                  </a:txBody>
+                  <a:tcPr anchor="ctr"/>
+                </a:tc>
+                <a:tc>
+                  <a:txBody>
+                    <a:bodyPr/>
+                    <a:lstStyle/>
+                    <a:p>
+                      <a:pPr algn="ctr"/>
+                      <a:r>
+                        <a:rPr lang="en-US" dirty="0"/>
+                        <a:t>1.08</a:t>
+                      </a:r>
+                    </a:p>
+                  </a:txBody>
+                  <a:tcPr anchor="ctr"/>
+                </a:tc>
+                <a:tc>
+                  <a:txBody>
+                    <a:bodyPr/>
+                    <a:lstStyle/>
+                    <a:p>
+                      <a:pPr algn="ctr"/>
+                      <a:endParaRPr lang="en-US" dirty="0"/>
+                    </a:p>
+                  </a:txBody>
+                  <a:tcPr anchor="ctr"/>
+                </a:tc>
+                <a:extLst>
+                  <a:ext uri="{0D108BD9-81ED-4DB2-BD59-A6C34878D82A}">
+                    <a16:rowId xmlns:a16="http://schemas.microsoft.com/office/drawing/2014/main" val="282036224"/>
+                  </a:ext>
+                </a:extLst>
+              </a:tr>
+              <a:tr h="505569">
+                <a:tc>
+                  <a:txBody>
+                    <a:bodyPr/>
+                    <a:lstStyle/>
+                    <a:p>
+                      <a:r>
+                        <a:rPr lang="en-US" dirty="0"/>
+                        <a:t>dense MLP</a:t>
+                      </a:r>
+                    </a:p>
+                  </a:txBody>
+                  <a:tcPr anchor="ctr"/>
+                </a:tc>
+                <a:tc>
+                  <a:txBody>
+                    <a:bodyPr/>
+                    <a:lstStyle/>
+                    <a:p>
+                      <a:pPr algn="ctr"/>
+                      <a:r>
+                        <a:rPr lang="en-US" dirty="0"/>
+                        <a:t>0.20</a:t>
+                      </a:r>
+                    </a:p>
+                  </a:txBody>
+                  <a:tcPr anchor="ctr"/>
+                </a:tc>
+                <a:tc>
+                  <a:txBody>
+                    <a:bodyPr/>
+                    <a:lstStyle/>
+                    <a:p>
+                      <a:pPr algn="ctr"/>
+                      <a:r>
+                        <a:rPr lang="en-US" dirty="0"/>
+                        <a:t>0.29</a:t>
+                      </a:r>
+                    </a:p>
+                  </a:txBody>
+                  <a:tcPr anchor="ctr"/>
+                </a:tc>
+                <a:tc>
+                  <a:txBody>
+                    <a:bodyPr/>
+                    <a:lstStyle/>
+                    <a:p>
+                      <a:pPr algn="ctr"/>
+                      <a:r>
+                        <a:rPr lang="en-US" dirty="0"/>
+                        <a:t>10K</a:t>
+                      </a:r>
+                    </a:p>
+                  </a:txBody>
+                  <a:tcPr anchor="ctr"/>
+                </a:tc>
+                <a:tc>
+                  <a:txBody>
+                    <a:bodyPr/>
+                    <a:lstStyle/>
+                    <a:p>
+                      <a:pPr algn="ctr"/>
+                      <a:r>
+                        <a:rPr lang="en-US" dirty="0"/>
+                        <a:t>1.06</a:t>
+                      </a:r>
+                    </a:p>
+                  </a:txBody>
+                  <a:tcPr anchor="ctr"/>
+                </a:tc>
+                <a:tc>
+                  <a:txBody>
+                    <a:bodyPr/>
+                    <a:lstStyle/>
+                    <a:p>
+                      <a:pPr algn="ctr"/>
+                      <a:endParaRPr lang="en-US" dirty="0"/>
+                    </a:p>
+                  </a:txBody>
+                  <a:tcPr anchor="ctr"/>
+                </a:tc>
+                <a:extLst>
+                  <a:ext uri="{0D108BD9-81ED-4DB2-BD59-A6C34878D82A}">
+                    <a16:rowId xmlns:a16="http://schemas.microsoft.com/office/drawing/2014/main" val="3862729885"/>
+                  </a:ext>
+                </a:extLst>
+              </a:tr>
+              <a:tr h="505569">
+                <a:tc>
+                  <a:txBody>
+                    <a:bodyPr/>
+                    <a:lstStyle/>
+                    <a:p>
+                      <a:r>
+                        <a:rPr lang="en-US" dirty="0"/>
+                        <a:t>residual MLP</a:t>
+                      </a:r>
+                    </a:p>
+                  </a:txBody>
+                  <a:tcPr anchor="ctr"/>
+                </a:tc>
+                <a:tc>
+                  <a:txBody>
+                    <a:bodyPr/>
+                    <a:lstStyle/>
+                    <a:p>
+                      <a:pPr algn="ctr"/>
+                      <a:r>
+                        <a:rPr lang="en-US" dirty="0"/>
+                        <a:t>0.24</a:t>
+                      </a:r>
+                    </a:p>
+                  </a:txBody>
+                  <a:tcPr anchor="ctr"/>
+                </a:tc>
+                <a:tc>
+                  <a:txBody>
+                    <a:bodyPr/>
+                    <a:lstStyle/>
+                    <a:p>
+                      <a:pPr algn="ctr"/>
+                      <a:r>
+                        <a:rPr lang="en-US" dirty="0"/>
+                        <a:t>0.30</a:t>
+                      </a:r>
+                    </a:p>
+                  </a:txBody>
+                  <a:tcPr anchor="ctr"/>
+                </a:tc>
+                <a:tc>
+                  <a:txBody>
+                    <a:bodyPr/>
+                    <a:lstStyle/>
+                    <a:p>
+                      <a:pPr algn="ctr"/>
+                      <a:r>
+                        <a:rPr lang="en-US" dirty="0"/>
+                        <a:t>10K</a:t>
+                      </a:r>
+                    </a:p>
+                  </a:txBody>
+                  <a:tcPr anchor="ctr"/>
+                </a:tc>
+                <a:tc>
+                  <a:txBody>
+                    <a:bodyPr/>
+                    <a:lstStyle/>
+                    <a:p>
+                      <a:pPr algn="ctr"/>
+                      <a:r>
+                        <a:rPr lang="en-US" dirty="0"/>
+                        <a:t>1.05</a:t>
+                      </a:r>
+                    </a:p>
+                  </a:txBody>
+                  <a:tcPr anchor="ctr"/>
+                </a:tc>
+                <a:tc>
+                  <a:txBody>
+                    <a:bodyPr/>
+                    <a:lstStyle/>
+                    <a:p>
+                      <a:pPr algn="ctr"/>
+                      <a:endParaRPr lang="en-US" dirty="0"/>
+                    </a:p>
+                  </a:txBody>
+                  <a:tcPr anchor="ctr"/>
+                </a:tc>
+                <a:extLst>
+                  <a:ext uri="{0D108BD9-81ED-4DB2-BD59-A6C34878D82A}">
+                    <a16:rowId xmlns:a16="http://schemas.microsoft.com/office/drawing/2014/main" val="3248717932"/>
+                  </a:ext>
+                </a:extLst>
+              </a:tr>
+              <a:tr h="505569">
+                <a:tc>
+                  <a:txBody>
+                    <a:bodyPr/>
+                    <a:lstStyle/>
+                    <a:p>
+                      <a:r>
+                        <a:rPr lang="en-US" dirty="0"/>
+                        <a:t>VIT</a:t>
+                      </a:r>
+                    </a:p>
+                  </a:txBody>
+                  <a:tcPr anchor="ctr"/>
+                </a:tc>
+                <a:tc>
+                  <a:txBody>
+                    <a:bodyPr/>
+                    <a:lstStyle/>
+                    <a:p>
+                      <a:pPr algn="ctr"/>
+                      <a:r>
+                        <a:rPr lang="en-US" dirty="0"/>
+                        <a:t>0.28</a:t>
+                      </a:r>
+                    </a:p>
+                  </a:txBody>
+                  <a:tcPr anchor="ctr"/>
+                </a:tc>
+                <a:tc>
+                  <a:txBody>
+                    <a:bodyPr/>
+                    <a:lstStyle/>
+                    <a:p>
+                      <a:pPr algn="ctr"/>
+                      <a:r>
+                        <a:rPr lang="en-US" dirty="0"/>
+                        <a:t>0.34</a:t>
+                      </a:r>
+                    </a:p>
+                  </a:txBody>
+                  <a:tcPr anchor="ctr"/>
+                </a:tc>
+                <a:tc>
+                  <a:txBody>
+                    <a:bodyPr/>
+                    <a:lstStyle/>
+                    <a:p>
+                      <a:pPr algn="ctr"/>
+                      <a:r>
+                        <a:rPr lang="en-US" dirty="0"/>
+                        <a:t>1250</a:t>
+                      </a:r>
+                    </a:p>
+                  </a:txBody>
+                  <a:tcPr anchor="ctr"/>
+                </a:tc>
+                <a:tc>
+                  <a:txBody>
+                    <a:bodyPr/>
+                    <a:lstStyle/>
+                    <a:p>
+                      <a:pPr algn="ctr"/>
+                      <a:r>
+                        <a:rPr lang="en-US" dirty="0"/>
+                        <a:t>1.02</a:t>
+                      </a:r>
+                    </a:p>
+                  </a:txBody>
+                  <a:tcPr anchor="ctr"/>
+                </a:tc>
+                <a:tc>
+                  <a:txBody>
+                    <a:bodyPr/>
+                    <a:lstStyle/>
+                    <a:p>
+                      <a:pPr algn="ctr"/>
+                      <a:endParaRPr lang="en-US" dirty="0"/>
+                    </a:p>
+                  </a:txBody>
+                  <a:tcPr anchor="ctr"/>
+                </a:tc>
+                <a:extLst>
+                  <a:ext uri="{0D108BD9-81ED-4DB2-BD59-A6C34878D82A}">
+                    <a16:rowId xmlns:a16="http://schemas.microsoft.com/office/drawing/2014/main" val="1232718432"/>
+                  </a:ext>
+                </a:extLst>
+              </a:tr>
+              <a:tr h="505569">
+                <a:tc>
+                  <a:txBody>
+                    <a:bodyPr/>
+                    <a:lstStyle/>
+                    <a:p>
+                      <a:r>
+                        <a:rPr lang="en-US" dirty="0"/>
+                        <a:t>BERT (naive) </a:t>
+                      </a:r>
+                      <a:r>
+                        <a:rPr lang="en-US" baseline="30000" dirty="0"/>
+                        <a:t>1</a:t>
+                      </a:r>
+                    </a:p>
+                  </a:txBody>
+                  <a:tcPr anchor="ctr"/>
+                </a:tc>
+                <a:tc>
+                  <a:txBody>
+                    <a:bodyPr/>
+                    <a:lstStyle/>
+                    <a:p>
+                      <a:pPr algn="ctr"/>
+                      <a:r>
+                        <a:rPr lang="en-US" dirty="0"/>
+                        <a:t>0.03</a:t>
+                      </a:r>
+                    </a:p>
+                  </a:txBody>
+                  <a:tcPr anchor="ctr"/>
+                </a:tc>
+                <a:tc>
+                  <a:txBody>
+                    <a:bodyPr/>
+                    <a:lstStyle/>
+                    <a:p>
+                      <a:pPr algn="ctr"/>
+                      <a:r>
+                        <a:rPr lang="en-US" dirty="0"/>
+                        <a:t>0.27</a:t>
+                      </a:r>
+                    </a:p>
+                  </a:txBody>
+                  <a:tcPr anchor="ctr"/>
+                </a:tc>
+                <a:tc>
+                  <a:txBody>
+                    <a:bodyPr/>
+                    <a:lstStyle/>
+                    <a:p>
+                      <a:pPr algn="ctr"/>
+                      <a:r>
+                        <a:rPr lang="en-US" dirty="0"/>
+                        <a:t>1000</a:t>
+                      </a:r>
+                    </a:p>
+                  </a:txBody>
+                  <a:tcPr anchor="ctr"/>
+                </a:tc>
+                <a:tc>
+                  <a:txBody>
+                    <a:bodyPr/>
+                    <a:lstStyle/>
+                    <a:p>
+                      <a:pPr algn="ctr"/>
+                      <a:endParaRPr lang="en-US" dirty="0"/>
+                    </a:p>
+                  </a:txBody>
+                  <a:tcPr anchor="ctr"/>
+                </a:tc>
+                <a:tc>
+                  <a:txBody>
+                    <a:bodyPr/>
+                    <a:lstStyle/>
+                    <a:p>
+                      <a:pPr algn="ctr"/>
+                      <a:r>
+                        <a:rPr lang="en-US" dirty="0"/>
+                        <a:t>strong overfitting</a:t>
+                      </a:r>
+                    </a:p>
+                  </a:txBody>
+                  <a:tcPr anchor="ctr"/>
+                </a:tc>
+                <a:extLst>
+                  <a:ext uri="{0D108BD9-81ED-4DB2-BD59-A6C34878D82A}">
+                    <a16:rowId xmlns:a16="http://schemas.microsoft.com/office/drawing/2014/main" val="461321389"/>
+                  </a:ext>
+                </a:extLst>
+              </a:tr>
+              <a:tr h="505569">
+                <a:tc rowSpan="2">
+                  <a:txBody>
+                    <a:bodyPr/>
+                    <a:lstStyle/>
+                    <a:p>
+                      <a:r>
+                        <a:rPr lang="en-US" dirty="0"/>
+                        <a:t>BERT (full) </a:t>
+                      </a:r>
+                      <a:r>
+                        <a:rPr lang="en-US" baseline="30000" dirty="0"/>
+                        <a:t>2</a:t>
+                      </a:r>
+                    </a:p>
+                  </a:txBody>
+                  <a:tcPr anchor="ctr"/>
+                </a:tc>
+                <a:tc>
+                  <a:txBody>
+                    <a:bodyPr/>
+                    <a:lstStyle/>
+                    <a:p>
+                      <a:pPr algn="ctr"/>
+                      <a:r>
+                        <a:rPr lang="en-US" dirty="0"/>
+                        <a:t>0.34</a:t>
+                      </a:r>
+                    </a:p>
+                  </a:txBody>
+                  <a:tcPr anchor="ctr"/>
+                </a:tc>
+                <a:tc>
+                  <a:txBody>
+                    <a:bodyPr/>
+                    <a:lstStyle/>
+                    <a:p>
+                      <a:pPr algn="ctr"/>
+                      <a:r>
+                        <a:rPr lang="en-US" dirty="0"/>
+                        <a:t>0.33</a:t>
+                      </a:r>
+                    </a:p>
+                  </a:txBody>
+                  <a:tcPr anchor="ctr"/>
+                </a:tc>
+                <a:tc>
+                  <a:txBody>
+                    <a:bodyPr/>
+                    <a:lstStyle/>
+                    <a:p>
+                      <a:pPr algn="ctr"/>
+                      <a:r>
+                        <a:rPr lang="en-US" dirty="0"/>
+                        <a:t>10 </a:t>
+                      </a:r>
+                      <a:r>
+                        <a:rPr lang="en-US" baseline="30000" dirty="0"/>
+                        <a:t>3</a:t>
+                      </a:r>
+                    </a:p>
+                  </a:txBody>
+                  <a:tcPr anchor="ctr"/>
+                </a:tc>
+                <a:tc>
+                  <a:txBody>
+                    <a:bodyPr/>
+                    <a:lstStyle/>
+                    <a:p>
+                      <a:pPr algn="ctr"/>
+                      <a:r>
+                        <a:rPr lang="en-US" dirty="0" err="1"/>
+                        <a:t>na</a:t>
+                      </a:r>
+                      <a:endParaRPr lang="en-US" dirty="0"/>
+                    </a:p>
+                  </a:txBody>
+                  <a:tcPr anchor="ctr"/>
+                </a:tc>
+                <a:tc>
+                  <a:txBody>
+                    <a:bodyPr/>
+                    <a:lstStyle/>
+                    <a:p>
+                      <a:pPr algn="ctr"/>
+                      <a:r>
+                        <a:rPr lang="en-US" dirty="0"/>
+                        <a:t>pre-train</a:t>
+                      </a:r>
+                    </a:p>
+                  </a:txBody>
+                  <a:tcPr anchor="ctr"/>
+                </a:tc>
+                <a:extLst>
+                  <a:ext uri="{0D108BD9-81ED-4DB2-BD59-A6C34878D82A}">
+                    <a16:rowId xmlns:a16="http://schemas.microsoft.com/office/drawing/2014/main" val="4051566852"/>
+                  </a:ext>
+                </a:extLst>
+              </a:tr>
+              <a:tr h="505569">
+                <a:tc vMerge="1">
+                  <a:txBody>
+                    <a:bodyPr/>
+                    <a:lstStyle/>
+                    <a:p>
+                      <a:endParaRPr lang="en-US" baseline="30000" dirty="0"/>
+                    </a:p>
+                  </a:txBody>
+                  <a:tcPr/>
+                </a:tc>
+                <a:tc>
+                  <a:txBody>
+                    <a:bodyPr/>
+                    <a:lstStyle/>
+                    <a:p>
+                      <a:pPr algn="ctr"/>
+                      <a:endParaRPr lang="en-US"/>
+                    </a:p>
+                  </a:txBody>
+                  <a:tcPr anchor="ctr"/>
+                </a:tc>
+                <a:tc>
+                  <a:txBody>
+                    <a:bodyPr/>
+                    <a:lstStyle/>
+                    <a:p>
+                      <a:pPr algn="ctr"/>
+                      <a:endParaRPr lang="en-US"/>
+                    </a:p>
+                  </a:txBody>
+                  <a:tcPr anchor="ctr"/>
+                </a:tc>
+                <a:tc>
+                  <a:txBody>
+                    <a:bodyPr/>
+                    <a:lstStyle/>
+                    <a:p>
+                      <a:pPr algn="ctr"/>
+                      <a:endParaRPr lang="en-US"/>
+                    </a:p>
+                  </a:txBody>
+                  <a:tcPr anchor="ctr"/>
+                </a:tc>
+                <a:tc>
+                  <a:txBody>
+                    <a:bodyPr/>
+                    <a:lstStyle/>
+                    <a:p>
+                      <a:pPr algn="ctr"/>
+                      <a:endParaRPr lang="en-US" dirty="0"/>
+                    </a:p>
+                  </a:txBody>
+                  <a:tcPr anchor="ctr"/>
+                </a:tc>
+                <a:tc>
+                  <a:txBody>
+                    <a:bodyPr/>
+                    <a:lstStyle/>
+                    <a:p>
+                      <a:pPr algn="ctr"/>
+                      <a:r>
+                        <a:rPr lang="en-US" dirty="0"/>
+                        <a:t>fine-tune</a:t>
+                      </a:r>
+                    </a:p>
+                  </a:txBody>
+                  <a:tcPr anchor="ctr"/>
+                </a:tc>
+                <a:extLst>
+                  <a:ext uri="{0D108BD9-81ED-4DB2-BD59-A6C34878D82A}">
+                    <a16:rowId xmlns:a16="http://schemas.microsoft.com/office/drawing/2014/main" val="3788428899"/>
+                  </a:ext>
+                </a:extLst>
+              </a:tr>
+            </a:tbl>
+          </a:graphicData>
+        </a:graphic>
+      </p:graphicFrame>
+      <p:sp>
+        <p:nvSpPr>
+          <p:cNvPr id="4" name="TextBox 3">
+            <a:extLst>
+              <a:ext uri="{FF2B5EF4-FFF2-40B4-BE49-F238E27FC236}">
+                <a16:creationId xmlns:a16="http://schemas.microsoft.com/office/drawing/2014/main" id="{00DD7777-9BF6-823F-4376-3C2BB81EAC9C}"/>
+              </a:ext>
+            </a:extLst>
+          </p:cNvPr>
+          <p:cNvSpPr txBox="1"/>
+          <p:nvPr/>
+        </p:nvSpPr>
+        <p:spPr>
+          <a:xfrm>
+            <a:off x="389614" y="5534108"/>
+            <a:ext cx="8333435" cy="923330"/>
+          </a:xfrm>
+          <a:prstGeom prst="rect">
+            <a:avLst/>
+          </a:prstGeom>
+          <a:noFill/>
+        </p:spPr>
+        <p:txBody>
+          <a:bodyPr wrap="none" rtlCol="0">
+            <a:spAutoFit/>
+          </a:bodyPr>
+          <a:lstStyle/>
+          <a:p>
+            <a:pPr marL="342900" indent="-342900">
+              <a:buAutoNum type="arabicPeriod"/>
+            </a:pPr>
+            <a:r>
+              <a:rPr lang="en-US" dirty="0"/>
+              <a:t>Train the fine-tune BERT model from scratch (no pre-training) on </a:t>
+            </a:r>
+            <a:r>
+              <a:rPr lang="en-US" dirty="0" err="1"/>
+              <a:t>scFV</a:t>
+            </a:r>
+            <a:r>
+              <a:rPr lang="en-US" dirty="0"/>
+              <a:t> train data</a:t>
+            </a:r>
+          </a:p>
+          <a:p>
+            <a:pPr marL="342900" indent="-342900">
+              <a:buAutoNum type="arabicPeriod"/>
+            </a:pPr>
+            <a:r>
+              <a:rPr lang="en-US" dirty="0"/>
+              <a:t>Pre-train BERT on OAS dataset, then fine-tune on </a:t>
+            </a:r>
+            <a:r>
+              <a:rPr lang="en-US" dirty="0" err="1"/>
+              <a:t>scFv</a:t>
+            </a:r>
+            <a:r>
+              <a:rPr lang="en-US" dirty="0"/>
+              <a:t> train data</a:t>
+            </a:r>
+          </a:p>
+          <a:p>
+            <a:pPr marL="342900" indent="-342900">
+              <a:buAutoNum type="arabicPeriod"/>
+            </a:pPr>
+            <a:r>
+              <a:rPr lang="en-US" dirty="0"/>
+              <a:t>OAS dataset is </a:t>
+            </a:r>
+            <a:r>
+              <a:rPr lang="en-US" b="0" dirty="0">
+                <a:effectLst/>
+              </a:rPr>
+              <a:t>18061315 rows.</a:t>
+            </a:r>
+            <a:endParaRPr lang="en-US" dirty="0"/>
+          </a:p>
+        </p:txBody>
+      </p:sp>
+    </p:spTree>
+    <p:extLst>
+      <p:ext uri="{BB962C8B-B14F-4D97-AF65-F5344CB8AC3E}">
+        <p14:creationId xmlns:p14="http://schemas.microsoft.com/office/powerpoint/2010/main" val="127111251"/>
+      </p:ext>
+    </p:extLst>
+  </p:cSld>
+  <p:clrMapOvr>
+    <a:masterClrMapping/>
+  </p:clrMapOvr>
+</p:sld>
+</file>
+
+<file path=ppt/slides/slide11.xml><?xml version="1.0" encoding="utf-8"?>
+<p:sld xmlns:a="http://schemas.openxmlformats.org/drawingml/2006/main" xmlns:r="http://schemas.openxmlformats.org/officeDocument/2006/relationships" xmlns:p="http://schemas.openxmlformats.org/presentationml/2006/main">
+  <p:cSld>
+    <p:spTree>
+      <p:nvGrpSpPr>
+        <p:cNvPr id="1" name=""/>
+        <p:cNvGrpSpPr/>
+        <p:nvPr/>
+      </p:nvGrpSpPr>
+      <p:grpSpPr>
+        <a:xfrm>
+          <a:off x="0" y="0"/>
+          <a:ext cx="0" cy="0"/>
+          <a:chOff x="0" y="0"/>
+          <a:chExt cx="0" cy="0"/>
+        </a:xfrm>
+      </p:grpSpPr>
+      <p:sp>
+        <p:nvSpPr>
+          <p:cNvPr id="2" name="TextBox 1">
+            <a:extLst>
+              <a:ext uri="{FF2B5EF4-FFF2-40B4-BE49-F238E27FC236}">
+                <a16:creationId xmlns:a16="http://schemas.microsoft.com/office/drawing/2014/main" id="{D7B699E5-6A91-D5D4-A6B0-C71C42589BC8}"/>
+              </a:ext>
+            </a:extLst>
+          </p:cNvPr>
+          <p:cNvSpPr txBox="1"/>
+          <p:nvPr/>
+        </p:nvSpPr>
+        <p:spPr>
+          <a:xfrm>
+            <a:off x="140127" y="221836"/>
+            <a:ext cx="3558346" cy="461665"/>
+          </a:xfrm>
+          <a:prstGeom prst="rect">
+            <a:avLst/>
+          </a:prstGeom>
+          <a:noFill/>
+        </p:spPr>
+        <p:txBody>
+          <a:bodyPr wrap="none" rtlCol="0">
+            <a:spAutoFit/>
+          </a:bodyPr>
+          <a:lstStyle/>
+          <a:p>
+            <a:r>
+              <a:rPr lang="en-US" sz="2400" dirty="0"/>
+              <a:t>Results:  Dataset Clean-2</a:t>
+            </a:r>
+          </a:p>
+        </p:txBody>
+      </p:sp>
+      <p:graphicFrame>
+        <p:nvGraphicFramePr>
+          <p:cNvPr id="3" name="Table 2">
+            <a:extLst>
+              <a:ext uri="{FF2B5EF4-FFF2-40B4-BE49-F238E27FC236}">
+                <a16:creationId xmlns:a16="http://schemas.microsoft.com/office/drawing/2014/main" id="{06968A34-6E02-9A89-9D28-711A65FA6A49}"/>
+              </a:ext>
+            </a:extLst>
+          </p:cNvPr>
+          <p:cNvGraphicFramePr>
+            <a:graphicFrameLocks noGrp="1"/>
+          </p:cNvGraphicFramePr>
+          <p:nvPr>
+            <p:extLst>
+              <p:ext uri="{D42A27DB-BD31-4B8C-83A1-F6EECF244321}">
+                <p14:modId xmlns:p14="http://schemas.microsoft.com/office/powerpoint/2010/main" val="3225059863"/>
               </p:ext>
             </p:extLst>
           </p:nvPr>
@@ -3784,6 +4719,699 @@
                         <a:rPr lang="en-US" dirty="0"/>
                         <a:t>860</a:t>
                       </a:r>
+                    </a:p>
+                  </a:txBody>
+                  <a:tcPr anchor="ctr"/>
+                </a:tc>
+                <a:tc>
+                  <a:txBody>
+                    <a:bodyPr/>
+                    <a:lstStyle/>
+                    <a:p>
+                      <a:pPr algn="ctr"/>
+                      <a:r>
+                        <a:rPr lang="en-US" dirty="0"/>
+                        <a:t>0.94</a:t>
+                      </a:r>
+                    </a:p>
+                  </a:txBody>
+                  <a:tcPr anchor="ctr"/>
+                </a:tc>
+                <a:tc>
+                  <a:txBody>
+                    <a:bodyPr/>
+                    <a:lstStyle/>
+                    <a:p>
+                      <a:pPr algn="ctr"/>
+                      <a:endParaRPr lang="en-US" dirty="0"/>
+                    </a:p>
+                  </a:txBody>
+                  <a:tcPr anchor="ctr"/>
+                </a:tc>
+                <a:extLst>
+                  <a:ext uri="{0D108BD9-81ED-4DB2-BD59-A6C34878D82A}">
+                    <a16:rowId xmlns:a16="http://schemas.microsoft.com/office/drawing/2014/main" val="1232718432"/>
+                  </a:ext>
+                </a:extLst>
+              </a:tr>
+              <a:tr h="505569">
+                <a:tc>
+                  <a:txBody>
+                    <a:bodyPr/>
+                    <a:lstStyle/>
+                    <a:p>
+                      <a:r>
+                        <a:rPr lang="en-US" dirty="0"/>
+                        <a:t>BERT (naive) </a:t>
+                      </a:r>
+                      <a:r>
+                        <a:rPr lang="en-US" baseline="30000" dirty="0"/>
+                        <a:t>1</a:t>
+                      </a:r>
+                    </a:p>
+                  </a:txBody>
+                  <a:tcPr anchor="ctr"/>
+                </a:tc>
+                <a:tc>
+                  <a:txBody>
+                    <a:bodyPr/>
+                    <a:lstStyle/>
+                    <a:p>
+                      <a:pPr algn="ctr"/>
+                      <a:endParaRPr lang="en-US" dirty="0"/>
+                    </a:p>
+                  </a:txBody>
+                  <a:tcPr anchor="ctr"/>
+                </a:tc>
+                <a:tc>
+                  <a:txBody>
+                    <a:bodyPr/>
+                    <a:lstStyle/>
+                    <a:p>
+                      <a:pPr algn="ctr"/>
+                      <a:endParaRPr lang="en-US" dirty="0"/>
+                    </a:p>
+                  </a:txBody>
+                  <a:tcPr anchor="ctr"/>
+                </a:tc>
+                <a:tc>
+                  <a:txBody>
+                    <a:bodyPr/>
+                    <a:lstStyle/>
+                    <a:p>
+                      <a:pPr algn="ctr"/>
+                      <a:endParaRPr lang="en-US" dirty="0"/>
+                    </a:p>
+                  </a:txBody>
+                  <a:tcPr anchor="ctr"/>
+                </a:tc>
+                <a:tc>
+                  <a:txBody>
+                    <a:bodyPr/>
+                    <a:lstStyle/>
+                    <a:p>
+                      <a:pPr algn="ctr"/>
+                      <a:endParaRPr lang="en-US" dirty="0"/>
+                    </a:p>
+                  </a:txBody>
+                  <a:tcPr anchor="ctr"/>
+                </a:tc>
+                <a:tc>
+                  <a:txBody>
+                    <a:bodyPr/>
+                    <a:lstStyle/>
+                    <a:p>
+                      <a:pPr algn="ctr"/>
+                      <a:endParaRPr lang="en-US" dirty="0"/>
+                    </a:p>
+                  </a:txBody>
+                  <a:tcPr anchor="ctr"/>
+                </a:tc>
+                <a:extLst>
+                  <a:ext uri="{0D108BD9-81ED-4DB2-BD59-A6C34878D82A}">
+                    <a16:rowId xmlns:a16="http://schemas.microsoft.com/office/drawing/2014/main" val="461321389"/>
+                  </a:ext>
+                </a:extLst>
+              </a:tr>
+              <a:tr h="505569">
+                <a:tc rowSpan="2">
+                  <a:txBody>
+                    <a:bodyPr/>
+                    <a:lstStyle/>
+                    <a:p>
+                      <a:r>
+                        <a:rPr lang="en-US" dirty="0"/>
+                        <a:t>BERT (full) </a:t>
+                      </a:r>
+                      <a:r>
+                        <a:rPr lang="en-US" baseline="30000" dirty="0"/>
+                        <a:t>2</a:t>
+                      </a:r>
+                    </a:p>
+                  </a:txBody>
+                  <a:tcPr anchor="ctr"/>
+                </a:tc>
+                <a:tc>
+                  <a:txBody>
+                    <a:bodyPr/>
+                    <a:lstStyle/>
+                    <a:p>
+                      <a:pPr algn="ctr"/>
+                      <a:endParaRPr lang="en-US" dirty="0"/>
+                    </a:p>
+                  </a:txBody>
+                  <a:tcPr anchor="ctr"/>
+                </a:tc>
+                <a:tc>
+                  <a:txBody>
+                    <a:bodyPr/>
+                    <a:lstStyle/>
+                    <a:p>
+                      <a:pPr algn="ctr"/>
+                      <a:endParaRPr lang="en-US"/>
+                    </a:p>
+                  </a:txBody>
+                  <a:tcPr anchor="ctr"/>
+                </a:tc>
+                <a:tc>
+                  <a:txBody>
+                    <a:bodyPr/>
+                    <a:lstStyle/>
+                    <a:p>
+                      <a:pPr algn="ctr"/>
+                      <a:endParaRPr lang="en-US"/>
+                    </a:p>
+                  </a:txBody>
+                  <a:tcPr anchor="ctr"/>
+                </a:tc>
+                <a:tc>
+                  <a:txBody>
+                    <a:bodyPr/>
+                    <a:lstStyle/>
+                    <a:p>
+                      <a:pPr algn="ctr"/>
+                      <a:endParaRPr lang="en-US"/>
+                    </a:p>
+                  </a:txBody>
+                  <a:tcPr anchor="ctr"/>
+                </a:tc>
+                <a:tc>
+                  <a:txBody>
+                    <a:bodyPr/>
+                    <a:lstStyle/>
+                    <a:p>
+                      <a:pPr algn="ctr"/>
+                      <a:r>
+                        <a:rPr lang="en-US" dirty="0"/>
+                        <a:t>pre-train</a:t>
+                      </a:r>
+                    </a:p>
+                  </a:txBody>
+                  <a:tcPr anchor="ctr"/>
+                </a:tc>
+                <a:extLst>
+                  <a:ext uri="{0D108BD9-81ED-4DB2-BD59-A6C34878D82A}">
+                    <a16:rowId xmlns:a16="http://schemas.microsoft.com/office/drawing/2014/main" val="4051566852"/>
+                  </a:ext>
+                </a:extLst>
+              </a:tr>
+              <a:tr h="505569">
+                <a:tc vMerge="1">
+                  <a:txBody>
+                    <a:bodyPr/>
+                    <a:lstStyle/>
+                    <a:p>
+                      <a:endParaRPr lang="en-US" baseline="30000" dirty="0"/>
+                    </a:p>
+                  </a:txBody>
+                  <a:tcPr/>
+                </a:tc>
+                <a:tc>
+                  <a:txBody>
+                    <a:bodyPr/>
+                    <a:lstStyle/>
+                    <a:p>
+                      <a:pPr algn="ctr"/>
+                      <a:endParaRPr lang="en-US"/>
+                    </a:p>
+                  </a:txBody>
+                  <a:tcPr anchor="ctr"/>
+                </a:tc>
+                <a:tc>
+                  <a:txBody>
+                    <a:bodyPr/>
+                    <a:lstStyle/>
+                    <a:p>
+                      <a:pPr algn="ctr"/>
+                      <a:endParaRPr lang="en-US"/>
+                    </a:p>
+                  </a:txBody>
+                  <a:tcPr anchor="ctr"/>
+                </a:tc>
+                <a:tc>
+                  <a:txBody>
+                    <a:bodyPr/>
+                    <a:lstStyle/>
+                    <a:p>
+                      <a:pPr algn="ctr"/>
+                      <a:endParaRPr lang="en-US"/>
+                    </a:p>
+                  </a:txBody>
+                  <a:tcPr anchor="ctr"/>
+                </a:tc>
+                <a:tc>
+                  <a:txBody>
+                    <a:bodyPr/>
+                    <a:lstStyle/>
+                    <a:p>
+                      <a:pPr algn="ctr"/>
+                      <a:endParaRPr lang="en-US" dirty="0"/>
+                    </a:p>
+                  </a:txBody>
+                  <a:tcPr anchor="ctr"/>
+                </a:tc>
+                <a:tc>
+                  <a:txBody>
+                    <a:bodyPr/>
+                    <a:lstStyle/>
+                    <a:p>
+                      <a:pPr algn="ctr"/>
+                      <a:r>
+                        <a:rPr lang="en-US" dirty="0"/>
+                        <a:t>fine-tune</a:t>
+                      </a:r>
+                    </a:p>
+                  </a:txBody>
+                  <a:tcPr anchor="ctr"/>
+                </a:tc>
+                <a:extLst>
+                  <a:ext uri="{0D108BD9-81ED-4DB2-BD59-A6C34878D82A}">
+                    <a16:rowId xmlns:a16="http://schemas.microsoft.com/office/drawing/2014/main" val="3788428899"/>
+                  </a:ext>
+                </a:extLst>
+              </a:tr>
+            </a:tbl>
+          </a:graphicData>
+        </a:graphic>
+      </p:graphicFrame>
+      <p:sp>
+        <p:nvSpPr>
+          <p:cNvPr id="4" name="TextBox 3">
+            <a:extLst>
+              <a:ext uri="{FF2B5EF4-FFF2-40B4-BE49-F238E27FC236}">
+                <a16:creationId xmlns:a16="http://schemas.microsoft.com/office/drawing/2014/main" id="{00DD7777-9BF6-823F-4376-3C2BB81EAC9C}"/>
+              </a:ext>
+            </a:extLst>
+          </p:cNvPr>
+          <p:cNvSpPr txBox="1"/>
+          <p:nvPr/>
+        </p:nvSpPr>
+        <p:spPr>
+          <a:xfrm>
+            <a:off x="389614" y="5534108"/>
+            <a:ext cx="8333435" cy="646331"/>
+          </a:xfrm>
+          <a:prstGeom prst="rect">
+            <a:avLst/>
+          </a:prstGeom>
+          <a:noFill/>
+        </p:spPr>
+        <p:txBody>
+          <a:bodyPr wrap="none" rtlCol="0">
+            <a:spAutoFit/>
+          </a:bodyPr>
+          <a:lstStyle/>
+          <a:p>
+            <a:pPr marL="342900" indent="-342900">
+              <a:buAutoNum type="arabicPeriod"/>
+            </a:pPr>
+            <a:r>
+              <a:rPr lang="en-US" dirty="0"/>
+              <a:t>Train the fine-tune BERT model from scratch (no pre-training) on </a:t>
+            </a:r>
+            <a:r>
+              <a:rPr lang="en-US" dirty="0" err="1"/>
+              <a:t>scFV</a:t>
+            </a:r>
+            <a:r>
+              <a:rPr lang="en-US" dirty="0"/>
+              <a:t> train data</a:t>
+            </a:r>
+          </a:p>
+          <a:p>
+            <a:pPr marL="342900" indent="-342900">
+              <a:buAutoNum type="arabicPeriod"/>
+            </a:pPr>
+            <a:r>
+              <a:rPr lang="en-US" dirty="0"/>
+              <a:t>Pre-train BERT on OAS dataset, then fine-tune on </a:t>
+            </a:r>
+            <a:r>
+              <a:rPr lang="en-US" dirty="0" err="1"/>
+              <a:t>scFv</a:t>
+            </a:r>
+            <a:r>
+              <a:rPr lang="en-US" dirty="0"/>
+              <a:t> train data</a:t>
+            </a:r>
+          </a:p>
+        </p:txBody>
+      </p:sp>
+    </p:spTree>
+    <p:extLst>
+      <p:ext uri="{BB962C8B-B14F-4D97-AF65-F5344CB8AC3E}">
+        <p14:creationId xmlns:p14="http://schemas.microsoft.com/office/powerpoint/2010/main" val="1303042645"/>
+      </p:ext>
+    </p:extLst>
+  </p:cSld>
+  <p:clrMapOvr>
+    <a:masterClrMapping/>
+  </p:clrMapOvr>
+</p:sld>
+</file>
+
+<file path=ppt/slides/slide12.xml><?xml version="1.0" encoding="utf-8"?>
+<p:sld xmlns:a="http://schemas.openxmlformats.org/drawingml/2006/main" xmlns:r="http://schemas.openxmlformats.org/officeDocument/2006/relationships" xmlns:p="http://schemas.openxmlformats.org/presentationml/2006/main">
+  <p:cSld>
+    <p:spTree>
+      <p:nvGrpSpPr>
+        <p:cNvPr id="1" name=""/>
+        <p:cNvGrpSpPr/>
+        <p:nvPr/>
+      </p:nvGrpSpPr>
+      <p:grpSpPr>
+        <a:xfrm>
+          <a:off x="0" y="0"/>
+          <a:ext cx="0" cy="0"/>
+          <a:chOff x="0" y="0"/>
+          <a:chExt cx="0" cy="0"/>
+        </a:xfrm>
+      </p:grpSpPr>
+      <p:sp>
+        <p:nvSpPr>
+          <p:cNvPr id="2" name="TextBox 1">
+            <a:extLst>
+              <a:ext uri="{FF2B5EF4-FFF2-40B4-BE49-F238E27FC236}">
+                <a16:creationId xmlns:a16="http://schemas.microsoft.com/office/drawing/2014/main" id="{D7B699E5-6A91-D5D4-A6B0-C71C42589BC8}"/>
+              </a:ext>
+            </a:extLst>
+          </p:cNvPr>
+          <p:cNvSpPr txBox="1"/>
+          <p:nvPr/>
+        </p:nvSpPr>
+        <p:spPr>
+          <a:xfrm>
+            <a:off x="140127" y="221836"/>
+            <a:ext cx="3558346" cy="461665"/>
+          </a:xfrm>
+          <a:prstGeom prst="rect">
+            <a:avLst/>
+          </a:prstGeom>
+          <a:noFill/>
+        </p:spPr>
+        <p:txBody>
+          <a:bodyPr wrap="none" rtlCol="0">
+            <a:spAutoFit/>
+          </a:bodyPr>
+          <a:lstStyle/>
+          <a:p>
+            <a:r>
+              <a:rPr lang="en-US" sz="2400" dirty="0"/>
+              <a:t>Results:  Dataset Clean-3</a:t>
+            </a:r>
+          </a:p>
+        </p:txBody>
+      </p:sp>
+      <p:graphicFrame>
+        <p:nvGraphicFramePr>
+          <p:cNvPr id="3" name="Table 2">
+            <a:extLst>
+              <a:ext uri="{FF2B5EF4-FFF2-40B4-BE49-F238E27FC236}">
+                <a16:creationId xmlns:a16="http://schemas.microsoft.com/office/drawing/2014/main" id="{06968A34-6E02-9A89-9D28-711A65FA6A49}"/>
+              </a:ext>
+            </a:extLst>
+          </p:cNvPr>
+          <p:cNvGraphicFramePr>
+            <a:graphicFrameLocks noGrp="1"/>
+          </p:cNvGraphicFramePr>
+          <p:nvPr>
+            <p:extLst>
+              <p:ext uri="{D42A27DB-BD31-4B8C-83A1-F6EECF244321}">
+                <p14:modId xmlns:p14="http://schemas.microsoft.com/office/powerpoint/2010/main" val="3375131024"/>
+              </p:ext>
+            </p:extLst>
+          </p:nvPr>
+        </p:nvGraphicFramePr>
+        <p:xfrm>
+          <a:off x="1729491" y="1086528"/>
+          <a:ext cx="8484186" cy="3167925"/>
+        </p:xfrm>
+        <a:graphic>
+          <a:graphicData uri="http://schemas.openxmlformats.org/drawingml/2006/table">
+            <a:tbl>
+              <a:tblPr firstRow="1" bandRow="1">
+                <a:tableStyleId>{5C22544A-7EE6-4342-B048-85BDC9FD1C3A}</a:tableStyleId>
+              </a:tblPr>
+              <a:tblGrid>
+                <a:gridCol w="1662524">
+                  <a:extLst>
+                    <a:ext uri="{9D8B030D-6E8A-4147-A177-3AD203B41FA5}">
+                      <a16:colId xmlns:a16="http://schemas.microsoft.com/office/drawing/2014/main" val="1065848917"/>
+                    </a:ext>
+                  </a:extLst>
+                </a:gridCol>
+                <a:gridCol w="1087495">
+                  <a:extLst>
+                    <a:ext uri="{9D8B030D-6E8A-4147-A177-3AD203B41FA5}">
+                      <a16:colId xmlns:a16="http://schemas.microsoft.com/office/drawing/2014/main" val="873310604"/>
+                    </a:ext>
+                  </a:extLst>
+                </a:gridCol>
+                <a:gridCol w="1160010">
+                  <a:extLst>
+                    <a:ext uri="{9D8B030D-6E8A-4147-A177-3AD203B41FA5}">
+                      <a16:colId xmlns:a16="http://schemas.microsoft.com/office/drawing/2014/main" val="3981708244"/>
+                    </a:ext>
+                  </a:extLst>
+                </a:gridCol>
+                <a:gridCol w="1524719">
+                  <a:extLst>
+                    <a:ext uri="{9D8B030D-6E8A-4147-A177-3AD203B41FA5}">
+                      <a16:colId xmlns:a16="http://schemas.microsoft.com/office/drawing/2014/main" val="1135465181"/>
+                    </a:ext>
+                  </a:extLst>
+                </a:gridCol>
+                <a:gridCol w="1524719">
+                  <a:extLst>
+                    <a:ext uri="{9D8B030D-6E8A-4147-A177-3AD203B41FA5}">
+                      <a16:colId xmlns:a16="http://schemas.microsoft.com/office/drawing/2014/main" val="91865083"/>
+                    </a:ext>
+                  </a:extLst>
+                </a:gridCol>
+                <a:gridCol w="1524719">
+                  <a:extLst>
+                    <a:ext uri="{9D8B030D-6E8A-4147-A177-3AD203B41FA5}">
+                      <a16:colId xmlns:a16="http://schemas.microsoft.com/office/drawing/2014/main" val="2256753199"/>
+                    </a:ext>
+                  </a:extLst>
+                </a:gridCol>
+              </a:tblGrid>
+              <a:tr h="505569">
+                <a:tc>
+                  <a:txBody>
+                    <a:bodyPr/>
+                    <a:lstStyle/>
+                    <a:p>
+                      <a:pPr algn="ctr"/>
+                      <a:r>
+                        <a:rPr lang="en-US" dirty="0"/>
+                        <a:t>Model</a:t>
+                      </a:r>
+                    </a:p>
+                  </a:txBody>
+                  <a:tcPr anchor="ctr"/>
+                </a:tc>
+                <a:tc>
+                  <a:txBody>
+                    <a:bodyPr/>
+                    <a:lstStyle/>
+                    <a:p>
+                      <a:pPr algn="ctr"/>
+                      <a:r>
+                        <a:rPr lang="en-US" dirty="0"/>
+                        <a:t>Train Loss</a:t>
+                      </a:r>
+                    </a:p>
+                  </a:txBody>
+                  <a:tcPr anchor="ctr"/>
+                </a:tc>
+                <a:tc>
+                  <a:txBody>
+                    <a:bodyPr/>
+                    <a:lstStyle/>
+                    <a:p>
+                      <a:pPr algn="ctr"/>
+                      <a:r>
+                        <a:rPr lang="en-US" dirty="0"/>
+                        <a:t>Valid. Loss</a:t>
+                      </a:r>
+                    </a:p>
+                  </a:txBody>
+                  <a:tcPr anchor="ctr"/>
+                </a:tc>
+                <a:tc>
+                  <a:txBody>
+                    <a:bodyPr/>
+                    <a:lstStyle/>
+                    <a:p>
+                      <a:pPr algn="ctr"/>
+                      <a:r>
+                        <a:rPr lang="en-US" dirty="0"/>
+                        <a:t>Epochs</a:t>
+                      </a:r>
+                    </a:p>
+                  </a:txBody>
+                  <a:tcPr anchor="ctr"/>
+                </a:tc>
+                <a:tc>
+                  <a:txBody>
+                    <a:bodyPr/>
+                    <a:lstStyle/>
+                    <a:p>
+                      <a:pPr algn="ctr"/>
+                      <a:r>
+                        <a:rPr lang="en-US" dirty="0"/>
+                        <a:t>RMSD</a:t>
+                      </a:r>
+                    </a:p>
+                    <a:p>
+                      <a:pPr algn="ctr"/>
+                      <a:r>
+                        <a:rPr lang="en-US" dirty="0"/>
+                        <a:t>(valid set)</a:t>
+                      </a:r>
+                    </a:p>
+                  </a:txBody>
+                  <a:tcPr anchor="ctr"/>
+                </a:tc>
+                <a:tc>
+                  <a:txBody>
+                    <a:bodyPr/>
+                    <a:lstStyle/>
+                    <a:p>
+                      <a:pPr algn="ctr"/>
+                      <a:r>
+                        <a:rPr lang="en-US" dirty="0"/>
+                        <a:t>Comment</a:t>
+                      </a:r>
+                    </a:p>
+                  </a:txBody>
+                  <a:tcPr anchor="ctr"/>
+                </a:tc>
+                <a:extLst>
+                  <a:ext uri="{0D108BD9-81ED-4DB2-BD59-A6C34878D82A}">
+                    <a16:rowId xmlns:a16="http://schemas.microsoft.com/office/drawing/2014/main" val="1617347897"/>
+                  </a:ext>
+                </a:extLst>
+              </a:tr>
+              <a:tr h="505569">
+                <a:tc>
+                  <a:txBody>
+                    <a:bodyPr/>
+                    <a:lstStyle/>
+                    <a:p>
+                      <a:r>
+                        <a:rPr lang="en-US" dirty="0"/>
+                        <a:t>residual MLP</a:t>
+                      </a:r>
+                    </a:p>
+                  </a:txBody>
+                  <a:tcPr anchor="ctr"/>
+                </a:tc>
+                <a:tc>
+                  <a:txBody>
+                    <a:bodyPr/>
+                    <a:lstStyle/>
+                    <a:p>
+                      <a:pPr algn="ctr"/>
+                      <a:endParaRPr lang="en-US" dirty="0"/>
+                    </a:p>
+                  </a:txBody>
+                  <a:tcPr anchor="ctr"/>
+                </a:tc>
+                <a:tc>
+                  <a:txBody>
+                    <a:bodyPr/>
+                    <a:lstStyle/>
+                    <a:p>
+                      <a:pPr algn="ctr"/>
+                      <a:endParaRPr lang="en-US" dirty="0"/>
+                    </a:p>
+                  </a:txBody>
+                  <a:tcPr anchor="ctr"/>
+                </a:tc>
+                <a:tc>
+                  <a:txBody>
+                    <a:bodyPr/>
+                    <a:lstStyle/>
+                    <a:p>
+                      <a:pPr algn="ctr"/>
+                      <a:endParaRPr lang="en-US" dirty="0"/>
+                    </a:p>
+                  </a:txBody>
+                  <a:tcPr anchor="ctr"/>
+                </a:tc>
+                <a:tc>
+                  <a:txBody>
+                    <a:bodyPr/>
+                    <a:lstStyle/>
+                    <a:p>
+                      <a:pPr algn="ctr"/>
+                      <a:endParaRPr lang="en-US" dirty="0"/>
+                    </a:p>
+                  </a:txBody>
+                  <a:tcPr anchor="ctr"/>
+                </a:tc>
+                <a:tc>
+                  <a:txBody>
+                    <a:bodyPr/>
+                    <a:lstStyle/>
+                    <a:p>
+                      <a:pPr algn="ctr"/>
+                      <a:endParaRPr lang="en-US" dirty="0"/>
+                    </a:p>
+                  </a:txBody>
+                  <a:tcPr anchor="ctr"/>
+                </a:tc>
+                <a:extLst>
+                  <a:ext uri="{0D108BD9-81ED-4DB2-BD59-A6C34878D82A}">
+                    <a16:rowId xmlns:a16="http://schemas.microsoft.com/office/drawing/2014/main" val="3248717932"/>
+                  </a:ext>
+                </a:extLst>
+              </a:tr>
+              <a:tr h="505569">
+                <a:tc>
+                  <a:txBody>
+                    <a:bodyPr/>
+                    <a:lstStyle/>
+                    <a:p>
+                      <a:r>
+                        <a:rPr lang="en-US" dirty="0"/>
+                        <a:t>VIT</a:t>
+                      </a:r>
+                    </a:p>
+                  </a:txBody>
+                  <a:tcPr anchor="ctr"/>
+                </a:tc>
+                <a:tc>
+                  <a:txBody>
+                    <a:bodyPr/>
+                    <a:lstStyle/>
+                    <a:p>
+                      <a:pPr algn="ctr"/>
+                      <a:endParaRPr lang="en-US" dirty="0"/>
+                    </a:p>
+                  </a:txBody>
+                  <a:tcPr anchor="ctr"/>
+                </a:tc>
+                <a:tc>
+                  <a:txBody>
+                    <a:bodyPr/>
+                    <a:lstStyle/>
+                    <a:p>
+                      <a:pPr algn="ctr"/>
+                      <a:endParaRPr lang="en-US" dirty="0"/>
+                    </a:p>
+                  </a:txBody>
+                  <a:tcPr anchor="ctr"/>
+                </a:tc>
+                <a:tc>
+                  <a:txBody>
+                    <a:bodyPr/>
+                    <a:lstStyle/>
+                    <a:p>
+                      <a:pPr algn="ctr"/>
+                      <a:endParaRPr lang="en-US" dirty="0"/>
                     </a:p>
                   </a:txBody>
                   <a:tcPr anchor="ctr"/>
@@ -4122,7 +5750,7 @@
     </p:spTree>
     <p:extLst>
       <p:ext uri="{BB962C8B-B14F-4D97-AF65-F5344CB8AC3E}">
-        <p14:creationId xmlns:p14="http://schemas.microsoft.com/office/powerpoint/2010/main" val="1303042645"/>
+        <p14:creationId xmlns:p14="http://schemas.microsoft.com/office/powerpoint/2010/main" val="1062387867"/>
       </p:ext>
     </p:extLst>
   </p:cSld>
@@ -4132,7 +5760,7 @@
 </p:sld>
 </file>
 
-<file path=ppt/slides/slide11.xml><?xml version="1.0" encoding="utf-8"?>
+<file path=ppt/slides/slide13.xml><?xml version="1.0" encoding="utf-8"?>
 <p:sld xmlns:a="http://schemas.openxmlformats.org/drawingml/2006/main" xmlns:r="http://schemas.openxmlformats.org/officeDocument/2006/relationships" xmlns:p="http://schemas.openxmlformats.org/presentationml/2006/main">
   <p:cSld>
     <p:spTree>
@@ -4535,7 +6163,7 @@
 </p:sld>
 </file>
 
-<file path=ppt/slides/slide12.xml><?xml version="1.0" encoding="utf-8"?>
+<file path=ppt/slides/slide14.xml><?xml version="1.0" encoding="utf-8"?>
 <p:sld xmlns:a="http://schemas.openxmlformats.org/drawingml/2006/main" xmlns:r="http://schemas.openxmlformats.org/officeDocument/2006/relationships" xmlns:p="http://schemas.openxmlformats.org/presentationml/2006/main">
   <p:cSld>
     <p:spTree>
@@ -4923,7 +6551,7 @@
 </p:sld>
 </file>
 
-<file path=ppt/slides/slide13.xml><?xml version="1.0" encoding="utf-8"?>
+<file path=ppt/slides/slide15.xml><?xml version="1.0" encoding="utf-8"?>
 <p:sld xmlns:a="http://schemas.openxmlformats.org/drawingml/2006/main" xmlns:r="http://schemas.openxmlformats.org/officeDocument/2006/relationships" xmlns:p="http://schemas.openxmlformats.org/presentationml/2006/main">
   <p:cSld>
     <p:spTree>
@@ -5308,7 +6936,7 @@
 </p:sld>
 </file>
 
-<file path=ppt/slides/slide14.xml><?xml version="1.0" encoding="utf-8"?>
+<file path=ppt/slides/slide16.xml><?xml version="1.0" encoding="utf-8"?>
 <p:sld xmlns:a="http://schemas.openxmlformats.org/drawingml/2006/main" xmlns:r="http://schemas.openxmlformats.org/officeDocument/2006/relationships" xmlns:p="http://schemas.openxmlformats.org/presentationml/2006/main">
   <p:cSld>
     <p:spTree>
@@ -6999,7 +8627,7 @@
 </p:sld>
 </file>
 
-<file path=ppt/slides/slide15.xml><?xml version="1.0" encoding="utf-8"?>
+<file path=ppt/slides/slide17.xml><?xml version="1.0" encoding="utf-8"?>
 <p:sld xmlns:a="http://schemas.openxmlformats.org/drawingml/2006/main" xmlns:r="http://schemas.openxmlformats.org/officeDocument/2006/relationships" xmlns:p="http://schemas.openxmlformats.org/presentationml/2006/main">
   <p:cSld>
     <p:spTree>
@@ -7678,7 +9306,7 @@
 </p:sld>
 </file>
 
-<file path=ppt/slides/slide16.xml><?xml version="1.0" encoding="utf-8"?>
+<file path=ppt/slides/slide18.xml><?xml version="1.0" encoding="utf-8"?>
 <p:sld xmlns:a="http://schemas.openxmlformats.org/drawingml/2006/main" xmlns:r="http://schemas.openxmlformats.org/officeDocument/2006/relationships" xmlns:p="http://schemas.openxmlformats.org/presentationml/2006/main">
   <p:cSld>
     <p:spTree>
@@ -8906,7 +10534,7 @@
 </p:sld>
 </file>
 
-<file path=ppt/slides/slide17.xml><?xml version="1.0" encoding="utf-8"?>
+<file path=ppt/slides/slide19.xml><?xml version="1.0" encoding="utf-8"?>
 <p:sld xmlns:a="http://schemas.openxmlformats.org/drawingml/2006/main" xmlns:r="http://schemas.openxmlformats.org/officeDocument/2006/relationships" xmlns:p="http://schemas.openxmlformats.org/presentationml/2006/main">
   <p:cSld>
     <p:spTree>
@@ -11729,7 +13357,386 @@
 </p:sld>
 </file>
 
-<file path=ppt/slides/slide18.xml><?xml version="1.0" encoding="utf-8"?>
+<file path=ppt/slides/slide2.xml><?xml version="1.0" encoding="utf-8"?>
+<p:sld xmlns:a="http://schemas.openxmlformats.org/drawingml/2006/main" xmlns:r="http://schemas.openxmlformats.org/officeDocument/2006/relationships" xmlns:p="http://schemas.openxmlformats.org/presentationml/2006/main">
+  <p:cSld>
+    <p:spTree>
+      <p:nvGrpSpPr>
+        <p:cNvPr id="1" name=""/>
+        <p:cNvGrpSpPr/>
+        <p:nvPr/>
+      </p:nvGrpSpPr>
+      <p:grpSpPr>
+        <a:xfrm>
+          <a:off x="0" y="0"/>
+          <a:ext cx="0" cy="0"/>
+          <a:chOff x="0" y="0"/>
+          <a:chExt cx="0" cy="0"/>
+        </a:xfrm>
+      </p:grpSpPr>
+      <p:sp>
+        <p:nvSpPr>
+          <p:cNvPr id="2" name="TextBox 1">
+            <a:extLst>
+              <a:ext uri="{FF2B5EF4-FFF2-40B4-BE49-F238E27FC236}">
+                <a16:creationId xmlns:a16="http://schemas.microsoft.com/office/drawing/2014/main" id="{E758D5CD-18BF-EE2E-47E2-E832CEE7988E}"/>
+              </a:ext>
+            </a:extLst>
+          </p:cNvPr>
+          <p:cNvSpPr txBox="1"/>
+          <p:nvPr/>
+        </p:nvSpPr>
+        <p:spPr>
+          <a:xfrm>
+            <a:off x="140127" y="221836"/>
+            <a:ext cx="3472810" cy="461665"/>
+          </a:xfrm>
+          <a:prstGeom prst="rect">
+            <a:avLst/>
+          </a:prstGeom>
+          <a:noFill/>
+        </p:spPr>
+        <p:txBody>
+          <a:bodyPr wrap="none" rtlCol="0">
+            <a:spAutoFit/>
+          </a:bodyPr>
+          <a:lstStyle/>
+          <a:p>
+            <a:r>
+              <a:rPr lang="en-US" sz="2400" dirty="0"/>
+              <a:t>Data set analysis – part 1</a:t>
+            </a:r>
+          </a:p>
+        </p:txBody>
+      </p:sp>
+      <p:sp>
+        <p:nvSpPr>
+          <p:cNvPr id="5" name="TextBox 4">
+            <a:extLst>
+              <a:ext uri="{FF2B5EF4-FFF2-40B4-BE49-F238E27FC236}">
+                <a16:creationId xmlns:a16="http://schemas.microsoft.com/office/drawing/2014/main" id="{9D21562E-004E-F27D-F7B0-73BC9E3A90A1}"/>
+              </a:ext>
+            </a:extLst>
+          </p:cNvPr>
+          <p:cNvSpPr txBox="1"/>
+          <p:nvPr/>
+        </p:nvSpPr>
+        <p:spPr>
+          <a:xfrm>
+            <a:off x="223864" y="961394"/>
+            <a:ext cx="7074915" cy="2800767"/>
+          </a:xfrm>
+          <a:prstGeom prst="rect">
+            <a:avLst/>
+          </a:prstGeom>
+          <a:noFill/>
+        </p:spPr>
+        <p:txBody>
+          <a:bodyPr wrap="square">
+            <a:spAutoFit/>
+          </a:bodyPr>
+          <a:lstStyle/>
+          <a:p>
+            <a:r>
+              <a:rPr lang="en-US" sz="1600" b="1" dirty="0" err="1">
+                <a:effectLst/>
+              </a:rPr>
+              <a:t>alphaseq_data_train.csv</a:t>
+            </a:r>
+            <a:endParaRPr lang="en-US" sz="1600" b="1" dirty="0">
+              <a:effectLst/>
+            </a:endParaRPr>
+          </a:p>
+          <a:p>
+            <a:pPr marL="285750" indent="-285750">
+              <a:buFont typeface="Arial" panose="020B0604020202020204" pitchFamily="34" charset="0"/>
+              <a:buChar char="•"/>
+            </a:pPr>
+            <a:r>
+              <a:rPr lang="en-US" sz="1600" b="0" dirty="0">
+                <a:effectLst/>
+              </a:rPr>
+              <a:t>29199 unique aa sequences</a:t>
+            </a:r>
+          </a:p>
+          <a:p>
+            <a:pPr marL="742950" lvl="1" indent="-285750">
+              <a:buFont typeface="Arial" panose="020B0604020202020204" pitchFamily="34" charset="0"/>
+              <a:buChar char="•"/>
+            </a:pPr>
+            <a:r>
+              <a:rPr lang="en-US" sz="1600" dirty="0"/>
+              <a:t>For duplicate entries use the mean of their </a:t>
+            </a:r>
+            <a:r>
+              <a:rPr lang="en-US" sz="1600" dirty="0" err="1"/>
+              <a:t>Kd</a:t>
+            </a:r>
+            <a:r>
+              <a:rPr lang="en-US" sz="1600" dirty="0"/>
+              <a:t> values</a:t>
+            </a:r>
+            <a:endParaRPr lang="en-US" sz="1600" b="0" dirty="0">
+              <a:effectLst/>
+            </a:endParaRPr>
+          </a:p>
+          <a:p>
+            <a:pPr marL="285750" indent="-285750">
+              <a:buFont typeface="Arial" panose="020B0604020202020204" pitchFamily="34" charset="0"/>
+              <a:buChar char="•"/>
+            </a:pPr>
+            <a:r>
+              <a:rPr lang="en-US" sz="1600" b="0" dirty="0">
+                <a:effectLst/>
+              </a:rPr>
+              <a:t>remove all entries with NANs for </a:t>
+            </a:r>
+            <a:r>
+              <a:rPr lang="en-US" sz="1600" b="0" dirty="0" err="1">
+                <a:effectLst/>
+              </a:rPr>
+              <a:t>Kd</a:t>
+            </a:r>
+            <a:endParaRPr lang="en-US" sz="1600" b="0" dirty="0">
+              <a:effectLst/>
+            </a:endParaRPr>
+          </a:p>
+          <a:p>
+            <a:pPr marL="285750" indent="-285750">
+              <a:buFont typeface="Arial" panose="020B0604020202020204" pitchFamily="34" charset="0"/>
+              <a:buChar char="•"/>
+            </a:pPr>
+            <a:r>
+              <a:rPr lang="en-US" sz="1600" b="0" dirty="0">
+                <a:effectLst/>
+              </a:rPr>
+              <a:t>all sequences are same length: 246 residues</a:t>
+            </a:r>
+          </a:p>
+          <a:p>
+            <a:pPr marL="285750" indent="-285750">
+              <a:buFont typeface="Arial" panose="020B0604020202020204" pitchFamily="34" charset="0"/>
+              <a:buChar char="•"/>
+            </a:pPr>
+            <a:r>
+              <a:rPr lang="en-US" sz="1600" dirty="0"/>
+              <a:t>plot distribution of </a:t>
+            </a:r>
+            <a:r>
+              <a:rPr lang="en-US" sz="1600" dirty="0" err="1"/>
+              <a:t>Kd</a:t>
+            </a:r>
+            <a:r>
+              <a:rPr lang="en-US" sz="1600" dirty="0"/>
+              <a:t> values</a:t>
+            </a:r>
+          </a:p>
+          <a:p>
+            <a:pPr marL="742950" lvl="1" indent="-285750">
+              <a:buFont typeface="Arial" panose="020B0604020202020204" pitchFamily="34" charset="0"/>
+              <a:buChar char="•"/>
+            </a:pPr>
+            <a:r>
+              <a:rPr lang="en-US" sz="1600" dirty="0"/>
+              <a:t>interesting bimodal distribution</a:t>
+            </a:r>
+          </a:p>
+          <a:p>
+            <a:pPr marL="742950" lvl="1" indent="-285750">
+              <a:buFont typeface="Arial" panose="020B0604020202020204" pitchFamily="34" charset="0"/>
+              <a:buChar char="•"/>
+            </a:pPr>
+            <a:r>
+              <a:rPr lang="en-US" sz="1600" dirty="0"/>
+              <a:t>diff between the two peaks is ~0.25 kcal/mol </a:t>
+            </a:r>
+            <a:r>
+              <a:rPr lang="en-US" sz="1600" dirty="0">
+                <a:latin typeface="Symbol" pitchFamily="2" charset="2"/>
+              </a:rPr>
+              <a:t>D</a:t>
+            </a:r>
+            <a:r>
+              <a:rPr lang="en-US" sz="1600" dirty="0"/>
+              <a:t>G</a:t>
+            </a:r>
+          </a:p>
+          <a:p>
+            <a:pPr marL="285750" indent="-285750">
+              <a:buFont typeface="Arial" panose="020B0604020202020204" pitchFamily="34" charset="0"/>
+              <a:buChar char="•"/>
+            </a:pPr>
+            <a:r>
+              <a:rPr lang="en-US" sz="1600" b="0" dirty="0">
+                <a:effectLst/>
+              </a:rPr>
+              <a:t>plot the variability at each residue position in the sequence</a:t>
+            </a:r>
+          </a:p>
+          <a:p>
+            <a:pPr marL="742950" lvl="1" indent="-285750">
+              <a:buFont typeface="Arial" panose="020B0604020202020204" pitchFamily="34" charset="0"/>
+              <a:buChar char="•"/>
+            </a:pPr>
+            <a:r>
+              <a:rPr lang="en-US" sz="1600" dirty="0"/>
+              <a:t>80 residue region (position 29 to 108) has all the mutations</a:t>
+            </a:r>
+          </a:p>
+          <a:p>
+            <a:pPr marL="742950" lvl="1" indent="-285750">
+              <a:buFont typeface="Arial" panose="020B0604020202020204" pitchFamily="34" charset="0"/>
+              <a:buChar char="•"/>
+            </a:pPr>
+            <a:r>
+              <a:rPr lang="en-US" sz="1600" dirty="0"/>
+              <a:t>this is likely a CDR region</a:t>
+            </a:r>
+            <a:endParaRPr lang="en-US" sz="1600" b="0" dirty="0">
+              <a:effectLst/>
+            </a:endParaRPr>
+          </a:p>
+        </p:txBody>
+      </p:sp>
+      <p:pic>
+        <p:nvPicPr>
+          <p:cNvPr id="6" name="Picture 5">
+            <a:extLst>
+              <a:ext uri="{FF2B5EF4-FFF2-40B4-BE49-F238E27FC236}">
+                <a16:creationId xmlns:a16="http://schemas.microsoft.com/office/drawing/2014/main" id="{D17F21C1-D1A7-E53B-97D8-88CD6C8728DA}"/>
+              </a:ext>
+            </a:extLst>
+          </p:cNvPr>
+          <p:cNvPicPr>
+            <a:picLocks noChangeAspect="1"/>
+          </p:cNvPicPr>
+          <p:nvPr/>
+        </p:nvPicPr>
+        <p:blipFill>
+          <a:blip r:embed="rId2"/>
+          <a:stretch>
+            <a:fillRect/>
+          </a:stretch>
+        </p:blipFill>
+        <p:spPr>
+          <a:xfrm>
+            <a:off x="8015617" y="221836"/>
+            <a:ext cx="3683000" cy="2870200"/>
+          </a:xfrm>
+          <a:prstGeom prst="rect">
+            <a:avLst/>
+          </a:prstGeom>
+        </p:spPr>
+      </p:pic>
+      <p:sp>
+        <p:nvSpPr>
+          <p:cNvPr id="7" name="TextBox 6">
+            <a:extLst>
+              <a:ext uri="{FF2B5EF4-FFF2-40B4-BE49-F238E27FC236}">
+                <a16:creationId xmlns:a16="http://schemas.microsoft.com/office/drawing/2014/main" id="{6F74E53A-581B-C458-F657-00CE2DE6B2CE}"/>
+              </a:ext>
+            </a:extLst>
+          </p:cNvPr>
+          <p:cNvSpPr txBox="1"/>
+          <p:nvPr/>
+        </p:nvSpPr>
+        <p:spPr>
+          <a:xfrm>
+            <a:off x="8556321" y="3092036"/>
+            <a:ext cx="3288946" cy="523220"/>
+          </a:xfrm>
+          <a:prstGeom prst="rect">
+            <a:avLst/>
+          </a:prstGeom>
+          <a:noFill/>
+        </p:spPr>
+        <p:txBody>
+          <a:bodyPr wrap="square" rtlCol="0">
+            <a:spAutoFit/>
+          </a:bodyPr>
+          <a:lstStyle/>
+          <a:p>
+            <a:r>
+              <a:rPr lang="en-US" sz="1400" dirty="0"/>
+              <a:t>bimodal-like distribution is similar to that reported in the Nature paper</a:t>
+            </a:r>
+          </a:p>
+        </p:txBody>
+      </p:sp>
+      <p:pic>
+        <p:nvPicPr>
+          <p:cNvPr id="8" name="Picture 7">
+            <a:extLst>
+              <a:ext uri="{FF2B5EF4-FFF2-40B4-BE49-F238E27FC236}">
+                <a16:creationId xmlns:a16="http://schemas.microsoft.com/office/drawing/2014/main" id="{6A5B62CE-2B72-1D08-0C96-9BE8BE846DFD}"/>
+              </a:ext>
+            </a:extLst>
+          </p:cNvPr>
+          <p:cNvPicPr>
+            <a:picLocks noChangeAspect="1"/>
+          </p:cNvPicPr>
+          <p:nvPr/>
+        </p:nvPicPr>
+        <p:blipFill>
+          <a:blip r:embed="rId3"/>
+          <a:stretch>
+            <a:fillRect/>
+          </a:stretch>
+        </p:blipFill>
+        <p:spPr>
+          <a:xfrm>
+            <a:off x="2078121" y="4196152"/>
+            <a:ext cx="3366402" cy="2454215"/>
+          </a:xfrm>
+          <a:prstGeom prst="rect">
+            <a:avLst/>
+          </a:prstGeom>
+        </p:spPr>
+      </p:pic>
+      <p:pic>
+        <p:nvPicPr>
+          <p:cNvPr id="9" name="Picture 8">
+            <a:extLst>
+              <a:ext uri="{FF2B5EF4-FFF2-40B4-BE49-F238E27FC236}">
+                <a16:creationId xmlns:a16="http://schemas.microsoft.com/office/drawing/2014/main" id="{3BFBCF0B-3639-7E22-34EB-3B5317FFCBF8}"/>
+              </a:ext>
+            </a:extLst>
+          </p:cNvPr>
+          <p:cNvPicPr>
+            <a:picLocks noChangeAspect="1"/>
+          </p:cNvPicPr>
+          <p:nvPr/>
+        </p:nvPicPr>
+        <p:blipFill>
+          <a:blip r:embed="rId4"/>
+          <a:stretch>
+            <a:fillRect/>
+          </a:stretch>
+        </p:blipFill>
+        <p:spPr>
+          <a:xfrm>
+            <a:off x="6631692" y="3893149"/>
+            <a:ext cx="3225425" cy="2757218"/>
+          </a:xfrm>
+          <a:prstGeom prst="rect">
+            <a:avLst/>
+          </a:prstGeom>
+        </p:spPr>
+      </p:pic>
+    </p:spTree>
+    <p:extLst>
+      <p:ext uri="{BB962C8B-B14F-4D97-AF65-F5344CB8AC3E}">
+        <p14:creationId xmlns:p14="http://schemas.microsoft.com/office/powerpoint/2010/main" val="2470448845"/>
+      </p:ext>
+    </p:extLst>
+  </p:cSld>
+  <p:clrMapOvr>
+    <a:masterClrMapping/>
+  </p:clrMapOvr>
+</p:sld>
+</file>
+
+<file path=ppt/slides/slide20.xml><?xml version="1.0" encoding="utf-8"?>
 <p:sld xmlns:a="http://schemas.openxmlformats.org/drawingml/2006/main" xmlns:r="http://schemas.openxmlformats.org/officeDocument/2006/relationships" xmlns:p="http://schemas.openxmlformats.org/presentationml/2006/main">
   <p:cSld>
     <p:spTree>
@@ -15677,7 +17684,7 @@
 </p:sld>
 </file>
 
-<file path=ppt/slides/slide19.xml><?xml version="1.0" encoding="utf-8"?>
+<file path=ppt/slides/slide21.xml><?xml version="1.0" encoding="utf-8"?>
 <p:sld xmlns:a="http://schemas.openxmlformats.org/drawingml/2006/main" xmlns:r="http://schemas.openxmlformats.org/officeDocument/2006/relationships" xmlns:p="http://schemas.openxmlformats.org/presentationml/2006/main">
   <p:cSld>
     <p:spTree>
@@ -18692,386 +20699,7 @@
 </p:sld>
 </file>
 
-<file path=ppt/slides/slide2.xml><?xml version="1.0" encoding="utf-8"?>
-<p:sld xmlns:a="http://schemas.openxmlformats.org/drawingml/2006/main" xmlns:r="http://schemas.openxmlformats.org/officeDocument/2006/relationships" xmlns:p="http://schemas.openxmlformats.org/presentationml/2006/main">
-  <p:cSld>
-    <p:spTree>
-      <p:nvGrpSpPr>
-        <p:cNvPr id="1" name=""/>
-        <p:cNvGrpSpPr/>
-        <p:nvPr/>
-      </p:nvGrpSpPr>
-      <p:grpSpPr>
-        <a:xfrm>
-          <a:off x="0" y="0"/>
-          <a:ext cx="0" cy="0"/>
-          <a:chOff x="0" y="0"/>
-          <a:chExt cx="0" cy="0"/>
-        </a:xfrm>
-      </p:grpSpPr>
-      <p:sp>
-        <p:nvSpPr>
-          <p:cNvPr id="2" name="TextBox 1">
-            <a:extLst>
-              <a:ext uri="{FF2B5EF4-FFF2-40B4-BE49-F238E27FC236}">
-                <a16:creationId xmlns:a16="http://schemas.microsoft.com/office/drawing/2014/main" id="{E758D5CD-18BF-EE2E-47E2-E832CEE7988E}"/>
-              </a:ext>
-            </a:extLst>
-          </p:cNvPr>
-          <p:cNvSpPr txBox="1"/>
-          <p:nvPr/>
-        </p:nvSpPr>
-        <p:spPr>
-          <a:xfrm>
-            <a:off x="140127" y="221836"/>
-            <a:ext cx="3472810" cy="461665"/>
-          </a:xfrm>
-          <a:prstGeom prst="rect">
-            <a:avLst/>
-          </a:prstGeom>
-          <a:noFill/>
-        </p:spPr>
-        <p:txBody>
-          <a:bodyPr wrap="none" rtlCol="0">
-            <a:spAutoFit/>
-          </a:bodyPr>
-          <a:lstStyle/>
-          <a:p>
-            <a:r>
-              <a:rPr lang="en-US" sz="2400" dirty="0"/>
-              <a:t>Data set analysis – part 1</a:t>
-            </a:r>
-          </a:p>
-        </p:txBody>
-      </p:sp>
-      <p:sp>
-        <p:nvSpPr>
-          <p:cNvPr id="5" name="TextBox 4">
-            <a:extLst>
-              <a:ext uri="{FF2B5EF4-FFF2-40B4-BE49-F238E27FC236}">
-                <a16:creationId xmlns:a16="http://schemas.microsoft.com/office/drawing/2014/main" id="{9D21562E-004E-F27D-F7B0-73BC9E3A90A1}"/>
-              </a:ext>
-            </a:extLst>
-          </p:cNvPr>
-          <p:cNvSpPr txBox="1"/>
-          <p:nvPr/>
-        </p:nvSpPr>
-        <p:spPr>
-          <a:xfrm>
-            <a:off x="223864" y="961394"/>
-            <a:ext cx="7074915" cy="2800767"/>
-          </a:xfrm>
-          <a:prstGeom prst="rect">
-            <a:avLst/>
-          </a:prstGeom>
-          <a:noFill/>
-        </p:spPr>
-        <p:txBody>
-          <a:bodyPr wrap="square">
-            <a:spAutoFit/>
-          </a:bodyPr>
-          <a:lstStyle/>
-          <a:p>
-            <a:r>
-              <a:rPr lang="en-US" sz="1600" b="1" dirty="0" err="1">
-                <a:effectLst/>
-              </a:rPr>
-              <a:t>alphaseq_data_train.csv</a:t>
-            </a:r>
-            <a:endParaRPr lang="en-US" sz="1600" b="1" dirty="0">
-              <a:effectLst/>
-            </a:endParaRPr>
-          </a:p>
-          <a:p>
-            <a:pPr marL="285750" indent="-285750">
-              <a:buFont typeface="Arial" panose="020B0604020202020204" pitchFamily="34" charset="0"/>
-              <a:buChar char="•"/>
-            </a:pPr>
-            <a:r>
-              <a:rPr lang="en-US" sz="1600" b="0" dirty="0">
-                <a:effectLst/>
-              </a:rPr>
-              <a:t>29199 unique aa sequences</a:t>
-            </a:r>
-          </a:p>
-          <a:p>
-            <a:pPr marL="742950" lvl="1" indent="-285750">
-              <a:buFont typeface="Arial" panose="020B0604020202020204" pitchFamily="34" charset="0"/>
-              <a:buChar char="•"/>
-            </a:pPr>
-            <a:r>
-              <a:rPr lang="en-US" sz="1600" dirty="0"/>
-              <a:t>For duplicate entries use the mean of their </a:t>
-            </a:r>
-            <a:r>
-              <a:rPr lang="en-US" sz="1600" dirty="0" err="1"/>
-              <a:t>Kd</a:t>
-            </a:r>
-            <a:r>
-              <a:rPr lang="en-US" sz="1600" dirty="0"/>
-              <a:t> values</a:t>
-            </a:r>
-            <a:endParaRPr lang="en-US" sz="1600" b="0" dirty="0">
-              <a:effectLst/>
-            </a:endParaRPr>
-          </a:p>
-          <a:p>
-            <a:pPr marL="285750" indent="-285750">
-              <a:buFont typeface="Arial" panose="020B0604020202020204" pitchFamily="34" charset="0"/>
-              <a:buChar char="•"/>
-            </a:pPr>
-            <a:r>
-              <a:rPr lang="en-US" sz="1600" b="0" dirty="0">
-                <a:effectLst/>
-              </a:rPr>
-              <a:t>remove all entries with NANs for </a:t>
-            </a:r>
-            <a:r>
-              <a:rPr lang="en-US" sz="1600" b="0" dirty="0" err="1">
-                <a:effectLst/>
-              </a:rPr>
-              <a:t>Kd</a:t>
-            </a:r>
-            <a:endParaRPr lang="en-US" sz="1600" b="0" dirty="0">
-              <a:effectLst/>
-            </a:endParaRPr>
-          </a:p>
-          <a:p>
-            <a:pPr marL="285750" indent="-285750">
-              <a:buFont typeface="Arial" panose="020B0604020202020204" pitchFamily="34" charset="0"/>
-              <a:buChar char="•"/>
-            </a:pPr>
-            <a:r>
-              <a:rPr lang="en-US" sz="1600" b="0" dirty="0">
-                <a:effectLst/>
-              </a:rPr>
-              <a:t>all sequences are same length: 246 residues</a:t>
-            </a:r>
-          </a:p>
-          <a:p>
-            <a:pPr marL="285750" indent="-285750">
-              <a:buFont typeface="Arial" panose="020B0604020202020204" pitchFamily="34" charset="0"/>
-              <a:buChar char="•"/>
-            </a:pPr>
-            <a:r>
-              <a:rPr lang="en-US" sz="1600" dirty="0"/>
-              <a:t>plot distribution of </a:t>
-            </a:r>
-            <a:r>
-              <a:rPr lang="en-US" sz="1600" dirty="0" err="1"/>
-              <a:t>Kd</a:t>
-            </a:r>
-            <a:r>
-              <a:rPr lang="en-US" sz="1600" dirty="0"/>
-              <a:t> values</a:t>
-            </a:r>
-          </a:p>
-          <a:p>
-            <a:pPr marL="742950" lvl="1" indent="-285750">
-              <a:buFont typeface="Arial" panose="020B0604020202020204" pitchFamily="34" charset="0"/>
-              <a:buChar char="•"/>
-            </a:pPr>
-            <a:r>
-              <a:rPr lang="en-US" sz="1600" dirty="0"/>
-              <a:t>interesting bimodal distribution</a:t>
-            </a:r>
-          </a:p>
-          <a:p>
-            <a:pPr marL="742950" lvl="1" indent="-285750">
-              <a:buFont typeface="Arial" panose="020B0604020202020204" pitchFamily="34" charset="0"/>
-              <a:buChar char="•"/>
-            </a:pPr>
-            <a:r>
-              <a:rPr lang="en-US" sz="1600" dirty="0"/>
-              <a:t>diff between the two peaks is ~0.25 kcal/mol </a:t>
-            </a:r>
-            <a:r>
-              <a:rPr lang="en-US" sz="1600" dirty="0">
-                <a:latin typeface="Symbol" pitchFamily="2" charset="2"/>
-              </a:rPr>
-              <a:t>D</a:t>
-            </a:r>
-            <a:r>
-              <a:rPr lang="en-US" sz="1600" dirty="0"/>
-              <a:t>G</a:t>
-            </a:r>
-          </a:p>
-          <a:p>
-            <a:pPr marL="285750" indent="-285750">
-              <a:buFont typeface="Arial" panose="020B0604020202020204" pitchFamily="34" charset="0"/>
-              <a:buChar char="•"/>
-            </a:pPr>
-            <a:r>
-              <a:rPr lang="en-US" sz="1600" b="0" dirty="0">
-                <a:effectLst/>
-              </a:rPr>
-              <a:t>plot the variability at each residue position in the sequence</a:t>
-            </a:r>
-          </a:p>
-          <a:p>
-            <a:pPr marL="742950" lvl="1" indent="-285750">
-              <a:buFont typeface="Arial" panose="020B0604020202020204" pitchFamily="34" charset="0"/>
-              <a:buChar char="•"/>
-            </a:pPr>
-            <a:r>
-              <a:rPr lang="en-US" sz="1600" dirty="0"/>
-              <a:t>80 residue region (position 29 to 108) has all the mutations</a:t>
-            </a:r>
-          </a:p>
-          <a:p>
-            <a:pPr marL="742950" lvl="1" indent="-285750">
-              <a:buFont typeface="Arial" panose="020B0604020202020204" pitchFamily="34" charset="0"/>
-              <a:buChar char="•"/>
-            </a:pPr>
-            <a:r>
-              <a:rPr lang="en-US" sz="1600" dirty="0"/>
-              <a:t>this is likely a CDR region</a:t>
-            </a:r>
-            <a:endParaRPr lang="en-US" sz="1600" b="0" dirty="0">
-              <a:effectLst/>
-            </a:endParaRPr>
-          </a:p>
-        </p:txBody>
-      </p:sp>
-      <p:pic>
-        <p:nvPicPr>
-          <p:cNvPr id="6" name="Picture 5">
-            <a:extLst>
-              <a:ext uri="{FF2B5EF4-FFF2-40B4-BE49-F238E27FC236}">
-                <a16:creationId xmlns:a16="http://schemas.microsoft.com/office/drawing/2014/main" id="{D17F21C1-D1A7-E53B-97D8-88CD6C8728DA}"/>
-              </a:ext>
-            </a:extLst>
-          </p:cNvPr>
-          <p:cNvPicPr>
-            <a:picLocks noChangeAspect="1"/>
-          </p:cNvPicPr>
-          <p:nvPr/>
-        </p:nvPicPr>
-        <p:blipFill>
-          <a:blip r:embed="rId2"/>
-          <a:stretch>
-            <a:fillRect/>
-          </a:stretch>
-        </p:blipFill>
-        <p:spPr>
-          <a:xfrm>
-            <a:off x="8015617" y="221836"/>
-            <a:ext cx="3683000" cy="2870200"/>
-          </a:xfrm>
-          <a:prstGeom prst="rect">
-            <a:avLst/>
-          </a:prstGeom>
-        </p:spPr>
-      </p:pic>
-      <p:sp>
-        <p:nvSpPr>
-          <p:cNvPr id="7" name="TextBox 6">
-            <a:extLst>
-              <a:ext uri="{FF2B5EF4-FFF2-40B4-BE49-F238E27FC236}">
-                <a16:creationId xmlns:a16="http://schemas.microsoft.com/office/drawing/2014/main" id="{6F74E53A-581B-C458-F657-00CE2DE6B2CE}"/>
-              </a:ext>
-            </a:extLst>
-          </p:cNvPr>
-          <p:cNvSpPr txBox="1"/>
-          <p:nvPr/>
-        </p:nvSpPr>
-        <p:spPr>
-          <a:xfrm>
-            <a:off x="8556321" y="3092036"/>
-            <a:ext cx="3288946" cy="523220"/>
-          </a:xfrm>
-          <a:prstGeom prst="rect">
-            <a:avLst/>
-          </a:prstGeom>
-          <a:noFill/>
-        </p:spPr>
-        <p:txBody>
-          <a:bodyPr wrap="square" rtlCol="0">
-            <a:spAutoFit/>
-          </a:bodyPr>
-          <a:lstStyle/>
-          <a:p>
-            <a:r>
-              <a:rPr lang="en-US" sz="1400" dirty="0"/>
-              <a:t>bimodal-like distribution is similar to that reported in the Nature paper</a:t>
-            </a:r>
-          </a:p>
-        </p:txBody>
-      </p:sp>
-      <p:pic>
-        <p:nvPicPr>
-          <p:cNvPr id="8" name="Picture 7">
-            <a:extLst>
-              <a:ext uri="{FF2B5EF4-FFF2-40B4-BE49-F238E27FC236}">
-                <a16:creationId xmlns:a16="http://schemas.microsoft.com/office/drawing/2014/main" id="{6A5B62CE-2B72-1D08-0C96-9BE8BE846DFD}"/>
-              </a:ext>
-            </a:extLst>
-          </p:cNvPr>
-          <p:cNvPicPr>
-            <a:picLocks noChangeAspect="1"/>
-          </p:cNvPicPr>
-          <p:nvPr/>
-        </p:nvPicPr>
-        <p:blipFill>
-          <a:blip r:embed="rId3"/>
-          <a:stretch>
-            <a:fillRect/>
-          </a:stretch>
-        </p:blipFill>
-        <p:spPr>
-          <a:xfrm>
-            <a:off x="2078121" y="4196152"/>
-            <a:ext cx="3366402" cy="2454215"/>
-          </a:xfrm>
-          <a:prstGeom prst="rect">
-            <a:avLst/>
-          </a:prstGeom>
-        </p:spPr>
-      </p:pic>
-      <p:pic>
-        <p:nvPicPr>
-          <p:cNvPr id="9" name="Picture 8">
-            <a:extLst>
-              <a:ext uri="{FF2B5EF4-FFF2-40B4-BE49-F238E27FC236}">
-                <a16:creationId xmlns:a16="http://schemas.microsoft.com/office/drawing/2014/main" id="{3BFBCF0B-3639-7E22-34EB-3B5317FFCBF8}"/>
-              </a:ext>
-            </a:extLst>
-          </p:cNvPr>
-          <p:cNvPicPr>
-            <a:picLocks noChangeAspect="1"/>
-          </p:cNvPicPr>
-          <p:nvPr/>
-        </p:nvPicPr>
-        <p:blipFill>
-          <a:blip r:embed="rId4"/>
-          <a:stretch>
-            <a:fillRect/>
-          </a:stretch>
-        </p:blipFill>
-        <p:spPr>
-          <a:xfrm>
-            <a:off x="6631692" y="3893149"/>
-            <a:ext cx="3225425" cy="2757218"/>
-          </a:xfrm>
-          <a:prstGeom prst="rect">
-            <a:avLst/>
-          </a:prstGeom>
-        </p:spPr>
-      </p:pic>
-    </p:spTree>
-    <p:extLst>
-      <p:ext uri="{BB962C8B-B14F-4D97-AF65-F5344CB8AC3E}">
-        <p14:creationId xmlns:p14="http://schemas.microsoft.com/office/powerpoint/2010/main" val="2470448845"/>
-      </p:ext>
-    </p:extLst>
-  </p:cSld>
-  <p:clrMapOvr>
-    <a:masterClrMapping/>
-  </p:clrMapOvr>
-</p:sld>
-</file>
-
-<file path=ppt/slides/slide20.xml><?xml version="1.0" encoding="utf-8"?>
+<file path=ppt/slides/slide22.xml><?xml version="1.0" encoding="utf-8"?>
 <p:sld xmlns:a="http://schemas.openxmlformats.org/drawingml/2006/main" xmlns:r="http://schemas.openxmlformats.org/officeDocument/2006/relationships" xmlns:p="http://schemas.openxmlformats.org/presentationml/2006/main">
   <p:cSld>
     <p:spTree>
@@ -19269,7 +20897,7 @@
 </p:sld>
 </file>
 
-<file path=ppt/slides/slide21.xml><?xml version="1.0" encoding="utf-8"?>
+<file path=ppt/slides/slide23.xml><?xml version="1.0" encoding="utf-8"?>
 <p:sld xmlns:a="http://schemas.openxmlformats.org/drawingml/2006/main" xmlns:r="http://schemas.openxmlformats.org/officeDocument/2006/relationships" xmlns:p="http://schemas.openxmlformats.org/presentationml/2006/main">
   <p:cSld>
     <p:spTree>
@@ -19606,7 +21234,7 @@
 </p:sld>
 </file>
 
-<file path=ppt/slides/slide22.xml><?xml version="1.0" encoding="utf-8"?>
+<file path=ppt/slides/slide24.xml><?xml version="1.0" encoding="utf-8"?>
 <p:sld xmlns:a="http://schemas.openxmlformats.org/drawingml/2006/main" xmlns:r="http://schemas.openxmlformats.org/officeDocument/2006/relationships" xmlns:p="http://schemas.openxmlformats.org/presentationml/2006/main">
   <p:cSld>
     <p:spTree>
@@ -19793,7 +21421,7 @@
 </p:sld>
 </file>
 
-<file path=ppt/slides/slide23.xml><?xml version="1.0" encoding="utf-8"?>
+<file path=ppt/slides/slide25.xml><?xml version="1.0" encoding="utf-8"?>
 <p:sld xmlns:a="http://schemas.openxmlformats.org/drawingml/2006/main" xmlns:r="http://schemas.openxmlformats.org/officeDocument/2006/relationships" xmlns:p="http://schemas.openxmlformats.org/presentationml/2006/main">
   <p:cSld>
     <p:spTree>
@@ -20345,7 +21973,7 @@
 </p:sld>
 </file>
 
-<file path=ppt/slides/slide24.xml><?xml version="1.0" encoding="utf-8"?>
+<file path=ppt/slides/slide26.xml><?xml version="1.0" encoding="utf-8"?>
 <p:sld xmlns:a="http://schemas.openxmlformats.org/drawingml/2006/main" xmlns:r="http://schemas.openxmlformats.org/officeDocument/2006/relationships" xmlns:p="http://schemas.openxmlformats.org/presentationml/2006/main">
   <p:cSld>
     <p:spTree>
@@ -20653,7 +22281,7 @@
 </p:sld>
 </file>
 
-<file path=ppt/slides/slide25.xml><?xml version="1.0" encoding="utf-8"?>
+<file path=ppt/slides/slide27.xml><?xml version="1.0" encoding="utf-8"?>
 <p:sld xmlns:a="http://schemas.openxmlformats.org/drawingml/2006/main" xmlns:r="http://schemas.openxmlformats.org/officeDocument/2006/relationships" xmlns:p="http://schemas.openxmlformats.org/presentationml/2006/main">
   <p:cSld>
     <p:spTree>
@@ -22113,7 +23741,7 @@
         <p:spPr>
           <a:xfrm>
             <a:off x="0" y="42099"/>
-            <a:ext cx="3165995" cy="461665"/>
+            <a:ext cx="3302251" cy="461665"/>
           </a:xfrm>
           <a:prstGeom prst="rect">
             <a:avLst/>
@@ -22128,7 +23756,7 @@
           <a:p>
             <a:r>
               <a:rPr lang="en-US" sz="2400" dirty="0"/>
-              <a:t>Plan for model training</a:t>
+              <a:t>Ideas for model training</a:t>
             </a:r>
           </a:p>
         </p:txBody>
@@ -22688,6 +24316,188 @@
           <a:chExt cx="0" cy="0"/>
         </a:xfrm>
       </p:grpSpPr>
+      <p:sp>
+        <p:nvSpPr>
+          <p:cNvPr id="2" name="TextBox 1">
+            <a:extLst>
+              <a:ext uri="{FF2B5EF4-FFF2-40B4-BE49-F238E27FC236}">
+                <a16:creationId xmlns:a16="http://schemas.microsoft.com/office/drawing/2014/main" id="{943CD40A-05F3-9ADF-0C95-5997A3DC340E}"/>
+              </a:ext>
+            </a:extLst>
+          </p:cNvPr>
+          <p:cNvSpPr txBox="1"/>
+          <p:nvPr/>
+        </p:nvSpPr>
+        <p:spPr>
+          <a:xfrm>
+            <a:off x="173866" y="154242"/>
+            <a:ext cx="2661626" cy="461665"/>
+          </a:xfrm>
+          <a:prstGeom prst="rect">
+            <a:avLst/>
+          </a:prstGeom>
+          <a:noFill/>
+        </p:spPr>
+        <p:txBody>
+          <a:bodyPr wrap="none" rtlCol="0">
+            <a:spAutoFit/>
+          </a:bodyPr>
+          <a:lstStyle/>
+          <a:p>
+            <a:r>
+              <a:rPr lang="en-US" sz="2400" dirty="0"/>
+              <a:t>Vision Transformer</a:t>
+            </a:r>
+          </a:p>
+        </p:txBody>
+      </p:sp>
+      <p:sp>
+        <p:nvSpPr>
+          <p:cNvPr id="3" name="TextBox 2">
+            <a:extLst>
+              <a:ext uri="{FF2B5EF4-FFF2-40B4-BE49-F238E27FC236}">
+                <a16:creationId xmlns:a16="http://schemas.microsoft.com/office/drawing/2014/main" id="{7426AB23-99B9-FA2D-64B7-92464BD1021C}"/>
+              </a:ext>
+            </a:extLst>
+          </p:cNvPr>
+          <p:cNvSpPr txBox="1"/>
+          <p:nvPr/>
+        </p:nvSpPr>
+        <p:spPr>
+          <a:xfrm>
+            <a:off x="8091578" y="6124755"/>
+            <a:ext cx="2946128" cy="338554"/>
+          </a:xfrm>
+          <a:prstGeom prst="rect">
+            <a:avLst/>
+          </a:prstGeom>
+          <a:noFill/>
+        </p:spPr>
+        <p:txBody>
+          <a:bodyPr wrap="none" rtlCol="0">
+            <a:spAutoFit/>
+          </a:bodyPr>
+          <a:lstStyle/>
+          <a:p>
+            <a:r>
+              <a:rPr lang="en-US" sz="1600" dirty="0">
+                <a:hlinkClick r:id="rId2"/>
+              </a:rPr>
+              <a:t>http://arxiv.org/abs/2010.11929</a:t>
+            </a:r>
+            <a:endParaRPr lang="en-US" sz="1600" dirty="0"/>
+          </a:p>
+        </p:txBody>
+      </p:sp>
+      <p:pic>
+        <p:nvPicPr>
+          <p:cNvPr id="4" name="Picture 3">
+            <a:extLst>
+              <a:ext uri="{FF2B5EF4-FFF2-40B4-BE49-F238E27FC236}">
+                <a16:creationId xmlns:a16="http://schemas.microsoft.com/office/drawing/2014/main" id="{48E43E58-8692-E1E7-8341-CFB8086C1269}"/>
+              </a:ext>
+            </a:extLst>
+          </p:cNvPr>
+          <p:cNvPicPr>
+            <a:picLocks noChangeAspect="1"/>
+          </p:cNvPicPr>
+          <p:nvPr/>
+        </p:nvPicPr>
+        <p:blipFill>
+          <a:blip r:embed="rId3"/>
+          <a:stretch>
+            <a:fillRect/>
+          </a:stretch>
+        </p:blipFill>
+        <p:spPr>
+          <a:xfrm>
+            <a:off x="1373037" y="1614577"/>
+            <a:ext cx="7772400" cy="4267200"/>
+          </a:xfrm>
+          <a:prstGeom prst="rect">
+            <a:avLst/>
+          </a:prstGeom>
+        </p:spPr>
+      </p:pic>
+      <p:sp>
+        <p:nvSpPr>
+          <p:cNvPr id="5" name="TextBox 4">
+            <a:extLst>
+              <a:ext uri="{FF2B5EF4-FFF2-40B4-BE49-F238E27FC236}">
+                <a16:creationId xmlns:a16="http://schemas.microsoft.com/office/drawing/2014/main" id="{5462D80E-05AE-0E1C-ACAB-7014788A0B55}"/>
+              </a:ext>
+            </a:extLst>
+          </p:cNvPr>
+          <p:cNvSpPr txBox="1"/>
+          <p:nvPr/>
+        </p:nvSpPr>
+        <p:spPr>
+          <a:xfrm>
+            <a:off x="508072" y="725268"/>
+            <a:ext cx="8637365" cy="646331"/>
+          </a:xfrm>
+          <a:prstGeom prst="rect">
+            <a:avLst/>
+          </a:prstGeom>
+          <a:noFill/>
+        </p:spPr>
+        <p:txBody>
+          <a:bodyPr wrap="none" rtlCol="0">
+            <a:spAutoFit/>
+          </a:bodyPr>
+          <a:lstStyle/>
+          <a:p>
+            <a:r>
+              <a:rPr lang="en-US" sz="1800" dirty="0"/>
+              <a:t>The simplest model that uses self-attention that I think can be applied to this problem</a:t>
+            </a:r>
+          </a:p>
+          <a:p>
+            <a:r>
+              <a:rPr lang="en-US" dirty="0"/>
+              <a:t>Can be readily run on my </a:t>
+            </a:r>
+            <a:r>
+              <a:rPr lang="en-US" dirty="0" err="1"/>
+              <a:t>Macbook</a:t>
+            </a:r>
+            <a:r>
+              <a:rPr lang="en-US" dirty="0"/>
+              <a:t> M2 hardware</a:t>
+            </a:r>
+          </a:p>
+        </p:txBody>
+      </p:sp>
+    </p:spTree>
+    <p:extLst>
+      <p:ext uri="{BB962C8B-B14F-4D97-AF65-F5344CB8AC3E}">
+        <p14:creationId xmlns:p14="http://schemas.microsoft.com/office/powerpoint/2010/main" val="655398832"/>
+      </p:ext>
+    </p:extLst>
+  </p:cSld>
+  <p:clrMapOvr>
+    <a:masterClrMapping/>
+  </p:clrMapOvr>
+</p:sld>
+</file>
+
+<file path=ppt/slides/slide8.xml><?xml version="1.0" encoding="utf-8"?>
+<p:sld xmlns:a="http://schemas.openxmlformats.org/drawingml/2006/main" xmlns:r="http://schemas.openxmlformats.org/officeDocument/2006/relationships" xmlns:p="http://schemas.openxmlformats.org/presentationml/2006/main">
+  <p:cSld>
+    <p:spTree>
+      <p:nvGrpSpPr>
+        <p:cNvPr id="1" name=""/>
+        <p:cNvGrpSpPr/>
+        <p:nvPr/>
+      </p:nvGrpSpPr>
+      <p:grpSpPr>
+        <a:xfrm>
+          <a:off x="0" y="0"/>
+          <a:ext cx="0" cy="0"/>
+          <a:chOff x="0" y="0"/>
+          <a:chExt cx="0" cy="0"/>
+        </a:xfrm>
+      </p:grpSpPr>
       <p:pic>
         <p:nvPicPr>
           <p:cNvPr id="2" name="Picture 1">
@@ -22710,7 +24520,7 @@
         </p:blipFill>
         <p:spPr>
           <a:xfrm>
-            <a:off x="1389780" y="3615546"/>
+            <a:off x="1389780" y="4124507"/>
             <a:ext cx="2651352" cy="2638605"/>
           </a:xfrm>
           <a:prstGeom prst="rect">
@@ -22718,128 +24528,6 @@
           </a:prstGeom>
         </p:spPr>
       </p:pic>
-      <p:sp>
-        <p:nvSpPr>
-          <p:cNvPr id="3" name="TextBox 2">
-            <a:extLst>
-              <a:ext uri="{FF2B5EF4-FFF2-40B4-BE49-F238E27FC236}">
-                <a16:creationId xmlns:a16="http://schemas.microsoft.com/office/drawing/2014/main" id="{E9FDD25F-6501-8CA5-89EF-C711D6688400}"/>
-              </a:ext>
-            </a:extLst>
-          </p:cNvPr>
-          <p:cNvSpPr txBox="1"/>
-          <p:nvPr/>
-        </p:nvSpPr>
-        <p:spPr>
-          <a:xfrm>
-            <a:off x="1389781" y="992038"/>
-            <a:ext cx="5728491" cy="369332"/>
-          </a:xfrm>
-          <a:prstGeom prst="rect">
-            <a:avLst/>
-          </a:prstGeom>
-          <a:noFill/>
-        </p:spPr>
-        <p:txBody>
-          <a:bodyPr wrap="none" rtlCol="0">
-            <a:spAutoFit/>
-          </a:bodyPr>
-          <a:lstStyle/>
-          <a:p>
-            <a:r>
-              <a:rPr lang="en-US" dirty="0"/>
-              <a:t>aa sequence: </a:t>
-            </a:r>
-            <a:r>
-              <a:rPr lang="en-US" b="0" i="0" dirty="0">
-                <a:effectLst/>
-              </a:rPr>
-              <a:t> ['CLS', 'Q', 'V', 'Q', 'L', 'V', ‘Q, …, ‘PAD’, ‘PAD’]</a:t>
-            </a:r>
-            <a:endParaRPr lang="en-US" dirty="0"/>
-          </a:p>
-        </p:txBody>
-      </p:sp>
-      <p:sp>
-        <p:nvSpPr>
-          <p:cNvPr id="5" name="TextBox 4">
-            <a:extLst>
-              <a:ext uri="{FF2B5EF4-FFF2-40B4-BE49-F238E27FC236}">
-                <a16:creationId xmlns:a16="http://schemas.microsoft.com/office/drawing/2014/main" id="{155D5DCD-DEEC-39C6-6802-35236D434F1B}"/>
-              </a:ext>
-            </a:extLst>
-          </p:cNvPr>
-          <p:cNvSpPr txBox="1"/>
-          <p:nvPr/>
-        </p:nvSpPr>
-        <p:spPr>
-          <a:xfrm>
-            <a:off x="1389781" y="1683491"/>
-            <a:ext cx="4653838" cy="369332"/>
-          </a:xfrm>
-          <a:prstGeom prst="rect">
-            <a:avLst/>
-          </a:prstGeom>
-          <a:noFill/>
-        </p:spPr>
-        <p:txBody>
-          <a:bodyPr wrap="none" rtlCol="0">
-            <a:spAutoFit/>
-          </a:bodyPr>
-          <a:lstStyle/>
-          <a:p>
-            <a:r>
-              <a:rPr lang="en-US" dirty="0"/>
-              <a:t>encoded: </a:t>
-            </a:r>
-            <a:r>
-              <a:rPr lang="en-US" b="0" i="0" dirty="0">
-                <a:effectLst/>
-              </a:rPr>
-              <a:t>[ 0, 14, 18, 14, 10, 18, 14, …, 23, 23]</a:t>
-            </a:r>
-            <a:endParaRPr lang="en-US" dirty="0"/>
-          </a:p>
-        </p:txBody>
-      </p:sp>
-      <p:sp>
-        <p:nvSpPr>
-          <p:cNvPr id="6" name="TextBox 5">
-            <a:extLst>
-              <a:ext uri="{FF2B5EF4-FFF2-40B4-BE49-F238E27FC236}">
-                <a16:creationId xmlns:a16="http://schemas.microsoft.com/office/drawing/2014/main" id="{0FBB4CDD-25CA-0CF2-05D8-0166E2F0CA55}"/>
-              </a:ext>
-            </a:extLst>
-          </p:cNvPr>
-          <p:cNvSpPr txBox="1"/>
-          <p:nvPr/>
-        </p:nvSpPr>
-        <p:spPr>
-          <a:xfrm>
-            <a:off x="1389781" y="2374219"/>
-            <a:ext cx="8807924" cy="369332"/>
-          </a:xfrm>
-          <a:prstGeom prst="rect">
-            <a:avLst/>
-          </a:prstGeom>
-          <a:noFill/>
-        </p:spPr>
-        <p:txBody>
-          <a:bodyPr wrap="none" rtlCol="0">
-            <a:spAutoFit/>
-          </a:bodyPr>
-          <a:lstStyle/>
-          <a:p>
-            <a:r>
-              <a:rPr lang="en-US" b="0" i="0" dirty="0">
-                <a:effectLst/>
-              </a:rPr>
-              <a:t>binary: [000000000000110100010010000011010000010000…]    (using 8-bits per token)</a:t>
-            </a:r>
-            <a:endParaRPr lang="en-US" dirty="0"/>
-          </a:p>
-        </p:txBody>
-      </p:sp>
       <p:sp>
         <p:nvSpPr>
           <p:cNvPr id="7" name="TextBox 6">
@@ -22854,8 +24542,8 @@
         </p:nvSpPr>
         <p:spPr>
           <a:xfrm>
-            <a:off x="148753" y="101886"/>
-            <a:ext cx="6100453" cy="461665"/>
+            <a:off x="640464" y="665975"/>
+            <a:ext cx="5012462" cy="369332"/>
           </a:xfrm>
           <a:prstGeom prst="rect">
             <a:avLst/>
@@ -22869,153 +24557,296 @@
           <a:lstStyle/>
           <a:p>
             <a:r>
-              <a:rPr lang="en-US" sz="2400" dirty="0"/>
-              <a:t>Treat the </a:t>
-            </a:r>
-            <a:r>
-              <a:rPr lang="en-US" sz="2400" dirty="0" err="1"/>
+              <a:rPr lang="en-US" dirty="0"/>
+              <a:t>Convert the </a:t>
+            </a:r>
+            <a:r>
+              <a:rPr lang="en-US" dirty="0" err="1"/>
               <a:t>scFv</a:t>
             </a:r>
             <a:r>
-              <a:rPr lang="en-US" sz="2400" dirty="0"/>
-              <a:t> aa sequences as a B&amp;W image</a:t>
+              <a:rPr lang="en-US" dirty="0"/>
+              <a:t> aa sequences into B&amp;W images</a:t>
             </a:r>
           </a:p>
         </p:txBody>
       </p:sp>
-      <p:cxnSp>
-        <p:nvCxnSpPr>
-          <p:cNvPr id="9" name="Curved Connector 8">
+      <p:grpSp>
+        <p:nvGrpSpPr>
+          <p:cNvPr id="28" name="Group 27">
             <a:extLst>
               <a:ext uri="{FF2B5EF4-FFF2-40B4-BE49-F238E27FC236}">
-                <a16:creationId xmlns:a16="http://schemas.microsoft.com/office/drawing/2014/main" id="{82820658-53FA-DD3B-39DC-7302B329DA04}"/>
+                <a16:creationId xmlns:a16="http://schemas.microsoft.com/office/drawing/2014/main" id="{46D3CCCE-10BB-A7F0-E847-F3B504E206F7}"/>
               </a:ext>
             </a:extLst>
           </p:cNvPr>
-          <p:cNvCxnSpPr>
-            <a:cxnSpLocks/>
-            <a:stCxn id="3" idx="1"/>
-            <a:endCxn id="5" idx="1"/>
-          </p:cNvCxnSpPr>
+          <p:cNvGrpSpPr/>
           <p:nvPr/>
-        </p:nvCxnSpPr>
-        <p:spPr>
-          <a:xfrm rot="10800000" flipV="1">
-            <a:off x="1389781" y="1176703"/>
-            <a:ext cx="12700" cy="691453"/>
+        </p:nvGrpSpPr>
+        <p:grpSpPr>
+          <a:xfrm>
+            <a:off x="1389781" y="1490946"/>
+            <a:ext cx="8807924" cy="1761566"/>
+            <a:chOff x="1389781" y="981985"/>
+            <a:chExt cx="8807924" cy="1761566"/>
           </a:xfrm>
-          <a:prstGeom prst="curvedConnector3">
-            <a:avLst>
-              <a:gd name="adj1" fmla="val 1800000"/>
-            </a:avLst>
-          </a:prstGeom>
-          <a:ln>
-            <a:tailEnd type="triangle" w="lg" len="lg"/>
-          </a:ln>
-        </p:spPr>
-        <p:style>
-          <a:lnRef idx="2">
-            <a:schemeClr val="accent1"/>
-          </a:lnRef>
-          <a:fillRef idx="0">
-            <a:schemeClr val="accent1"/>
-          </a:fillRef>
-          <a:effectRef idx="1">
-            <a:schemeClr val="accent1"/>
-          </a:effectRef>
-          <a:fontRef idx="minor">
-            <a:schemeClr val="tx1"/>
-          </a:fontRef>
-        </p:style>
-      </p:cxnSp>
-      <p:cxnSp>
-        <p:nvCxnSpPr>
-          <p:cNvPr id="11" name="Curved Connector 10">
-            <a:extLst>
-              <a:ext uri="{FF2B5EF4-FFF2-40B4-BE49-F238E27FC236}">
-                <a16:creationId xmlns:a16="http://schemas.microsoft.com/office/drawing/2014/main" id="{75342AFA-FBFA-F9AD-8AC3-B9BAB0848A16}"/>
-              </a:ext>
-            </a:extLst>
-          </p:cNvPr>
-          <p:cNvCxnSpPr>
-            <a:cxnSpLocks/>
-            <a:stCxn id="5" idx="1"/>
-            <a:endCxn id="6" idx="1"/>
-          </p:cNvCxnSpPr>
-          <p:nvPr/>
-        </p:nvCxnSpPr>
-        <p:spPr>
-          <a:xfrm rot="10800000" flipV="1">
-            <a:off x="1389781" y="1868157"/>
-            <a:ext cx="12700" cy="690728"/>
-          </a:xfrm>
-          <a:prstGeom prst="curvedConnector3">
-            <a:avLst>
-              <a:gd name="adj1" fmla="val 1800000"/>
-            </a:avLst>
-          </a:prstGeom>
-          <a:ln>
-            <a:tailEnd type="triangle" w="lg" len="lg"/>
-          </a:ln>
-        </p:spPr>
-        <p:style>
-          <a:lnRef idx="2">
-            <a:schemeClr val="accent1"/>
-          </a:lnRef>
-          <a:fillRef idx="0">
-            <a:schemeClr val="accent1"/>
-          </a:fillRef>
-          <a:effectRef idx="1">
-            <a:schemeClr val="accent1"/>
-          </a:effectRef>
-          <a:fontRef idx="minor">
-            <a:schemeClr val="tx1"/>
-          </a:fontRef>
-        </p:style>
-      </p:cxnSp>
-      <p:sp>
-        <p:nvSpPr>
-          <p:cNvPr id="15" name="TextBox 14">
-            <a:extLst>
-              <a:ext uri="{FF2B5EF4-FFF2-40B4-BE49-F238E27FC236}">
-                <a16:creationId xmlns:a16="http://schemas.microsoft.com/office/drawing/2014/main" id="{49C96ADA-8EDD-82DB-6425-07FC116B3FCD}"/>
-              </a:ext>
-            </a:extLst>
-          </p:cNvPr>
-          <p:cNvSpPr txBox="1"/>
-          <p:nvPr/>
-        </p:nvSpPr>
-        <p:spPr>
-          <a:xfrm>
-            <a:off x="7737231" y="981985"/>
-            <a:ext cx="2356479" cy="369332"/>
-          </a:xfrm>
-          <a:prstGeom prst="rect">
-            <a:avLst/>
-          </a:prstGeom>
-          <a:noFill/>
-        </p:spPr>
-        <p:txBody>
-          <a:bodyPr wrap="none" rtlCol="0">
-            <a:spAutoFit/>
-          </a:bodyPr>
-          <a:lstStyle/>
-          <a:p>
-            <a:r>
-              <a:rPr lang="en-US" dirty="0"/>
-              <a:t>(use </a:t>
-            </a:r>
-            <a:r>
-              <a:rPr lang="en-US" dirty="0" err="1"/>
-              <a:t>block_size</a:t>
-            </a:r>
-            <a:r>
-              <a:rPr lang="en-US" dirty="0"/>
-              <a:t> = 288)</a:t>
-            </a:r>
-          </a:p>
-        </p:txBody>
-      </p:sp>
+        </p:grpSpPr>
+        <p:sp>
+          <p:nvSpPr>
+            <p:cNvPr id="3" name="TextBox 2">
+              <a:extLst>
+                <a:ext uri="{FF2B5EF4-FFF2-40B4-BE49-F238E27FC236}">
+                  <a16:creationId xmlns:a16="http://schemas.microsoft.com/office/drawing/2014/main" id="{E9FDD25F-6501-8CA5-89EF-C711D6688400}"/>
+                </a:ext>
+              </a:extLst>
+            </p:cNvPr>
+            <p:cNvSpPr txBox="1"/>
+            <p:nvPr/>
+          </p:nvSpPr>
+          <p:spPr>
+            <a:xfrm>
+              <a:off x="1389781" y="992038"/>
+              <a:ext cx="5728491" cy="369332"/>
+            </a:xfrm>
+            <a:prstGeom prst="rect">
+              <a:avLst/>
+            </a:prstGeom>
+            <a:noFill/>
+          </p:spPr>
+          <p:txBody>
+            <a:bodyPr wrap="none" rtlCol="0">
+              <a:spAutoFit/>
+            </a:bodyPr>
+            <a:lstStyle/>
+            <a:p>
+              <a:r>
+                <a:rPr lang="en-US" dirty="0"/>
+                <a:t>aa sequence: </a:t>
+              </a:r>
+              <a:r>
+                <a:rPr lang="en-US" b="0" i="0" dirty="0">
+                  <a:effectLst/>
+                </a:rPr>
+                <a:t> ['CLS', 'Q', 'V', 'Q', 'L', 'V', ‘Q, …, ‘PAD’, ‘PAD’]</a:t>
+              </a:r>
+              <a:endParaRPr lang="en-US" dirty="0"/>
+            </a:p>
+          </p:txBody>
+        </p:sp>
+        <p:sp>
+          <p:nvSpPr>
+            <p:cNvPr id="5" name="TextBox 4">
+              <a:extLst>
+                <a:ext uri="{FF2B5EF4-FFF2-40B4-BE49-F238E27FC236}">
+                  <a16:creationId xmlns:a16="http://schemas.microsoft.com/office/drawing/2014/main" id="{155D5DCD-DEEC-39C6-6802-35236D434F1B}"/>
+                </a:ext>
+              </a:extLst>
+            </p:cNvPr>
+            <p:cNvSpPr txBox="1"/>
+            <p:nvPr/>
+          </p:nvSpPr>
+          <p:spPr>
+            <a:xfrm>
+              <a:off x="1389781" y="1683491"/>
+              <a:ext cx="4653838" cy="369332"/>
+            </a:xfrm>
+            <a:prstGeom prst="rect">
+              <a:avLst/>
+            </a:prstGeom>
+            <a:noFill/>
+          </p:spPr>
+          <p:txBody>
+            <a:bodyPr wrap="none" rtlCol="0">
+              <a:spAutoFit/>
+            </a:bodyPr>
+            <a:lstStyle/>
+            <a:p>
+              <a:r>
+                <a:rPr lang="en-US" dirty="0"/>
+                <a:t>encoded: </a:t>
+              </a:r>
+              <a:r>
+                <a:rPr lang="en-US" b="0" i="0" dirty="0">
+                  <a:effectLst/>
+                </a:rPr>
+                <a:t>[ 0, 14, 18, 14, 10, 18, 14, …, 23, 23]</a:t>
+              </a:r>
+              <a:endParaRPr lang="en-US" dirty="0"/>
+            </a:p>
+          </p:txBody>
+        </p:sp>
+        <p:sp>
+          <p:nvSpPr>
+            <p:cNvPr id="6" name="TextBox 5">
+              <a:extLst>
+                <a:ext uri="{FF2B5EF4-FFF2-40B4-BE49-F238E27FC236}">
+                  <a16:creationId xmlns:a16="http://schemas.microsoft.com/office/drawing/2014/main" id="{0FBB4CDD-25CA-0CF2-05D8-0166E2F0CA55}"/>
+                </a:ext>
+              </a:extLst>
+            </p:cNvPr>
+            <p:cNvSpPr txBox="1"/>
+            <p:nvPr/>
+          </p:nvSpPr>
+          <p:spPr>
+            <a:xfrm>
+              <a:off x="1389781" y="2374219"/>
+              <a:ext cx="8807924" cy="369332"/>
+            </a:xfrm>
+            <a:prstGeom prst="rect">
+              <a:avLst/>
+            </a:prstGeom>
+            <a:noFill/>
+          </p:spPr>
+          <p:txBody>
+            <a:bodyPr wrap="none" rtlCol="0">
+              <a:spAutoFit/>
+            </a:bodyPr>
+            <a:lstStyle/>
+            <a:p>
+              <a:r>
+                <a:rPr lang="en-US" b="0" i="0" dirty="0">
+                  <a:effectLst/>
+                </a:rPr>
+                <a:t>binary: [000000000000110100010010000011010000010000…]    (using 8-bits per token)</a:t>
+              </a:r>
+              <a:endParaRPr lang="en-US" dirty="0"/>
+            </a:p>
+          </p:txBody>
+        </p:sp>
+        <p:cxnSp>
+          <p:nvCxnSpPr>
+            <p:cNvPr id="9" name="Curved Connector 8">
+              <a:extLst>
+                <a:ext uri="{FF2B5EF4-FFF2-40B4-BE49-F238E27FC236}">
+                  <a16:creationId xmlns:a16="http://schemas.microsoft.com/office/drawing/2014/main" id="{82820658-53FA-DD3B-39DC-7302B329DA04}"/>
+                </a:ext>
+              </a:extLst>
+            </p:cNvPr>
+            <p:cNvCxnSpPr>
+              <a:cxnSpLocks/>
+              <a:stCxn id="3" idx="1"/>
+              <a:endCxn id="5" idx="1"/>
+            </p:cNvCxnSpPr>
+            <p:nvPr/>
+          </p:nvCxnSpPr>
+          <p:spPr>
+            <a:xfrm rot="10800000" flipV="1">
+              <a:off x="1389781" y="1176703"/>
+              <a:ext cx="12700" cy="691453"/>
+            </a:xfrm>
+            <a:prstGeom prst="curvedConnector3">
+              <a:avLst>
+                <a:gd name="adj1" fmla="val 1800000"/>
+              </a:avLst>
+            </a:prstGeom>
+            <a:ln>
+              <a:tailEnd type="triangle" w="lg" len="lg"/>
+            </a:ln>
+          </p:spPr>
+          <p:style>
+            <a:lnRef idx="2">
+              <a:schemeClr val="accent1"/>
+            </a:lnRef>
+            <a:fillRef idx="0">
+              <a:schemeClr val="accent1"/>
+            </a:fillRef>
+            <a:effectRef idx="1">
+              <a:schemeClr val="accent1"/>
+            </a:effectRef>
+            <a:fontRef idx="minor">
+              <a:schemeClr val="tx1"/>
+            </a:fontRef>
+          </p:style>
+        </p:cxnSp>
+        <p:cxnSp>
+          <p:nvCxnSpPr>
+            <p:cNvPr id="11" name="Curved Connector 10">
+              <a:extLst>
+                <a:ext uri="{FF2B5EF4-FFF2-40B4-BE49-F238E27FC236}">
+                  <a16:creationId xmlns:a16="http://schemas.microsoft.com/office/drawing/2014/main" id="{75342AFA-FBFA-F9AD-8AC3-B9BAB0848A16}"/>
+                </a:ext>
+              </a:extLst>
+            </p:cNvPr>
+            <p:cNvCxnSpPr>
+              <a:cxnSpLocks/>
+              <a:stCxn id="5" idx="1"/>
+              <a:endCxn id="6" idx="1"/>
+            </p:cNvCxnSpPr>
+            <p:nvPr/>
+          </p:nvCxnSpPr>
+          <p:spPr>
+            <a:xfrm rot="10800000" flipV="1">
+              <a:off x="1389781" y="1868157"/>
+              <a:ext cx="12700" cy="690728"/>
+            </a:xfrm>
+            <a:prstGeom prst="curvedConnector3">
+              <a:avLst>
+                <a:gd name="adj1" fmla="val 1800000"/>
+              </a:avLst>
+            </a:prstGeom>
+            <a:ln>
+              <a:tailEnd type="triangle" w="lg" len="lg"/>
+            </a:ln>
+          </p:spPr>
+          <p:style>
+            <a:lnRef idx="2">
+              <a:schemeClr val="accent1"/>
+            </a:lnRef>
+            <a:fillRef idx="0">
+              <a:schemeClr val="accent1"/>
+            </a:fillRef>
+            <a:effectRef idx="1">
+              <a:schemeClr val="accent1"/>
+            </a:effectRef>
+            <a:fontRef idx="minor">
+              <a:schemeClr val="tx1"/>
+            </a:fontRef>
+          </p:style>
+        </p:cxnSp>
+        <p:sp>
+          <p:nvSpPr>
+            <p:cNvPr id="15" name="TextBox 14">
+              <a:extLst>
+                <a:ext uri="{FF2B5EF4-FFF2-40B4-BE49-F238E27FC236}">
+                  <a16:creationId xmlns:a16="http://schemas.microsoft.com/office/drawing/2014/main" id="{49C96ADA-8EDD-82DB-6425-07FC116B3FCD}"/>
+                </a:ext>
+              </a:extLst>
+            </p:cNvPr>
+            <p:cNvSpPr txBox="1"/>
+            <p:nvPr/>
+          </p:nvSpPr>
+          <p:spPr>
+            <a:xfrm>
+              <a:off x="7737231" y="981985"/>
+              <a:ext cx="2356479" cy="369332"/>
+            </a:xfrm>
+            <a:prstGeom prst="rect">
+              <a:avLst/>
+            </a:prstGeom>
+            <a:noFill/>
+          </p:spPr>
+          <p:txBody>
+            <a:bodyPr wrap="none" rtlCol="0">
+              <a:spAutoFit/>
+            </a:bodyPr>
+            <a:lstStyle/>
+            <a:p>
+              <a:r>
+                <a:rPr lang="en-US" dirty="0"/>
+                <a:t>(use </a:t>
+              </a:r>
+              <a:r>
+                <a:rPr lang="en-US" dirty="0" err="1"/>
+                <a:t>block_size</a:t>
+              </a:r>
+              <a:r>
+                <a:rPr lang="en-US" dirty="0"/>
+                <a:t> = 288)</a:t>
+              </a:r>
+            </a:p>
+          </p:txBody>
+        </p:sp>
+      </p:grpSp>
       <p:cxnSp>
         <p:nvCxnSpPr>
           <p:cNvPr id="20" name="Straight Arrow Connector 19">
@@ -23033,7 +24864,7 @@
         </p:nvCxnSpPr>
         <p:spPr>
           <a:xfrm>
-            <a:off x="2715456" y="2811916"/>
+            <a:off x="2715456" y="3320877"/>
             <a:ext cx="0" cy="803630"/>
           </a:xfrm>
           <a:prstGeom prst="straightConnector1">
@@ -23072,8 +24903,8 @@
         </p:nvSpPr>
         <p:spPr>
           <a:xfrm>
-            <a:off x="2759635" y="3011480"/>
-            <a:ext cx="5017527" cy="369332"/>
+            <a:off x="2759635" y="3520441"/>
+            <a:ext cx="5412700" cy="369332"/>
           </a:xfrm>
           <a:prstGeom prst="rect">
             <a:avLst/>
@@ -23092,7 +24923,7 @@
             </a:r>
             <a:r>
               <a:rPr lang="en-US" sz="1400" dirty="0"/>
-              <a:t>(first, trim off trailing 4 bits from above)</a:t>
+              <a:t>(after trimming off trailing 4 bits from above)</a:t>
             </a:r>
           </a:p>
         </p:txBody>
@@ -23111,8 +24942,8 @@
         </p:nvSpPr>
         <p:spPr>
           <a:xfrm>
-            <a:off x="7118272" y="5495565"/>
-            <a:ext cx="4779706" cy="954107"/>
+            <a:off x="6273945" y="5657911"/>
+            <a:ext cx="5283049" cy="954107"/>
           </a:xfrm>
           <a:prstGeom prst="rect">
             <a:avLst/>
@@ -23127,7 +24958,7 @@
           <a:p>
             <a:r>
               <a:rPr lang="en-US" sz="1400" dirty="0"/>
-              <a:t>stretch goals? </a:t>
+              <a:t>stretch goals </a:t>
             </a:r>
           </a:p>
           <a:p>
@@ -23155,7 +24986,7 @@
             </a:r>
             <a:r>
               <a:rPr lang="en-US" sz="1400" dirty="0"/>
-              <a:t> channel for variability in aa sequence</a:t>
+              <a:t> channel for variability vs position in aa sequence</a:t>
             </a:r>
           </a:p>
           <a:p>
@@ -23192,7 +25023,7 @@
         </p:nvSpPr>
         <p:spPr>
           <a:xfrm>
-            <a:off x="4114800" y="4114450"/>
+            <a:off x="4114800" y="4623411"/>
             <a:ext cx="5472075" cy="369332"/>
           </a:xfrm>
           <a:prstGeom prst="rect">
@@ -23209,6 +25040,41 @@
             <a:r>
               <a:rPr lang="en-US" dirty="0"/>
               <a:t>Vision Transformer regression model on these images</a:t>
+            </a:r>
+          </a:p>
+        </p:txBody>
+      </p:sp>
+      <p:sp>
+        <p:nvSpPr>
+          <p:cNvPr id="29" name="TextBox 28">
+            <a:extLst>
+              <a:ext uri="{FF2B5EF4-FFF2-40B4-BE49-F238E27FC236}">
+                <a16:creationId xmlns:a16="http://schemas.microsoft.com/office/drawing/2014/main" id="{036B47F0-B1B5-5A30-CC20-8AD75B5B40CA}"/>
+              </a:ext>
+            </a:extLst>
+          </p:cNvPr>
+          <p:cNvSpPr txBox="1"/>
+          <p:nvPr/>
+        </p:nvSpPr>
+        <p:spPr>
+          <a:xfrm>
+            <a:off x="173866" y="154242"/>
+            <a:ext cx="2661626" cy="461665"/>
+          </a:xfrm>
+          <a:prstGeom prst="rect">
+            <a:avLst/>
+          </a:prstGeom>
+          <a:noFill/>
+        </p:spPr>
+        <p:txBody>
+          <a:bodyPr wrap="none" rtlCol="0">
+            <a:spAutoFit/>
+          </a:bodyPr>
+          <a:lstStyle/>
+          <a:p>
+            <a:r>
+              <a:rPr lang="en-US" sz="2400" dirty="0"/>
+              <a:t>Vision Transformer</a:t>
             </a:r>
           </a:p>
         </p:txBody>
@@ -23226,7 +25092,7 @@
 </p:sld>
 </file>
 
-<file path=ppt/slides/slide8.xml><?xml version="1.0" encoding="utf-8"?>
+<file path=ppt/slides/slide9.xml><?xml version="1.0" encoding="utf-8"?>
 <p:sld xmlns:a="http://schemas.openxmlformats.org/drawingml/2006/main" xmlns:r="http://schemas.openxmlformats.org/officeDocument/2006/relationships" xmlns:p="http://schemas.openxmlformats.org/presentationml/2006/main">
   <p:cSld>
     <p:spTree>
@@ -23640,939 +25506,6 @@
     <p:extLst>
       <p:ext uri="{BB962C8B-B14F-4D97-AF65-F5344CB8AC3E}">
         <p14:creationId xmlns:p14="http://schemas.microsoft.com/office/powerpoint/2010/main" val="1592508389"/>
-      </p:ext>
-    </p:extLst>
-  </p:cSld>
-  <p:clrMapOvr>
-    <a:masterClrMapping/>
-  </p:clrMapOvr>
-</p:sld>
-</file>
-
-<file path=ppt/slides/slide9.xml><?xml version="1.0" encoding="utf-8"?>
-<p:sld xmlns:a="http://schemas.openxmlformats.org/drawingml/2006/main" xmlns:r="http://schemas.openxmlformats.org/officeDocument/2006/relationships" xmlns:p="http://schemas.openxmlformats.org/presentationml/2006/main">
-  <p:cSld>
-    <p:spTree>
-      <p:nvGrpSpPr>
-        <p:cNvPr id="1" name=""/>
-        <p:cNvGrpSpPr/>
-        <p:nvPr/>
-      </p:nvGrpSpPr>
-      <p:grpSpPr>
-        <a:xfrm>
-          <a:off x="0" y="0"/>
-          <a:ext cx="0" cy="0"/>
-          <a:chOff x="0" y="0"/>
-          <a:chExt cx="0" cy="0"/>
-        </a:xfrm>
-      </p:grpSpPr>
-      <p:sp>
-        <p:nvSpPr>
-          <p:cNvPr id="2" name="TextBox 1">
-            <a:extLst>
-              <a:ext uri="{FF2B5EF4-FFF2-40B4-BE49-F238E27FC236}">
-                <a16:creationId xmlns:a16="http://schemas.microsoft.com/office/drawing/2014/main" id="{D7B699E5-6A91-D5D4-A6B0-C71C42589BC8}"/>
-              </a:ext>
-            </a:extLst>
-          </p:cNvPr>
-          <p:cNvSpPr txBox="1"/>
-          <p:nvPr/>
-        </p:nvSpPr>
-        <p:spPr>
-          <a:xfrm>
-            <a:off x="140127" y="221836"/>
-            <a:ext cx="3535199" cy="461665"/>
-          </a:xfrm>
-          <a:prstGeom prst="rect">
-            <a:avLst/>
-          </a:prstGeom>
-          <a:noFill/>
-        </p:spPr>
-        <p:txBody>
-          <a:bodyPr wrap="none" rtlCol="0">
-            <a:spAutoFit/>
-          </a:bodyPr>
-          <a:lstStyle/>
-          <a:p>
-            <a:r>
-              <a:rPr lang="en-US" sz="2400" dirty="0"/>
-              <a:t>Results:  Dataset Clean-1</a:t>
-            </a:r>
-          </a:p>
-        </p:txBody>
-      </p:sp>
-      <p:graphicFrame>
-        <p:nvGraphicFramePr>
-          <p:cNvPr id="3" name="Table 2">
-            <a:extLst>
-              <a:ext uri="{FF2B5EF4-FFF2-40B4-BE49-F238E27FC236}">
-                <a16:creationId xmlns:a16="http://schemas.microsoft.com/office/drawing/2014/main" id="{06968A34-6E02-9A89-9D28-711A65FA6A49}"/>
-              </a:ext>
-            </a:extLst>
-          </p:cNvPr>
-          <p:cNvGraphicFramePr>
-            <a:graphicFrameLocks noGrp="1"/>
-          </p:cNvGraphicFramePr>
-          <p:nvPr>
-            <p:extLst>
-              <p:ext uri="{D42A27DB-BD31-4B8C-83A1-F6EECF244321}">
-                <p14:modId xmlns:p14="http://schemas.microsoft.com/office/powerpoint/2010/main" val="1561107242"/>
-              </p:ext>
-            </p:extLst>
-          </p:nvPr>
-        </p:nvGraphicFramePr>
-        <p:xfrm>
-          <a:off x="1155168" y="1019273"/>
-          <a:ext cx="8556704" cy="4179063"/>
-        </p:xfrm>
-        <a:graphic>
-          <a:graphicData uri="http://schemas.openxmlformats.org/drawingml/2006/table">
-            <a:tbl>
-              <a:tblPr firstRow="1" bandRow="1">
-                <a:tableStyleId>{5C22544A-7EE6-4342-B048-85BDC9FD1C3A}</a:tableStyleId>
-              </a:tblPr>
-              <a:tblGrid>
-                <a:gridCol w="1552639">
-                  <a:extLst>
-                    <a:ext uri="{9D8B030D-6E8A-4147-A177-3AD203B41FA5}">
-                      <a16:colId xmlns:a16="http://schemas.microsoft.com/office/drawing/2014/main" val="1065848917"/>
-                    </a:ext>
-                  </a:extLst>
-                </a:gridCol>
-                <a:gridCol w="1355182">
-                  <a:extLst>
-                    <a:ext uri="{9D8B030D-6E8A-4147-A177-3AD203B41FA5}">
-                      <a16:colId xmlns:a16="http://schemas.microsoft.com/office/drawing/2014/main" val="873310604"/>
-                    </a:ext>
-                  </a:extLst>
-                </a:gridCol>
-                <a:gridCol w="1445547">
-                  <a:extLst>
-                    <a:ext uri="{9D8B030D-6E8A-4147-A177-3AD203B41FA5}">
-                      <a16:colId xmlns:a16="http://schemas.microsoft.com/office/drawing/2014/main" val="3981708244"/>
-                    </a:ext>
-                  </a:extLst>
-                </a:gridCol>
-                <a:gridCol w="1070391">
-                  <a:extLst>
-                    <a:ext uri="{9D8B030D-6E8A-4147-A177-3AD203B41FA5}">
-                      <a16:colId xmlns:a16="http://schemas.microsoft.com/office/drawing/2014/main" val="1135465181"/>
-                    </a:ext>
-                  </a:extLst>
-                </a:gridCol>
-                <a:gridCol w="1232916">
-                  <a:extLst>
-                    <a:ext uri="{9D8B030D-6E8A-4147-A177-3AD203B41FA5}">
-                      <a16:colId xmlns:a16="http://schemas.microsoft.com/office/drawing/2014/main" val="784973340"/>
-                    </a:ext>
-                  </a:extLst>
-                </a:gridCol>
-                <a:gridCol w="1900029">
-                  <a:extLst>
-                    <a:ext uri="{9D8B030D-6E8A-4147-A177-3AD203B41FA5}">
-                      <a16:colId xmlns:a16="http://schemas.microsoft.com/office/drawing/2014/main" val="2256753199"/>
-                    </a:ext>
-                  </a:extLst>
-                </a:gridCol>
-              </a:tblGrid>
-              <a:tr h="505569">
-                <a:tc>
-                  <a:txBody>
-                    <a:bodyPr/>
-                    <a:lstStyle/>
-                    <a:p>
-                      <a:pPr algn="ctr"/>
-                      <a:r>
-                        <a:rPr lang="en-US" dirty="0"/>
-                        <a:t>Model</a:t>
-                      </a:r>
-                    </a:p>
-                  </a:txBody>
-                  <a:tcPr anchor="ctr"/>
-                </a:tc>
-                <a:tc>
-                  <a:txBody>
-                    <a:bodyPr/>
-                    <a:lstStyle/>
-                    <a:p>
-                      <a:pPr algn="ctr"/>
-                      <a:r>
-                        <a:rPr lang="en-US" dirty="0"/>
-                        <a:t>Train Loss</a:t>
-                      </a:r>
-                    </a:p>
-                  </a:txBody>
-                  <a:tcPr anchor="ctr"/>
-                </a:tc>
-                <a:tc>
-                  <a:txBody>
-                    <a:bodyPr/>
-                    <a:lstStyle/>
-                    <a:p>
-                      <a:pPr algn="ctr"/>
-                      <a:r>
-                        <a:rPr lang="en-US" dirty="0"/>
-                        <a:t>Valid. Loss</a:t>
-                      </a:r>
-                    </a:p>
-                  </a:txBody>
-                  <a:tcPr anchor="ctr"/>
-                </a:tc>
-                <a:tc>
-                  <a:txBody>
-                    <a:bodyPr/>
-                    <a:lstStyle/>
-                    <a:p>
-                      <a:pPr algn="ctr"/>
-                      <a:r>
-                        <a:rPr lang="en-US" dirty="0"/>
-                        <a:t>Epochs</a:t>
-                      </a:r>
-                    </a:p>
-                  </a:txBody>
-                  <a:tcPr anchor="ctr"/>
-                </a:tc>
-                <a:tc>
-                  <a:txBody>
-                    <a:bodyPr/>
-                    <a:lstStyle/>
-                    <a:p>
-                      <a:pPr algn="ctr"/>
-                      <a:r>
-                        <a:rPr lang="en-US" dirty="0"/>
-                        <a:t>RMSD </a:t>
-                      </a:r>
-                    </a:p>
-                    <a:p>
-                      <a:pPr algn="ctr"/>
-                      <a:r>
-                        <a:rPr lang="en-US" dirty="0"/>
-                        <a:t>(valid set)</a:t>
-                      </a:r>
-                    </a:p>
-                  </a:txBody>
-                  <a:tcPr anchor="ctr"/>
-                </a:tc>
-                <a:tc>
-                  <a:txBody>
-                    <a:bodyPr/>
-                    <a:lstStyle/>
-                    <a:p>
-                      <a:pPr algn="ctr"/>
-                      <a:r>
-                        <a:rPr lang="en-US" dirty="0"/>
-                        <a:t>Comment</a:t>
-                      </a:r>
-                    </a:p>
-                  </a:txBody>
-                  <a:tcPr anchor="ctr"/>
-                </a:tc>
-                <a:extLst>
-                  <a:ext uri="{0D108BD9-81ED-4DB2-BD59-A6C34878D82A}">
-                    <a16:rowId xmlns:a16="http://schemas.microsoft.com/office/drawing/2014/main" val="1617347897"/>
-                  </a:ext>
-                </a:extLst>
-              </a:tr>
-              <a:tr h="505569">
-                <a:tc>
-                  <a:txBody>
-                    <a:bodyPr/>
-                    <a:lstStyle/>
-                    <a:p>
-                      <a:r>
-                        <a:rPr lang="en-US" dirty="0"/>
-                        <a:t>MLP</a:t>
-                      </a:r>
-                    </a:p>
-                  </a:txBody>
-                  <a:tcPr anchor="ctr"/>
-                </a:tc>
-                <a:tc>
-                  <a:txBody>
-                    <a:bodyPr/>
-                    <a:lstStyle/>
-                    <a:p>
-                      <a:pPr algn="ctr"/>
-                      <a:r>
-                        <a:rPr lang="en-US" dirty="0"/>
-                        <a:t>0.23</a:t>
-                      </a:r>
-                    </a:p>
-                  </a:txBody>
-                  <a:tcPr anchor="ctr"/>
-                </a:tc>
-                <a:tc>
-                  <a:txBody>
-                    <a:bodyPr/>
-                    <a:lstStyle/>
-                    <a:p>
-                      <a:pPr algn="ctr"/>
-                      <a:r>
-                        <a:rPr lang="en-US" dirty="0"/>
-                        <a:t>0.31</a:t>
-                      </a:r>
-                    </a:p>
-                  </a:txBody>
-                  <a:tcPr anchor="ctr"/>
-                </a:tc>
-                <a:tc>
-                  <a:txBody>
-                    <a:bodyPr/>
-                    <a:lstStyle/>
-                    <a:p>
-                      <a:pPr algn="ctr"/>
-                      <a:r>
-                        <a:rPr lang="en-US" dirty="0"/>
-                        <a:t>10K</a:t>
-                      </a:r>
-                    </a:p>
-                  </a:txBody>
-                  <a:tcPr anchor="ctr"/>
-                </a:tc>
-                <a:tc>
-                  <a:txBody>
-                    <a:bodyPr/>
-                    <a:lstStyle/>
-                    <a:p>
-                      <a:pPr algn="ctr"/>
-                      <a:r>
-                        <a:rPr lang="en-US" dirty="0"/>
-                        <a:t>1.08</a:t>
-                      </a:r>
-                    </a:p>
-                  </a:txBody>
-                  <a:tcPr anchor="ctr"/>
-                </a:tc>
-                <a:tc>
-                  <a:txBody>
-                    <a:bodyPr/>
-                    <a:lstStyle/>
-                    <a:p>
-                      <a:pPr algn="ctr"/>
-                      <a:endParaRPr lang="en-US" dirty="0"/>
-                    </a:p>
-                  </a:txBody>
-                  <a:tcPr anchor="ctr"/>
-                </a:tc>
-                <a:extLst>
-                  <a:ext uri="{0D108BD9-81ED-4DB2-BD59-A6C34878D82A}">
-                    <a16:rowId xmlns:a16="http://schemas.microsoft.com/office/drawing/2014/main" val="282036224"/>
-                  </a:ext>
-                </a:extLst>
-              </a:tr>
-              <a:tr h="505569">
-                <a:tc>
-                  <a:txBody>
-                    <a:bodyPr/>
-                    <a:lstStyle/>
-                    <a:p>
-                      <a:r>
-                        <a:rPr lang="en-US" dirty="0"/>
-                        <a:t>dense MLP</a:t>
-                      </a:r>
-                    </a:p>
-                  </a:txBody>
-                  <a:tcPr anchor="ctr"/>
-                </a:tc>
-                <a:tc>
-                  <a:txBody>
-                    <a:bodyPr/>
-                    <a:lstStyle/>
-                    <a:p>
-                      <a:pPr algn="ctr"/>
-                      <a:r>
-                        <a:rPr lang="en-US" dirty="0"/>
-                        <a:t>0.20</a:t>
-                      </a:r>
-                    </a:p>
-                  </a:txBody>
-                  <a:tcPr anchor="ctr"/>
-                </a:tc>
-                <a:tc>
-                  <a:txBody>
-                    <a:bodyPr/>
-                    <a:lstStyle/>
-                    <a:p>
-                      <a:pPr algn="ctr"/>
-                      <a:r>
-                        <a:rPr lang="en-US" dirty="0"/>
-                        <a:t>0.29</a:t>
-                      </a:r>
-                    </a:p>
-                  </a:txBody>
-                  <a:tcPr anchor="ctr"/>
-                </a:tc>
-                <a:tc>
-                  <a:txBody>
-                    <a:bodyPr/>
-                    <a:lstStyle/>
-                    <a:p>
-                      <a:pPr algn="ctr"/>
-                      <a:r>
-                        <a:rPr lang="en-US" dirty="0"/>
-                        <a:t>10K</a:t>
-                      </a:r>
-                    </a:p>
-                  </a:txBody>
-                  <a:tcPr anchor="ctr"/>
-                </a:tc>
-                <a:tc>
-                  <a:txBody>
-                    <a:bodyPr/>
-                    <a:lstStyle/>
-                    <a:p>
-                      <a:pPr algn="ctr"/>
-                      <a:r>
-                        <a:rPr lang="en-US" dirty="0"/>
-                        <a:t>1.06</a:t>
-                      </a:r>
-                    </a:p>
-                  </a:txBody>
-                  <a:tcPr anchor="ctr"/>
-                </a:tc>
-                <a:tc>
-                  <a:txBody>
-                    <a:bodyPr/>
-                    <a:lstStyle/>
-                    <a:p>
-                      <a:pPr algn="ctr"/>
-                      <a:endParaRPr lang="en-US" dirty="0"/>
-                    </a:p>
-                  </a:txBody>
-                  <a:tcPr anchor="ctr"/>
-                </a:tc>
-                <a:extLst>
-                  <a:ext uri="{0D108BD9-81ED-4DB2-BD59-A6C34878D82A}">
-                    <a16:rowId xmlns:a16="http://schemas.microsoft.com/office/drawing/2014/main" val="3862729885"/>
-                  </a:ext>
-                </a:extLst>
-              </a:tr>
-              <a:tr h="505569">
-                <a:tc>
-                  <a:txBody>
-                    <a:bodyPr/>
-                    <a:lstStyle/>
-                    <a:p>
-                      <a:r>
-                        <a:rPr lang="en-US" dirty="0"/>
-                        <a:t>residual MLP</a:t>
-                      </a:r>
-                    </a:p>
-                  </a:txBody>
-                  <a:tcPr anchor="ctr"/>
-                </a:tc>
-                <a:tc>
-                  <a:txBody>
-                    <a:bodyPr/>
-                    <a:lstStyle/>
-                    <a:p>
-                      <a:pPr algn="ctr"/>
-                      <a:r>
-                        <a:rPr lang="en-US" dirty="0"/>
-                        <a:t>0.24</a:t>
-                      </a:r>
-                    </a:p>
-                  </a:txBody>
-                  <a:tcPr anchor="ctr"/>
-                </a:tc>
-                <a:tc>
-                  <a:txBody>
-                    <a:bodyPr/>
-                    <a:lstStyle/>
-                    <a:p>
-                      <a:pPr algn="ctr"/>
-                      <a:r>
-                        <a:rPr lang="en-US" dirty="0"/>
-                        <a:t>0.30</a:t>
-                      </a:r>
-                    </a:p>
-                  </a:txBody>
-                  <a:tcPr anchor="ctr"/>
-                </a:tc>
-                <a:tc>
-                  <a:txBody>
-                    <a:bodyPr/>
-                    <a:lstStyle/>
-                    <a:p>
-                      <a:pPr algn="ctr"/>
-                      <a:r>
-                        <a:rPr lang="en-US" dirty="0"/>
-                        <a:t>10K</a:t>
-                      </a:r>
-                    </a:p>
-                  </a:txBody>
-                  <a:tcPr anchor="ctr"/>
-                </a:tc>
-                <a:tc>
-                  <a:txBody>
-                    <a:bodyPr/>
-                    <a:lstStyle/>
-                    <a:p>
-                      <a:pPr algn="ctr"/>
-                      <a:r>
-                        <a:rPr lang="en-US" dirty="0"/>
-                        <a:t>1.05</a:t>
-                      </a:r>
-                    </a:p>
-                  </a:txBody>
-                  <a:tcPr anchor="ctr"/>
-                </a:tc>
-                <a:tc>
-                  <a:txBody>
-                    <a:bodyPr/>
-                    <a:lstStyle/>
-                    <a:p>
-                      <a:pPr algn="ctr"/>
-                      <a:endParaRPr lang="en-US" dirty="0"/>
-                    </a:p>
-                  </a:txBody>
-                  <a:tcPr anchor="ctr"/>
-                </a:tc>
-                <a:extLst>
-                  <a:ext uri="{0D108BD9-81ED-4DB2-BD59-A6C34878D82A}">
-                    <a16:rowId xmlns:a16="http://schemas.microsoft.com/office/drawing/2014/main" val="3248717932"/>
-                  </a:ext>
-                </a:extLst>
-              </a:tr>
-              <a:tr h="505569">
-                <a:tc>
-                  <a:txBody>
-                    <a:bodyPr/>
-                    <a:lstStyle/>
-                    <a:p>
-                      <a:r>
-                        <a:rPr lang="en-US" dirty="0"/>
-                        <a:t>VIT</a:t>
-                      </a:r>
-                    </a:p>
-                  </a:txBody>
-                  <a:tcPr anchor="ctr"/>
-                </a:tc>
-                <a:tc>
-                  <a:txBody>
-                    <a:bodyPr/>
-                    <a:lstStyle/>
-                    <a:p>
-                      <a:pPr algn="ctr"/>
-                      <a:r>
-                        <a:rPr lang="en-US" dirty="0"/>
-                        <a:t>0.28</a:t>
-                      </a:r>
-                    </a:p>
-                  </a:txBody>
-                  <a:tcPr anchor="ctr"/>
-                </a:tc>
-                <a:tc>
-                  <a:txBody>
-                    <a:bodyPr/>
-                    <a:lstStyle/>
-                    <a:p>
-                      <a:pPr algn="ctr"/>
-                      <a:r>
-                        <a:rPr lang="en-US" dirty="0"/>
-                        <a:t>0.34</a:t>
-                      </a:r>
-                    </a:p>
-                  </a:txBody>
-                  <a:tcPr anchor="ctr"/>
-                </a:tc>
-                <a:tc>
-                  <a:txBody>
-                    <a:bodyPr/>
-                    <a:lstStyle/>
-                    <a:p>
-                      <a:pPr algn="ctr"/>
-                      <a:r>
-                        <a:rPr lang="en-US" dirty="0"/>
-                        <a:t>1250</a:t>
-                      </a:r>
-                    </a:p>
-                  </a:txBody>
-                  <a:tcPr anchor="ctr"/>
-                </a:tc>
-                <a:tc>
-                  <a:txBody>
-                    <a:bodyPr/>
-                    <a:lstStyle/>
-                    <a:p>
-                      <a:pPr algn="ctr"/>
-                      <a:r>
-                        <a:rPr lang="en-US" dirty="0"/>
-                        <a:t>1.02</a:t>
-                      </a:r>
-                    </a:p>
-                  </a:txBody>
-                  <a:tcPr anchor="ctr"/>
-                </a:tc>
-                <a:tc>
-                  <a:txBody>
-                    <a:bodyPr/>
-                    <a:lstStyle/>
-                    <a:p>
-                      <a:pPr algn="ctr"/>
-                      <a:endParaRPr lang="en-US" dirty="0"/>
-                    </a:p>
-                  </a:txBody>
-                  <a:tcPr anchor="ctr"/>
-                </a:tc>
-                <a:extLst>
-                  <a:ext uri="{0D108BD9-81ED-4DB2-BD59-A6C34878D82A}">
-                    <a16:rowId xmlns:a16="http://schemas.microsoft.com/office/drawing/2014/main" val="1232718432"/>
-                  </a:ext>
-                </a:extLst>
-              </a:tr>
-              <a:tr h="505569">
-                <a:tc>
-                  <a:txBody>
-                    <a:bodyPr/>
-                    <a:lstStyle/>
-                    <a:p>
-                      <a:r>
-                        <a:rPr lang="en-US" dirty="0"/>
-                        <a:t>BERT (naive) </a:t>
-                      </a:r>
-                      <a:r>
-                        <a:rPr lang="en-US" baseline="30000" dirty="0"/>
-                        <a:t>1</a:t>
-                      </a:r>
-                    </a:p>
-                  </a:txBody>
-                  <a:tcPr anchor="ctr"/>
-                </a:tc>
-                <a:tc>
-                  <a:txBody>
-                    <a:bodyPr/>
-                    <a:lstStyle/>
-                    <a:p>
-                      <a:pPr algn="ctr"/>
-                      <a:r>
-                        <a:rPr lang="en-US" dirty="0"/>
-                        <a:t>0.03</a:t>
-                      </a:r>
-                    </a:p>
-                  </a:txBody>
-                  <a:tcPr anchor="ctr"/>
-                </a:tc>
-                <a:tc>
-                  <a:txBody>
-                    <a:bodyPr/>
-                    <a:lstStyle/>
-                    <a:p>
-                      <a:pPr algn="ctr"/>
-                      <a:r>
-                        <a:rPr lang="en-US" dirty="0"/>
-                        <a:t>0.27</a:t>
-                      </a:r>
-                    </a:p>
-                  </a:txBody>
-                  <a:tcPr anchor="ctr"/>
-                </a:tc>
-                <a:tc>
-                  <a:txBody>
-                    <a:bodyPr/>
-                    <a:lstStyle/>
-                    <a:p>
-                      <a:pPr algn="ctr"/>
-                      <a:r>
-                        <a:rPr lang="en-US" dirty="0"/>
-                        <a:t>1000</a:t>
-                      </a:r>
-                    </a:p>
-                  </a:txBody>
-                  <a:tcPr anchor="ctr"/>
-                </a:tc>
-                <a:tc>
-                  <a:txBody>
-                    <a:bodyPr/>
-                    <a:lstStyle/>
-                    <a:p>
-                      <a:pPr algn="ctr"/>
-                      <a:endParaRPr lang="en-US" dirty="0"/>
-                    </a:p>
-                  </a:txBody>
-                  <a:tcPr anchor="ctr"/>
-                </a:tc>
-                <a:tc>
-                  <a:txBody>
-                    <a:bodyPr/>
-                    <a:lstStyle/>
-                    <a:p>
-                      <a:pPr algn="ctr"/>
-                      <a:r>
-                        <a:rPr lang="en-US" dirty="0"/>
-                        <a:t>strong overfitting</a:t>
-                      </a:r>
-                    </a:p>
-                  </a:txBody>
-                  <a:tcPr anchor="ctr"/>
-                </a:tc>
-                <a:extLst>
-                  <a:ext uri="{0D108BD9-81ED-4DB2-BD59-A6C34878D82A}">
-                    <a16:rowId xmlns:a16="http://schemas.microsoft.com/office/drawing/2014/main" val="461321389"/>
-                  </a:ext>
-                </a:extLst>
-              </a:tr>
-              <a:tr h="505569">
-                <a:tc rowSpan="2">
-                  <a:txBody>
-                    <a:bodyPr/>
-                    <a:lstStyle/>
-                    <a:p>
-                      <a:r>
-                        <a:rPr lang="en-US" dirty="0"/>
-                        <a:t>BERT (full) </a:t>
-                      </a:r>
-                      <a:r>
-                        <a:rPr lang="en-US" baseline="30000" dirty="0"/>
-                        <a:t>2</a:t>
-                      </a:r>
-                    </a:p>
-                  </a:txBody>
-                  <a:tcPr anchor="ctr"/>
-                </a:tc>
-                <a:tc>
-                  <a:txBody>
-                    <a:bodyPr/>
-                    <a:lstStyle/>
-                    <a:p>
-                      <a:pPr algn="ctr"/>
-                      <a:r>
-                        <a:rPr lang="en-US" dirty="0"/>
-                        <a:t>0.34</a:t>
-                      </a:r>
-                    </a:p>
-                  </a:txBody>
-                  <a:tcPr anchor="ctr"/>
-                </a:tc>
-                <a:tc>
-                  <a:txBody>
-                    <a:bodyPr/>
-                    <a:lstStyle/>
-                    <a:p>
-                      <a:pPr algn="ctr"/>
-                      <a:r>
-                        <a:rPr lang="en-US" dirty="0"/>
-                        <a:t>0.33</a:t>
-                      </a:r>
-                    </a:p>
-                  </a:txBody>
-                  <a:tcPr anchor="ctr"/>
-                </a:tc>
-                <a:tc>
-                  <a:txBody>
-                    <a:bodyPr/>
-                    <a:lstStyle/>
-                    <a:p>
-                      <a:pPr algn="ctr"/>
-                      <a:r>
-                        <a:rPr lang="en-US" dirty="0"/>
-                        <a:t>10 </a:t>
-                      </a:r>
-                      <a:r>
-                        <a:rPr lang="en-US" baseline="30000" dirty="0"/>
-                        <a:t>3</a:t>
-                      </a:r>
-                    </a:p>
-                  </a:txBody>
-                  <a:tcPr anchor="ctr"/>
-                </a:tc>
-                <a:tc>
-                  <a:txBody>
-                    <a:bodyPr/>
-                    <a:lstStyle/>
-                    <a:p>
-                      <a:pPr algn="ctr"/>
-                      <a:r>
-                        <a:rPr lang="en-US" dirty="0" err="1"/>
-                        <a:t>na</a:t>
-                      </a:r>
-                      <a:endParaRPr lang="en-US" dirty="0"/>
-                    </a:p>
-                  </a:txBody>
-                  <a:tcPr anchor="ctr"/>
-                </a:tc>
-                <a:tc>
-                  <a:txBody>
-                    <a:bodyPr/>
-                    <a:lstStyle/>
-                    <a:p>
-                      <a:pPr algn="ctr"/>
-                      <a:r>
-                        <a:rPr lang="en-US" dirty="0"/>
-                        <a:t>pre-train</a:t>
-                      </a:r>
-                    </a:p>
-                  </a:txBody>
-                  <a:tcPr anchor="ctr"/>
-                </a:tc>
-                <a:extLst>
-                  <a:ext uri="{0D108BD9-81ED-4DB2-BD59-A6C34878D82A}">
-                    <a16:rowId xmlns:a16="http://schemas.microsoft.com/office/drawing/2014/main" val="4051566852"/>
-                  </a:ext>
-                </a:extLst>
-              </a:tr>
-              <a:tr h="505569">
-                <a:tc vMerge="1">
-                  <a:txBody>
-                    <a:bodyPr/>
-                    <a:lstStyle/>
-                    <a:p>
-                      <a:endParaRPr lang="en-US" baseline="30000" dirty="0"/>
-                    </a:p>
-                  </a:txBody>
-                  <a:tcPr/>
-                </a:tc>
-                <a:tc>
-                  <a:txBody>
-                    <a:bodyPr/>
-                    <a:lstStyle/>
-                    <a:p>
-                      <a:pPr algn="ctr"/>
-                      <a:endParaRPr lang="en-US"/>
-                    </a:p>
-                  </a:txBody>
-                  <a:tcPr anchor="ctr"/>
-                </a:tc>
-                <a:tc>
-                  <a:txBody>
-                    <a:bodyPr/>
-                    <a:lstStyle/>
-                    <a:p>
-                      <a:pPr algn="ctr"/>
-                      <a:endParaRPr lang="en-US"/>
-                    </a:p>
-                  </a:txBody>
-                  <a:tcPr anchor="ctr"/>
-                </a:tc>
-                <a:tc>
-                  <a:txBody>
-                    <a:bodyPr/>
-                    <a:lstStyle/>
-                    <a:p>
-                      <a:pPr algn="ctr"/>
-                      <a:endParaRPr lang="en-US"/>
-                    </a:p>
-                  </a:txBody>
-                  <a:tcPr anchor="ctr"/>
-                </a:tc>
-                <a:tc>
-                  <a:txBody>
-                    <a:bodyPr/>
-                    <a:lstStyle/>
-                    <a:p>
-                      <a:pPr algn="ctr"/>
-                      <a:endParaRPr lang="en-US" dirty="0"/>
-                    </a:p>
-                  </a:txBody>
-                  <a:tcPr anchor="ctr"/>
-                </a:tc>
-                <a:tc>
-                  <a:txBody>
-                    <a:bodyPr/>
-                    <a:lstStyle/>
-                    <a:p>
-                      <a:pPr algn="ctr"/>
-                      <a:r>
-                        <a:rPr lang="en-US" dirty="0"/>
-                        <a:t>fine-tune</a:t>
-                      </a:r>
-                    </a:p>
-                  </a:txBody>
-                  <a:tcPr anchor="ctr"/>
-                </a:tc>
-                <a:extLst>
-                  <a:ext uri="{0D108BD9-81ED-4DB2-BD59-A6C34878D82A}">
-                    <a16:rowId xmlns:a16="http://schemas.microsoft.com/office/drawing/2014/main" val="3788428899"/>
-                  </a:ext>
-                </a:extLst>
-              </a:tr>
-            </a:tbl>
-          </a:graphicData>
-        </a:graphic>
-      </p:graphicFrame>
-      <p:sp>
-        <p:nvSpPr>
-          <p:cNvPr id="4" name="TextBox 3">
-            <a:extLst>
-              <a:ext uri="{FF2B5EF4-FFF2-40B4-BE49-F238E27FC236}">
-                <a16:creationId xmlns:a16="http://schemas.microsoft.com/office/drawing/2014/main" id="{00DD7777-9BF6-823F-4376-3C2BB81EAC9C}"/>
-              </a:ext>
-            </a:extLst>
-          </p:cNvPr>
-          <p:cNvSpPr txBox="1"/>
-          <p:nvPr/>
-        </p:nvSpPr>
-        <p:spPr>
-          <a:xfrm>
-            <a:off x="389614" y="5534108"/>
-            <a:ext cx="8333435" cy="923330"/>
-          </a:xfrm>
-          <a:prstGeom prst="rect">
-            <a:avLst/>
-          </a:prstGeom>
-          <a:noFill/>
-        </p:spPr>
-        <p:txBody>
-          <a:bodyPr wrap="none" rtlCol="0">
-            <a:spAutoFit/>
-          </a:bodyPr>
-          <a:lstStyle/>
-          <a:p>
-            <a:pPr marL="342900" indent="-342900">
-              <a:buAutoNum type="arabicPeriod"/>
-            </a:pPr>
-            <a:r>
-              <a:rPr lang="en-US" dirty="0"/>
-              <a:t>Train the fine-tune BERT model from scratch (no pre-training) on </a:t>
-            </a:r>
-            <a:r>
-              <a:rPr lang="en-US" dirty="0" err="1"/>
-              <a:t>scFV</a:t>
-            </a:r>
-            <a:r>
-              <a:rPr lang="en-US" dirty="0"/>
-              <a:t> train data</a:t>
-            </a:r>
-          </a:p>
-          <a:p>
-            <a:pPr marL="342900" indent="-342900">
-              <a:buAutoNum type="arabicPeriod"/>
-            </a:pPr>
-            <a:r>
-              <a:rPr lang="en-US" dirty="0"/>
-              <a:t>Pre-train BERT on OAS dataset, then fine-tune on </a:t>
-            </a:r>
-            <a:r>
-              <a:rPr lang="en-US" dirty="0" err="1"/>
-              <a:t>scFv</a:t>
-            </a:r>
-            <a:r>
-              <a:rPr lang="en-US" dirty="0"/>
-              <a:t> train data</a:t>
-            </a:r>
-          </a:p>
-          <a:p>
-            <a:pPr marL="342900" indent="-342900">
-              <a:buAutoNum type="arabicPeriod"/>
-            </a:pPr>
-            <a:r>
-              <a:rPr lang="en-US" dirty="0"/>
-              <a:t>OAS dataset is </a:t>
-            </a:r>
-            <a:r>
-              <a:rPr lang="en-US" b="0" dirty="0">
-                <a:effectLst/>
-              </a:rPr>
-              <a:t>18061315 rows.</a:t>
-            </a:r>
-            <a:endParaRPr lang="en-US" dirty="0"/>
-          </a:p>
-        </p:txBody>
-      </p:sp>
-    </p:spTree>
-    <p:extLst>
-      <p:ext uri="{BB962C8B-B14F-4D97-AF65-F5344CB8AC3E}">
-        <p14:creationId xmlns:p14="http://schemas.microsoft.com/office/powerpoint/2010/main" val="127111251"/>
       </p:ext>
     </p:extLst>
   </p:cSld>

</xml_diff>

<commit_message>
slide deck more VIT inference results
</commit_message>
<xml_diff>
--- a/Homework-aAlphaBio.pptx
+++ b/Homework-aAlphaBio.pptx
@@ -13,25 +13,27 @@
     <p:sldId id="333" r:id="rId7"/>
     <p:sldId id="342" r:id="rId8"/>
     <p:sldId id="336" r:id="rId9"/>
-    <p:sldId id="320" r:id="rId10"/>
-    <p:sldId id="334" r:id="rId11"/>
-    <p:sldId id="340" r:id="rId12"/>
-    <p:sldId id="341" r:id="rId13"/>
-    <p:sldId id="257" r:id="rId14"/>
-    <p:sldId id="258" r:id="rId15"/>
-    <p:sldId id="335" r:id="rId16"/>
-    <p:sldId id="337" r:id="rId17"/>
-    <p:sldId id="330" r:id="rId18"/>
-    <p:sldId id="329" r:id="rId19"/>
-    <p:sldId id="331" r:id="rId20"/>
-    <p:sldId id="318" r:id="rId21"/>
-    <p:sldId id="321" r:id="rId22"/>
-    <p:sldId id="259" r:id="rId23"/>
-    <p:sldId id="322" r:id="rId24"/>
-    <p:sldId id="260" r:id="rId25"/>
-    <p:sldId id="324" r:id="rId26"/>
-    <p:sldId id="261" r:id="rId27"/>
-    <p:sldId id="323" r:id="rId28"/>
+    <p:sldId id="344" r:id="rId10"/>
+    <p:sldId id="343" r:id="rId11"/>
+    <p:sldId id="320" r:id="rId12"/>
+    <p:sldId id="334" r:id="rId13"/>
+    <p:sldId id="340" r:id="rId14"/>
+    <p:sldId id="341" r:id="rId15"/>
+    <p:sldId id="257" r:id="rId16"/>
+    <p:sldId id="258" r:id="rId17"/>
+    <p:sldId id="335" r:id="rId18"/>
+    <p:sldId id="337" r:id="rId19"/>
+    <p:sldId id="330" r:id="rId20"/>
+    <p:sldId id="329" r:id="rId21"/>
+    <p:sldId id="331" r:id="rId22"/>
+    <p:sldId id="318" r:id="rId23"/>
+    <p:sldId id="321" r:id="rId24"/>
+    <p:sldId id="259" r:id="rId25"/>
+    <p:sldId id="322" r:id="rId26"/>
+    <p:sldId id="260" r:id="rId27"/>
+    <p:sldId id="324" r:id="rId28"/>
+    <p:sldId id="261" r:id="rId29"/>
+    <p:sldId id="323" r:id="rId30"/>
   </p:sldIdLst>
   <p:sldSz cx="12192000" cy="6858000"/>
   <p:notesSz cx="6858000" cy="9144000"/>
@@ -3436,6 +3438,1522 @@
 </file>
 
 <file path=ppt/slides/slide10.xml><?xml version="1.0" encoding="utf-8"?>
+<p:sld xmlns:a="http://schemas.openxmlformats.org/drawingml/2006/main" xmlns:r="http://schemas.openxmlformats.org/officeDocument/2006/relationships" xmlns:p="http://schemas.openxmlformats.org/presentationml/2006/main">
+  <p:cSld>
+    <p:spTree>
+      <p:nvGrpSpPr>
+        <p:cNvPr id="1" name=""/>
+        <p:cNvGrpSpPr/>
+        <p:nvPr/>
+      </p:nvGrpSpPr>
+      <p:grpSpPr>
+        <a:xfrm>
+          <a:off x="0" y="0"/>
+          <a:ext cx="0" cy="0"/>
+          <a:chOff x="0" y="0"/>
+          <a:chExt cx="0" cy="0"/>
+        </a:xfrm>
+      </p:grpSpPr>
+      <p:sp>
+        <p:nvSpPr>
+          <p:cNvPr id="2" name="TextBox 1">
+            <a:extLst>
+              <a:ext uri="{FF2B5EF4-FFF2-40B4-BE49-F238E27FC236}">
+                <a16:creationId xmlns:a16="http://schemas.microsoft.com/office/drawing/2014/main" id="{F8E231D6-438C-BCE9-2D4A-B65BED30FBD7}"/>
+              </a:ext>
+            </a:extLst>
+          </p:cNvPr>
+          <p:cNvSpPr txBox="1"/>
+          <p:nvPr/>
+        </p:nvSpPr>
+        <p:spPr>
+          <a:xfrm>
+            <a:off x="173866" y="154242"/>
+            <a:ext cx="4369851" cy="461665"/>
+          </a:xfrm>
+          <a:prstGeom prst="rect">
+            <a:avLst/>
+          </a:prstGeom>
+          <a:noFill/>
+        </p:spPr>
+        <p:txBody>
+          <a:bodyPr wrap="none" rtlCol="0">
+            <a:spAutoFit/>
+          </a:bodyPr>
+          <a:lstStyle/>
+          <a:p>
+            <a:r>
+              <a:rPr lang="en-US" sz="2400" dirty="0"/>
+              <a:t>Settings for models and training</a:t>
+            </a:r>
+          </a:p>
+        </p:txBody>
+      </p:sp>
+      <p:grpSp>
+        <p:nvGrpSpPr>
+          <p:cNvPr id="22" name="Group 21">
+            <a:extLst>
+              <a:ext uri="{FF2B5EF4-FFF2-40B4-BE49-F238E27FC236}">
+                <a16:creationId xmlns:a16="http://schemas.microsoft.com/office/drawing/2014/main" id="{BB53754A-358D-9F4B-D58B-3A61F898B3A4}"/>
+              </a:ext>
+            </a:extLst>
+          </p:cNvPr>
+          <p:cNvGrpSpPr/>
+          <p:nvPr/>
+        </p:nvGrpSpPr>
+        <p:grpSpPr>
+          <a:xfrm>
+            <a:off x="681491" y="1052422"/>
+            <a:ext cx="2435923" cy="2941608"/>
+            <a:chOff x="681491" y="1052422"/>
+            <a:chExt cx="2435923" cy="2941608"/>
+          </a:xfrm>
+        </p:grpSpPr>
+        <p:sp>
+          <p:nvSpPr>
+            <p:cNvPr id="13" name="Rectangle 12">
+              <a:extLst>
+                <a:ext uri="{FF2B5EF4-FFF2-40B4-BE49-F238E27FC236}">
+                  <a16:creationId xmlns:a16="http://schemas.microsoft.com/office/drawing/2014/main" id="{FFDC333F-D8D2-B5D5-CDC0-E75EA11236F7}"/>
+                </a:ext>
+              </a:extLst>
+            </p:cNvPr>
+            <p:cNvSpPr/>
+            <p:nvPr/>
+          </p:nvSpPr>
+          <p:spPr>
+            <a:xfrm>
+              <a:off x="681491" y="1052422"/>
+              <a:ext cx="2435923" cy="2941608"/>
+            </a:xfrm>
+            <a:prstGeom prst="rect">
+              <a:avLst/>
+            </a:prstGeom>
+            <a:solidFill>
+              <a:schemeClr val="accent4">
+                <a:alpha val="19958"/>
+              </a:schemeClr>
+            </a:solidFill>
+            <a:ln>
+              <a:solidFill>
+                <a:schemeClr val="tx1"/>
+              </a:solidFill>
+            </a:ln>
+          </p:spPr>
+          <p:style>
+            <a:lnRef idx="2">
+              <a:schemeClr val="accent1">
+                <a:shade val="15000"/>
+              </a:schemeClr>
+            </a:lnRef>
+            <a:fillRef idx="1">
+              <a:schemeClr val="accent1"/>
+            </a:fillRef>
+            <a:effectRef idx="0">
+              <a:schemeClr val="accent1"/>
+            </a:effectRef>
+            <a:fontRef idx="minor">
+              <a:schemeClr val="lt1"/>
+            </a:fontRef>
+          </p:style>
+          <p:txBody>
+            <a:bodyPr rtlCol="0" anchor="ctr"/>
+            <a:lstStyle/>
+            <a:p>
+              <a:pPr algn="ctr"/>
+              <a:endParaRPr lang="en-US"/>
+            </a:p>
+          </p:txBody>
+        </p:sp>
+        <p:sp>
+          <p:nvSpPr>
+            <p:cNvPr id="8" name="TextBox 7">
+              <a:extLst>
+                <a:ext uri="{FF2B5EF4-FFF2-40B4-BE49-F238E27FC236}">
+                  <a16:creationId xmlns:a16="http://schemas.microsoft.com/office/drawing/2014/main" id="{A8AD42C4-3C54-2DA7-EBC4-0680E29331FB}"/>
+                </a:ext>
+              </a:extLst>
+            </p:cNvPr>
+            <p:cNvSpPr txBox="1"/>
+            <p:nvPr/>
+          </p:nvSpPr>
+          <p:spPr>
+            <a:xfrm>
+              <a:off x="1059560" y="1052425"/>
+              <a:ext cx="1531188" cy="369332"/>
+            </a:xfrm>
+            <a:prstGeom prst="rect">
+              <a:avLst/>
+            </a:prstGeom>
+            <a:noFill/>
+          </p:spPr>
+          <p:txBody>
+            <a:bodyPr wrap="none" rtlCol="0">
+              <a:spAutoFit/>
+            </a:bodyPr>
+            <a:lstStyle/>
+            <a:p>
+              <a:r>
+                <a:rPr lang="en-US" dirty="0"/>
+                <a:t>Residual MLP</a:t>
+              </a:r>
+            </a:p>
+          </p:txBody>
+        </p:sp>
+        <p:sp>
+          <p:nvSpPr>
+            <p:cNvPr id="9" name="TextBox 8">
+              <a:extLst>
+                <a:ext uri="{FF2B5EF4-FFF2-40B4-BE49-F238E27FC236}">
+                  <a16:creationId xmlns:a16="http://schemas.microsoft.com/office/drawing/2014/main" id="{9D35129A-ADAA-58D1-D1A6-5D364944A302}"/>
+                </a:ext>
+              </a:extLst>
+            </p:cNvPr>
+            <p:cNvSpPr txBox="1"/>
+            <p:nvPr/>
+          </p:nvSpPr>
+          <p:spPr>
+            <a:xfrm>
+              <a:off x="681491" y="1414740"/>
+              <a:ext cx="2435923" cy="830997"/>
+            </a:xfrm>
+            <a:prstGeom prst="rect">
+              <a:avLst/>
+            </a:prstGeom>
+            <a:noFill/>
+          </p:spPr>
+          <p:txBody>
+            <a:bodyPr wrap="none" rtlCol="0">
+              <a:spAutoFit/>
+            </a:bodyPr>
+            <a:lstStyle/>
+            <a:p>
+              <a:pPr marL="285750" indent="-285750">
+                <a:buFont typeface="Arial" panose="020B0604020202020204" pitchFamily="34" charset="0"/>
+                <a:buChar char="•"/>
+              </a:pPr>
+              <a:r>
+                <a:rPr lang="en-US" sz="1600" dirty="0"/>
+                <a:t>8 layers</a:t>
+              </a:r>
+            </a:p>
+            <a:p>
+              <a:pPr marL="285750" indent="-285750">
+                <a:buFont typeface="Arial" panose="020B0604020202020204" pitchFamily="34" charset="0"/>
+                <a:buChar char="•"/>
+              </a:pPr>
+              <a:r>
+                <a:rPr lang="en-US" sz="1600" dirty="0"/>
+                <a:t>input/output size : 248</a:t>
+              </a:r>
+            </a:p>
+            <a:p>
+              <a:pPr marL="285750" indent="-285750">
+                <a:buFont typeface="Arial" panose="020B0604020202020204" pitchFamily="34" charset="0"/>
+                <a:buChar char="•"/>
+              </a:pPr>
+              <a:r>
+                <a:rPr lang="en-US" sz="1600" dirty="0"/>
+                <a:t>dropout : 0.2</a:t>
+              </a:r>
+            </a:p>
+          </p:txBody>
+        </p:sp>
+      </p:grpSp>
+      <p:grpSp>
+        <p:nvGrpSpPr>
+          <p:cNvPr id="23" name="Group 22">
+            <a:extLst>
+              <a:ext uri="{FF2B5EF4-FFF2-40B4-BE49-F238E27FC236}">
+                <a16:creationId xmlns:a16="http://schemas.microsoft.com/office/drawing/2014/main" id="{0C3ECD85-051C-8EAD-5345-2A59D923A7E6}"/>
+              </a:ext>
+            </a:extLst>
+          </p:cNvPr>
+          <p:cNvGrpSpPr/>
+          <p:nvPr/>
+        </p:nvGrpSpPr>
+        <p:grpSpPr>
+          <a:xfrm>
+            <a:off x="3219842" y="1052422"/>
+            <a:ext cx="2524089" cy="2941608"/>
+            <a:chOff x="3219842" y="1052422"/>
+            <a:chExt cx="2524089" cy="2941608"/>
+          </a:xfrm>
+        </p:grpSpPr>
+        <p:sp>
+          <p:nvSpPr>
+            <p:cNvPr id="14" name="Rectangle 13">
+              <a:extLst>
+                <a:ext uri="{FF2B5EF4-FFF2-40B4-BE49-F238E27FC236}">
+                  <a16:creationId xmlns:a16="http://schemas.microsoft.com/office/drawing/2014/main" id="{74E03991-1C61-E3BE-0D5A-658BAA9108B0}"/>
+                </a:ext>
+              </a:extLst>
+            </p:cNvPr>
+            <p:cNvSpPr/>
+            <p:nvPr/>
+          </p:nvSpPr>
+          <p:spPr>
+            <a:xfrm>
+              <a:off x="3227451" y="1052422"/>
+              <a:ext cx="2435923" cy="2941608"/>
+            </a:xfrm>
+            <a:prstGeom prst="rect">
+              <a:avLst/>
+            </a:prstGeom>
+            <a:solidFill>
+              <a:schemeClr val="accent4">
+                <a:alpha val="19958"/>
+              </a:schemeClr>
+            </a:solidFill>
+            <a:ln>
+              <a:solidFill>
+                <a:schemeClr val="tx1"/>
+              </a:solidFill>
+            </a:ln>
+          </p:spPr>
+          <p:style>
+            <a:lnRef idx="2">
+              <a:schemeClr val="accent1">
+                <a:shade val="15000"/>
+              </a:schemeClr>
+            </a:lnRef>
+            <a:fillRef idx="1">
+              <a:schemeClr val="accent1"/>
+            </a:fillRef>
+            <a:effectRef idx="0">
+              <a:schemeClr val="accent1"/>
+            </a:effectRef>
+            <a:fontRef idx="minor">
+              <a:schemeClr val="lt1"/>
+            </a:fontRef>
+          </p:style>
+          <p:txBody>
+            <a:bodyPr rtlCol="0" anchor="ctr"/>
+            <a:lstStyle/>
+            <a:p>
+              <a:pPr algn="ctr"/>
+              <a:endParaRPr lang="en-US"/>
+            </a:p>
+          </p:txBody>
+        </p:sp>
+        <p:sp>
+          <p:nvSpPr>
+            <p:cNvPr id="4" name="TextBox 3">
+              <a:extLst>
+                <a:ext uri="{FF2B5EF4-FFF2-40B4-BE49-F238E27FC236}">
+                  <a16:creationId xmlns:a16="http://schemas.microsoft.com/office/drawing/2014/main" id="{865FD086-6A13-F70D-8E9B-4C8B87747B22}"/>
+                </a:ext>
+              </a:extLst>
+            </p:cNvPr>
+            <p:cNvSpPr txBox="1"/>
+            <p:nvPr/>
+          </p:nvSpPr>
+          <p:spPr>
+            <a:xfrm>
+              <a:off x="3219842" y="1052425"/>
+              <a:ext cx="2524089" cy="369332"/>
+            </a:xfrm>
+            <a:prstGeom prst="rect">
+              <a:avLst/>
+            </a:prstGeom>
+            <a:noFill/>
+          </p:spPr>
+          <p:txBody>
+            <a:bodyPr wrap="none" rtlCol="0">
+              <a:spAutoFit/>
+            </a:bodyPr>
+            <a:lstStyle/>
+            <a:p>
+              <a:r>
+                <a:rPr lang="en-US" dirty="0"/>
+                <a:t>Vision Transformer (VIT)</a:t>
+              </a:r>
+            </a:p>
+          </p:txBody>
+        </p:sp>
+        <p:sp>
+          <p:nvSpPr>
+            <p:cNvPr id="10" name="TextBox 9">
+              <a:extLst>
+                <a:ext uri="{FF2B5EF4-FFF2-40B4-BE49-F238E27FC236}">
+                  <a16:creationId xmlns:a16="http://schemas.microsoft.com/office/drawing/2014/main" id="{5858CE13-6B26-2D98-C03E-DBF7332C0E72}"/>
+                </a:ext>
+              </a:extLst>
+            </p:cNvPr>
+            <p:cNvSpPr txBox="1"/>
+            <p:nvPr/>
+          </p:nvSpPr>
+          <p:spPr>
+            <a:xfrm>
+              <a:off x="3264470" y="1414740"/>
+              <a:ext cx="2258311" cy="2308324"/>
+            </a:xfrm>
+            <a:prstGeom prst="rect">
+              <a:avLst/>
+            </a:prstGeom>
+            <a:noFill/>
+          </p:spPr>
+          <p:txBody>
+            <a:bodyPr wrap="none" rtlCol="0">
+              <a:spAutoFit/>
+            </a:bodyPr>
+            <a:lstStyle/>
+            <a:p>
+              <a:pPr marL="285750" indent="-285750">
+                <a:buFont typeface="Arial" panose="020B0604020202020204" pitchFamily="34" charset="0"/>
+                <a:buChar char="•"/>
+              </a:pPr>
+              <a:r>
+                <a:rPr lang="en-US" sz="1600" dirty="0"/>
+                <a:t>block size: 288</a:t>
+              </a:r>
+            </a:p>
+            <a:p>
+              <a:pPr marL="285750" indent="-285750">
+                <a:buFont typeface="Arial" panose="020B0604020202020204" pitchFamily="34" charset="0"/>
+                <a:buChar char="•"/>
+              </a:pPr>
+              <a:r>
+                <a:rPr lang="en-US" sz="1600" dirty="0" err="1"/>
+                <a:t>img</a:t>
+              </a:r>
+              <a:r>
+                <a:rPr lang="en-US" sz="1600" dirty="0"/>
+                <a:t> size: (1,48,48)</a:t>
+              </a:r>
+            </a:p>
+            <a:p>
+              <a:pPr marL="285750" indent="-285750">
+                <a:buFont typeface="Arial" panose="020B0604020202020204" pitchFamily="34" charset="0"/>
+                <a:buChar char="•"/>
+              </a:pPr>
+              <a:r>
+                <a:rPr lang="en-US" sz="1600" dirty="0" err="1"/>
+                <a:t>emb_dim</a:t>
+              </a:r>
+              <a:r>
+                <a:rPr lang="en-US" sz="1600" dirty="0"/>
+                <a:t>: 128</a:t>
+              </a:r>
+            </a:p>
+            <a:p>
+              <a:pPr marL="285750" indent="-285750">
+                <a:buFont typeface="Arial" panose="020B0604020202020204" pitchFamily="34" charset="0"/>
+                <a:buChar char="•"/>
+              </a:pPr>
+              <a:r>
+                <a:rPr lang="en-US" sz="1600" dirty="0" err="1"/>
+                <a:t>patch_dim</a:t>
+              </a:r>
+              <a:r>
+                <a:rPr lang="en-US" sz="1600" dirty="0"/>
+                <a:t>: 4</a:t>
+              </a:r>
+            </a:p>
+            <a:p>
+              <a:pPr marL="285750" indent="-285750">
+                <a:buFont typeface="Arial" panose="020B0604020202020204" pitchFamily="34" charset="0"/>
+                <a:buChar char="•"/>
+              </a:pPr>
+              <a:r>
+                <a:rPr lang="en-US" sz="1600" dirty="0"/>
+                <a:t>heads: 8</a:t>
+              </a:r>
+            </a:p>
+            <a:p>
+              <a:pPr marL="285750" indent="-285750">
+                <a:buFont typeface="Arial" panose="020B0604020202020204" pitchFamily="34" charset="0"/>
+                <a:buChar char="•"/>
+              </a:pPr>
+              <a:r>
+                <a:rPr lang="en-US" sz="1600" dirty="0"/>
+                <a:t>layers: 6</a:t>
+              </a:r>
+            </a:p>
+            <a:p>
+              <a:pPr marL="285750" indent="-285750">
+                <a:buFont typeface="Arial" panose="020B0604020202020204" pitchFamily="34" charset="0"/>
+                <a:buChar char="•"/>
+              </a:pPr>
+              <a:r>
+                <a:rPr lang="en-US" sz="1600" dirty="0"/>
+                <a:t>vocab size: 25</a:t>
+              </a:r>
+            </a:p>
+            <a:p>
+              <a:pPr marL="285750" indent="-285750">
+                <a:buFont typeface="Arial" panose="020B0604020202020204" pitchFamily="34" charset="0"/>
+                <a:buChar char="•"/>
+              </a:pPr>
+              <a:r>
+                <a:rPr lang="en-US" sz="1600" dirty="0"/>
+                <a:t>dropout </a:t>
+              </a:r>
+              <a:r>
+                <a:rPr lang="en-US" sz="1600" dirty="0" err="1"/>
+                <a:t>mlp</a:t>
+              </a:r>
+              <a:r>
+                <a:rPr lang="en-US" sz="1600" dirty="0"/>
+                <a:t>: 0.3</a:t>
+              </a:r>
+            </a:p>
+            <a:p>
+              <a:pPr marL="285750" indent="-285750">
+                <a:buFont typeface="Arial" panose="020B0604020202020204" pitchFamily="34" charset="0"/>
+                <a:buChar char="•"/>
+              </a:pPr>
+              <a:r>
+                <a:rPr lang="en-US" sz="1600" dirty="0"/>
+                <a:t>dropout </a:t>
+              </a:r>
+              <a:r>
+                <a:rPr lang="en-US" sz="1600" dirty="0" err="1"/>
+                <a:t>tformer</a:t>
+              </a:r>
+              <a:r>
+                <a:rPr lang="en-US" sz="1600" dirty="0"/>
+                <a:t>: 0.1</a:t>
+              </a:r>
+            </a:p>
+          </p:txBody>
+        </p:sp>
+      </p:grpSp>
+      <p:grpSp>
+        <p:nvGrpSpPr>
+          <p:cNvPr id="24" name="Group 23">
+            <a:extLst>
+              <a:ext uri="{FF2B5EF4-FFF2-40B4-BE49-F238E27FC236}">
+                <a16:creationId xmlns:a16="http://schemas.microsoft.com/office/drawing/2014/main" id="{16549EC4-5C33-A19F-7347-12AA8BDDE2E3}"/>
+              </a:ext>
+            </a:extLst>
+          </p:cNvPr>
+          <p:cNvGrpSpPr/>
+          <p:nvPr/>
+        </p:nvGrpSpPr>
+        <p:grpSpPr>
+          <a:xfrm>
+            <a:off x="5828290" y="1052422"/>
+            <a:ext cx="2435923" cy="3163085"/>
+            <a:chOff x="5828290" y="1052422"/>
+            <a:chExt cx="2435923" cy="3163085"/>
+          </a:xfrm>
+        </p:grpSpPr>
+        <p:sp>
+          <p:nvSpPr>
+            <p:cNvPr id="15" name="Rectangle 14">
+              <a:extLst>
+                <a:ext uri="{FF2B5EF4-FFF2-40B4-BE49-F238E27FC236}">
+                  <a16:creationId xmlns:a16="http://schemas.microsoft.com/office/drawing/2014/main" id="{62BEBBAF-18EA-F3CD-2ECC-EA9E8D4B73D7}"/>
+                </a:ext>
+              </a:extLst>
+            </p:cNvPr>
+            <p:cNvSpPr/>
+            <p:nvPr/>
+          </p:nvSpPr>
+          <p:spPr>
+            <a:xfrm>
+              <a:off x="5828290" y="1052422"/>
+              <a:ext cx="2435923" cy="2941608"/>
+            </a:xfrm>
+            <a:prstGeom prst="rect">
+              <a:avLst/>
+            </a:prstGeom>
+            <a:solidFill>
+              <a:schemeClr val="accent4">
+                <a:alpha val="19958"/>
+              </a:schemeClr>
+            </a:solidFill>
+            <a:ln>
+              <a:solidFill>
+                <a:schemeClr val="tx1"/>
+              </a:solidFill>
+            </a:ln>
+          </p:spPr>
+          <p:style>
+            <a:lnRef idx="2">
+              <a:schemeClr val="accent1">
+                <a:shade val="15000"/>
+              </a:schemeClr>
+            </a:lnRef>
+            <a:fillRef idx="1">
+              <a:schemeClr val="accent1"/>
+            </a:fillRef>
+            <a:effectRef idx="0">
+              <a:schemeClr val="accent1"/>
+            </a:effectRef>
+            <a:fontRef idx="minor">
+              <a:schemeClr val="lt1"/>
+            </a:fontRef>
+          </p:style>
+          <p:txBody>
+            <a:bodyPr rtlCol="0" anchor="ctr"/>
+            <a:lstStyle/>
+            <a:p>
+              <a:pPr algn="ctr"/>
+              <a:endParaRPr lang="en-US"/>
+            </a:p>
+          </p:txBody>
+        </p:sp>
+        <p:sp>
+          <p:nvSpPr>
+            <p:cNvPr id="6" name="TextBox 5">
+              <a:extLst>
+                <a:ext uri="{FF2B5EF4-FFF2-40B4-BE49-F238E27FC236}">
+                  <a16:creationId xmlns:a16="http://schemas.microsoft.com/office/drawing/2014/main" id="{94D35DF2-BD73-C434-8BB7-FF641C7D2938}"/>
+                </a:ext>
+              </a:extLst>
+            </p:cNvPr>
+            <p:cNvSpPr txBox="1"/>
+            <p:nvPr/>
+          </p:nvSpPr>
+          <p:spPr>
+            <a:xfrm>
+              <a:off x="6247667" y="1052425"/>
+              <a:ext cx="1598515" cy="369332"/>
+            </a:xfrm>
+            <a:prstGeom prst="rect">
+              <a:avLst/>
+            </a:prstGeom>
+            <a:noFill/>
+          </p:spPr>
+          <p:txBody>
+            <a:bodyPr wrap="none" rtlCol="0">
+              <a:spAutoFit/>
+            </a:bodyPr>
+            <a:lstStyle/>
+            <a:p>
+              <a:r>
+                <a:rPr lang="en-US" dirty="0"/>
+                <a:t>BERT pre-train</a:t>
+              </a:r>
+            </a:p>
+          </p:txBody>
+        </p:sp>
+        <p:sp>
+          <p:nvSpPr>
+            <p:cNvPr id="11" name="TextBox 10">
+              <a:extLst>
+                <a:ext uri="{FF2B5EF4-FFF2-40B4-BE49-F238E27FC236}">
+                  <a16:creationId xmlns:a16="http://schemas.microsoft.com/office/drawing/2014/main" id="{1295B3D1-E65B-D10A-E01A-745ED5F1ED49}"/>
+                </a:ext>
+              </a:extLst>
+            </p:cNvPr>
+            <p:cNvSpPr txBox="1"/>
+            <p:nvPr/>
+          </p:nvSpPr>
+          <p:spPr>
+            <a:xfrm>
+              <a:off x="6080611" y="1414740"/>
+              <a:ext cx="2028504" cy="2800767"/>
+            </a:xfrm>
+            <a:prstGeom prst="rect">
+              <a:avLst/>
+            </a:prstGeom>
+            <a:noFill/>
+          </p:spPr>
+          <p:txBody>
+            <a:bodyPr wrap="none" rtlCol="0">
+              <a:spAutoFit/>
+            </a:bodyPr>
+            <a:lstStyle/>
+            <a:p>
+              <a:pPr marL="285750" indent="-285750">
+                <a:buFont typeface="Arial" panose="020B0604020202020204" pitchFamily="34" charset="0"/>
+                <a:buChar char="•"/>
+              </a:pPr>
+              <a:r>
+                <a:rPr lang="en-US" sz="1600" dirty="0"/>
+                <a:t>block size: 248</a:t>
+              </a:r>
+            </a:p>
+            <a:p>
+              <a:pPr marL="285750" indent="-285750">
+                <a:buFont typeface="Arial" panose="020B0604020202020204" pitchFamily="34" charset="0"/>
+                <a:buChar char="•"/>
+              </a:pPr>
+              <a:r>
+                <a:rPr lang="en-US" sz="1600" dirty="0" err="1"/>
+                <a:t>emb_dim</a:t>
+              </a:r>
+              <a:r>
+                <a:rPr lang="en-US" sz="1600" dirty="0"/>
+                <a:t>: 192</a:t>
+              </a:r>
+            </a:p>
+            <a:p>
+              <a:pPr marL="285750" indent="-285750">
+                <a:buFont typeface="Arial" panose="020B0604020202020204" pitchFamily="34" charset="0"/>
+                <a:buChar char="•"/>
+              </a:pPr>
+              <a:r>
+                <a:rPr lang="en-US" sz="1600" dirty="0"/>
+                <a:t>heads: 8</a:t>
+              </a:r>
+            </a:p>
+            <a:p>
+              <a:pPr marL="285750" indent="-285750">
+                <a:buFont typeface="Arial" panose="020B0604020202020204" pitchFamily="34" charset="0"/>
+                <a:buChar char="•"/>
+              </a:pPr>
+              <a:r>
+                <a:rPr lang="en-US" sz="1600" dirty="0"/>
+                <a:t>layers: 6</a:t>
+              </a:r>
+            </a:p>
+            <a:p>
+              <a:pPr marL="285750" indent="-285750">
+                <a:buFont typeface="Arial" panose="020B0604020202020204" pitchFamily="34" charset="0"/>
+                <a:buChar char="•"/>
+              </a:pPr>
+              <a:r>
+                <a:rPr lang="en-US" sz="1600" dirty="0"/>
+                <a:t>mask prob: 0.15</a:t>
+              </a:r>
+            </a:p>
+            <a:p>
+              <a:pPr marL="285750" indent="-285750">
+                <a:buFont typeface="Arial" panose="020B0604020202020204" pitchFamily="34" charset="0"/>
+                <a:buChar char="•"/>
+              </a:pPr>
+              <a:r>
+                <a:rPr lang="en-US" sz="1600" dirty="0"/>
+                <a:t>vocab size: 25</a:t>
+              </a:r>
+            </a:p>
+            <a:p>
+              <a:pPr marL="285750" indent="-285750">
+                <a:buFont typeface="Arial" panose="020B0604020202020204" pitchFamily="34" charset="0"/>
+                <a:buChar char="•"/>
+              </a:pPr>
+              <a:r>
+                <a:rPr lang="en-US" sz="1600" dirty="0"/>
+                <a:t>dropouts</a:t>
+              </a:r>
+            </a:p>
+            <a:p>
+              <a:pPr marL="742950" lvl="1" indent="-285750">
+                <a:buFont typeface="Arial" panose="020B0604020202020204" pitchFamily="34" charset="0"/>
+                <a:buChar char="•"/>
+              </a:pPr>
+              <a:r>
+                <a:rPr lang="en-US" sz="1600" dirty="0" err="1"/>
+                <a:t>emb</a:t>
+              </a:r>
+              <a:r>
+                <a:rPr lang="en-US" sz="1600" dirty="0"/>
+                <a:t>: 0.1</a:t>
+              </a:r>
+            </a:p>
+            <a:p>
+              <a:pPr marL="742950" lvl="1" indent="-285750">
+                <a:buFont typeface="Arial" panose="020B0604020202020204" pitchFamily="34" charset="0"/>
+                <a:buChar char="•"/>
+              </a:pPr>
+              <a:r>
+                <a:rPr lang="en-US" sz="1600" dirty="0"/>
+                <a:t>residual: 0.1</a:t>
+              </a:r>
+            </a:p>
+            <a:p>
+              <a:pPr marL="742950" lvl="1" indent="-285750">
+                <a:buFont typeface="Arial" panose="020B0604020202020204" pitchFamily="34" charset="0"/>
+                <a:buChar char="•"/>
+              </a:pPr>
+              <a:r>
+                <a:rPr lang="en-US" sz="1600" dirty="0" err="1"/>
+                <a:t>attn:</a:t>
+              </a:r>
+              <a:r>
+                <a:rPr lang="en-US" sz="1600" dirty="0"/>
+                <a:t> 0.1</a:t>
+              </a:r>
+            </a:p>
+            <a:p>
+              <a:pPr marL="285750" indent="-285750">
+                <a:buFont typeface="Arial" panose="020B0604020202020204" pitchFamily="34" charset="0"/>
+                <a:buChar char="•"/>
+              </a:pPr>
+              <a:endParaRPr lang="en-US" sz="1600" dirty="0"/>
+            </a:p>
+          </p:txBody>
+        </p:sp>
+      </p:grpSp>
+      <p:grpSp>
+        <p:nvGrpSpPr>
+          <p:cNvPr id="25" name="Group 24">
+            <a:extLst>
+              <a:ext uri="{FF2B5EF4-FFF2-40B4-BE49-F238E27FC236}">
+                <a16:creationId xmlns:a16="http://schemas.microsoft.com/office/drawing/2014/main" id="{D84FB101-46A9-724B-73E3-3460EF2C80F7}"/>
+              </a:ext>
+            </a:extLst>
+          </p:cNvPr>
+          <p:cNvGrpSpPr/>
+          <p:nvPr/>
+        </p:nvGrpSpPr>
+        <p:grpSpPr>
+          <a:xfrm>
+            <a:off x="8516534" y="1052422"/>
+            <a:ext cx="2435923" cy="2941608"/>
+            <a:chOff x="8516534" y="1052422"/>
+            <a:chExt cx="2435923" cy="2941608"/>
+          </a:xfrm>
+        </p:grpSpPr>
+        <p:sp>
+          <p:nvSpPr>
+            <p:cNvPr id="16" name="Rectangle 15">
+              <a:extLst>
+                <a:ext uri="{FF2B5EF4-FFF2-40B4-BE49-F238E27FC236}">
+                  <a16:creationId xmlns:a16="http://schemas.microsoft.com/office/drawing/2014/main" id="{9076DE57-CD38-F5D7-D311-F3C498F8F124}"/>
+                </a:ext>
+              </a:extLst>
+            </p:cNvPr>
+            <p:cNvSpPr/>
+            <p:nvPr/>
+          </p:nvSpPr>
+          <p:spPr>
+            <a:xfrm>
+              <a:off x="8516534" y="1052422"/>
+              <a:ext cx="2435923" cy="2941608"/>
+            </a:xfrm>
+            <a:prstGeom prst="rect">
+              <a:avLst/>
+            </a:prstGeom>
+            <a:solidFill>
+              <a:schemeClr val="accent4">
+                <a:alpha val="19958"/>
+              </a:schemeClr>
+            </a:solidFill>
+            <a:ln>
+              <a:solidFill>
+                <a:schemeClr val="tx1"/>
+              </a:solidFill>
+            </a:ln>
+          </p:spPr>
+          <p:style>
+            <a:lnRef idx="2">
+              <a:schemeClr val="accent1">
+                <a:shade val="15000"/>
+              </a:schemeClr>
+            </a:lnRef>
+            <a:fillRef idx="1">
+              <a:schemeClr val="accent1"/>
+            </a:fillRef>
+            <a:effectRef idx="0">
+              <a:schemeClr val="accent1"/>
+            </a:effectRef>
+            <a:fontRef idx="minor">
+              <a:schemeClr val="lt1"/>
+            </a:fontRef>
+          </p:style>
+          <p:txBody>
+            <a:bodyPr rtlCol="0" anchor="ctr"/>
+            <a:lstStyle/>
+            <a:p>
+              <a:pPr algn="ctr"/>
+              <a:endParaRPr lang="en-US"/>
+            </a:p>
+          </p:txBody>
+        </p:sp>
+        <p:sp>
+          <p:nvSpPr>
+            <p:cNvPr id="7" name="TextBox 6">
+              <a:extLst>
+                <a:ext uri="{FF2B5EF4-FFF2-40B4-BE49-F238E27FC236}">
+                  <a16:creationId xmlns:a16="http://schemas.microsoft.com/office/drawing/2014/main" id="{843B2943-5BB5-5DBB-7721-E313935CD162}"/>
+                </a:ext>
+              </a:extLst>
+            </p:cNvPr>
+            <p:cNvSpPr txBox="1"/>
+            <p:nvPr/>
+          </p:nvSpPr>
+          <p:spPr>
+            <a:xfrm>
+              <a:off x="8896602" y="1052425"/>
+              <a:ext cx="1646989" cy="369332"/>
+            </a:xfrm>
+            <a:prstGeom prst="rect">
+              <a:avLst/>
+            </a:prstGeom>
+            <a:noFill/>
+          </p:spPr>
+          <p:txBody>
+            <a:bodyPr wrap="none" rtlCol="0">
+              <a:spAutoFit/>
+            </a:bodyPr>
+            <a:lstStyle/>
+            <a:p>
+              <a:r>
+                <a:rPr lang="en-US" dirty="0"/>
+                <a:t>BERT fine-tune</a:t>
+              </a:r>
+            </a:p>
+          </p:txBody>
+        </p:sp>
+        <p:sp>
+          <p:nvSpPr>
+            <p:cNvPr id="12" name="TextBox 11">
+              <a:extLst>
+                <a:ext uri="{FF2B5EF4-FFF2-40B4-BE49-F238E27FC236}">
+                  <a16:creationId xmlns:a16="http://schemas.microsoft.com/office/drawing/2014/main" id="{D345135F-4C5E-C0F0-FDA6-6CE9C653C015}"/>
+                </a:ext>
+              </a:extLst>
+            </p:cNvPr>
+            <p:cNvSpPr txBox="1"/>
+            <p:nvPr/>
+          </p:nvSpPr>
+          <p:spPr>
+            <a:xfrm>
+              <a:off x="8597668" y="1414740"/>
+              <a:ext cx="2354789" cy="2062103"/>
+            </a:xfrm>
+            <a:prstGeom prst="rect">
+              <a:avLst/>
+            </a:prstGeom>
+            <a:noFill/>
+          </p:spPr>
+          <p:txBody>
+            <a:bodyPr wrap="square" rtlCol="0">
+              <a:spAutoFit/>
+            </a:bodyPr>
+            <a:lstStyle/>
+            <a:p>
+              <a:pPr marL="285750" indent="-285750">
+                <a:buFont typeface="Arial" panose="020B0604020202020204" pitchFamily="34" charset="0"/>
+                <a:buChar char="•"/>
+              </a:pPr>
+              <a:r>
+                <a:rPr lang="en-US" sz="1600" dirty="0"/>
+                <a:t>BERT pre-train</a:t>
+              </a:r>
+            </a:p>
+            <a:p>
+              <a:pPr marL="285750" indent="-285750">
+                <a:buFont typeface="Arial" panose="020B0604020202020204" pitchFamily="34" charset="0"/>
+                <a:buChar char="•"/>
+              </a:pPr>
+              <a:r>
+                <a:rPr lang="en-US" sz="1600" dirty="0"/>
+                <a:t>mask prob: 0</a:t>
+              </a:r>
+            </a:p>
+            <a:p>
+              <a:pPr marL="285750" indent="-285750">
+                <a:buFont typeface="Arial" panose="020B0604020202020204" pitchFamily="34" charset="0"/>
+                <a:buChar char="•"/>
+              </a:pPr>
+              <a:r>
+                <a:rPr lang="en-US" sz="1600" dirty="0"/>
+                <a:t>head dropout: 0.2</a:t>
+              </a:r>
+            </a:p>
+            <a:p>
+              <a:pPr marL="285750" indent="-285750">
+                <a:buFont typeface="Arial" panose="020B0604020202020204" pitchFamily="34" charset="0"/>
+                <a:buChar char="•"/>
+              </a:pPr>
+              <a:r>
+                <a:rPr lang="en-US" sz="1600" dirty="0"/>
+                <a:t>base </a:t>
+              </a:r>
+              <a:r>
+                <a:rPr lang="en-US" sz="1600" dirty="0" err="1"/>
+                <a:t>tformer</a:t>
+              </a:r>
+              <a:r>
+                <a:rPr lang="en-US" sz="1600" dirty="0"/>
+                <a:t> layers:</a:t>
+              </a:r>
+            </a:p>
+            <a:p>
+              <a:pPr marL="742950" lvl="1" indent="-285750">
+                <a:buFont typeface="Arial" panose="020B0604020202020204" pitchFamily="34" charset="0"/>
+                <a:buChar char="•"/>
+              </a:pPr>
+              <a:r>
+                <a:rPr lang="en-US" sz="1600" dirty="0"/>
+                <a:t>all frozen</a:t>
+              </a:r>
+            </a:p>
+            <a:p>
+              <a:pPr marL="742950" lvl="1" indent="-285750">
+                <a:buFont typeface="Arial" panose="020B0604020202020204" pitchFamily="34" charset="0"/>
+                <a:buChar char="•"/>
+              </a:pPr>
+              <a:r>
+                <a:rPr lang="en-US" sz="1600" dirty="0"/>
+                <a:t>unfreeze last 1</a:t>
+              </a:r>
+            </a:p>
+            <a:p>
+              <a:pPr marL="742950" lvl="1" indent="-285750">
+                <a:buFont typeface="Arial" panose="020B0604020202020204" pitchFamily="34" charset="0"/>
+                <a:buChar char="•"/>
+              </a:pPr>
+              <a:r>
+                <a:rPr lang="en-US" sz="1600" dirty="0"/>
+                <a:t>unfreeze last 2</a:t>
+              </a:r>
+            </a:p>
+            <a:p>
+              <a:pPr marL="742950" lvl="1" indent="-285750">
+                <a:buFont typeface="Arial" panose="020B0604020202020204" pitchFamily="34" charset="0"/>
+                <a:buChar char="•"/>
+              </a:pPr>
+              <a:r>
+                <a:rPr lang="en-US" sz="1600" dirty="0"/>
+                <a:t>unfreeze last 3</a:t>
+              </a:r>
+            </a:p>
+          </p:txBody>
+        </p:sp>
+      </p:grpSp>
+      <p:sp>
+        <p:nvSpPr>
+          <p:cNvPr id="21" name="TextBox 20">
+            <a:extLst>
+              <a:ext uri="{FF2B5EF4-FFF2-40B4-BE49-F238E27FC236}">
+                <a16:creationId xmlns:a16="http://schemas.microsoft.com/office/drawing/2014/main" id="{55619909-2482-8E10-24D1-F543F57A7335}"/>
+              </a:ext>
+            </a:extLst>
+          </p:cNvPr>
+          <p:cNvSpPr txBox="1"/>
+          <p:nvPr/>
+        </p:nvSpPr>
+        <p:spPr>
+          <a:xfrm>
+            <a:off x="436781" y="4430545"/>
+            <a:ext cx="10783018" cy="1815882"/>
+          </a:xfrm>
+          <a:prstGeom prst="rect">
+            <a:avLst/>
+          </a:prstGeom>
+          <a:noFill/>
+        </p:spPr>
+        <p:txBody>
+          <a:bodyPr wrap="square" rtlCol="0">
+            <a:spAutoFit/>
+          </a:bodyPr>
+          <a:lstStyle/>
+          <a:p>
+            <a:r>
+              <a:rPr lang="en-US" sz="1600" dirty="0" err="1"/>
+              <a:t>Misc</a:t>
+            </a:r>
+            <a:r>
+              <a:rPr lang="en-US" sz="1600" dirty="0"/>
+              <a:t>:</a:t>
+            </a:r>
+          </a:p>
+          <a:p>
+            <a:pPr marL="285750" indent="-285750">
+              <a:buFont typeface="Arial" panose="020B0604020202020204" pitchFamily="34" charset="0"/>
+              <a:buChar char="•"/>
+            </a:pPr>
+            <a:r>
+              <a:rPr lang="en-US" sz="1600" dirty="0"/>
+              <a:t>BERT pre-train: due to resource constraints, I had to use a very tiny BERT (</a:t>
+            </a:r>
+            <a:r>
+              <a:rPr lang="en-US" sz="1600" dirty="0" err="1"/>
+              <a:t>emb</a:t>
+            </a:r>
+            <a:r>
+              <a:rPr lang="en-US" sz="1600" dirty="0"/>
+              <a:t>, heads, layers) and only did 10 epochs of pre-training</a:t>
+            </a:r>
+          </a:p>
+          <a:p>
+            <a:pPr marL="285750" indent="-285750">
+              <a:buFont typeface="Arial" panose="020B0604020202020204" pitchFamily="34" charset="0"/>
+              <a:buChar char="•"/>
+            </a:pPr>
+            <a:r>
+              <a:rPr lang="en-US" sz="1600" dirty="0"/>
+              <a:t>VIT: due to resource constraints, I could not explore larger attention heads (</a:t>
+            </a:r>
+            <a:r>
+              <a:rPr lang="en-US" sz="1600" dirty="0" err="1"/>
+              <a:t>emb</a:t>
+            </a:r>
+            <a:r>
+              <a:rPr lang="en-US" sz="1600" dirty="0"/>
+              <a:t>, heads, layers)</a:t>
+            </a:r>
+          </a:p>
+          <a:p>
+            <a:pPr marL="285750" indent="-285750">
+              <a:buFont typeface="Arial" panose="020B0604020202020204" pitchFamily="34" charset="0"/>
+              <a:buChar char="•"/>
+            </a:pPr>
+            <a:r>
+              <a:rPr lang="en-US" sz="1600" dirty="0" err="1"/>
+              <a:t>AdamW</a:t>
+            </a:r>
+            <a:r>
+              <a:rPr lang="en-US" sz="1600" dirty="0"/>
+              <a:t> and exponential learning rate decay for all trainings</a:t>
+            </a:r>
+          </a:p>
+          <a:p>
+            <a:pPr marL="285750" indent="-285750">
+              <a:buFont typeface="Arial" panose="020B0604020202020204" pitchFamily="34" charset="0"/>
+              <a:buChar char="•"/>
+            </a:pPr>
+            <a:r>
+              <a:rPr lang="en-US" sz="1600" dirty="0"/>
+              <a:t>Initial learning rate 0.0001</a:t>
+            </a:r>
+          </a:p>
+          <a:p>
+            <a:pPr marL="285750" indent="-285750">
+              <a:buFont typeface="Arial" panose="020B0604020202020204" pitchFamily="34" charset="0"/>
+              <a:buChar char="•"/>
+            </a:pPr>
+            <a:r>
+              <a:rPr lang="en-US" sz="1600" dirty="0"/>
+              <a:t>Loss: MSE</a:t>
+            </a:r>
+          </a:p>
+        </p:txBody>
+      </p:sp>
+    </p:spTree>
+    <p:extLst>
+      <p:ext uri="{BB962C8B-B14F-4D97-AF65-F5344CB8AC3E}">
+        <p14:creationId xmlns:p14="http://schemas.microsoft.com/office/powerpoint/2010/main" val="4045523547"/>
+      </p:ext>
+    </p:extLst>
+  </p:cSld>
+  <p:clrMapOvr>
+    <a:masterClrMapping/>
+  </p:clrMapOvr>
+</p:sld>
+</file>
+
+<file path=ppt/slides/slide11.xml><?xml version="1.0" encoding="utf-8"?>
+<p:sld xmlns:a="http://schemas.openxmlformats.org/drawingml/2006/main" xmlns:r="http://schemas.openxmlformats.org/officeDocument/2006/relationships" xmlns:p="http://schemas.openxmlformats.org/presentationml/2006/main">
+  <p:cSld>
+    <p:spTree>
+      <p:nvGrpSpPr>
+        <p:cNvPr id="1" name=""/>
+        <p:cNvGrpSpPr/>
+        <p:nvPr/>
+      </p:nvGrpSpPr>
+      <p:grpSpPr>
+        <a:xfrm>
+          <a:off x="0" y="0"/>
+          <a:ext cx="0" cy="0"/>
+          <a:chOff x="0" y="0"/>
+          <a:chExt cx="0" cy="0"/>
+        </a:xfrm>
+      </p:grpSpPr>
+      <p:sp>
+        <p:nvSpPr>
+          <p:cNvPr id="2" name="TextBox 1">
+            <a:extLst>
+              <a:ext uri="{FF2B5EF4-FFF2-40B4-BE49-F238E27FC236}">
+                <a16:creationId xmlns:a16="http://schemas.microsoft.com/office/drawing/2014/main" id="{A6B8D544-62FB-BED5-1F3D-8DE1F9A51DC3}"/>
+              </a:ext>
+            </a:extLst>
+          </p:cNvPr>
+          <p:cNvSpPr txBox="1"/>
+          <p:nvPr/>
+        </p:nvSpPr>
+        <p:spPr>
+          <a:xfrm>
+            <a:off x="140127" y="221836"/>
+            <a:ext cx="6376297" cy="461665"/>
+          </a:xfrm>
+          <a:prstGeom prst="rect">
+            <a:avLst/>
+          </a:prstGeom>
+          <a:noFill/>
+        </p:spPr>
+        <p:txBody>
+          <a:bodyPr wrap="none" rtlCol="0">
+            <a:spAutoFit/>
+          </a:bodyPr>
+          <a:lstStyle/>
+          <a:p>
+            <a:r>
+              <a:rPr lang="en-US" sz="2400" dirty="0"/>
+              <a:t>BERT Stuff:   Relevant literature, code, and data</a:t>
+            </a:r>
+          </a:p>
+        </p:txBody>
+      </p:sp>
+      <p:sp>
+        <p:nvSpPr>
+          <p:cNvPr id="3" name="TextBox 2">
+            <a:extLst>
+              <a:ext uri="{FF2B5EF4-FFF2-40B4-BE49-F238E27FC236}">
+                <a16:creationId xmlns:a16="http://schemas.microsoft.com/office/drawing/2014/main" id="{9750003C-8501-0DA4-F28D-311FF3F150A4}"/>
+              </a:ext>
+            </a:extLst>
+          </p:cNvPr>
+          <p:cNvSpPr txBox="1"/>
+          <p:nvPr/>
+        </p:nvSpPr>
+        <p:spPr>
+          <a:xfrm>
+            <a:off x="765387" y="1291616"/>
+            <a:ext cx="9574610" cy="5016758"/>
+          </a:xfrm>
+          <a:prstGeom prst="rect">
+            <a:avLst/>
+          </a:prstGeom>
+          <a:noFill/>
+        </p:spPr>
+        <p:txBody>
+          <a:bodyPr wrap="square" rtlCol="0">
+            <a:spAutoFit/>
+          </a:bodyPr>
+          <a:lstStyle/>
+          <a:p>
+            <a:pPr marL="285750" indent="-285750">
+              <a:buFont typeface="Arial" panose="020B0604020202020204" pitchFamily="34" charset="0"/>
+              <a:buChar char="•"/>
+            </a:pPr>
+            <a:r>
+              <a:rPr lang="en-US" sz="1600" dirty="0"/>
+              <a:t>BERT : </a:t>
+            </a:r>
+            <a:r>
+              <a:rPr lang="en-US" sz="1600" dirty="0">
+                <a:hlinkClick r:id="rId2"/>
+              </a:rPr>
+              <a:t>https://aclanthology.org/N19-1423.pdf</a:t>
+            </a:r>
+            <a:endParaRPr lang="en-US" sz="1600" dirty="0"/>
+          </a:p>
+          <a:p>
+            <a:pPr marL="285750" indent="-285750">
+              <a:buFont typeface="Arial" panose="020B0604020202020204" pitchFamily="34" charset="0"/>
+              <a:buChar char="•"/>
+            </a:pPr>
+            <a:endParaRPr lang="en-US" sz="1600" dirty="0"/>
+          </a:p>
+          <a:p>
+            <a:pPr marL="285750" indent="-285750">
+              <a:buFont typeface="Arial" panose="020B0604020202020204" pitchFamily="34" charset="0"/>
+              <a:buChar char="•"/>
+            </a:pPr>
+            <a:r>
+              <a:rPr lang="en-US" sz="1600" dirty="0" err="1"/>
+              <a:t>ProteinBERT</a:t>
+            </a:r>
+            <a:r>
+              <a:rPr lang="en-US" sz="1600" dirty="0"/>
+              <a:t> : </a:t>
+            </a:r>
+            <a:r>
+              <a:rPr lang="en-US" sz="1600" dirty="0">
+                <a:hlinkClick r:id="rId3"/>
+              </a:rPr>
+              <a:t>https://doi.org/10.1093/bioinformatics/btac020</a:t>
+            </a:r>
+            <a:endParaRPr lang="en-US" sz="1600" dirty="0"/>
+          </a:p>
+          <a:p>
+            <a:endParaRPr lang="en-US" sz="1600" dirty="0"/>
+          </a:p>
+          <a:p>
+            <a:pPr marL="285750" indent="-285750">
+              <a:buFont typeface="Arial" panose="020B0604020202020204" pitchFamily="34" charset="0"/>
+              <a:buChar char="•"/>
+            </a:pPr>
+            <a:r>
+              <a:rPr lang="en-US" sz="1600" dirty="0"/>
+              <a:t>Code partially taken from:</a:t>
+            </a:r>
+          </a:p>
+          <a:p>
+            <a:pPr marL="742950" lvl="1" indent="-285750">
+              <a:buFont typeface="Arial" panose="020B0604020202020204" pitchFamily="34" charset="0"/>
+              <a:buChar char="•"/>
+            </a:pPr>
+            <a:r>
+              <a:rPr lang="en-US" sz="1600" dirty="0"/>
+              <a:t>Barney Hill : </a:t>
+            </a:r>
+            <a:r>
+              <a:rPr lang="en-US" sz="1600" b="0" dirty="0">
+                <a:effectLst/>
+                <a:hlinkClick r:id="rId4"/>
+              </a:rPr>
+              <a:t>https://github.com/barneyhill/minBERT</a:t>
+            </a:r>
+            <a:endParaRPr lang="en-US" sz="1600" b="0" dirty="0">
+              <a:effectLst/>
+            </a:endParaRPr>
+          </a:p>
+          <a:p>
+            <a:pPr marL="742950" lvl="1" indent="-285750">
+              <a:buFont typeface="Arial" panose="020B0604020202020204" pitchFamily="34" charset="0"/>
+              <a:buChar char="•"/>
+            </a:pPr>
+            <a:r>
+              <a:rPr lang="en-US" sz="1600" dirty="0"/>
+              <a:t>Andrej </a:t>
+            </a:r>
+            <a:r>
+              <a:rPr lang="en-US" sz="1600" dirty="0" err="1"/>
+              <a:t>Karpathy</a:t>
+            </a:r>
+            <a:r>
+              <a:rPr lang="en-US" sz="1600" dirty="0"/>
+              <a:t>: </a:t>
+            </a:r>
+            <a:r>
+              <a:rPr lang="en-US" sz="1600" b="0" dirty="0">
+                <a:effectLst/>
+                <a:hlinkClick r:id="rId5"/>
+              </a:rPr>
+              <a:t>https://github.com/karpathy/minGPT</a:t>
+            </a:r>
+            <a:endParaRPr lang="en-US" sz="1600" b="0" dirty="0">
+              <a:effectLst/>
+            </a:endParaRPr>
+          </a:p>
+          <a:p>
+            <a:pPr marL="742950" lvl="1" indent="-285750">
+              <a:buFont typeface="Arial" panose="020B0604020202020204" pitchFamily="34" charset="0"/>
+              <a:buChar char="•"/>
+            </a:pPr>
+            <a:r>
+              <a:rPr lang="en-US" sz="1600" dirty="0"/>
+              <a:t>my Table Transformer code (from real-estate automated valuation model development)</a:t>
+            </a:r>
+          </a:p>
+          <a:p>
+            <a:pPr marL="742950" lvl="1" indent="-285750">
+              <a:buFont typeface="Arial" panose="020B0604020202020204" pitchFamily="34" charset="0"/>
+              <a:buChar char="•"/>
+            </a:pPr>
+            <a:endParaRPr lang="en-US" sz="1600" dirty="0"/>
+          </a:p>
+          <a:p>
+            <a:pPr marL="285750" indent="-285750">
+              <a:buFont typeface="Arial" panose="020B0604020202020204" pitchFamily="34" charset="0"/>
+              <a:buChar char="•"/>
+            </a:pPr>
+            <a:r>
+              <a:rPr lang="en-US" sz="1600" dirty="0"/>
+              <a:t>A</a:t>
+            </a:r>
+            <a:r>
+              <a:rPr lang="en-US" sz="1600" b="0" dirty="0">
+                <a:effectLst/>
+              </a:rPr>
+              <a:t>-Alpha Bio:</a:t>
+            </a:r>
+          </a:p>
+          <a:p>
+            <a:pPr marL="742950" lvl="1" indent="-285750">
+              <a:buFont typeface="Arial" panose="020B0604020202020204" pitchFamily="34" charset="0"/>
+              <a:buChar char="•"/>
+            </a:pPr>
+            <a:r>
+              <a:rPr lang="en-US" sz="1600" dirty="0"/>
+              <a:t>Nature Comm: </a:t>
+            </a:r>
+            <a:r>
+              <a:rPr lang="en-US" sz="1600" dirty="0">
+                <a:hlinkClick r:id="rId6"/>
+              </a:rPr>
+              <a:t>http://biorxiv.org/lookup/doi/10.1101/2022.10.07.502662</a:t>
+            </a:r>
+            <a:endParaRPr lang="en-US" sz="1600" dirty="0"/>
+          </a:p>
+          <a:p>
+            <a:pPr marL="742950" lvl="1" indent="-285750">
+              <a:buFont typeface="Arial" panose="020B0604020202020204" pitchFamily="34" charset="0"/>
+              <a:buChar char="•"/>
+            </a:pPr>
+            <a:r>
+              <a:rPr lang="en-US" sz="1600" dirty="0"/>
+              <a:t>Nature: </a:t>
+            </a:r>
+            <a:r>
+              <a:rPr lang="en-US" sz="1600" dirty="0">
+                <a:hlinkClick r:id="rId7"/>
+              </a:rPr>
+              <a:t>https://www.nature.com/articles/s41597-022-01779-4</a:t>
+            </a:r>
+            <a:endParaRPr lang="en-US" sz="1600" dirty="0"/>
+          </a:p>
+          <a:p>
+            <a:pPr marL="742950" lvl="1" indent="-285750">
+              <a:buFont typeface="Arial" panose="020B0604020202020204" pitchFamily="34" charset="0"/>
+              <a:buChar char="•"/>
+            </a:pPr>
+            <a:r>
+              <a:rPr lang="en-US" sz="1600" dirty="0" err="1"/>
+              <a:t>scFv</a:t>
+            </a:r>
+            <a:r>
+              <a:rPr lang="en-US" sz="1600" dirty="0"/>
+              <a:t> Datasets: </a:t>
+            </a:r>
+            <a:r>
+              <a:rPr lang="en-US" sz="1600" dirty="0">
+                <a:hlinkClick r:id="rId8"/>
+              </a:rPr>
+              <a:t>https://github.com/mit-ll/AlphaSeq_Antibody_Dataset.git</a:t>
+            </a:r>
+            <a:endParaRPr lang="en-US" sz="1600" b="0" dirty="0">
+              <a:effectLst/>
+            </a:endParaRPr>
+          </a:p>
+          <a:p>
+            <a:pPr marL="742950" lvl="1" indent="-285750">
+              <a:buFont typeface="Arial" panose="020B0604020202020204" pitchFamily="34" charset="0"/>
+              <a:buChar char="•"/>
+            </a:pPr>
+            <a:endParaRPr lang="en-US" sz="1600" dirty="0"/>
+          </a:p>
+          <a:p>
+            <a:pPr marL="285750" indent="-285750">
+              <a:buFont typeface="Arial" panose="020B0604020202020204" pitchFamily="34" charset="0"/>
+              <a:buChar char="•"/>
+            </a:pPr>
+            <a:r>
+              <a:rPr lang="en-US" sz="1600" b="0" dirty="0">
+                <a:effectLst/>
+              </a:rPr>
+              <a:t>Observed Antibody Space :  </a:t>
+            </a:r>
+          </a:p>
+          <a:p>
+            <a:pPr marL="742950" lvl="1" indent="-285750">
+              <a:buFont typeface="Arial" panose="020B0604020202020204" pitchFamily="34" charset="0"/>
+              <a:buChar char="•"/>
+            </a:pPr>
+            <a:r>
+              <a:rPr lang="en-US" sz="1600" b="0" dirty="0">
+                <a:effectLst/>
+                <a:hlinkClick r:id="rId9"/>
+              </a:rPr>
+              <a:t>https://doi.org/10.4049/jimmunol.1800708</a:t>
+            </a:r>
+            <a:endParaRPr lang="en-US" sz="1600" b="0" dirty="0">
+              <a:effectLst/>
+            </a:endParaRPr>
+          </a:p>
+          <a:p>
+            <a:pPr marL="742950" lvl="1" indent="-285750">
+              <a:buFont typeface="Arial" panose="020B0604020202020204" pitchFamily="34" charset="0"/>
+              <a:buChar char="•"/>
+            </a:pPr>
+            <a:r>
+              <a:rPr lang="en-US" sz="1600" b="0" dirty="0">
+                <a:effectLst/>
+                <a:hlinkClick r:id="rId10"/>
+              </a:rPr>
+              <a:t>https://opig.stats.ox.ac.uk/webapps/oas/</a:t>
+            </a:r>
+            <a:endParaRPr lang="en-US" sz="1600" b="0" dirty="0">
+              <a:effectLst/>
+            </a:endParaRPr>
+          </a:p>
+          <a:p>
+            <a:pPr marL="742950" lvl="1" indent="-285750">
+              <a:buFont typeface="Arial" panose="020B0604020202020204" pitchFamily="34" charset="0"/>
+              <a:buChar char="•"/>
+            </a:pPr>
+            <a:endParaRPr lang="en-US" sz="1600" dirty="0"/>
+          </a:p>
+          <a:p>
+            <a:pPr marL="285750" indent="-285750">
+              <a:buFont typeface="Arial" panose="020B0604020202020204" pitchFamily="34" charset="0"/>
+              <a:buChar char="•"/>
+            </a:pPr>
+            <a:r>
+              <a:rPr lang="en-US" sz="1600" dirty="0"/>
+              <a:t>My </a:t>
+            </a:r>
+            <a:r>
+              <a:rPr lang="en-US" sz="1600" dirty="0" err="1"/>
+              <a:t>Github</a:t>
+            </a:r>
+            <a:r>
+              <a:rPr lang="en-US" sz="1600" dirty="0"/>
+              <a:t> repo for this homework’s code: </a:t>
+            </a:r>
+            <a:r>
+              <a:rPr lang="en-US" sz="1600" dirty="0">
+                <a:solidFill>
+                  <a:srgbClr val="FF0000"/>
+                </a:solidFill>
+              </a:rPr>
+              <a:t>TODO (2 repos) </a:t>
+            </a:r>
+            <a:r>
+              <a:rPr lang="en-US" sz="1600" dirty="0">
+                <a:hlinkClick r:id="rId11"/>
+              </a:rPr>
+              <a:t>https://github.com/planaria158/BERT.git</a:t>
+            </a:r>
+            <a:endParaRPr lang="en-US" sz="1600" dirty="0"/>
+          </a:p>
+          <a:p>
+            <a:pPr marL="285750" indent="-285750">
+              <a:buFont typeface="Arial" panose="020B0604020202020204" pitchFamily="34" charset="0"/>
+              <a:buChar char="•"/>
+            </a:pPr>
+            <a:endParaRPr lang="en-US" sz="1600" dirty="0"/>
+          </a:p>
+        </p:txBody>
+      </p:sp>
+      <p:sp>
+        <p:nvSpPr>
+          <p:cNvPr id="5" name="TextBox 4">
+            <a:extLst>
+              <a:ext uri="{FF2B5EF4-FFF2-40B4-BE49-F238E27FC236}">
+                <a16:creationId xmlns:a16="http://schemas.microsoft.com/office/drawing/2014/main" id="{00DEACF3-1DAE-F38C-6985-089A5766A04C}"/>
+              </a:ext>
+            </a:extLst>
+          </p:cNvPr>
+          <p:cNvSpPr txBox="1"/>
+          <p:nvPr/>
+        </p:nvSpPr>
+        <p:spPr>
+          <a:xfrm>
+            <a:off x="140127" y="679781"/>
+            <a:ext cx="9369296" cy="307777"/>
+          </a:xfrm>
+          <a:prstGeom prst="rect">
+            <a:avLst/>
+          </a:prstGeom>
+          <a:noFill/>
+        </p:spPr>
+        <p:txBody>
+          <a:bodyPr wrap="none" rtlCol="0">
+            <a:spAutoFit/>
+          </a:bodyPr>
+          <a:lstStyle/>
+          <a:p>
+            <a:r>
+              <a:rPr lang="en-US" sz="1400" dirty="0"/>
+              <a:t>Note: I did most of the BERT coding/testing in the 2 weeks before my call with Adrian (i.e. before getting the HW problem)</a:t>
+            </a:r>
+          </a:p>
+        </p:txBody>
+      </p:sp>
+    </p:spTree>
+    <p:extLst>
+      <p:ext uri="{BB962C8B-B14F-4D97-AF65-F5344CB8AC3E}">
+        <p14:creationId xmlns:p14="http://schemas.microsoft.com/office/powerpoint/2010/main" val="1592508389"/>
+      </p:ext>
+    </p:extLst>
+  </p:cSld>
+  <p:clrMapOvr>
+    <a:masterClrMapping/>
+  </p:clrMapOvr>
+</p:sld>
+</file>
+
+<file path=ppt/slides/slide12.xml><?xml version="1.0" encoding="utf-8"?>
 <p:sld xmlns:a="http://schemas.openxmlformats.org/drawingml/2006/main" xmlns:r="http://schemas.openxmlformats.org/officeDocument/2006/relationships" xmlns:p="http://schemas.openxmlformats.org/presentationml/2006/main">
   <p:cSld>
     <p:spTree>
@@ -4368,7 +5886,7 @@
 </p:sld>
 </file>
 
-<file path=ppt/slides/slide11.xml><?xml version="1.0" encoding="utf-8"?>
+<file path=ppt/slides/slide13.xml><?xml version="1.0" encoding="utf-8"?>
 <p:sld xmlns:a="http://schemas.openxmlformats.org/drawingml/2006/main" xmlns:r="http://schemas.openxmlformats.org/officeDocument/2006/relationships" xmlns:p="http://schemas.openxmlformats.org/presentationml/2006/main">
   <p:cSld>
     <p:spTree>
@@ -5070,7 +6588,7 @@
 </p:sld>
 </file>
 
-<file path=ppt/slides/slide12.xml><?xml version="1.0" encoding="utf-8"?>
+<file path=ppt/slides/slide14.xml><?xml version="1.0" encoding="utf-8"?>
 <p:sld xmlns:a="http://schemas.openxmlformats.org/drawingml/2006/main" xmlns:r="http://schemas.openxmlformats.org/officeDocument/2006/relationships" xmlns:p="http://schemas.openxmlformats.org/presentationml/2006/main">
   <p:cSld>
     <p:spTree>
@@ -5137,14 +6655,14 @@
           <p:nvPr>
             <p:extLst>
               <p:ext uri="{D42A27DB-BD31-4B8C-83A1-F6EECF244321}">
-                <p14:modId xmlns:p14="http://schemas.microsoft.com/office/powerpoint/2010/main" val="3375131024"/>
+                <p14:modId xmlns:p14="http://schemas.microsoft.com/office/powerpoint/2010/main" val="3799707048"/>
               </p:ext>
             </p:extLst>
           </p:nvPr>
         </p:nvGraphicFramePr>
         <p:xfrm>
-          <a:off x="1729491" y="1086528"/>
-          <a:ext cx="8484186" cy="3167925"/>
+          <a:off x="671456" y="784606"/>
+          <a:ext cx="9734939" cy="5020221"/>
         </p:xfrm>
         <a:graphic>
           <a:graphicData uri="http://schemas.openxmlformats.org/drawingml/2006/table">
@@ -5153,42 +6671,42 @@
                 <a:tableStyleId>{5C22544A-7EE6-4342-B048-85BDC9FD1C3A}</a:tableStyleId>
               </a:tblPr>
               <a:tblGrid>
-                <a:gridCol w="1662524">
+                <a:gridCol w="1655724">
                   <a:extLst>
                     <a:ext uri="{9D8B030D-6E8A-4147-A177-3AD203B41FA5}">
                       <a16:colId xmlns:a16="http://schemas.microsoft.com/office/drawing/2014/main" val="1065848917"/>
                     </a:ext>
                   </a:extLst>
                 </a:gridCol>
-                <a:gridCol w="1087495">
+                <a:gridCol w="1396282">
                   <a:extLst>
                     <a:ext uri="{9D8B030D-6E8A-4147-A177-3AD203B41FA5}">
                       <a16:colId xmlns:a16="http://schemas.microsoft.com/office/drawing/2014/main" val="873310604"/>
                     </a:ext>
                   </a:extLst>
                 </a:gridCol>
-                <a:gridCol w="1160010">
+                <a:gridCol w="1489386">
                   <a:extLst>
                     <a:ext uri="{9D8B030D-6E8A-4147-A177-3AD203B41FA5}">
                       <a16:colId xmlns:a16="http://schemas.microsoft.com/office/drawing/2014/main" val="3981708244"/>
                     </a:ext>
                   </a:extLst>
                 </a:gridCol>
-                <a:gridCol w="1524719">
+                <a:gridCol w="1106226">
                   <a:extLst>
                     <a:ext uri="{9D8B030D-6E8A-4147-A177-3AD203B41FA5}">
                       <a16:colId xmlns:a16="http://schemas.microsoft.com/office/drawing/2014/main" val="1135465181"/>
                     </a:ext>
                   </a:extLst>
                 </a:gridCol>
-                <a:gridCol w="1524719">
+                <a:gridCol w="1363281">
                   <a:extLst>
                     <a:ext uri="{9D8B030D-6E8A-4147-A177-3AD203B41FA5}">
                       <a16:colId xmlns:a16="http://schemas.microsoft.com/office/drawing/2014/main" val="91865083"/>
                     </a:ext>
                   </a:extLst>
                 </a:gridCol>
-                <a:gridCol w="1524719">
+                <a:gridCol w="2724040">
                   <a:extLst>
                     <a:ext uri="{9D8B030D-6E8A-4147-A177-3AD203B41FA5}">
                       <a16:colId xmlns:a16="http://schemas.microsoft.com/office/drawing/2014/main" val="2256753199"/>
@@ -5196,7 +6714,7 @@
                   </a:extLst>
                 </a:gridCol>
               </a:tblGrid>
-              <a:tr h="505569">
+              <a:tr h="565542">
                 <a:tc>
                   <a:txBody>
                     <a:bodyPr/>
@@ -5294,7 +6812,7 @@
                   </a:ext>
                 </a:extLst>
               </a:tr>
-              <a:tr h="505569">
+              <a:tr h="446695">
                 <a:tc>
                   <a:txBody>
                     <a:bodyPr/>
@@ -5369,7 +6887,7 @@
                   </a:ext>
                 </a:extLst>
               </a:tr>
-              <a:tr h="505569">
+              <a:tr h="446695">
                 <a:tc>
                   <a:txBody>
                     <a:bodyPr/>
@@ -5444,15 +6962,15 @@
                   </a:ext>
                 </a:extLst>
               </a:tr>
-              <a:tr h="505569">
-                <a:tc>
+              <a:tr h="446695">
+                <a:tc rowSpan="5">
                   <a:txBody>
                     <a:bodyPr/>
                     <a:lstStyle/>
                     <a:p>
                       <a:r>
                         <a:rPr lang="en-US" dirty="0"/>
-                        <a:t>BERT (naive) </a:t>
+                        <a:t>BERT </a:t>
                       </a:r>
                       <a:r>
                         <a:rPr lang="en-US" baseline="30000" dirty="0"/>
@@ -5468,74 +6986,9 @@
                     <a:lstStyle/>
                     <a:p>
                       <a:pPr algn="ctr"/>
-                      <a:endParaRPr lang="en-US" dirty="0"/>
-                    </a:p>
-                  </a:txBody>
-                  <a:tcPr anchor="ctr"/>
-                </a:tc>
-                <a:tc>
-                  <a:txBody>
-                    <a:bodyPr/>
-                    <a:lstStyle/>
-                    <a:p>
-                      <a:pPr algn="ctr"/>
-                      <a:endParaRPr lang="en-US" dirty="0"/>
-                    </a:p>
-                  </a:txBody>
-                  <a:tcPr anchor="ctr"/>
-                </a:tc>
-                <a:tc>
-                  <a:txBody>
-                    <a:bodyPr/>
-                    <a:lstStyle/>
-                    <a:p>
-                      <a:pPr algn="ctr"/>
-                      <a:endParaRPr lang="en-US" dirty="0"/>
-                    </a:p>
-                  </a:txBody>
-                  <a:tcPr anchor="ctr"/>
-                </a:tc>
-                <a:tc>
-                  <a:txBody>
-                    <a:bodyPr/>
-                    <a:lstStyle/>
-                    <a:p>
-                      <a:pPr algn="ctr"/>
-                      <a:endParaRPr lang="en-US" dirty="0"/>
-                    </a:p>
-                  </a:txBody>
-                  <a:tcPr anchor="ctr"/>
-                </a:tc>
-                <a:tc>
-                  <a:txBody>
-                    <a:bodyPr/>
-                    <a:lstStyle/>
-                    <a:p>
-                      <a:pPr algn="ctr"/>
-                      <a:endParaRPr lang="en-US" dirty="0"/>
-                    </a:p>
-                  </a:txBody>
-                  <a:tcPr anchor="ctr"/>
-                </a:tc>
-                <a:extLst>
-                  <a:ext uri="{0D108BD9-81ED-4DB2-BD59-A6C34878D82A}">
-                    <a16:rowId xmlns:a16="http://schemas.microsoft.com/office/drawing/2014/main" val="461321389"/>
-                  </a:ext>
-                </a:extLst>
-              </a:tr>
-              <a:tr h="505569">
-                <a:tc rowSpan="2">
-                  <a:txBody>
-                    <a:bodyPr/>
-                    <a:lstStyle/>
-                    <a:p>
                       <a:r>
                         <a:rPr lang="en-US" dirty="0"/>
-                        <a:t>BERT (full) </a:t>
-                      </a:r>
-                      <a:r>
-                        <a:rPr lang="en-US" baseline="30000" dirty="0"/>
-                        <a:t>2</a:t>
+                        <a:t>0.34</a:t>
                       </a:r>
                     </a:p>
                   </a:txBody>
@@ -5547,7 +7000,10 @@
                     <a:lstStyle/>
                     <a:p>
                       <a:pPr algn="ctr"/>
-                      <a:endParaRPr lang="en-US" dirty="0"/>
+                      <a:r>
+                        <a:rPr lang="en-US" dirty="0"/>
+                        <a:t>0.33</a:t>
+                      </a:r>
                     </a:p>
                   </a:txBody>
                   <a:tcPr anchor="ctr"/>
@@ -5558,7 +7014,11 @@
                     <a:lstStyle/>
                     <a:p>
                       <a:pPr algn="ctr"/>
-                      <a:endParaRPr lang="en-US"/>
+                      <a:r>
+                        <a:rPr lang="en-US" dirty="0"/>
+                        <a:t>10</a:t>
+                      </a:r>
+                      <a:endParaRPr lang="en-US" baseline="30000" dirty="0"/>
                     </a:p>
                   </a:txBody>
                   <a:tcPr anchor="ctr"/>
@@ -5569,18 +7029,11 @@
                     <a:lstStyle/>
                     <a:p>
                       <a:pPr algn="ctr"/>
-                      <a:endParaRPr lang="en-US"/>
-                    </a:p>
-                  </a:txBody>
-                  <a:tcPr anchor="ctr"/>
-                </a:tc>
-                <a:tc>
-                  <a:txBody>
-                    <a:bodyPr/>
-                    <a:lstStyle/>
-                    <a:p>
-                      <a:pPr algn="ctr"/>
-                      <a:endParaRPr lang="en-US"/>
+                      <a:r>
+                        <a:rPr lang="en-US" dirty="0" err="1"/>
+                        <a:t>na</a:t>
+                      </a:r>
+                      <a:endParaRPr lang="en-US" dirty="0"/>
                     </a:p>
                   </a:txBody>
                   <a:tcPr anchor="ctr"/>
@@ -5605,7 +7058,7 @@
                   </a:ext>
                 </a:extLst>
               </a:tr>
-              <a:tr h="505569">
+              <a:tr h="538611">
                 <a:tc vMerge="1">
                   <a:txBody>
                     <a:bodyPr/>
@@ -5622,7 +7075,10 @@
                     <a:lstStyle/>
                     <a:p>
                       <a:pPr algn="ctr"/>
-                      <a:endParaRPr lang="en-US"/>
+                      <a:r>
+                        <a:rPr lang="en-US" dirty="0"/>
+                        <a:t>0.51</a:t>
+                      </a:r>
                     </a:p>
                   </a:txBody>
                   <a:tcPr anchor="ctr"/>
@@ -5633,7 +7089,10 @@
                     <a:lstStyle/>
                     <a:p>
                       <a:pPr algn="ctr"/>
-                      <a:endParaRPr lang="en-US"/>
+                      <a:r>
+                        <a:rPr lang="en-US" dirty="0"/>
+                        <a:t>0.52</a:t>
+                      </a:r>
                     </a:p>
                   </a:txBody>
                   <a:tcPr anchor="ctr"/>
@@ -5644,7 +7103,10 @@
                     <a:lstStyle/>
                     <a:p>
                       <a:pPr algn="ctr"/>
-                      <a:endParaRPr lang="en-US"/>
+                      <a:r>
+                        <a:rPr lang="en-US" dirty="0"/>
+                        <a:t>160</a:t>
+                      </a:r>
                     </a:p>
                   </a:txBody>
                   <a:tcPr anchor="ctr"/>
@@ -5671,12 +7133,316 @@
                         <a:t>fine-tune</a:t>
                       </a:r>
                     </a:p>
+                    <a:p>
+                      <a:pPr algn="ctr"/>
+                      <a:r>
+                        <a:rPr lang="en-US" sz="1600" dirty="0"/>
+                        <a:t>transformer frozen</a:t>
+                      </a:r>
+                    </a:p>
                   </a:txBody>
                   <a:tcPr anchor="ctr"/>
                 </a:tc>
                 <a:extLst>
                   <a:ext uri="{0D108BD9-81ED-4DB2-BD59-A6C34878D82A}">
                     <a16:rowId xmlns:a16="http://schemas.microsoft.com/office/drawing/2014/main" val="3788428899"/>
+                  </a:ext>
+                </a:extLst>
+              </a:tr>
+              <a:tr h="727125">
+                <a:tc vMerge="1">
+                  <a:txBody>
+                    <a:bodyPr/>
+                    <a:lstStyle/>
+                    <a:p>
+                      <a:endParaRPr lang="en-US"/>
+                    </a:p>
+                  </a:txBody>
+                  <a:tcPr/>
+                </a:tc>
+                <a:tc>
+                  <a:txBody>
+                    <a:bodyPr/>
+                    <a:lstStyle/>
+                    <a:p>
+                      <a:pPr algn="ctr"/>
+                      <a:r>
+                        <a:rPr lang="en-US" dirty="0"/>
+                        <a:t>0.50</a:t>
+                      </a:r>
+                    </a:p>
+                  </a:txBody>
+                  <a:tcPr anchor="ctr"/>
+                </a:tc>
+                <a:tc>
+                  <a:txBody>
+                    <a:bodyPr/>
+                    <a:lstStyle/>
+                    <a:p>
+                      <a:pPr algn="ctr"/>
+                      <a:r>
+                        <a:rPr lang="en-US" dirty="0"/>
+                        <a:t>0.52</a:t>
+                      </a:r>
+                    </a:p>
+                  </a:txBody>
+                  <a:tcPr anchor="ctr"/>
+                </a:tc>
+                <a:tc>
+                  <a:txBody>
+                    <a:bodyPr/>
+                    <a:lstStyle/>
+                    <a:p>
+                      <a:pPr algn="ctr"/>
+                      <a:r>
+                        <a:rPr lang="en-US" dirty="0"/>
+                        <a:t>335</a:t>
+                      </a:r>
+                    </a:p>
+                  </a:txBody>
+                  <a:tcPr anchor="ctr"/>
+                </a:tc>
+                <a:tc>
+                  <a:txBody>
+                    <a:bodyPr/>
+                    <a:lstStyle/>
+                    <a:p>
+                      <a:pPr algn="ctr"/>
+                      <a:endParaRPr lang="en-US" dirty="0"/>
+                    </a:p>
+                  </a:txBody>
+                  <a:tcPr anchor="ctr"/>
+                </a:tc>
+                <a:tc>
+                  <a:txBody>
+                    <a:bodyPr/>
+                    <a:lstStyle/>
+                    <a:p>
+                      <a:pPr algn="ctr"/>
+                      <a:r>
+                        <a:rPr lang="en-US" sz="1600" dirty="0"/>
+                        <a:t>fine-tune</a:t>
+                      </a:r>
+                    </a:p>
+                    <a:p>
+                      <a:pPr algn="ctr"/>
+                      <a:r>
+                        <a:rPr lang="en-US" sz="1600" dirty="0"/>
+                        <a:t>last 1 layer </a:t>
+                      </a:r>
+                      <a:r>
+                        <a:rPr lang="en-US" sz="1600" dirty="0" err="1"/>
+                        <a:t>tform</a:t>
+                      </a:r>
+                      <a:r>
+                        <a:rPr lang="en-US" sz="1600" dirty="0"/>
+                        <a:t> unfrozen</a:t>
+                      </a:r>
+                    </a:p>
+                    <a:p>
+                      <a:pPr algn="ctr"/>
+                      <a:r>
+                        <a:rPr lang="en-US" sz="1600" dirty="0"/>
+                        <a:t>maybe overfitting…</a:t>
+                      </a:r>
+                    </a:p>
+                  </a:txBody>
+                  <a:tcPr anchor="ctr"/>
+                </a:tc>
+                <a:extLst>
+                  <a:ext uri="{0D108BD9-81ED-4DB2-BD59-A6C34878D82A}">
+                    <a16:rowId xmlns:a16="http://schemas.microsoft.com/office/drawing/2014/main" val="3796785061"/>
+                  </a:ext>
+                </a:extLst>
+              </a:tr>
+              <a:tr h="754056">
+                <a:tc vMerge="1">
+                  <a:txBody>
+                    <a:bodyPr/>
+                    <a:lstStyle/>
+                    <a:p>
+                      <a:endParaRPr lang="en-US" baseline="30000" dirty="0"/>
+                    </a:p>
+                  </a:txBody>
+                  <a:tcPr anchor="ctr"/>
+                </a:tc>
+                <a:tc>
+                  <a:txBody>
+                    <a:bodyPr/>
+                    <a:lstStyle/>
+                    <a:p>
+                      <a:pPr algn="ctr"/>
+                      <a:r>
+                        <a:rPr lang="en-US" dirty="0"/>
+                        <a:t>0.24</a:t>
+                      </a:r>
+                    </a:p>
+                  </a:txBody>
+                  <a:tcPr anchor="ctr"/>
+                </a:tc>
+                <a:tc>
+                  <a:txBody>
+                    <a:bodyPr/>
+                    <a:lstStyle/>
+                    <a:p>
+                      <a:pPr algn="ctr"/>
+                      <a:r>
+                        <a:rPr lang="en-US" dirty="0"/>
+                        <a:t>0.29</a:t>
+                      </a:r>
+                    </a:p>
+                  </a:txBody>
+                  <a:tcPr anchor="ctr"/>
+                </a:tc>
+                <a:tc>
+                  <a:txBody>
+                    <a:bodyPr/>
+                    <a:lstStyle/>
+                    <a:p>
+                      <a:pPr algn="ctr"/>
+                      <a:r>
+                        <a:rPr lang="en-US" dirty="0"/>
+                        <a:t>460</a:t>
+                      </a:r>
+                    </a:p>
+                  </a:txBody>
+                  <a:tcPr anchor="ctr"/>
+                </a:tc>
+                <a:tc>
+                  <a:txBody>
+                    <a:bodyPr/>
+                    <a:lstStyle/>
+                    <a:p>
+                      <a:pPr algn="ctr"/>
+                      <a:endParaRPr lang="en-US" dirty="0"/>
+                    </a:p>
+                  </a:txBody>
+                  <a:tcPr anchor="ctr"/>
+                </a:tc>
+                <a:tc>
+                  <a:txBody>
+                    <a:bodyPr/>
+                    <a:lstStyle/>
+                    <a:p>
+                      <a:pPr algn="ctr"/>
+                      <a:r>
+                        <a:rPr lang="en-US" dirty="0"/>
+                        <a:t>fine-tune</a:t>
+                      </a:r>
+                    </a:p>
+                    <a:p>
+                      <a:pPr algn="ctr"/>
+                      <a:r>
+                        <a:rPr lang="en-US" sz="1600" dirty="0"/>
+                        <a:t>last 2 layers </a:t>
+                      </a:r>
+                      <a:r>
+                        <a:rPr lang="en-US" sz="1600" dirty="0" err="1"/>
+                        <a:t>tform</a:t>
+                      </a:r>
+                      <a:r>
+                        <a:rPr lang="en-US" sz="1600" dirty="0"/>
+                        <a:t> unfrozen</a:t>
+                      </a:r>
+                    </a:p>
+                    <a:p>
+                      <a:pPr algn="ctr"/>
+                      <a:r>
+                        <a:rPr lang="en-US" sz="1600" dirty="0"/>
+                        <a:t>maybe overfitting…</a:t>
+                      </a:r>
+                    </a:p>
+                  </a:txBody>
+                  <a:tcPr anchor="ctr"/>
+                </a:tc>
+                <a:extLst>
+                  <a:ext uri="{0D108BD9-81ED-4DB2-BD59-A6C34878D82A}">
+                    <a16:rowId xmlns:a16="http://schemas.microsoft.com/office/drawing/2014/main" val="3068902763"/>
+                  </a:ext>
+                </a:extLst>
+              </a:tr>
+              <a:tr h="754056">
+                <a:tc vMerge="1">
+                  <a:txBody>
+                    <a:bodyPr/>
+                    <a:lstStyle/>
+                    <a:p>
+                      <a:endParaRPr lang="en-US" baseline="30000" dirty="0"/>
+                    </a:p>
+                  </a:txBody>
+                  <a:tcPr anchor="ctr"/>
+                </a:tc>
+                <a:tc>
+                  <a:txBody>
+                    <a:bodyPr/>
+                    <a:lstStyle/>
+                    <a:p>
+                      <a:pPr algn="ctr"/>
+                      <a:r>
+                        <a:rPr lang="en-US" dirty="0"/>
+                        <a:t>0.05</a:t>
+                      </a:r>
+                    </a:p>
+                  </a:txBody>
+                  <a:tcPr anchor="ctr"/>
+                </a:tc>
+                <a:tc>
+                  <a:txBody>
+                    <a:bodyPr/>
+                    <a:lstStyle/>
+                    <a:p>
+                      <a:pPr algn="ctr"/>
+                      <a:r>
+                        <a:rPr lang="en-US"/>
+                        <a:t>0.18</a:t>
+                      </a:r>
+                      <a:endParaRPr lang="en-US" dirty="0"/>
+                    </a:p>
+                  </a:txBody>
+                  <a:tcPr anchor="ctr"/>
+                </a:tc>
+                <a:tc>
+                  <a:txBody>
+                    <a:bodyPr/>
+                    <a:lstStyle/>
+                    <a:p>
+                      <a:pPr algn="ctr"/>
+                      <a:r>
+                        <a:rPr lang="en-US" dirty="0"/>
+                        <a:t>675</a:t>
+                      </a:r>
+                    </a:p>
+                  </a:txBody>
+                  <a:tcPr anchor="ctr"/>
+                </a:tc>
+                <a:tc>
+                  <a:txBody>
+                    <a:bodyPr/>
+                    <a:lstStyle/>
+                    <a:p>
+                      <a:pPr algn="ctr"/>
+                      <a:endParaRPr lang="en-US" dirty="0"/>
+                    </a:p>
+                  </a:txBody>
+                  <a:tcPr anchor="ctr"/>
+                </a:tc>
+                <a:tc>
+                  <a:txBody>
+                    <a:bodyPr/>
+                    <a:lstStyle/>
+                    <a:p>
+                      <a:pPr algn="ctr"/>
+                      <a:r>
+                        <a:rPr lang="en-US" sz="1600" dirty="0"/>
+                        <a:t>unfreeze last 3 layers</a:t>
+                      </a:r>
+                    </a:p>
+                  </a:txBody>
+                  <a:tcPr anchor="ctr"/>
+                </a:tc>
+                <a:extLst>
+                  <a:ext uri="{0D108BD9-81ED-4DB2-BD59-A6C34878D82A}">
+                    <a16:rowId xmlns:a16="http://schemas.microsoft.com/office/drawing/2014/main" val="3315586637"/>
                   </a:ext>
                 </a:extLst>
               </a:tr>
@@ -5698,8 +7464,8 @@
         </p:nvSpPr>
         <p:spPr>
           <a:xfrm>
-            <a:off x="389614" y="5534108"/>
-            <a:ext cx="8333435" cy="646331"/>
+            <a:off x="389614" y="6344991"/>
+            <a:ext cx="10016781" cy="369332"/>
           </a:xfrm>
           <a:prstGeom prst="rect">
             <a:avLst/>
@@ -5717,23 +7483,6 @@
             </a:pPr>
             <a:r>
               <a:rPr lang="en-US" dirty="0"/>
-              <a:t>Train the fine-tune BERT model from scratch (no pre-training) on </a:t>
-            </a:r>
-            <a:r>
-              <a:rPr lang="en-US" dirty="0" err="1"/>
-              <a:t>scFV</a:t>
-            </a:r>
-            <a:r>
-              <a:rPr lang="en-US" dirty="0"/>
-              <a:t> train data</a:t>
-            </a:r>
-          </a:p>
-          <a:p>
-            <a:pPr marL="342900" indent="-342900">
-              <a:buAutoNum type="arabicPeriod"/>
-            </a:pPr>
-            <a:r>
-              <a:rPr lang="en-US" dirty="0"/>
               <a:t>Pre-train BERT on OAS dataset, then fine-tune on </a:t>
             </a:r>
             <a:r>
@@ -5742,8 +7491,15 @@
             </a:r>
             <a:r>
               <a:rPr lang="en-US" dirty="0"/>
-              <a:t> train data</a:t>
-            </a:r>
+              <a:t> train data (OAS dataset is </a:t>
+            </a:r>
+            <a:r>
+              <a:rPr lang="en-US" b="0" dirty="0">
+                <a:effectLst/>
+              </a:rPr>
+              <a:t>18061315 rows)</a:t>
+            </a:r>
+            <a:endParaRPr lang="en-US" dirty="0"/>
           </a:p>
         </p:txBody>
       </p:sp>
@@ -5760,7 +7516,7 @@
 </p:sld>
 </file>
 
-<file path=ppt/slides/slide13.xml><?xml version="1.0" encoding="utf-8"?>
+<file path=ppt/slides/slide15.xml><?xml version="1.0" encoding="utf-8"?>
 <p:sld xmlns:a="http://schemas.openxmlformats.org/drawingml/2006/main" xmlns:r="http://schemas.openxmlformats.org/officeDocument/2006/relationships" xmlns:p="http://schemas.openxmlformats.org/presentationml/2006/main">
   <p:cSld>
     <p:spTree>
@@ -6163,7 +7919,7 @@
 </p:sld>
 </file>
 
-<file path=ppt/slides/slide14.xml><?xml version="1.0" encoding="utf-8"?>
+<file path=ppt/slides/slide16.xml><?xml version="1.0" encoding="utf-8"?>
 <p:sld xmlns:a="http://schemas.openxmlformats.org/drawingml/2006/main" xmlns:r="http://schemas.openxmlformats.org/officeDocument/2006/relationships" xmlns:p="http://schemas.openxmlformats.org/presentationml/2006/main">
   <p:cSld>
     <p:spTree>
@@ -6551,7 +8307,7 @@
 </p:sld>
 </file>
 
-<file path=ppt/slides/slide15.xml><?xml version="1.0" encoding="utf-8"?>
+<file path=ppt/slides/slide17.xml><?xml version="1.0" encoding="utf-8"?>
 <p:sld xmlns:a="http://schemas.openxmlformats.org/drawingml/2006/main" xmlns:r="http://schemas.openxmlformats.org/officeDocument/2006/relationships" xmlns:p="http://schemas.openxmlformats.org/presentationml/2006/main">
   <p:cSld>
     <p:spTree>
@@ -6936,7 +8692,7 @@
 </p:sld>
 </file>
 
-<file path=ppt/slides/slide16.xml><?xml version="1.0" encoding="utf-8"?>
+<file path=ppt/slides/slide18.xml><?xml version="1.0" encoding="utf-8"?>
 <p:sld xmlns:a="http://schemas.openxmlformats.org/drawingml/2006/main" xmlns:r="http://schemas.openxmlformats.org/officeDocument/2006/relationships" xmlns:p="http://schemas.openxmlformats.org/presentationml/2006/main">
   <p:cSld>
     <p:spTree>
@@ -8627,7 +10383,7 @@
 </p:sld>
 </file>
 
-<file path=ppt/slides/slide17.xml><?xml version="1.0" encoding="utf-8"?>
+<file path=ppt/slides/slide19.xml><?xml version="1.0" encoding="utf-8"?>
 <p:sld xmlns:a="http://schemas.openxmlformats.org/drawingml/2006/main" xmlns:r="http://schemas.openxmlformats.org/officeDocument/2006/relationships" xmlns:p="http://schemas.openxmlformats.org/presentationml/2006/main">
   <p:cSld>
     <p:spTree>
@@ -9306,7 +11062,386 @@
 </p:sld>
 </file>
 
-<file path=ppt/slides/slide18.xml><?xml version="1.0" encoding="utf-8"?>
+<file path=ppt/slides/slide2.xml><?xml version="1.0" encoding="utf-8"?>
+<p:sld xmlns:a="http://schemas.openxmlformats.org/drawingml/2006/main" xmlns:r="http://schemas.openxmlformats.org/officeDocument/2006/relationships" xmlns:p="http://schemas.openxmlformats.org/presentationml/2006/main">
+  <p:cSld>
+    <p:spTree>
+      <p:nvGrpSpPr>
+        <p:cNvPr id="1" name=""/>
+        <p:cNvGrpSpPr/>
+        <p:nvPr/>
+      </p:nvGrpSpPr>
+      <p:grpSpPr>
+        <a:xfrm>
+          <a:off x="0" y="0"/>
+          <a:ext cx="0" cy="0"/>
+          <a:chOff x="0" y="0"/>
+          <a:chExt cx="0" cy="0"/>
+        </a:xfrm>
+      </p:grpSpPr>
+      <p:sp>
+        <p:nvSpPr>
+          <p:cNvPr id="2" name="TextBox 1">
+            <a:extLst>
+              <a:ext uri="{FF2B5EF4-FFF2-40B4-BE49-F238E27FC236}">
+                <a16:creationId xmlns:a16="http://schemas.microsoft.com/office/drawing/2014/main" id="{E758D5CD-18BF-EE2E-47E2-E832CEE7988E}"/>
+              </a:ext>
+            </a:extLst>
+          </p:cNvPr>
+          <p:cNvSpPr txBox="1"/>
+          <p:nvPr/>
+        </p:nvSpPr>
+        <p:spPr>
+          <a:xfrm>
+            <a:off x="140127" y="221836"/>
+            <a:ext cx="3472810" cy="461665"/>
+          </a:xfrm>
+          <a:prstGeom prst="rect">
+            <a:avLst/>
+          </a:prstGeom>
+          <a:noFill/>
+        </p:spPr>
+        <p:txBody>
+          <a:bodyPr wrap="none" rtlCol="0">
+            <a:spAutoFit/>
+          </a:bodyPr>
+          <a:lstStyle/>
+          <a:p>
+            <a:r>
+              <a:rPr lang="en-US" sz="2400" dirty="0"/>
+              <a:t>Data set analysis – part 1</a:t>
+            </a:r>
+          </a:p>
+        </p:txBody>
+      </p:sp>
+      <p:sp>
+        <p:nvSpPr>
+          <p:cNvPr id="5" name="TextBox 4">
+            <a:extLst>
+              <a:ext uri="{FF2B5EF4-FFF2-40B4-BE49-F238E27FC236}">
+                <a16:creationId xmlns:a16="http://schemas.microsoft.com/office/drawing/2014/main" id="{9D21562E-004E-F27D-F7B0-73BC9E3A90A1}"/>
+              </a:ext>
+            </a:extLst>
+          </p:cNvPr>
+          <p:cNvSpPr txBox="1"/>
+          <p:nvPr/>
+        </p:nvSpPr>
+        <p:spPr>
+          <a:xfrm>
+            <a:off x="223864" y="961394"/>
+            <a:ext cx="7074915" cy="2800767"/>
+          </a:xfrm>
+          <a:prstGeom prst="rect">
+            <a:avLst/>
+          </a:prstGeom>
+          <a:noFill/>
+        </p:spPr>
+        <p:txBody>
+          <a:bodyPr wrap="square">
+            <a:spAutoFit/>
+          </a:bodyPr>
+          <a:lstStyle/>
+          <a:p>
+            <a:r>
+              <a:rPr lang="en-US" sz="1600" b="1" dirty="0" err="1">
+                <a:effectLst/>
+              </a:rPr>
+              <a:t>alphaseq_data_train.csv</a:t>
+            </a:r>
+            <a:endParaRPr lang="en-US" sz="1600" b="1" dirty="0">
+              <a:effectLst/>
+            </a:endParaRPr>
+          </a:p>
+          <a:p>
+            <a:pPr marL="285750" indent="-285750">
+              <a:buFont typeface="Arial" panose="020B0604020202020204" pitchFamily="34" charset="0"/>
+              <a:buChar char="•"/>
+            </a:pPr>
+            <a:r>
+              <a:rPr lang="en-US" sz="1600" b="0" dirty="0">
+                <a:effectLst/>
+              </a:rPr>
+              <a:t>29199 unique aa sequences</a:t>
+            </a:r>
+          </a:p>
+          <a:p>
+            <a:pPr marL="742950" lvl="1" indent="-285750">
+              <a:buFont typeface="Arial" panose="020B0604020202020204" pitchFamily="34" charset="0"/>
+              <a:buChar char="•"/>
+            </a:pPr>
+            <a:r>
+              <a:rPr lang="en-US" sz="1600" dirty="0"/>
+              <a:t>For duplicate entries use the mean of their </a:t>
+            </a:r>
+            <a:r>
+              <a:rPr lang="en-US" sz="1600" dirty="0" err="1"/>
+              <a:t>Kd</a:t>
+            </a:r>
+            <a:r>
+              <a:rPr lang="en-US" sz="1600" dirty="0"/>
+              <a:t> values</a:t>
+            </a:r>
+            <a:endParaRPr lang="en-US" sz="1600" b="0" dirty="0">
+              <a:effectLst/>
+            </a:endParaRPr>
+          </a:p>
+          <a:p>
+            <a:pPr marL="285750" indent="-285750">
+              <a:buFont typeface="Arial" panose="020B0604020202020204" pitchFamily="34" charset="0"/>
+              <a:buChar char="•"/>
+            </a:pPr>
+            <a:r>
+              <a:rPr lang="en-US" sz="1600" b="0" dirty="0">
+                <a:effectLst/>
+              </a:rPr>
+              <a:t>remove all entries with NANs for </a:t>
+            </a:r>
+            <a:r>
+              <a:rPr lang="en-US" sz="1600" b="0" dirty="0" err="1">
+                <a:effectLst/>
+              </a:rPr>
+              <a:t>Kd</a:t>
+            </a:r>
+            <a:endParaRPr lang="en-US" sz="1600" b="0" dirty="0">
+              <a:effectLst/>
+            </a:endParaRPr>
+          </a:p>
+          <a:p>
+            <a:pPr marL="285750" indent="-285750">
+              <a:buFont typeface="Arial" panose="020B0604020202020204" pitchFamily="34" charset="0"/>
+              <a:buChar char="•"/>
+            </a:pPr>
+            <a:r>
+              <a:rPr lang="en-US" sz="1600" b="0" dirty="0">
+                <a:effectLst/>
+              </a:rPr>
+              <a:t>all sequences are same length: 246 residues</a:t>
+            </a:r>
+          </a:p>
+          <a:p>
+            <a:pPr marL="285750" indent="-285750">
+              <a:buFont typeface="Arial" panose="020B0604020202020204" pitchFamily="34" charset="0"/>
+              <a:buChar char="•"/>
+            </a:pPr>
+            <a:r>
+              <a:rPr lang="en-US" sz="1600" dirty="0"/>
+              <a:t>plot distribution of </a:t>
+            </a:r>
+            <a:r>
+              <a:rPr lang="en-US" sz="1600" dirty="0" err="1"/>
+              <a:t>Kd</a:t>
+            </a:r>
+            <a:r>
+              <a:rPr lang="en-US" sz="1600" dirty="0"/>
+              <a:t> values</a:t>
+            </a:r>
+          </a:p>
+          <a:p>
+            <a:pPr marL="742950" lvl="1" indent="-285750">
+              <a:buFont typeface="Arial" panose="020B0604020202020204" pitchFamily="34" charset="0"/>
+              <a:buChar char="•"/>
+            </a:pPr>
+            <a:r>
+              <a:rPr lang="en-US" sz="1600" dirty="0"/>
+              <a:t>interesting bimodal distribution</a:t>
+            </a:r>
+          </a:p>
+          <a:p>
+            <a:pPr marL="742950" lvl="1" indent="-285750">
+              <a:buFont typeface="Arial" panose="020B0604020202020204" pitchFamily="34" charset="0"/>
+              <a:buChar char="•"/>
+            </a:pPr>
+            <a:r>
+              <a:rPr lang="en-US" sz="1600" dirty="0"/>
+              <a:t>diff between the two peaks is ~0.25 kcal/mol </a:t>
+            </a:r>
+            <a:r>
+              <a:rPr lang="en-US" sz="1600" dirty="0">
+                <a:latin typeface="Symbol" pitchFamily="2" charset="2"/>
+              </a:rPr>
+              <a:t>D</a:t>
+            </a:r>
+            <a:r>
+              <a:rPr lang="en-US" sz="1600" dirty="0"/>
+              <a:t>G</a:t>
+            </a:r>
+          </a:p>
+          <a:p>
+            <a:pPr marL="285750" indent="-285750">
+              <a:buFont typeface="Arial" panose="020B0604020202020204" pitchFamily="34" charset="0"/>
+              <a:buChar char="•"/>
+            </a:pPr>
+            <a:r>
+              <a:rPr lang="en-US" sz="1600" b="0" dirty="0">
+                <a:effectLst/>
+              </a:rPr>
+              <a:t>plot the variability at each residue position in the sequence</a:t>
+            </a:r>
+          </a:p>
+          <a:p>
+            <a:pPr marL="742950" lvl="1" indent="-285750">
+              <a:buFont typeface="Arial" panose="020B0604020202020204" pitchFamily="34" charset="0"/>
+              <a:buChar char="•"/>
+            </a:pPr>
+            <a:r>
+              <a:rPr lang="en-US" sz="1600" dirty="0"/>
+              <a:t>80 residue region (position 29 to 108) has all the mutations</a:t>
+            </a:r>
+          </a:p>
+          <a:p>
+            <a:pPr marL="742950" lvl="1" indent="-285750">
+              <a:buFont typeface="Arial" panose="020B0604020202020204" pitchFamily="34" charset="0"/>
+              <a:buChar char="•"/>
+            </a:pPr>
+            <a:r>
+              <a:rPr lang="en-US" sz="1600" dirty="0"/>
+              <a:t>this is likely a CDR region</a:t>
+            </a:r>
+            <a:endParaRPr lang="en-US" sz="1600" b="0" dirty="0">
+              <a:effectLst/>
+            </a:endParaRPr>
+          </a:p>
+        </p:txBody>
+      </p:sp>
+      <p:pic>
+        <p:nvPicPr>
+          <p:cNvPr id="6" name="Picture 5">
+            <a:extLst>
+              <a:ext uri="{FF2B5EF4-FFF2-40B4-BE49-F238E27FC236}">
+                <a16:creationId xmlns:a16="http://schemas.microsoft.com/office/drawing/2014/main" id="{D17F21C1-D1A7-E53B-97D8-88CD6C8728DA}"/>
+              </a:ext>
+            </a:extLst>
+          </p:cNvPr>
+          <p:cNvPicPr>
+            <a:picLocks noChangeAspect="1"/>
+          </p:cNvPicPr>
+          <p:nvPr/>
+        </p:nvPicPr>
+        <p:blipFill>
+          <a:blip r:embed="rId2"/>
+          <a:stretch>
+            <a:fillRect/>
+          </a:stretch>
+        </p:blipFill>
+        <p:spPr>
+          <a:xfrm>
+            <a:off x="8015617" y="221836"/>
+            <a:ext cx="3683000" cy="2870200"/>
+          </a:xfrm>
+          <a:prstGeom prst="rect">
+            <a:avLst/>
+          </a:prstGeom>
+        </p:spPr>
+      </p:pic>
+      <p:sp>
+        <p:nvSpPr>
+          <p:cNvPr id="7" name="TextBox 6">
+            <a:extLst>
+              <a:ext uri="{FF2B5EF4-FFF2-40B4-BE49-F238E27FC236}">
+                <a16:creationId xmlns:a16="http://schemas.microsoft.com/office/drawing/2014/main" id="{6F74E53A-581B-C458-F657-00CE2DE6B2CE}"/>
+              </a:ext>
+            </a:extLst>
+          </p:cNvPr>
+          <p:cNvSpPr txBox="1"/>
+          <p:nvPr/>
+        </p:nvSpPr>
+        <p:spPr>
+          <a:xfrm>
+            <a:off x="8556321" y="3092036"/>
+            <a:ext cx="3288946" cy="523220"/>
+          </a:xfrm>
+          <a:prstGeom prst="rect">
+            <a:avLst/>
+          </a:prstGeom>
+          <a:noFill/>
+        </p:spPr>
+        <p:txBody>
+          <a:bodyPr wrap="square" rtlCol="0">
+            <a:spAutoFit/>
+          </a:bodyPr>
+          <a:lstStyle/>
+          <a:p>
+            <a:r>
+              <a:rPr lang="en-US" sz="1400" dirty="0"/>
+              <a:t>bimodal-like distribution is similar to that reported in the Nature paper</a:t>
+            </a:r>
+          </a:p>
+        </p:txBody>
+      </p:sp>
+      <p:pic>
+        <p:nvPicPr>
+          <p:cNvPr id="8" name="Picture 7">
+            <a:extLst>
+              <a:ext uri="{FF2B5EF4-FFF2-40B4-BE49-F238E27FC236}">
+                <a16:creationId xmlns:a16="http://schemas.microsoft.com/office/drawing/2014/main" id="{6A5B62CE-2B72-1D08-0C96-9BE8BE846DFD}"/>
+              </a:ext>
+            </a:extLst>
+          </p:cNvPr>
+          <p:cNvPicPr>
+            <a:picLocks noChangeAspect="1"/>
+          </p:cNvPicPr>
+          <p:nvPr/>
+        </p:nvPicPr>
+        <p:blipFill>
+          <a:blip r:embed="rId3"/>
+          <a:stretch>
+            <a:fillRect/>
+          </a:stretch>
+        </p:blipFill>
+        <p:spPr>
+          <a:xfrm>
+            <a:off x="2078121" y="4196152"/>
+            <a:ext cx="3366402" cy="2454215"/>
+          </a:xfrm>
+          <a:prstGeom prst="rect">
+            <a:avLst/>
+          </a:prstGeom>
+        </p:spPr>
+      </p:pic>
+      <p:pic>
+        <p:nvPicPr>
+          <p:cNvPr id="9" name="Picture 8">
+            <a:extLst>
+              <a:ext uri="{FF2B5EF4-FFF2-40B4-BE49-F238E27FC236}">
+                <a16:creationId xmlns:a16="http://schemas.microsoft.com/office/drawing/2014/main" id="{3BFBCF0B-3639-7E22-34EB-3B5317FFCBF8}"/>
+              </a:ext>
+            </a:extLst>
+          </p:cNvPr>
+          <p:cNvPicPr>
+            <a:picLocks noChangeAspect="1"/>
+          </p:cNvPicPr>
+          <p:nvPr/>
+        </p:nvPicPr>
+        <p:blipFill>
+          <a:blip r:embed="rId4"/>
+          <a:stretch>
+            <a:fillRect/>
+          </a:stretch>
+        </p:blipFill>
+        <p:spPr>
+          <a:xfrm>
+            <a:off x="6631692" y="3893149"/>
+            <a:ext cx="3225425" cy="2757218"/>
+          </a:xfrm>
+          <a:prstGeom prst="rect">
+            <a:avLst/>
+          </a:prstGeom>
+        </p:spPr>
+      </p:pic>
+    </p:spTree>
+    <p:extLst>
+      <p:ext uri="{BB962C8B-B14F-4D97-AF65-F5344CB8AC3E}">
+        <p14:creationId xmlns:p14="http://schemas.microsoft.com/office/powerpoint/2010/main" val="2470448845"/>
+      </p:ext>
+    </p:extLst>
+  </p:cSld>
+  <p:clrMapOvr>
+    <a:masterClrMapping/>
+  </p:clrMapOvr>
+</p:sld>
+</file>
+
+<file path=ppt/slides/slide20.xml><?xml version="1.0" encoding="utf-8"?>
 <p:sld xmlns:a="http://schemas.openxmlformats.org/drawingml/2006/main" xmlns:r="http://schemas.openxmlformats.org/officeDocument/2006/relationships" xmlns:p="http://schemas.openxmlformats.org/presentationml/2006/main">
   <p:cSld>
     <p:spTree>
@@ -10534,7 +12669,7 @@
 </p:sld>
 </file>
 
-<file path=ppt/slides/slide19.xml><?xml version="1.0" encoding="utf-8"?>
+<file path=ppt/slides/slide21.xml><?xml version="1.0" encoding="utf-8"?>
 <p:sld xmlns:a="http://schemas.openxmlformats.org/drawingml/2006/main" xmlns:r="http://schemas.openxmlformats.org/officeDocument/2006/relationships" xmlns:p="http://schemas.openxmlformats.org/presentationml/2006/main">
   <p:cSld>
     <p:spTree>
@@ -13357,386 +15492,7 @@
 </p:sld>
 </file>
 
-<file path=ppt/slides/slide2.xml><?xml version="1.0" encoding="utf-8"?>
-<p:sld xmlns:a="http://schemas.openxmlformats.org/drawingml/2006/main" xmlns:r="http://schemas.openxmlformats.org/officeDocument/2006/relationships" xmlns:p="http://schemas.openxmlformats.org/presentationml/2006/main">
-  <p:cSld>
-    <p:spTree>
-      <p:nvGrpSpPr>
-        <p:cNvPr id="1" name=""/>
-        <p:cNvGrpSpPr/>
-        <p:nvPr/>
-      </p:nvGrpSpPr>
-      <p:grpSpPr>
-        <a:xfrm>
-          <a:off x="0" y="0"/>
-          <a:ext cx="0" cy="0"/>
-          <a:chOff x="0" y="0"/>
-          <a:chExt cx="0" cy="0"/>
-        </a:xfrm>
-      </p:grpSpPr>
-      <p:sp>
-        <p:nvSpPr>
-          <p:cNvPr id="2" name="TextBox 1">
-            <a:extLst>
-              <a:ext uri="{FF2B5EF4-FFF2-40B4-BE49-F238E27FC236}">
-                <a16:creationId xmlns:a16="http://schemas.microsoft.com/office/drawing/2014/main" id="{E758D5CD-18BF-EE2E-47E2-E832CEE7988E}"/>
-              </a:ext>
-            </a:extLst>
-          </p:cNvPr>
-          <p:cNvSpPr txBox="1"/>
-          <p:nvPr/>
-        </p:nvSpPr>
-        <p:spPr>
-          <a:xfrm>
-            <a:off x="140127" y="221836"/>
-            <a:ext cx="3472810" cy="461665"/>
-          </a:xfrm>
-          <a:prstGeom prst="rect">
-            <a:avLst/>
-          </a:prstGeom>
-          <a:noFill/>
-        </p:spPr>
-        <p:txBody>
-          <a:bodyPr wrap="none" rtlCol="0">
-            <a:spAutoFit/>
-          </a:bodyPr>
-          <a:lstStyle/>
-          <a:p>
-            <a:r>
-              <a:rPr lang="en-US" sz="2400" dirty="0"/>
-              <a:t>Data set analysis – part 1</a:t>
-            </a:r>
-          </a:p>
-        </p:txBody>
-      </p:sp>
-      <p:sp>
-        <p:nvSpPr>
-          <p:cNvPr id="5" name="TextBox 4">
-            <a:extLst>
-              <a:ext uri="{FF2B5EF4-FFF2-40B4-BE49-F238E27FC236}">
-                <a16:creationId xmlns:a16="http://schemas.microsoft.com/office/drawing/2014/main" id="{9D21562E-004E-F27D-F7B0-73BC9E3A90A1}"/>
-              </a:ext>
-            </a:extLst>
-          </p:cNvPr>
-          <p:cNvSpPr txBox="1"/>
-          <p:nvPr/>
-        </p:nvSpPr>
-        <p:spPr>
-          <a:xfrm>
-            <a:off x="223864" y="961394"/>
-            <a:ext cx="7074915" cy="2800767"/>
-          </a:xfrm>
-          <a:prstGeom prst="rect">
-            <a:avLst/>
-          </a:prstGeom>
-          <a:noFill/>
-        </p:spPr>
-        <p:txBody>
-          <a:bodyPr wrap="square">
-            <a:spAutoFit/>
-          </a:bodyPr>
-          <a:lstStyle/>
-          <a:p>
-            <a:r>
-              <a:rPr lang="en-US" sz="1600" b="1" dirty="0" err="1">
-                <a:effectLst/>
-              </a:rPr>
-              <a:t>alphaseq_data_train.csv</a:t>
-            </a:r>
-            <a:endParaRPr lang="en-US" sz="1600" b="1" dirty="0">
-              <a:effectLst/>
-            </a:endParaRPr>
-          </a:p>
-          <a:p>
-            <a:pPr marL="285750" indent="-285750">
-              <a:buFont typeface="Arial" panose="020B0604020202020204" pitchFamily="34" charset="0"/>
-              <a:buChar char="•"/>
-            </a:pPr>
-            <a:r>
-              <a:rPr lang="en-US" sz="1600" b="0" dirty="0">
-                <a:effectLst/>
-              </a:rPr>
-              <a:t>29199 unique aa sequences</a:t>
-            </a:r>
-          </a:p>
-          <a:p>
-            <a:pPr marL="742950" lvl="1" indent="-285750">
-              <a:buFont typeface="Arial" panose="020B0604020202020204" pitchFamily="34" charset="0"/>
-              <a:buChar char="•"/>
-            </a:pPr>
-            <a:r>
-              <a:rPr lang="en-US" sz="1600" dirty="0"/>
-              <a:t>For duplicate entries use the mean of their </a:t>
-            </a:r>
-            <a:r>
-              <a:rPr lang="en-US" sz="1600" dirty="0" err="1"/>
-              <a:t>Kd</a:t>
-            </a:r>
-            <a:r>
-              <a:rPr lang="en-US" sz="1600" dirty="0"/>
-              <a:t> values</a:t>
-            </a:r>
-            <a:endParaRPr lang="en-US" sz="1600" b="0" dirty="0">
-              <a:effectLst/>
-            </a:endParaRPr>
-          </a:p>
-          <a:p>
-            <a:pPr marL="285750" indent="-285750">
-              <a:buFont typeface="Arial" panose="020B0604020202020204" pitchFamily="34" charset="0"/>
-              <a:buChar char="•"/>
-            </a:pPr>
-            <a:r>
-              <a:rPr lang="en-US" sz="1600" b="0" dirty="0">
-                <a:effectLst/>
-              </a:rPr>
-              <a:t>remove all entries with NANs for </a:t>
-            </a:r>
-            <a:r>
-              <a:rPr lang="en-US" sz="1600" b="0" dirty="0" err="1">
-                <a:effectLst/>
-              </a:rPr>
-              <a:t>Kd</a:t>
-            </a:r>
-            <a:endParaRPr lang="en-US" sz="1600" b="0" dirty="0">
-              <a:effectLst/>
-            </a:endParaRPr>
-          </a:p>
-          <a:p>
-            <a:pPr marL="285750" indent="-285750">
-              <a:buFont typeface="Arial" panose="020B0604020202020204" pitchFamily="34" charset="0"/>
-              <a:buChar char="•"/>
-            </a:pPr>
-            <a:r>
-              <a:rPr lang="en-US" sz="1600" b="0" dirty="0">
-                <a:effectLst/>
-              </a:rPr>
-              <a:t>all sequences are same length: 246 residues</a:t>
-            </a:r>
-          </a:p>
-          <a:p>
-            <a:pPr marL="285750" indent="-285750">
-              <a:buFont typeface="Arial" panose="020B0604020202020204" pitchFamily="34" charset="0"/>
-              <a:buChar char="•"/>
-            </a:pPr>
-            <a:r>
-              <a:rPr lang="en-US" sz="1600" dirty="0"/>
-              <a:t>plot distribution of </a:t>
-            </a:r>
-            <a:r>
-              <a:rPr lang="en-US" sz="1600" dirty="0" err="1"/>
-              <a:t>Kd</a:t>
-            </a:r>
-            <a:r>
-              <a:rPr lang="en-US" sz="1600" dirty="0"/>
-              <a:t> values</a:t>
-            </a:r>
-          </a:p>
-          <a:p>
-            <a:pPr marL="742950" lvl="1" indent="-285750">
-              <a:buFont typeface="Arial" panose="020B0604020202020204" pitchFamily="34" charset="0"/>
-              <a:buChar char="•"/>
-            </a:pPr>
-            <a:r>
-              <a:rPr lang="en-US" sz="1600" dirty="0"/>
-              <a:t>interesting bimodal distribution</a:t>
-            </a:r>
-          </a:p>
-          <a:p>
-            <a:pPr marL="742950" lvl="1" indent="-285750">
-              <a:buFont typeface="Arial" panose="020B0604020202020204" pitchFamily="34" charset="0"/>
-              <a:buChar char="•"/>
-            </a:pPr>
-            <a:r>
-              <a:rPr lang="en-US" sz="1600" dirty="0"/>
-              <a:t>diff between the two peaks is ~0.25 kcal/mol </a:t>
-            </a:r>
-            <a:r>
-              <a:rPr lang="en-US" sz="1600" dirty="0">
-                <a:latin typeface="Symbol" pitchFamily="2" charset="2"/>
-              </a:rPr>
-              <a:t>D</a:t>
-            </a:r>
-            <a:r>
-              <a:rPr lang="en-US" sz="1600" dirty="0"/>
-              <a:t>G</a:t>
-            </a:r>
-          </a:p>
-          <a:p>
-            <a:pPr marL="285750" indent="-285750">
-              <a:buFont typeface="Arial" panose="020B0604020202020204" pitchFamily="34" charset="0"/>
-              <a:buChar char="•"/>
-            </a:pPr>
-            <a:r>
-              <a:rPr lang="en-US" sz="1600" b="0" dirty="0">
-                <a:effectLst/>
-              </a:rPr>
-              <a:t>plot the variability at each residue position in the sequence</a:t>
-            </a:r>
-          </a:p>
-          <a:p>
-            <a:pPr marL="742950" lvl="1" indent="-285750">
-              <a:buFont typeface="Arial" panose="020B0604020202020204" pitchFamily="34" charset="0"/>
-              <a:buChar char="•"/>
-            </a:pPr>
-            <a:r>
-              <a:rPr lang="en-US" sz="1600" dirty="0"/>
-              <a:t>80 residue region (position 29 to 108) has all the mutations</a:t>
-            </a:r>
-          </a:p>
-          <a:p>
-            <a:pPr marL="742950" lvl="1" indent="-285750">
-              <a:buFont typeface="Arial" panose="020B0604020202020204" pitchFamily="34" charset="0"/>
-              <a:buChar char="•"/>
-            </a:pPr>
-            <a:r>
-              <a:rPr lang="en-US" sz="1600" dirty="0"/>
-              <a:t>this is likely a CDR region</a:t>
-            </a:r>
-            <a:endParaRPr lang="en-US" sz="1600" b="0" dirty="0">
-              <a:effectLst/>
-            </a:endParaRPr>
-          </a:p>
-        </p:txBody>
-      </p:sp>
-      <p:pic>
-        <p:nvPicPr>
-          <p:cNvPr id="6" name="Picture 5">
-            <a:extLst>
-              <a:ext uri="{FF2B5EF4-FFF2-40B4-BE49-F238E27FC236}">
-                <a16:creationId xmlns:a16="http://schemas.microsoft.com/office/drawing/2014/main" id="{D17F21C1-D1A7-E53B-97D8-88CD6C8728DA}"/>
-              </a:ext>
-            </a:extLst>
-          </p:cNvPr>
-          <p:cNvPicPr>
-            <a:picLocks noChangeAspect="1"/>
-          </p:cNvPicPr>
-          <p:nvPr/>
-        </p:nvPicPr>
-        <p:blipFill>
-          <a:blip r:embed="rId2"/>
-          <a:stretch>
-            <a:fillRect/>
-          </a:stretch>
-        </p:blipFill>
-        <p:spPr>
-          <a:xfrm>
-            <a:off x="8015617" y="221836"/>
-            <a:ext cx="3683000" cy="2870200"/>
-          </a:xfrm>
-          <a:prstGeom prst="rect">
-            <a:avLst/>
-          </a:prstGeom>
-        </p:spPr>
-      </p:pic>
-      <p:sp>
-        <p:nvSpPr>
-          <p:cNvPr id="7" name="TextBox 6">
-            <a:extLst>
-              <a:ext uri="{FF2B5EF4-FFF2-40B4-BE49-F238E27FC236}">
-                <a16:creationId xmlns:a16="http://schemas.microsoft.com/office/drawing/2014/main" id="{6F74E53A-581B-C458-F657-00CE2DE6B2CE}"/>
-              </a:ext>
-            </a:extLst>
-          </p:cNvPr>
-          <p:cNvSpPr txBox="1"/>
-          <p:nvPr/>
-        </p:nvSpPr>
-        <p:spPr>
-          <a:xfrm>
-            <a:off x="8556321" y="3092036"/>
-            <a:ext cx="3288946" cy="523220"/>
-          </a:xfrm>
-          <a:prstGeom prst="rect">
-            <a:avLst/>
-          </a:prstGeom>
-          <a:noFill/>
-        </p:spPr>
-        <p:txBody>
-          <a:bodyPr wrap="square" rtlCol="0">
-            <a:spAutoFit/>
-          </a:bodyPr>
-          <a:lstStyle/>
-          <a:p>
-            <a:r>
-              <a:rPr lang="en-US" sz="1400" dirty="0"/>
-              <a:t>bimodal-like distribution is similar to that reported in the Nature paper</a:t>
-            </a:r>
-          </a:p>
-        </p:txBody>
-      </p:sp>
-      <p:pic>
-        <p:nvPicPr>
-          <p:cNvPr id="8" name="Picture 7">
-            <a:extLst>
-              <a:ext uri="{FF2B5EF4-FFF2-40B4-BE49-F238E27FC236}">
-                <a16:creationId xmlns:a16="http://schemas.microsoft.com/office/drawing/2014/main" id="{6A5B62CE-2B72-1D08-0C96-9BE8BE846DFD}"/>
-              </a:ext>
-            </a:extLst>
-          </p:cNvPr>
-          <p:cNvPicPr>
-            <a:picLocks noChangeAspect="1"/>
-          </p:cNvPicPr>
-          <p:nvPr/>
-        </p:nvPicPr>
-        <p:blipFill>
-          <a:blip r:embed="rId3"/>
-          <a:stretch>
-            <a:fillRect/>
-          </a:stretch>
-        </p:blipFill>
-        <p:spPr>
-          <a:xfrm>
-            <a:off x="2078121" y="4196152"/>
-            <a:ext cx="3366402" cy="2454215"/>
-          </a:xfrm>
-          <a:prstGeom prst="rect">
-            <a:avLst/>
-          </a:prstGeom>
-        </p:spPr>
-      </p:pic>
-      <p:pic>
-        <p:nvPicPr>
-          <p:cNvPr id="9" name="Picture 8">
-            <a:extLst>
-              <a:ext uri="{FF2B5EF4-FFF2-40B4-BE49-F238E27FC236}">
-                <a16:creationId xmlns:a16="http://schemas.microsoft.com/office/drawing/2014/main" id="{3BFBCF0B-3639-7E22-34EB-3B5317FFCBF8}"/>
-              </a:ext>
-            </a:extLst>
-          </p:cNvPr>
-          <p:cNvPicPr>
-            <a:picLocks noChangeAspect="1"/>
-          </p:cNvPicPr>
-          <p:nvPr/>
-        </p:nvPicPr>
-        <p:blipFill>
-          <a:blip r:embed="rId4"/>
-          <a:stretch>
-            <a:fillRect/>
-          </a:stretch>
-        </p:blipFill>
-        <p:spPr>
-          <a:xfrm>
-            <a:off x="6631692" y="3893149"/>
-            <a:ext cx="3225425" cy="2757218"/>
-          </a:xfrm>
-          <a:prstGeom prst="rect">
-            <a:avLst/>
-          </a:prstGeom>
-        </p:spPr>
-      </p:pic>
-    </p:spTree>
-    <p:extLst>
-      <p:ext uri="{BB962C8B-B14F-4D97-AF65-F5344CB8AC3E}">
-        <p14:creationId xmlns:p14="http://schemas.microsoft.com/office/powerpoint/2010/main" val="2470448845"/>
-      </p:ext>
-    </p:extLst>
-  </p:cSld>
-  <p:clrMapOvr>
-    <a:masterClrMapping/>
-  </p:clrMapOvr>
-</p:sld>
-</file>
-
-<file path=ppt/slides/slide20.xml><?xml version="1.0" encoding="utf-8"?>
+<file path=ppt/slides/slide22.xml><?xml version="1.0" encoding="utf-8"?>
 <p:sld xmlns:a="http://schemas.openxmlformats.org/drawingml/2006/main" xmlns:r="http://schemas.openxmlformats.org/officeDocument/2006/relationships" xmlns:p="http://schemas.openxmlformats.org/presentationml/2006/main">
   <p:cSld>
     <p:spTree>
@@ -14969,7 +16725,7 @@
         </p:nvSpPr>
         <p:spPr>
           <a:xfrm rot="4384904">
-            <a:off x="1167205" y="5890212"/>
+            <a:off x="769894" y="4569544"/>
             <a:ext cx="1569005" cy="307777"/>
           </a:xfrm>
           <a:prstGeom prst="rect">
@@ -16060,7 +17816,7 @@
         </p:nvSpPr>
         <p:spPr>
           <a:xfrm rot="4384904">
-            <a:off x="1959758" y="5992727"/>
+            <a:off x="1562447" y="4672059"/>
             <a:ext cx="1783310" cy="307777"/>
           </a:xfrm>
           <a:prstGeom prst="rect">
@@ -16095,7 +17851,7 @@
         </p:nvSpPr>
         <p:spPr>
           <a:xfrm rot="4384904">
-            <a:off x="3033033" y="5890212"/>
+            <a:off x="2635722" y="4569544"/>
             <a:ext cx="1569005" cy="307777"/>
           </a:xfrm>
           <a:prstGeom prst="rect">
@@ -17372,7 +19128,7 @@
         </p:nvSpPr>
         <p:spPr>
           <a:xfrm rot="4384904">
-            <a:off x="7973606" y="5485964"/>
+            <a:off x="7576295" y="4165296"/>
             <a:ext cx="723936" cy="307777"/>
           </a:xfrm>
           <a:prstGeom prst="rect">
@@ -17407,7 +19163,7 @@
         </p:nvSpPr>
         <p:spPr>
           <a:xfrm rot="4384904">
-            <a:off x="8774889" y="5485964"/>
+            <a:off x="8377578" y="4165296"/>
             <a:ext cx="723936" cy="307777"/>
           </a:xfrm>
           <a:prstGeom prst="rect">
@@ -17609,7 +19365,7 @@
         </p:nvSpPr>
         <p:spPr>
           <a:xfrm rot="4384904">
-            <a:off x="6074625" y="5571766"/>
+            <a:off x="5677314" y="4251098"/>
             <a:ext cx="903303" cy="307777"/>
           </a:xfrm>
           <a:prstGeom prst="rect">
@@ -17644,7 +19400,7 @@
         </p:nvSpPr>
         <p:spPr>
           <a:xfrm>
-            <a:off x="2231068" y="5659733"/>
+            <a:off x="1929023" y="5644031"/>
             <a:ext cx="3326616" cy="523220"/>
           </a:xfrm>
           <a:prstGeom prst="rect">
@@ -17684,7 +19440,7 @@
 </p:sld>
 </file>
 
-<file path=ppt/slides/slide21.xml><?xml version="1.0" encoding="utf-8"?>
+<file path=ppt/slides/slide23.xml><?xml version="1.0" encoding="utf-8"?>
 <p:sld xmlns:a="http://schemas.openxmlformats.org/drawingml/2006/main" xmlns:r="http://schemas.openxmlformats.org/officeDocument/2006/relationships" xmlns:p="http://schemas.openxmlformats.org/presentationml/2006/main">
   <p:cSld>
     <p:spTree>
@@ -20699,7 +22455,7 @@
 </p:sld>
 </file>
 
-<file path=ppt/slides/slide22.xml><?xml version="1.0" encoding="utf-8"?>
+<file path=ppt/slides/slide24.xml><?xml version="1.0" encoding="utf-8"?>
 <p:sld xmlns:a="http://schemas.openxmlformats.org/drawingml/2006/main" xmlns:r="http://schemas.openxmlformats.org/officeDocument/2006/relationships" xmlns:p="http://schemas.openxmlformats.org/presentationml/2006/main">
   <p:cSld>
     <p:spTree>
@@ -20897,7 +22653,7 @@
 </p:sld>
 </file>
 
-<file path=ppt/slides/slide23.xml><?xml version="1.0" encoding="utf-8"?>
+<file path=ppt/slides/slide25.xml><?xml version="1.0" encoding="utf-8"?>
 <p:sld xmlns:a="http://schemas.openxmlformats.org/drawingml/2006/main" xmlns:r="http://schemas.openxmlformats.org/officeDocument/2006/relationships" xmlns:p="http://schemas.openxmlformats.org/presentationml/2006/main">
   <p:cSld>
     <p:spTree>
@@ -21234,7 +22990,7 @@
 </p:sld>
 </file>
 
-<file path=ppt/slides/slide24.xml><?xml version="1.0" encoding="utf-8"?>
+<file path=ppt/slides/slide26.xml><?xml version="1.0" encoding="utf-8"?>
 <p:sld xmlns:a="http://schemas.openxmlformats.org/drawingml/2006/main" xmlns:r="http://schemas.openxmlformats.org/officeDocument/2006/relationships" xmlns:p="http://schemas.openxmlformats.org/presentationml/2006/main">
   <p:cSld>
     <p:spTree>
@@ -21421,7 +23177,7 @@
 </p:sld>
 </file>
 
-<file path=ppt/slides/slide25.xml><?xml version="1.0" encoding="utf-8"?>
+<file path=ppt/slides/slide27.xml><?xml version="1.0" encoding="utf-8"?>
 <p:sld xmlns:a="http://schemas.openxmlformats.org/drawingml/2006/main" xmlns:r="http://schemas.openxmlformats.org/officeDocument/2006/relationships" xmlns:p="http://schemas.openxmlformats.org/presentationml/2006/main">
   <p:cSld>
     <p:spTree>
@@ -21973,7 +23729,7 @@
 </p:sld>
 </file>
 
-<file path=ppt/slides/slide26.xml><?xml version="1.0" encoding="utf-8"?>
+<file path=ppt/slides/slide28.xml><?xml version="1.0" encoding="utf-8"?>
 <p:sld xmlns:a="http://schemas.openxmlformats.org/drawingml/2006/main" xmlns:r="http://schemas.openxmlformats.org/officeDocument/2006/relationships" xmlns:p="http://schemas.openxmlformats.org/presentationml/2006/main">
   <p:cSld>
     <p:spTree>
@@ -22281,7 +24037,7 @@
 </p:sld>
 </file>
 
-<file path=ppt/slides/slide27.xml><?xml version="1.0" encoding="utf-8"?>
+<file path=ppt/slides/slide29.xml><?xml version="1.0" encoding="utf-8"?>
 <p:sld xmlns:a="http://schemas.openxmlformats.org/drawingml/2006/main" xmlns:r="http://schemas.openxmlformats.org/officeDocument/2006/relationships" xmlns:p="http://schemas.openxmlformats.org/presentationml/2006/main">
   <p:cSld>
     <p:spTree>
@@ -24434,7 +26190,7 @@
         <p:spPr>
           <a:xfrm>
             <a:off x="508072" y="725268"/>
-            <a:ext cx="8637365" cy="646331"/>
+            <a:ext cx="8834983" cy="646331"/>
           </a:xfrm>
           <a:prstGeom prst="rect">
             <a:avLst/>
@@ -24449,13 +26205,13 @@
           <a:p>
             <a:r>
               <a:rPr lang="en-US" sz="1800" dirty="0"/>
-              <a:t>The simplest model that uses self-attention that I think can be applied to this problem</a:t>
+              <a:t>The simplest model that uses self-attention which I think can be applied to this problem</a:t>
             </a:r>
           </a:p>
           <a:p>
             <a:r>
               <a:rPr lang="en-US" dirty="0"/>
-              <a:t>Can be readily run on my </a:t>
+              <a:t>Also, it can run on my </a:t>
             </a:r>
             <a:r>
               <a:rPr lang="en-US" dirty="0" err="1"/>
@@ -24463,7 +26219,7 @@
             </a:r>
             <a:r>
               <a:rPr lang="en-US" dirty="0"/>
-              <a:t> M2 hardware</a:t>
+              <a:t> M2 hardware pretty quickly</a:t>
             </a:r>
           </a:p>
         </p:txBody>
@@ -25114,7 +26870,7 @@
           <p:cNvPr id="2" name="TextBox 1">
             <a:extLst>
               <a:ext uri="{FF2B5EF4-FFF2-40B4-BE49-F238E27FC236}">
-                <a16:creationId xmlns:a16="http://schemas.microsoft.com/office/drawing/2014/main" id="{A6B8D544-62FB-BED5-1F3D-8DE1F9A51DC3}"/>
+                <a16:creationId xmlns:a16="http://schemas.microsoft.com/office/drawing/2014/main" id="{1AAA1C9C-FB2D-CD2D-F85E-23BCF1A59DF3}"/>
               </a:ext>
             </a:extLst>
           </p:cNvPr>
@@ -25123,8 +26879,8 @@
         </p:nvSpPr>
         <p:spPr>
           <a:xfrm>
-            <a:off x="140127" y="221836"/>
-            <a:ext cx="6376297" cy="461665"/>
+            <a:off x="173866" y="154242"/>
+            <a:ext cx="869725" cy="461665"/>
           </a:xfrm>
           <a:prstGeom prst="rect">
             <a:avLst/>
@@ -25139,17 +26895,91 @@
           <a:p>
             <a:r>
               <a:rPr lang="en-US" sz="2400" dirty="0"/>
-              <a:t>BERT Stuff:   Relevant literature, code, and data</a:t>
+              <a:t>BERT</a:t>
             </a:r>
           </a:p>
         </p:txBody>
       </p:sp>
+      <p:pic>
+        <p:nvPicPr>
+          <p:cNvPr id="3" name="Picture 2">
+            <a:extLst>
+              <a:ext uri="{FF2B5EF4-FFF2-40B4-BE49-F238E27FC236}">
+                <a16:creationId xmlns:a16="http://schemas.microsoft.com/office/drawing/2014/main" id="{BE5CECA3-BD7D-460A-C42C-78CB24379D4B}"/>
+              </a:ext>
+            </a:extLst>
+          </p:cNvPr>
+          <p:cNvPicPr>
+            <a:picLocks noChangeAspect="1"/>
+          </p:cNvPicPr>
+          <p:nvPr/>
+        </p:nvPicPr>
+        <p:blipFill>
+          <a:blip r:embed="rId2"/>
+          <a:stretch>
+            <a:fillRect/>
+          </a:stretch>
+        </p:blipFill>
+        <p:spPr>
+          <a:xfrm>
+            <a:off x="861748" y="1092920"/>
+            <a:ext cx="7304187" cy="2336080"/>
+          </a:xfrm>
+          <a:prstGeom prst="rect">
+            <a:avLst/>
+          </a:prstGeom>
+          <a:ln>
+            <a:solidFill>
+              <a:schemeClr val="bg2">
+                <a:lumMod val="50000"/>
+              </a:schemeClr>
+            </a:solidFill>
+          </a:ln>
+        </p:spPr>
+      </p:pic>
+      <p:pic>
+        <p:nvPicPr>
+          <p:cNvPr id="4" name="Picture 3">
+            <a:extLst>
+              <a:ext uri="{FF2B5EF4-FFF2-40B4-BE49-F238E27FC236}">
+                <a16:creationId xmlns:a16="http://schemas.microsoft.com/office/drawing/2014/main" id="{7EABCB51-05DF-27E1-4369-F5A1A2870E22}"/>
+              </a:ext>
+            </a:extLst>
+          </p:cNvPr>
+          <p:cNvPicPr>
+            <a:picLocks noChangeAspect="1"/>
+          </p:cNvPicPr>
+          <p:nvPr/>
+        </p:nvPicPr>
+        <p:blipFill>
+          <a:blip r:embed="rId3"/>
+          <a:stretch>
+            <a:fillRect/>
+          </a:stretch>
+        </p:blipFill>
+        <p:spPr>
+          <a:xfrm>
+            <a:off x="861748" y="4130129"/>
+            <a:ext cx="6536116" cy="2336079"/>
+          </a:xfrm>
+          <a:prstGeom prst="rect">
+            <a:avLst/>
+          </a:prstGeom>
+          <a:ln>
+            <a:solidFill>
+              <a:schemeClr val="bg2">
+                <a:lumMod val="50000"/>
+              </a:schemeClr>
+            </a:solidFill>
+          </a:ln>
+        </p:spPr>
+      </p:pic>
       <p:sp>
         <p:nvSpPr>
-          <p:cNvPr id="3" name="TextBox 2">
+          <p:cNvPr id="5" name="TextBox 4">
             <a:extLst>
               <a:ext uri="{FF2B5EF4-FFF2-40B4-BE49-F238E27FC236}">
-                <a16:creationId xmlns:a16="http://schemas.microsoft.com/office/drawing/2014/main" id="{9750003C-8501-0DA4-F28D-311FF3F150A4}"/>
+                <a16:creationId xmlns:a16="http://schemas.microsoft.com/office/drawing/2014/main" id="{CCC6965F-FA30-7F55-A393-2A31108BF7F6}"/>
               </a:ext>
             </a:extLst>
           </p:cNvPr>
@@ -25158,331 +26988,8 @@
         </p:nvSpPr>
         <p:spPr>
           <a:xfrm>
-            <a:off x="765387" y="1291616"/>
-            <a:ext cx="9574610" cy="5016758"/>
-          </a:xfrm>
-          <a:prstGeom prst="rect">
-            <a:avLst/>
-          </a:prstGeom>
-          <a:noFill/>
-        </p:spPr>
-        <p:txBody>
-          <a:bodyPr wrap="square" rtlCol="0">
-            <a:spAutoFit/>
-          </a:bodyPr>
-          <a:lstStyle/>
-          <a:p>
-            <a:pPr marL="285750" indent="-285750">
-              <a:buFont typeface="Arial" panose="020B0604020202020204" pitchFamily="34" charset="0"/>
-              <a:buChar char="•"/>
-            </a:pPr>
-            <a:r>
-              <a:rPr lang="en-US" sz="1600" dirty="0"/>
-              <a:t>BERT : </a:t>
-            </a:r>
-            <a:r>
-              <a:rPr lang="en-US" sz="1600" dirty="0">
-                <a:hlinkClick r:id="rId2"/>
-              </a:rPr>
-              <a:t>https://aclanthology.org/N19-1423.pdf</a:t>
-            </a:r>
-            <a:endParaRPr lang="en-US" sz="1600" dirty="0"/>
-          </a:p>
-          <a:p>
-            <a:pPr marL="285750" indent="-285750">
-              <a:buFont typeface="Arial" panose="020B0604020202020204" pitchFamily="34" charset="0"/>
-              <a:buChar char="•"/>
-            </a:pPr>
-            <a:endParaRPr lang="en-US" sz="1600" dirty="0"/>
-          </a:p>
-          <a:p>
-            <a:pPr marL="285750" indent="-285750">
-              <a:buFont typeface="Arial" panose="020B0604020202020204" pitchFamily="34" charset="0"/>
-              <a:buChar char="•"/>
-            </a:pPr>
-            <a:r>
-              <a:rPr lang="en-US" sz="1600" dirty="0" err="1"/>
-              <a:t>ProteinBERT</a:t>
-            </a:r>
-            <a:r>
-              <a:rPr lang="en-US" sz="1600" dirty="0"/>
-              <a:t> : </a:t>
-            </a:r>
-            <a:r>
-              <a:rPr lang="en-US" sz="1600" dirty="0">
-                <a:hlinkClick r:id="rId3"/>
-              </a:rPr>
-              <a:t>https://doi.org/10.1093/bioinformatics/btac020</a:t>
-            </a:r>
-            <a:endParaRPr lang="en-US" sz="1600" dirty="0"/>
-          </a:p>
-          <a:p>
-            <a:endParaRPr lang="en-US" sz="1600" dirty="0"/>
-          </a:p>
-          <a:p>
-            <a:pPr marL="285750" indent="-285750">
-              <a:buFont typeface="Arial" panose="020B0604020202020204" pitchFamily="34" charset="0"/>
-              <a:buChar char="•"/>
-            </a:pPr>
-            <a:r>
-              <a:rPr lang="en-US" sz="1600" dirty="0"/>
-              <a:t>Code partially taken from:</a:t>
-            </a:r>
-          </a:p>
-          <a:p>
-            <a:pPr marL="742950" lvl="1" indent="-285750">
-              <a:buFont typeface="Arial" panose="020B0604020202020204" pitchFamily="34" charset="0"/>
-              <a:buChar char="•"/>
-            </a:pPr>
-            <a:r>
-              <a:rPr lang="en-US" sz="1600" dirty="0"/>
-              <a:t>Barney Hill : </a:t>
-            </a:r>
-            <a:r>
-              <a:rPr lang="en-US" sz="1600" b="0" dirty="0">
-                <a:effectLst/>
-                <a:hlinkClick r:id="rId4"/>
-              </a:rPr>
-              <a:t>https://github.com/barneyhill/minBERT</a:t>
-            </a:r>
-            <a:endParaRPr lang="en-US" sz="1600" b="0" dirty="0">
-              <a:effectLst/>
-            </a:endParaRPr>
-          </a:p>
-          <a:p>
-            <a:pPr marL="742950" lvl="1" indent="-285750">
-              <a:buFont typeface="Arial" panose="020B0604020202020204" pitchFamily="34" charset="0"/>
-              <a:buChar char="•"/>
-            </a:pPr>
-            <a:r>
-              <a:rPr lang="en-US" sz="1600" dirty="0"/>
-              <a:t>Andrej </a:t>
-            </a:r>
-            <a:r>
-              <a:rPr lang="en-US" sz="1600" dirty="0" err="1"/>
-              <a:t>Karpathy</a:t>
-            </a:r>
-            <a:r>
-              <a:rPr lang="en-US" sz="1600" dirty="0"/>
-              <a:t>: </a:t>
-            </a:r>
-            <a:r>
-              <a:rPr lang="en-US" sz="1600" b="0" dirty="0">
-                <a:effectLst/>
-                <a:hlinkClick r:id="rId5"/>
-              </a:rPr>
-              <a:t>https://github.com/karpathy/minGPT</a:t>
-            </a:r>
-            <a:endParaRPr lang="en-US" sz="1600" b="0" dirty="0">
-              <a:effectLst/>
-            </a:endParaRPr>
-          </a:p>
-          <a:p>
-            <a:pPr marL="742950" lvl="1" indent="-285750">
-              <a:buFont typeface="Arial" panose="020B0604020202020204" pitchFamily="34" charset="0"/>
-              <a:buChar char="•"/>
-            </a:pPr>
-            <a:r>
-              <a:rPr lang="en-US" sz="1600" dirty="0"/>
-              <a:t>my Table Transformer code (from real-estate automated valuation model development)</a:t>
-            </a:r>
-          </a:p>
-          <a:p>
-            <a:pPr marL="742950" lvl="1" indent="-285750">
-              <a:buFont typeface="Arial" panose="020B0604020202020204" pitchFamily="34" charset="0"/>
-              <a:buChar char="•"/>
-            </a:pPr>
-            <a:endParaRPr lang="en-US" sz="1600" dirty="0"/>
-          </a:p>
-          <a:p>
-            <a:pPr marL="285750" indent="-285750">
-              <a:buFont typeface="Arial" panose="020B0604020202020204" pitchFamily="34" charset="0"/>
-              <a:buChar char="•"/>
-            </a:pPr>
-            <a:r>
-              <a:rPr lang="en-US" sz="1600" dirty="0"/>
-              <a:t>A</a:t>
-            </a:r>
-            <a:r>
-              <a:rPr lang="en-US" sz="1600" b="0" dirty="0">
-                <a:effectLst/>
-              </a:rPr>
-              <a:t>-Alpha Bio:</a:t>
-            </a:r>
-          </a:p>
-          <a:p>
-            <a:pPr marL="742950" lvl="1" indent="-285750">
-              <a:buFont typeface="Arial" panose="020B0604020202020204" pitchFamily="34" charset="0"/>
-              <a:buChar char="•"/>
-            </a:pPr>
-            <a:r>
-              <a:rPr lang="en-US" sz="1600" dirty="0"/>
-              <a:t>Nature Comm: </a:t>
-            </a:r>
-            <a:r>
-              <a:rPr lang="en-US" sz="1600" dirty="0">
-                <a:hlinkClick r:id="rId6"/>
-              </a:rPr>
-              <a:t>http://biorxiv.org/lookup/doi/10.1101/2022.10.07.502662</a:t>
-            </a:r>
-            <a:endParaRPr lang="en-US" sz="1600" dirty="0"/>
-          </a:p>
-          <a:p>
-            <a:pPr marL="742950" lvl="1" indent="-285750">
-              <a:buFont typeface="Arial" panose="020B0604020202020204" pitchFamily="34" charset="0"/>
-              <a:buChar char="•"/>
-            </a:pPr>
-            <a:r>
-              <a:rPr lang="en-US" sz="1600" dirty="0"/>
-              <a:t>Nature: </a:t>
-            </a:r>
-            <a:r>
-              <a:rPr lang="en-US" sz="1600" dirty="0">
-                <a:hlinkClick r:id="rId7"/>
-              </a:rPr>
-              <a:t>https://www.nature.com/articles/s41597-022-01779-4</a:t>
-            </a:r>
-            <a:endParaRPr lang="en-US" sz="1600" dirty="0"/>
-          </a:p>
-          <a:p>
-            <a:pPr marL="742950" lvl="1" indent="-285750">
-              <a:buFont typeface="Arial" panose="020B0604020202020204" pitchFamily="34" charset="0"/>
-              <a:buChar char="•"/>
-            </a:pPr>
-            <a:r>
-              <a:rPr lang="en-US" sz="1600" dirty="0" err="1"/>
-              <a:t>scFv</a:t>
-            </a:r>
-            <a:r>
-              <a:rPr lang="en-US" sz="1600" dirty="0"/>
-              <a:t> Datasets: </a:t>
-            </a:r>
-            <a:r>
-              <a:rPr lang="en-US" sz="1600" dirty="0">
-                <a:hlinkClick r:id="rId8"/>
-              </a:rPr>
-              <a:t>https://github.com/mit-ll/AlphaSeq_Antibody_Dataset.git</a:t>
-            </a:r>
-            <a:endParaRPr lang="en-US" sz="1600" b="0" dirty="0">
-              <a:effectLst/>
-            </a:endParaRPr>
-          </a:p>
-          <a:p>
-            <a:pPr marL="742950" lvl="1" indent="-285750">
-              <a:buFont typeface="Arial" panose="020B0604020202020204" pitchFamily="34" charset="0"/>
-              <a:buChar char="•"/>
-            </a:pPr>
-            <a:endParaRPr lang="en-US" sz="1600" dirty="0"/>
-          </a:p>
-          <a:p>
-            <a:pPr marL="285750" indent="-285750">
-              <a:buFont typeface="Arial" panose="020B0604020202020204" pitchFamily="34" charset="0"/>
-              <a:buChar char="•"/>
-            </a:pPr>
-            <a:r>
-              <a:rPr lang="en-US" sz="1600" b="0" dirty="0">
-                <a:effectLst/>
-              </a:rPr>
-              <a:t>Observed Antibody Space :  </a:t>
-            </a:r>
-          </a:p>
-          <a:p>
-            <a:pPr marL="742950" lvl="1" indent="-285750">
-              <a:buFont typeface="Arial" panose="020B0604020202020204" pitchFamily="34" charset="0"/>
-              <a:buChar char="•"/>
-            </a:pPr>
-            <a:r>
-              <a:rPr lang="en-US" sz="1600" b="0" dirty="0">
-                <a:effectLst/>
-                <a:hlinkClick r:id="rId9"/>
-              </a:rPr>
-              <a:t>https://doi.org/10.4049/jimmunol.1800708</a:t>
-            </a:r>
-            <a:endParaRPr lang="en-US" sz="1600" b="0" dirty="0">
-              <a:effectLst/>
-            </a:endParaRPr>
-          </a:p>
-          <a:p>
-            <a:pPr marL="742950" lvl="1" indent="-285750">
-              <a:buFont typeface="Arial" panose="020B0604020202020204" pitchFamily="34" charset="0"/>
-              <a:buChar char="•"/>
-            </a:pPr>
-            <a:r>
-              <a:rPr lang="en-US" sz="1600" b="0" dirty="0">
-                <a:effectLst/>
-                <a:hlinkClick r:id="rId10"/>
-              </a:rPr>
-              <a:t>https://opig.stats.ox.ac.uk/webapps/oas/</a:t>
-            </a:r>
-            <a:endParaRPr lang="en-US" sz="1600" b="0" dirty="0">
-              <a:effectLst/>
-            </a:endParaRPr>
-          </a:p>
-          <a:p>
-            <a:pPr marL="742950" lvl="1" indent="-285750">
-              <a:buFont typeface="Arial" panose="020B0604020202020204" pitchFamily="34" charset="0"/>
-              <a:buChar char="•"/>
-            </a:pPr>
-            <a:endParaRPr lang="en-US" sz="1600" dirty="0"/>
-          </a:p>
-          <a:p>
-            <a:pPr marL="285750" indent="-285750">
-              <a:buFont typeface="Arial" panose="020B0604020202020204" pitchFamily="34" charset="0"/>
-              <a:buChar char="•"/>
-            </a:pPr>
-            <a:r>
-              <a:rPr lang="en-US" sz="1600" dirty="0"/>
-              <a:t>My </a:t>
-            </a:r>
-            <a:r>
-              <a:rPr lang="en-US" sz="1600" dirty="0" err="1"/>
-              <a:t>Github</a:t>
-            </a:r>
-            <a:r>
-              <a:rPr lang="en-US" sz="1600" dirty="0"/>
-              <a:t> repo for this homework’s code: </a:t>
-            </a:r>
-            <a:r>
-              <a:rPr lang="en-US" sz="1600" dirty="0">
-                <a:solidFill>
-                  <a:srgbClr val="FF0000"/>
-                </a:solidFill>
-              </a:rPr>
-              <a:t>TODO (2 repos) </a:t>
-            </a:r>
-            <a:r>
-              <a:rPr lang="en-US" sz="1600" dirty="0">
-                <a:hlinkClick r:id="rId11"/>
-              </a:rPr>
-              <a:t>https://github.com/planaria158/BERT.git</a:t>
-            </a:r>
-            <a:endParaRPr lang="en-US" sz="1600" dirty="0"/>
-          </a:p>
-          <a:p>
-            <a:pPr marL="285750" indent="-285750">
-              <a:buFont typeface="Arial" panose="020B0604020202020204" pitchFamily="34" charset="0"/>
-              <a:buChar char="•"/>
-            </a:pPr>
-            <a:endParaRPr lang="en-US" sz="1600" dirty="0"/>
-          </a:p>
-        </p:txBody>
-      </p:sp>
-      <p:sp>
-        <p:nvSpPr>
-          <p:cNvPr id="5" name="TextBox 4">
-            <a:extLst>
-              <a:ext uri="{FF2B5EF4-FFF2-40B4-BE49-F238E27FC236}">
-                <a16:creationId xmlns:a16="http://schemas.microsoft.com/office/drawing/2014/main" id="{00DEACF3-1DAE-F38C-6985-089A5766A04C}"/>
-              </a:ext>
-            </a:extLst>
-          </p:cNvPr>
-          <p:cNvSpPr txBox="1"/>
-          <p:nvPr/>
-        </p:nvSpPr>
-        <p:spPr>
-          <a:xfrm>
-            <a:off x="140127" y="679781"/>
-            <a:ext cx="9369296" cy="307777"/>
+            <a:off x="730398" y="723588"/>
+            <a:ext cx="2191626" cy="369332"/>
           </a:xfrm>
           <a:prstGeom prst="rect">
             <a:avLst/>
@@ -25496,8 +27003,113 @@
           <a:lstStyle/>
           <a:p>
             <a:r>
-              <a:rPr lang="en-US" sz="1400" dirty="0"/>
-              <a:t>Note: I did most of the BERT coding/testing in the 2 weeks before my call with Adrian (i.e. before getting the HW problem)</a:t>
+              <a:rPr lang="en-US" dirty="0"/>
+              <a:t>BERT pre-train, MLM</a:t>
+            </a:r>
+          </a:p>
+        </p:txBody>
+      </p:sp>
+      <p:sp>
+        <p:nvSpPr>
+          <p:cNvPr id="6" name="TextBox 5">
+            <a:extLst>
+              <a:ext uri="{FF2B5EF4-FFF2-40B4-BE49-F238E27FC236}">
+                <a16:creationId xmlns:a16="http://schemas.microsoft.com/office/drawing/2014/main" id="{8D727D7C-B7FF-B52A-765E-A4304408DCE8}"/>
+              </a:ext>
+            </a:extLst>
+          </p:cNvPr>
+          <p:cNvSpPr txBox="1"/>
+          <p:nvPr/>
+        </p:nvSpPr>
+        <p:spPr>
+          <a:xfrm>
+            <a:off x="730398" y="3760797"/>
+            <a:ext cx="1614929" cy="369332"/>
+          </a:xfrm>
+          <a:prstGeom prst="rect">
+            <a:avLst/>
+          </a:prstGeom>
+          <a:noFill/>
+        </p:spPr>
+        <p:txBody>
+          <a:bodyPr wrap="none" rtlCol="0">
+            <a:spAutoFit/>
+          </a:bodyPr>
+          <a:lstStyle/>
+          <a:p>
+            <a:r>
+              <a:rPr lang="en-US" dirty="0"/>
+              <a:t>BERT fine tune</a:t>
+            </a:r>
+          </a:p>
+        </p:txBody>
+      </p:sp>
+      <p:sp>
+        <p:nvSpPr>
+          <p:cNvPr id="7" name="TextBox 6">
+            <a:extLst>
+              <a:ext uri="{FF2B5EF4-FFF2-40B4-BE49-F238E27FC236}">
+                <a16:creationId xmlns:a16="http://schemas.microsoft.com/office/drawing/2014/main" id="{11BDF426-EAFE-3091-51B1-EF3CA945EE22}"/>
+              </a:ext>
+            </a:extLst>
+          </p:cNvPr>
+          <p:cNvSpPr txBox="1"/>
+          <p:nvPr/>
+        </p:nvSpPr>
+        <p:spPr>
+          <a:xfrm>
+            <a:off x="8297285" y="1891628"/>
+            <a:ext cx="3730445" cy="369332"/>
+          </a:xfrm>
+          <a:prstGeom prst="rect">
+            <a:avLst/>
+          </a:prstGeom>
+          <a:noFill/>
+        </p:spPr>
+        <p:txBody>
+          <a:bodyPr wrap="none" rtlCol="0">
+            <a:spAutoFit/>
+          </a:bodyPr>
+          <a:lstStyle/>
+          <a:p>
+            <a:r>
+              <a:rPr lang="en-US" dirty="0"/>
+              <a:t>Dataset: OAS light chain sequences</a:t>
+            </a:r>
+          </a:p>
+        </p:txBody>
+      </p:sp>
+      <p:sp>
+        <p:nvSpPr>
+          <p:cNvPr id="8" name="TextBox 7">
+            <a:extLst>
+              <a:ext uri="{FF2B5EF4-FFF2-40B4-BE49-F238E27FC236}">
+                <a16:creationId xmlns:a16="http://schemas.microsoft.com/office/drawing/2014/main" id="{9D9C1117-AE70-3B34-CBDC-766B07172B75}"/>
+              </a:ext>
+            </a:extLst>
+          </p:cNvPr>
+          <p:cNvSpPr txBox="1"/>
+          <p:nvPr/>
+        </p:nvSpPr>
+        <p:spPr>
+          <a:xfrm>
+            <a:off x="7529214" y="5113502"/>
+            <a:ext cx="3882153" cy="369332"/>
+          </a:xfrm>
+          <a:prstGeom prst="rect">
+            <a:avLst/>
+          </a:prstGeom>
+          <a:noFill/>
+        </p:spPr>
+        <p:txBody>
+          <a:bodyPr wrap="none" rtlCol="0">
+            <a:spAutoFit/>
+          </a:bodyPr>
+          <a:lstStyle/>
+          <a:p>
+            <a:r>
+              <a:rPr lang="en-US" dirty="0"/>
+              <a:t>Dataset:  A-Alpha Bio homework data</a:t>
             </a:r>
           </a:p>
         </p:txBody>
@@ -25505,7 +27117,7 @@
     </p:spTree>
     <p:extLst>
       <p:ext uri="{BB962C8B-B14F-4D97-AF65-F5344CB8AC3E}">
-        <p14:creationId xmlns:p14="http://schemas.microsoft.com/office/powerpoint/2010/main" val="1592508389"/>
+        <p14:creationId xmlns:p14="http://schemas.microsoft.com/office/powerpoint/2010/main" val="846146610"/>
       </p:ext>
     </p:extLst>
   </p:cSld>

</xml_diff>

<commit_message>
improvements to Inference notebook moved some incorrectly-placed inference results
</commit_message>
<xml_diff>
--- a/Homework-aAlphaBio.pptx
+++ b/Homework-aAlphaBio.pptx
@@ -6101,7 +6101,7 @@
           <p:nvPr>
             <p:extLst>
               <p:ext uri="{D42A27DB-BD31-4B8C-83A1-F6EECF244321}">
-                <p14:modId xmlns:p14="http://schemas.microsoft.com/office/powerpoint/2010/main" val="2024949114"/>
+                <p14:modId xmlns:p14="http://schemas.microsoft.com/office/powerpoint/2010/main" val="2000244956"/>
               </p:ext>
             </p:extLst>
           </p:nvPr>
@@ -6520,7 +6520,15 @@
                       <a:pPr algn="ctr"/>
                       <a:r>
                         <a:rPr lang="en-US" sz="1400" dirty="0"/>
-                        <a:t>with augmentation</a:t>
+                        <a:t>2x2 </a:t>
+                      </a:r>
+                      <a:r>
+                        <a:rPr lang="en-US" sz="1400" dirty="0" err="1"/>
+                        <a:t>img</a:t>
+                      </a:r>
+                      <a:r>
+                        <a:rPr lang="en-US" sz="1400" dirty="0"/>
+                        <a:t> patches</a:t>
                       </a:r>
                     </a:p>
                   </a:txBody>

</xml_diff>

<commit_message>
slide deck and readme
</commit_message>
<xml_diff>
--- a/Homework-aAlphaBio.pptx
+++ b/Homework-aAlphaBio.pptx
@@ -4766,7 +4766,7 @@
           <p:nvPr>
             <p:extLst>
               <p:ext uri="{D42A27DB-BD31-4B8C-83A1-F6EECF244321}">
-                <p14:modId xmlns:p14="http://schemas.microsoft.com/office/powerpoint/2010/main" val="2949008828"/>
+                <p14:modId xmlns:p14="http://schemas.microsoft.com/office/powerpoint/2010/main" val="4222309209"/>
               </p:ext>
             </p:extLst>
           </p:nvPr>
@@ -5265,7 +5265,7 @@
                             <a:schemeClr val="tx1"/>
                           </a:solidFill>
                         </a:rPr>
-                        <a:t>0.33</a:t>
+                        <a:t>0.39</a:t>
                       </a:r>
                     </a:p>
                   </a:txBody>
@@ -5366,7 +5366,11 @@
                     <a:p>
                       <a:pPr algn="ctr"/>
                       <a:r>
-                        <a:rPr lang="en-US" sz="1600" dirty="0"/>
+                        <a:rPr lang="en-US" sz="1600" dirty="0">
+                          <a:highlight>
+                            <a:srgbClr val="FFFF00"/>
+                          </a:highlight>
+                        </a:rPr>
                         <a:t>residual MLP</a:t>
                       </a:r>
                     </a:p>
@@ -5555,11 +5559,19 @@
                         <a:defRPr/>
                       </a:pPr>
                       <a:r>
-                        <a:rPr lang="en-US" sz="1600" dirty="0"/>
+                        <a:rPr lang="en-US" sz="1600" dirty="0">
+                          <a:highlight>
+                            <a:srgbClr val="FFFF00"/>
+                          </a:highlight>
+                        </a:rPr>
                         <a:t>VIT </a:t>
                       </a:r>
                       <a:r>
-                        <a:rPr lang="en-US" sz="1600" baseline="30000" dirty="0"/>
+                        <a:rPr lang="en-US" sz="1600" baseline="30000" dirty="0">
+                          <a:highlight>
+                            <a:srgbClr val="FFFF00"/>
+                          </a:highlight>
+                        </a:rPr>
                         <a:t>1</a:t>
                       </a:r>
                     </a:p>
@@ -5802,11 +5814,19 @@
                         <a:defRPr/>
                       </a:pPr>
                       <a:r>
-                        <a:rPr lang="en-US" sz="1600" dirty="0"/>
+                        <a:rPr lang="en-US" sz="1600" dirty="0">
+                          <a:highlight>
+                            <a:srgbClr val="FFFF00"/>
+                          </a:highlight>
+                        </a:rPr>
                         <a:t>VIT </a:t>
                       </a:r>
                       <a:r>
-                        <a:rPr lang="en-US" sz="1600" baseline="30000" dirty="0"/>
+                        <a:rPr lang="en-US" sz="1600" baseline="30000" dirty="0">
+                          <a:highlight>
+                            <a:srgbClr val="FFFF00"/>
+                          </a:highlight>
+                        </a:rPr>
                         <a:t>1</a:t>
                       </a:r>
                     </a:p>
@@ -5822,10 +5842,10 @@
                       <a:r>
                         <a:rPr lang="en-US" sz="1600" dirty="0">
                           <a:solidFill>
-                            <a:srgbClr val="FF0000"/>
+                            <a:schemeClr val="tx1"/>
                           </a:solidFill>
                         </a:rPr>
-                        <a:t>0.05</a:t>
+                        <a:t>0.10</a:t>
                       </a:r>
                     </a:p>
                   </a:txBody>
@@ -5840,10 +5860,10 @@
                       <a:r>
                         <a:rPr lang="en-US" sz="1600" dirty="0">
                           <a:solidFill>
-                            <a:srgbClr val="FF0000"/>
+                            <a:schemeClr val="tx1"/>
                           </a:solidFill>
                         </a:rPr>
-                        <a:t>0.14</a:t>
+                        <a:t>0.13</a:t>
                       </a:r>
                     </a:p>
                   </a:txBody>
@@ -5858,10 +5878,10 @@
                       <a:r>
                         <a:rPr lang="en-US" sz="1600" dirty="0">
                           <a:solidFill>
-                            <a:srgbClr val="FF0000"/>
+                            <a:schemeClr val="tx1"/>
                           </a:solidFill>
                         </a:rPr>
-                        <a:t>1300</a:t>
+                        <a:t>527</a:t>
                       </a:r>
                     </a:p>
                   </a:txBody>
@@ -5876,7 +5896,7 @@
                       <a:r>
                         <a:rPr lang="en-US" sz="1600" dirty="0">
                           <a:solidFill>
-                            <a:srgbClr val="FF0000"/>
+                            <a:schemeClr val="tx1"/>
                           </a:solidFill>
                         </a:rPr>
                         <a:t>0.26</a:t>
@@ -5891,11 +5911,14 @@
                     <a:lstStyle/>
                     <a:p>
                       <a:pPr algn="ctr"/>
-                      <a:endParaRPr lang="en-US" sz="1600" dirty="0">
-                        <a:solidFill>
-                          <a:srgbClr val="FF0000"/>
-                        </a:solidFill>
-                      </a:endParaRPr>
+                      <a:r>
+                        <a:rPr lang="en-US" sz="1600" dirty="0">
+                          <a:solidFill>
+                            <a:schemeClr val="tx1"/>
+                          </a:solidFill>
+                        </a:rPr>
+                        <a:t>0.13</a:t>
+                      </a:r>
                     </a:p>
                   </a:txBody>
                   <a:tcPr anchor="ctr"/>
@@ -5909,7 +5932,7 @@
                       <a:r>
                         <a:rPr lang="en-US" sz="1600" dirty="0">
                           <a:solidFill>
-                            <a:srgbClr val="FF0000"/>
+                            <a:schemeClr val="tx1"/>
                           </a:solidFill>
                         </a:rPr>
                         <a:t>0.15</a:t>
@@ -5927,10 +5950,10 @@
                       <a:r>
                         <a:rPr lang="en-US" sz="1600" dirty="0">
                           <a:solidFill>
-                            <a:srgbClr val="FF0000"/>
+                            <a:schemeClr val="tx1"/>
                           </a:solidFill>
                         </a:rPr>
-                        <a:t>50</a:t>
+                        <a:t>51</a:t>
                       </a:r>
                     </a:p>
                   </a:txBody>
@@ -5945,10 +5968,10 @@
                       <a:r>
                         <a:rPr lang="en-US" sz="1600" dirty="0">
                           <a:solidFill>
-                            <a:srgbClr val="FF0000"/>
+                            <a:schemeClr val="tx1"/>
                           </a:solidFill>
                         </a:rPr>
-                        <a:t>74</a:t>
+                        <a:t>75</a:t>
                       </a:r>
                     </a:p>
                   </a:txBody>
@@ -5998,8 +6021,16 @@
                         <a:defRPr/>
                       </a:pPr>
                       <a:r>
+                        <a:rPr lang="en-US" sz="1600" dirty="0">
+                          <a:highlight>
+                            <a:srgbClr val="FFFF00"/>
+                          </a:highlight>
+                        </a:rPr>
+                        <a:t>Transformer</a:t>
+                      </a:r>
+                      <a:r>
                         <a:rPr lang="en-US" sz="1600" dirty="0"/>
-                        <a:t>Transformer </a:t>
+                        <a:t> </a:t>
                       </a:r>
                       <a:r>
                         <a:rPr lang="en-US" sz="1600" baseline="30000" dirty="0"/>
@@ -6391,41 +6422,6 @@
       </p:sp>
       <p:sp>
         <p:nvSpPr>
-          <p:cNvPr id="6" name="TextBox 5">
-            <a:extLst>
-              <a:ext uri="{FF2B5EF4-FFF2-40B4-BE49-F238E27FC236}">
-                <a16:creationId xmlns:a16="http://schemas.microsoft.com/office/drawing/2014/main" id="{1CC42835-134E-14C3-25AC-A780B097C1E6}"/>
-              </a:ext>
-            </a:extLst>
-          </p:cNvPr>
-          <p:cNvSpPr txBox="1"/>
-          <p:nvPr/>
-        </p:nvSpPr>
-        <p:spPr>
-          <a:xfrm>
-            <a:off x="3985403" y="3364302"/>
-            <a:ext cx="1531188" cy="369332"/>
-          </a:xfrm>
-          <a:prstGeom prst="rect">
-            <a:avLst/>
-          </a:prstGeom>
-          <a:noFill/>
-        </p:spPr>
-        <p:txBody>
-          <a:bodyPr wrap="none" rtlCol="0">
-            <a:spAutoFit/>
-          </a:bodyPr>
-          <a:lstStyle/>
-          <a:p>
-            <a:r>
-              <a:rPr lang="en-US" dirty="0"/>
-              <a:t>Residual MLP</a:t>
-            </a:r>
-          </a:p>
-        </p:txBody>
-      </p:sp>
-      <p:sp>
-        <p:nvSpPr>
           <p:cNvPr id="8" name="TextBox 7">
             <a:extLst>
               <a:ext uri="{FF2B5EF4-FFF2-40B4-BE49-F238E27FC236}">
@@ -6438,7 +6434,7 @@
         </p:nvSpPr>
         <p:spPr>
           <a:xfrm>
-            <a:off x="6952891" y="3502325"/>
+            <a:off x="4459043" y="3431986"/>
             <a:ext cx="1544012" cy="369332"/>
           </a:xfrm>
           <a:prstGeom prst="rect">
@@ -6473,7 +6469,7 @@
         </p:nvSpPr>
         <p:spPr>
           <a:xfrm>
-            <a:off x="9825487" y="3579962"/>
+            <a:off x="7331639" y="3509623"/>
             <a:ext cx="1544012" cy="369332"/>
           </a:xfrm>
           <a:prstGeom prst="rect">
@@ -6581,8 +6577,38 @@
         </p:blipFill>
         <p:spPr>
           <a:xfrm>
-            <a:off x="6501674" y="1580723"/>
+            <a:off x="4007826" y="1510384"/>
             <a:ext cx="2446445" cy="1921602"/>
+          </a:xfrm>
+          <a:prstGeom prst="rect">
+            <a:avLst/>
+          </a:prstGeom>
+        </p:spPr>
+      </p:pic>
+      <p:pic>
+        <p:nvPicPr>
+          <p:cNvPr id="18" name="Picture 17">
+            <a:extLst>
+              <a:ext uri="{FF2B5EF4-FFF2-40B4-BE49-F238E27FC236}">
+                <a16:creationId xmlns:a16="http://schemas.microsoft.com/office/drawing/2014/main" id="{C362AFE6-F117-4EEC-DA1E-92F3B4424D24}"/>
+              </a:ext>
+            </a:extLst>
+          </p:cNvPr>
+          <p:cNvPicPr>
+            <a:picLocks noChangeAspect="1"/>
+          </p:cNvPicPr>
+          <p:nvPr/>
+        </p:nvPicPr>
+        <p:blipFill>
+          <a:blip r:embed="rId4"/>
+          <a:stretch>
+            <a:fillRect/>
+          </a:stretch>
+        </p:blipFill>
+        <p:spPr>
+          <a:xfrm>
+            <a:off x="6697837" y="1442700"/>
+            <a:ext cx="2591998" cy="2035929"/>
           </a:xfrm>
           <a:prstGeom prst="rect">
             <a:avLst/>
@@ -36492,27 +36518,7 @@
                   </a:schemeClr>
                 </a:solidFill>
               </a:rPr>
-              <a:t>don’t use: this breaks </a:t>
-            </a:r>
-            <a:r>
-              <a:rPr lang="en-US" sz="1600" dirty="0" err="1">
-                <a:solidFill>
-                  <a:schemeClr val="bg1">
-                    <a:lumMod val="65000"/>
-                  </a:schemeClr>
-                </a:solidFill>
-              </a:rPr>
-              <a:t>tformer</a:t>
-            </a:r>
-            <a:r>
-              <a:rPr lang="en-US" sz="1600" dirty="0">
-                <a:solidFill>
-                  <a:schemeClr val="bg1">
-                    <a:lumMod val="65000"/>
-                  </a:schemeClr>
-                </a:solidFill>
-              </a:rPr>
-              <a:t> position embedding? (fine for MLP though)</a:t>
+              <a:t>don’t use: this breaks transformer position embedding? (fine for MLP though)</a:t>
             </a:r>
           </a:p>
           <a:p>
@@ -36544,27 +36550,7 @@
                   </a:schemeClr>
                 </a:solidFill>
               </a:rPr>
-              <a:t>don’t use: this breaks </a:t>
-            </a:r>
-            <a:r>
-              <a:rPr lang="en-US" sz="1600" dirty="0" err="1">
-                <a:solidFill>
-                  <a:schemeClr val="bg1">
-                    <a:lumMod val="65000"/>
-                  </a:schemeClr>
-                </a:solidFill>
-              </a:rPr>
-              <a:t>tformer</a:t>
-            </a:r>
-            <a:r>
-              <a:rPr lang="en-US" sz="1600" dirty="0">
-                <a:solidFill>
-                  <a:schemeClr val="bg1">
-                    <a:lumMod val="65000"/>
-                  </a:schemeClr>
-                </a:solidFill>
-              </a:rPr>
-              <a:t> position embedding? (fine for MLP though)</a:t>
+              <a:t>don’t use: this breaks transformer position embedding? (fine for MLP though)</a:t>
             </a:r>
           </a:p>
           <a:p>
@@ -36600,7 +36586,7 @@
             </a:pPr>
             <a:r>
               <a:rPr lang="en-US" sz="1600" dirty="0"/>
-              <a:t>Augmentation (just some thoughts for now….)</a:t>
+              <a:t>Augmentation (not done)</a:t>
             </a:r>
           </a:p>
           <a:p>
@@ -36609,15 +36595,33 @@
               <a:buChar char="•"/>
             </a:pPr>
             <a:r>
-              <a:rPr lang="en-US" sz="1600" dirty="0"/>
+              <a:rPr lang="en-US" sz="1600" dirty="0">
+                <a:solidFill>
+                  <a:schemeClr val="bg1">
+                    <a:lumMod val="50000"/>
+                  </a:schemeClr>
+                </a:solidFill>
+              </a:rPr>
               <a:t>Use sequences from the dataset A-</a:t>
             </a:r>
             <a:r>
-              <a:rPr lang="en-US" sz="1600" dirty="0" err="1"/>
+              <a:rPr lang="en-US" sz="1600" dirty="0" err="1">
+                <a:solidFill>
+                  <a:schemeClr val="bg1">
+                    <a:lumMod val="50000"/>
+                  </a:schemeClr>
+                </a:solidFill>
+              </a:rPr>
               <a:t>AlphaBio</a:t>
             </a:r>
             <a:r>
-              <a:rPr lang="en-US" sz="1600" dirty="0"/>
+              <a:rPr lang="en-US" sz="1600" dirty="0">
+                <a:solidFill>
+                  <a:schemeClr val="bg1">
+                    <a:lumMod val="50000"/>
+                  </a:schemeClr>
+                </a:solidFill>
+              </a:rPr>
               <a:t> Nature paper (as long as no sequences match this training set or the holdout set)</a:t>
             </a:r>
           </a:p>
@@ -36626,7 +36630,13 @@
               <a:buFont typeface="Arial" panose="020B0604020202020204" pitchFamily="34" charset="0"/>
               <a:buChar char="•"/>
             </a:pPr>
-            <a:endParaRPr lang="en-US" sz="1600" dirty="0"/>
+            <a:endParaRPr lang="en-US" sz="1600" dirty="0">
+              <a:solidFill>
+                <a:schemeClr val="bg1">
+                  <a:lumMod val="50000"/>
+                </a:schemeClr>
+              </a:solidFill>
+            </a:endParaRPr>
           </a:p>
           <a:p>
             <a:pPr marL="742950" lvl="1" indent="-285750">
@@ -36634,7 +36644,13 @@
               <a:buChar char="•"/>
             </a:pPr>
             <a:r>
-              <a:rPr lang="en-US" sz="1600" dirty="0"/>
+              <a:rPr lang="en-US" sz="1600" dirty="0">
+                <a:solidFill>
+                  <a:schemeClr val="bg1">
+                    <a:lumMod val="50000"/>
+                  </a:schemeClr>
+                </a:solidFill>
+              </a:rPr>
               <a:t>Use sequences from Nature paper dataset #2 (the generated sequences) with the same caveat as above</a:t>
             </a:r>
           </a:p>
@@ -36643,7 +36659,13 @@
               <a:buFont typeface="Arial" panose="020B0604020202020204" pitchFamily="34" charset="0"/>
               <a:buChar char="•"/>
             </a:pPr>
-            <a:endParaRPr lang="en-US" sz="1600" dirty="0"/>
+            <a:endParaRPr lang="en-US" sz="1600" dirty="0">
+              <a:solidFill>
+                <a:schemeClr val="bg1">
+                  <a:lumMod val="50000"/>
+                </a:schemeClr>
+              </a:solidFill>
+            </a:endParaRPr>
           </a:p>
           <a:p>
             <a:pPr marL="742950" lvl="1" indent="-285750">
@@ -36651,7 +36673,13 @@
               <a:buChar char="•"/>
             </a:pPr>
             <a:r>
-              <a:rPr lang="en-US" sz="1600" dirty="0"/>
+              <a:rPr lang="en-US" sz="1600" dirty="0">
+                <a:solidFill>
+                  <a:schemeClr val="bg1">
+                    <a:lumMod val="50000"/>
+                  </a:schemeClr>
+                </a:solidFill>
+              </a:rPr>
               <a:t>Semi-supervised training; possible sources of unlabeled data</a:t>
             </a:r>
           </a:p>
@@ -36661,29 +36689,55 @@
               <a:buChar char="•"/>
             </a:pPr>
             <a:r>
-              <a:rPr lang="en-US" sz="1600" dirty="0"/>
+              <a:rPr lang="en-US" sz="1600" dirty="0">
+                <a:solidFill>
+                  <a:schemeClr val="bg1">
+                    <a:lumMod val="50000"/>
+                  </a:schemeClr>
+                </a:solidFill>
+              </a:rPr>
               <a:t>Use </a:t>
             </a:r>
             <a:r>
               <a:rPr lang="en-US" sz="1600" dirty="0" err="1">
+                <a:solidFill>
+                  <a:schemeClr val="bg1">
+                    <a:lumMod val="50000"/>
+                  </a:schemeClr>
+                </a:solidFill>
                 <a:effectLst/>
               </a:rPr>
               <a:t>alphaseq_data_train.csv</a:t>
             </a:r>
             <a:r>
               <a:rPr lang="en-US" sz="1600" dirty="0">
+                <a:solidFill>
+                  <a:schemeClr val="bg1">
+                    <a:lumMod val="50000"/>
+                  </a:schemeClr>
+                </a:solidFill>
                 <a:effectLst/>
               </a:rPr>
               <a:t> data with </a:t>
             </a:r>
             <a:r>
               <a:rPr lang="en-US" sz="1600" dirty="0" err="1">
+                <a:solidFill>
+                  <a:schemeClr val="bg1">
+                    <a:lumMod val="50000"/>
+                  </a:schemeClr>
+                </a:solidFill>
                 <a:effectLst/>
               </a:rPr>
               <a:t>Kd</a:t>
             </a:r>
             <a:r>
               <a:rPr lang="en-US" sz="1600" dirty="0">
+                <a:solidFill>
+                  <a:schemeClr val="bg1">
+                    <a:lumMod val="50000"/>
+                  </a:schemeClr>
+                </a:solidFill>
                 <a:effectLst/>
               </a:rPr>
               <a:t>=NANs</a:t>
@@ -36695,17 +36749,33 @@
               <a:buChar char="•"/>
             </a:pPr>
             <a:r>
-              <a:rPr lang="en-US" sz="1600" dirty="0"/>
+              <a:rPr lang="en-US" sz="1600" dirty="0">
+                <a:solidFill>
+                  <a:schemeClr val="bg1">
+                    <a:lumMod val="50000"/>
+                  </a:schemeClr>
+                </a:solidFill>
+              </a:rPr>
               <a:t>Use </a:t>
             </a:r>
             <a:r>
               <a:rPr lang="en-US" sz="1600" dirty="0" err="1">
+                <a:solidFill>
+                  <a:schemeClr val="bg1">
+                    <a:lumMod val="50000"/>
+                  </a:schemeClr>
+                </a:solidFill>
                 <a:effectLst/>
               </a:rPr>
               <a:t>alphaseq_data_train.csv</a:t>
             </a:r>
             <a:r>
               <a:rPr lang="en-US" sz="1600" dirty="0">
+                <a:solidFill>
+                  <a:schemeClr val="bg1">
+                    <a:lumMod val="50000"/>
+                  </a:schemeClr>
+                </a:solidFill>
                 <a:effectLst/>
               </a:rPr>
               <a:t> data with q-value &gt; 0.5</a:t>
@@ -36716,7 +36786,13 @@
               <a:buFont typeface="Arial" panose="020B0604020202020204" pitchFamily="34" charset="0"/>
               <a:buChar char="•"/>
             </a:pPr>
-            <a:endParaRPr lang="en-US" sz="1600" dirty="0"/>
+            <a:endParaRPr lang="en-US" sz="1600" dirty="0">
+              <a:solidFill>
+                <a:schemeClr val="bg1">
+                  <a:lumMod val="50000"/>
+                </a:schemeClr>
+              </a:solidFill>
+            </a:endParaRPr>
           </a:p>
           <a:p>
             <a:pPr marL="742950" lvl="1" indent="-285750">
@@ -36725,6 +36801,11 @@
             </a:pPr>
             <a:r>
               <a:rPr lang="en-US" sz="1600" dirty="0">
+                <a:solidFill>
+                  <a:schemeClr val="bg1">
+                    <a:lumMod val="50000"/>
+                  </a:schemeClr>
+                </a:solidFill>
                 <a:effectLst/>
               </a:rPr>
               <a:t>Pre-training (like BERT) on large set of similar sequences.</a:t>

</xml_diff>

<commit_message>
slide deck images for readme
</commit_message>
<xml_diff>
--- a/Homework-aAlphaBio.pptx
+++ b/Homework-aAlphaBio.pptx
@@ -8949,7 +8949,7 @@
         </p:nvSpPr>
         <p:spPr>
           <a:xfrm>
-            <a:off x="1883595" y="5110666"/>
+            <a:off x="2297663" y="5225401"/>
             <a:ext cx="7260406" cy="369332"/>
           </a:xfrm>
           <a:prstGeom prst="rect">
@@ -20424,92 +20424,71 @@
           </a:p>
         </p:txBody>
       </p:sp>
-      <p:grpSp>
-        <p:nvGrpSpPr>
-          <p:cNvPr id="10" name="Group 9">
-            <a:extLst>
-              <a:ext uri="{FF2B5EF4-FFF2-40B4-BE49-F238E27FC236}">
-                <a16:creationId xmlns:a16="http://schemas.microsoft.com/office/drawing/2014/main" id="{F5172D89-4EF7-2642-B028-388CC3302708}"/>
-              </a:ext>
-            </a:extLst>
-          </p:cNvPr>
-          <p:cNvGrpSpPr/>
+      <p:sp>
+        <p:nvSpPr>
+          <p:cNvPr id="9" name="TextBox 8">
+            <a:extLst>
+              <a:ext uri="{FF2B5EF4-FFF2-40B4-BE49-F238E27FC236}">
+                <a16:creationId xmlns:a16="http://schemas.microsoft.com/office/drawing/2014/main" id="{DEB93D53-C98F-967F-FD08-149A4D6157AA}"/>
+              </a:ext>
+            </a:extLst>
+          </p:cNvPr>
+          <p:cNvSpPr txBox="1"/>
           <p:nvPr/>
-        </p:nvGrpSpPr>
-        <p:grpSpPr>
+        </p:nvSpPr>
+        <p:spPr>
+          <a:xfrm>
+            <a:off x="8850539" y="4812123"/>
+            <a:ext cx="1783117" cy="369332"/>
+          </a:xfrm>
+          <a:prstGeom prst="rect">
+            <a:avLst/>
+          </a:prstGeom>
+          <a:noFill/>
+        </p:spPr>
+        <p:txBody>
+          <a:bodyPr wrap="none" rtlCol="0">
+            <a:spAutoFit/>
+          </a:bodyPr>
+          <a:lstStyle/>
+          <a:p>
+            <a:r>
+              <a:rPr lang="en-US" dirty="0"/>
+              <a:t>Clean-3 dataset</a:t>
+            </a:r>
+          </a:p>
+        </p:txBody>
+      </p:sp>
+      <p:pic>
+        <p:nvPicPr>
+          <p:cNvPr id="20" name="Picture 19">
+            <a:extLst>
+              <a:ext uri="{FF2B5EF4-FFF2-40B4-BE49-F238E27FC236}">
+                <a16:creationId xmlns:a16="http://schemas.microsoft.com/office/drawing/2014/main" id="{C1038154-5D7A-B535-E72C-6F71E15A8B37}"/>
+              </a:ext>
+            </a:extLst>
+          </p:cNvPr>
+          <p:cNvPicPr>
+            <a:picLocks noChangeAspect="1"/>
+          </p:cNvPicPr>
+          <p:nvPr/>
+        </p:nvPicPr>
+        <p:blipFill>
+          <a:blip r:embed="rId2"/>
+          <a:stretch>
+            <a:fillRect/>
+          </a:stretch>
+        </p:blipFill>
+        <p:spPr>
           <a:xfrm>
             <a:off x="7834644" y="1423473"/>
-            <a:ext cx="4033366" cy="3757982"/>
-            <a:chOff x="4090780" y="1423473"/>
-            <a:chExt cx="4033366" cy="3757982"/>
+            <a:ext cx="4033366" cy="3148973"/>
           </a:xfrm>
-        </p:grpSpPr>
-        <p:sp>
-          <p:nvSpPr>
-            <p:cNvPr id="9" name="TextBox 8">
-              <a:extLst>
-                <a:ext uri="{FF2B5EF4-FFF2-40B4-BE49-F238E27FC236}">
-                  <a16:creationId xmlns:a16="http://schemas.microsoft.com/office/drawing/2014/main" id="{DEB93D53-C98F-967F-FD08-149A4D6157AA}"/>
-                </a:ext>
-              </a:extLst>
-            </p:cNvPr>
-            <p:cNvSpPr txBox="1"/>
-            <p:nvPr/>
-          </p:nvSpPr>
-          <p:spPr>
-            <a:xfrm>
-              <a:off x="5106675" y="4812123"/>
-              <a:ext cx="1783117" cy="369332"/>
-            </a:xfrm>
-            <a:prstGeom prst="rect">
-              <a:avLst/>
-            </a:prstGeom>
-            <a:noFill/>
-          </p:spPr>
-          <p:txBody>
-            <a:bodyPr wrap="none" rtlCol="0">
-              <a:spAutoFit/>
-            </a:bodyPr>
-            <a:lstStyle/>
-            <a:p>
-              <a:r>
-                <a:rPr lang="en-US" dirty="0"/>
-                <a:t>Clean-3 dataset</a:t>
-              </a:r>
-            </a:p>
-          </p:txBody>
-        </p:sp>
-        <p:pic>
-          <p:nvPicPr>
-            <p:cNvPr id="20" name="Picture 19">
-              <a:extLst>
-                <a:ext uri="{FF2B5EF4-FFF2-40B4-BE49-F238E27FC236}">
-                  <a16:creationId xmlns:a16="http://schemas.microsoft.com/office/drawing/2014/main" id="{C1038154-5D7A-B535-E72C-6F71E15A8B37}"/>
-                </a:ext>
-              </a:extLst>
-            </p:cNvPr>
-            <p:cNvPicPr>
-              <a:picLocks noChangeAspect="1"/>
-            </p:cNvPicPr>
-            <p:nvPr/>
-          </p:nvPicPr>
-          <p:blipFill>
-            <a:blip r:embed="rId2"/>
-            <a:stretch>
-              <a:fillRect/>
-            </a:stretch>
-          </p:blipFill>
-          <p:spPr>
-            <a:xfrm>
-              <a:off x="4090780" y="1423473"/>
-              <a:ext cx="4033366" cy="3148973"/>
-            </a:xfrm>
-            <a:prstGeom prst="rect">
-              <a:avLst/>
-            </a:prstGeom>
-          </p:spPr>
-        </p:pic>
-      </p:grpSp>
+          <a:prstGeom prst="rect">
+            <a:avLst/>
+          </a:prstGeom>
+        </p:spPr>
+      </p:pic>
       <p:grpSp>
         <p:nvGrpSpPr>
           <p:cNvPr id="14" name="Group 13">

</xml_diff>

<commit_message>
more work on pre-training code.  Do NOT do 80-10-10 corruption strategy anymore.  It appears to really hurt the training. Rather simply replace all masked aa residues with the MASK token.
</commit_message>
<xml_diff>
--- a/Homework-aAlphaBio.pptx
+++ b/Homework-aAlphaBio.pptx
@@ -281,7 +281,7 @@
           <a:p>
             <a:fld id="{A99D5239-F08C-4643-B440-E380AF94EFE9}" type="datetimeFigureOut">
               <a:rPr lang="en-US" smtClean="0"/>
-              <a:t>5/10/24</a:t>
+              <a:t>5/12/24</a:t>
             </a:fld>
             <a:endParaRPr lang="en-US"/>
           </a:p>
@@ -479,7 +479,7 @@
           <a:p>
             <a:fld id="{A99D5239-F08C-4643-B440-E380AF94EFE9}" type="datetimeFigureOut">
               <a:rPr lang="en-US" smtClean="0"/>
-              <a:t>5/10/24</a:t>
+              <a:t>5/12/24</a:t>
             </a:fld>
             <a:endParaRPr lang="en-US"/>
           </a:p>
@@ -687,7 +687,7 @@
           <a:p>
             <a:fld id="{A99D5239-F08C-4643-B440-E380AF94EFE9}" type="datetimeFigureOut">
               <a:rPr lang="en-US" smtClean="0"/>
-              <a:t>5/10/24</a:t>
+              <a:t>5/12/24</a:t>
             </a:fld>
             <a:endParaRPr lang="en-US"/>
           </a:p>
@@ -885,7 +885,7 @@
           <a:p>
             <a:fld id="{A99D5239-F08C-4643-B440-E380AF94EFE9}" type="datetimeFigureOut">
               <a:rPr lang="en-US" smtClean="0"/>
-              <a:t>5/10/24</a:t>
+              <a:t>5/12/24</a:t>
             </a:fld>
             <a:endParaRPr lang="en-US"/>
           </a:p>
@@ -1160,7 +1160,7 @@
           <a:p>
             <a:fld id="{A99D5239-F08C-4643-B440-E380AF94EFE9}" type="datetimeFigureOut">
               <a:rPr lang="en-US" smtClean="0"/>
-              <a:t>5/10/24</a:t>
+              <a:t>5/12/24</a:t>
             </a:fld>
             <a:endParaRPr lang="en-US"/>
           </a:p>
@@ -1425,7 +1425,7 @@
           <a:p>
             <a:fld id="{A99D5239-F08C-4643-B440-E380AF94EFE9}" type="datetimeFigureOut">
               <a:rPr lang="en-US" smtClean="0"/>
-              <a:t>5/10/24</a:t>
+              <a:t>5/12/24</a:t>
             </a:fld>
             <a:endParaRPr lang="en-US"/>
           </a:p>
@@ -1837,7 +1837,7 @@
           <a:p>
             <a:fld id="{A99D5239-F08C-4643-B440-E380AF94EFE9}" type="datetimeFigureOut">
               <a:rPr lang="en-US" smtClean="0"/>
-              <a:t>5/10/24</a:t>
+              <a:t>5/12/24</a:t>
             </a:fld>
             <a:endParaRPr lang="en-US"/>
           </a:p>
@@ -1978,7 +1978,7 @@
           <a:p>
             <a:fld id="{A99D5239-F08C-4643-B440-E380AF94EFE9}" type="datetimeFigureOut">
               <a:rPr lang="en-US" smtClean="0"/>
-              <a:t>5/10/24</a:t>
+              <a:t>5/12/24</a:t>
             </a:fld>
             <a:endParaRPr lang="en-US"/>
           </a:p>
@@ -2091,7 +2091,7 @@
           <a:p>
             <a:fld id="{A99D5239-F08C-4643-B440-E380AF94EFE9}" type="datetimeFigureOut">
               <a:rPr lang="en-US" smtClean="0"/>
-              <a:t>5/10/24</a:t>
+              <a:t>5/12/24</a:t>
             </a:fld>
             <a:endParaRPr lang="en-US"/>
           </a:p>
@@ -2402,7 +2402,7 @@
           <a:p>
             <a:fld id="{A99D5239-F08C-4643-B440-E380AF94EFE9}" type="datetimeFigureOut">
               <a:rPr lang="en-US" smtClean="0"/>
-              <a:t>5/10/24</a:t>
+              <a:t>5/12/24</a:t>
             </a:fld>
             <a:endParaRPr lang="en-US"/>
           </a:p>
@@ -2690,7 +2690,7 @@
           <a:p>
             <a:fld id="{A99D5239-F08C-4643-B440-E380AF94EFE9}" type="datetimeFigureOut">
               <a:rPr lang="en-US" smtClean="0"/>
-              <a:t>5/10/24</a:t>
+              <a:t>5/12/24</a:t>
             </a:fld>
             <a:endParaRPr lang="en-US"/>
           </a:p>
@@ -2931,7 +2931,7 @@
           <a:p>
             <a:fld id="{A99D5239-F08C-4643-B440-E380AF94EFE9}" type="datetimeFigureOut">
               <a:rPr lang="en-US" smtClean="0"/>
-              <a:t>5/10/24</a:t>
+              <a:t>5/12/24</a:t>
             </a:fld>
             <a:endParaRPr lang="en-US"/>
           </a:p>
@@ -9724,7 +9724,7 @@
         <p:spPr>
           <a:xfrm>
             <a:off x="892718" y="905773"/>
-            <a:ext cx="10847834" cy="3785652"/>
+            <a:ext cx="10847834" cy="4524315"/>
           </a:xfrm>
           <a:prstGeom prst="rect">
             <a:avLst/>
@@ -9816,6 +9816,28 @@
               <a:rPr lang="en-US" sz="1600" dirty="0"/>
               <a:t>CAVEAT: In hindsight, I could simply have encoded/embed the same data from channels 2,3 into the linear Transformer model as well; which is probably more straightforward.  (So, using VIT probably not as clever as I originally thought)</a:t>
             </a:r>
+          </a:p>
+          <a:p>
+            <a:pPr marL="742950" lvl="1" indent="-285750">
+              <a:buFont typeface="Arial" panose="020B0604020202020204" pitchFamily="34" charset="0"/>
+              <a:buChar char="•"/>
+            </a:pPr>
+            <a:endParaRPr lang="en-US" sz="1600" dirty="0"/>
+          </a:p>
+          <a:p>
+            <a:pPr marL="742950" lvl="1" indent="-285750">
+              <a:buFont typeface="Arial" panose="020B0604020202020204" pitchFamily="34" charset="0"/>
+              <a:buChar char="•"/>
+            </a:pPr>
+            <a:r>
+              <a:rPr lang="en-US" sz="1600" dirty="0"/>
+              <a:t>CAVEAT #2: probably even worse since the inductive bias of an image infers that nearby pixels have </a:t>
+            </a:r>
+            <a:r>
+              <a:rPr lang="en-US" sz="1600"/>
+              <a:t>significant relationships.</a:t>
+            </a:r>
+            <a:endParaRPr lang="en-US" sz="1600" dirty="0"/>
           </a:p>
           <a:p>
             <a:pPr marL="742950" lvl="1" indent="-285750">

</xml_diff>

<commit_message>
more work on pretrain & finetune code and dataset(s)
</commit_message>
<xml_diff>
--- a/Homework-aAlphaBio.pptx
+++ b/Homework-aAlphaBio.pptx
@@ -28,6 +28,10 @@
     <p:sldId id="376" r:id="rId22"/>
     <p:sldId id="379" r:id="rId23"/>
     <p:sldId id="377" r:id="rId24"/>
+    <p:sldId id="380" r:id="rId25"/>
+    <p:sldId id="383" r:id="rId26"/>
+    <p:sldId id="381" r:id="rId27"/>
+    <p:sldId id="382" r:id="rId28"/>
   </p:sldIdLst>
   <p:sldSz cx="12192000" cy="6858000"/>
   <p:notesSz cx="6858000" cy="9144000"/>
@@ -9907,7 +9911,7 @@
         <p:spPr>
           <a:xfrm>
             <a:off x="3073121" y="1121434"/>
-            <a:ext cx="6045758" cy="646331"/>
+            <a:ext cx="6387198" cy="646331"/>
           </a:xfrm>
           <a:prstGeom prst="rect">
             <a:avLst/>
@@ -9922,7 +9926,7 @@
           <a:p>
             <a:r>
               <a:rPr lang="en-US" sz="3600" dirty="0"/>
-              <a:t>Addendum (submitted May 9)</a:t>
+              <a:t>Addendum 1 (submitted May 9)</a:t>
             </a:r>
           </a:p>
         </p:txBody>
@@ -12310,6 +12314,1350 @@
     <p:extLst>
       <p:ext uri="{BB962C8B-B14F-4D97-AF65-F5344CB8AC3E}">
         <p14:creationId xmlns:p14="http://schemas.microsoft.com/office/powerpoint/2010/main" val="2201223583"/>
+      </p:ext>
+    </p:extLst>
+  </p:cSld>
+  <p:clrMapOvr>
+    <a:masterClrMapping/>
+  </p:clrMapOvr>
+</p:sld>
+</file>
+
+<file path=ppt/slides/slide24.xml><?xml version="1.0" encoding="utf-8"?>
+<p:sld xmlns:a="http://schemas.openxmlformats.org/drawingml/2006/main" xmlns:r="http://schemas.openxmlformats.org/officeDocument/2006/relationships" xmlns:p="http://schemas.openxmlformats.org/presentationml/2006/main">
+  <p:cSld>
+    <p:spTree>
+      <p:nvGrpSpPr>
+        <p:cNvPr id="1" name=""/>
+        <p:cNvGrpSpPr/>
+        <p:nvPr/>
+      </p:nvGrpSpPr>
+      <p:grpSpPr>
+        <a:xfrm>
+          <a:off x="0" y="0"/>
+          <a:ext cx="0" cy="0"/>
+          <a:chOff x="0" y="0"/>
+          <a:chExt cx="0" cy="0"/>
+        </a:xfrm>
+      </p:grpSpPr>
+      <p:sp>
+        <p:nvSpPr>
+          <p:cNvPr id="3" name="TextBox 2">
+            <a:extLst>
+              <a:ext uri="{FF2B5EF4-FFF2-40B4-BE49-F238E27FC236}">
+                <a16:creationId xmlns:a16="http://schemas.microsoft.com/office/drawing/2014/main" id="{96C60A96-319C-393F-A041-4E3029C2EC02}"/>
+              </a:ext>
+            </a:extLst>
+          </p:cNvPr>
+          <p:cNvSpPr txBox="1"/>
+          <p:nvPr/>
+        </p:nvSpPr>
+        <p:spPr>
+          <a:xfrm>
+            <a:off x="473141" y="1158495"/>
+            <a:ext cx="11094881" cy="4524315"/>
+          </a:xfrm>
+          <a:prstGeom prst="rect">
+            <a:avLst/>
+          </a:prstGeom>
+          <a:noFill/>
+        </p:spPr>
+        <p:txBody>
+          <a:bodyPr wrap="square" rtlCol="0">
+            <a:spAutoFit/>
+          </a:bodyPr>
+          <a:lstStyle/>
+          <a:p>
+            <a:r>
+              <a:rPr lang="en-US" b="1" dirty="0"/>
+              <a:t>Continuing work</a:t>
+            </a:r>
+          </a:p>
+          <a:p>
+            <a:pPr marL="342900" indent="-342900">
+              <a:buFont typeface="Arial" panose="020B0604020202020204" pitchFamily="34" charset="0"/>
+              <a:buChar char="•"/>
+            </a:pPr>
+            <a:r>
+              <a:rPr lang="en-US" dirty="0"/>
+              <a:t>Modified Transformer (</a:t>
+            </a:r>
+            <a:r>
+              <a:rPr lang="en-US" dirty="0" err="1"/>
+              <a:t>tform.py</a:t>
+            </a:r>
+            <a:r>
+              <a:rPr lang="en-US" dirty="0"/>
+              <a:t>) model to support pre-training using masked language model (MLM)</a:t>
+            </a:r>
+          </a:p>
+          <a:p>
+            <a:pPr marL="342900" indent="-342900">
+              <a:buFont typeface="Arial" panose="020B0604020202020204" pitchFamily="34" charset="0"/>
+              <a:buChar char="•"/>
+            </a:pPr>
+            <a:r>
+              <a:rPr lang="en-US" dirty="0" err="1"/>
+              <a:t>Tform</a:t>
+            </a:r>
+            <a:r>
+              <a:rPr lang="en-US" dirty="0"/>
+              <a:t> can now be pre-trained as MLM and then fine-tuned on regression data</a:t>
+            </a:r>
+          </a:p>
+          <a:p>
+            <a:pPr marL="342900" indent="-342900">
+              <a:buFont typeface="Arial" panose="020B0604020202020204" pitchFamily="34" charset="0"/>
+              <a:buChar char="•"/>
+            </a:pPr>
+            <a:r>
+              <a:rPr lang="en-US" dirty="0"/>
+              <a:t>Modified </a:t>
+            </a:r>
+            <a:r>
+              <a:rPr lang="en-US" dirty="0" err="1"/>
+              <a:t>scFv_dataset</a:t>
+            </a:r>
+            <a:r>
+              <a:rPr lang="en-US" dirty="0"/>
+              <a:t> to support delivering either MLM or regression data depending on config</a:t>
+            </a:r>
+          </a:p>
+          <a:p>
+            <a:pPr marL="342900" indent="-342900">
+              <a:buFont typeface="Arial" panose="020B0604020202020204" pitchFamily="34" charset="0"/>
+              <a:buChar char="•"/>
+            </a:pPr>
+            <a:endParaRPr lang="en-US" dirty="0"/>
+          </a:p>
+          <a:p>
+            <a:pPr marL="342900" indent="-342900">
+              <a:buFont typeface="Arial" panose="020B0604020202020204" pitchFamily="34" charset="0"/>
+              <a:buChar char="•"/>
+            </a:pPr>
+            <a:r>
+              <a:rPr lang="en-US" dirty="0"/>
+              <a:t>Pretrain dataset: </a:t>
+            </a:r>
+          </a:p>
+          <a:p>
+            <a:pPr marL="800100" lvl="1" indent="-342900">
+              <a:buFont typeface="Arial" panose="020B0604020202020204" pitchFamily="34" charset="0"/>
+              <a:buChar char="•"/>
+            </a:pPr>
+            <a:r>
+              <a:rPr lang="en-US" dirty="0"/>
+              <a:t>As a test, I used the 17665 rows from </a:t>
+            </a:r>
+            <a:r>
+              <a:rPr lang="en-US" dirty="0" err="1"/>
+              <a:t>alphaseq_data_train.csv</a:t>
+            </a:r>
+            <a:r>
+              <a:rPr lang="en-US" dirty="0"/>
+              <a:t> that have </a:t>
+            </a:r>
+            <a:r>
+              <a:rPr lang="en-US" dirty="0" err="1"/>
+              <a:t>q_value</a:t>
+            </a:r>
+            <a:r>
+              <a:rPr lang="en-US" dirty="0"/>
+              <a:t> &gt; 0.5</a:t>
+            </a:r>
+          </a:p>
+          <a:p>
+            <a:pPr marL="800100" lvl="1" indent="-342900">
+              <a:buFont typeface="Arial" panose="020B0604020202020204" pitchFamily="34" charset="0"/>
+              <a:buChar char="•"/>
+            </a:pPr>
+            <a:r>
+              <a:rPr lang="en-US" dirty="0"/>
+              <a:t>These data are not included in the cleaned-4b dataset and only their sequences are used (not the </a:t>
+            </a:r>
+            <a:r>
+              <a:rPr lang="en-US" dirty="0" err="1"/>
+              <a:t>Kd</a:t>
+            </a:r>
+            <a:r>
+              <a:rPr lang="en-US" dirty="0"/>
+              <a:t>)</a:t>
+            </a:r>
+          </a:p>
+          <a:p>
+            <a:pPr marL="800100" lvl="1" indent="-342900">
+              <a:buFont typeface="Arial" panose="020B0604020202020204" pitchFamily="34" charset="0"/>
+              <a:buChar char="•"/>
+            </a:pPr>
+            <a:r>
+              <a:rPr lang="en-US" dirty="0"/>
+              <a:t>Pre-train with mask prob = 0.15.  Do not use the s</a:t>
+            </a:r>
+            <a:r>
+              <a:rPr lang="en-US" b="0" dirty="0">
+                <a:effectLst/>
+              </a:rPr>
+              <a:t>tandard 80-10-10 corruption strategy, but replace all masked residues the MASK token</a:t>
+            </a:r>
+          </a:p>
+          <a:p>
+            <a:pPr marL="800100" lvl="1" indent="-342900">
+              <a:buFont typeface="Arial" panose="020B0604020202020204" pitchFamily="34" charset="0"/>
+              <a:buChar char="•"/>
+            </a:pPr>
+            <a:endParaRPr lang="en-US" dirty="0"/>
+          </a:p>
+          <a:p>
+            <a:pPr marL="342900" indent="-342900">
+              <a:buFont typeface="Arial" panose="020B0604020202020204" pitchFamily="34" charset="0"/>
+              <a:buChar char="•"/>
+            </a:pPr>
+            <a:r>
+              <a:rPr lang="en-US" b="0" dirty="0">
+                <a:effectLst/>
+              </a:rPr>
+              <a:t>Fine tune train:</a:t>
+            </a:r>
+          </a:p>
+          <a:p>
+            <a:pPr marL="800100" lvl="1" indent="-342900">
+              <a:buFont typeface="Arial" panose="020B0604020202020204" pitchFamily="34" charset="0"/>
+              <a:buChar char="•"/>
+            </a:pPr>
+            <a:r>
+              <a:rPr lang="en-US" dirty="0"/>
+              <a:t>Use cleaned-4b dataset.</a:t>
+            </a:r>
+          </a:p>
+          <a:p>
+            <a:pPr marL="800100" lvl="1" indent="-342900">
+              <a:buFont typeface="Arial" panose="020B0604020202020204" pitchFamily="34" charset="0"/>
+              <a:buChar char="•"/>
+            </a:pPr>
+            <a:r>
+              <a:rPr lang="en-US" b="0" dirty="0">
+                <a:effectLst/>
+              </a:rPr>
+              <a:t>Freeze the base Transformer model</a:t>
+            </a:r>
+          </a:p>
+          <a:p>
+            <a:pPr marL="800100" lvl="1" indent="-342900">
+              <a:buFont typeface="Arial" panose="020B0604020202020204" pitchFamily="34" charset="0"/>
+              <a:buChar char="•"/>
+            </a:pPr>
+            <a:r>
+              <a:rPr lang="en-US" b="0" dirty="0">
+                <a:effectLst/>
+              </a:rPr>
+              <a:t>Train only the regression head</a:t>
+            </a:r>
+          </a:p>
+          <a:p>
+            <a:pPr marL="800100" lvl="1" indent="-342900">
+              <a:buFont typeface="Arial" panose="020B0604020202020204" pitchFamily="34" charset="0"/>
+              <a:buChar char="•"/>
+            </a:pPr>
+            <a:endParaRPr lang="en-US" dirty="0"/>
+          </a:p>
+        </p:txBody>
+      </p:sp>
+      <p:sp>
+        <p:nvSpPr>
+          <p:cNvPr id="2" name="TextBox 1">
+            <a:extLst>
+              <a:ext uri="{FF2B5EF4-FFF2-40B4-BE49-F238E27FC236}">
+                <a16:creationId xmlns:a16="http://schemas.microsoft.com/office/drawing/2014/main" id="{D9A9E41F-3A3B-C1E8-CA23-0D6862AED3EF}"/>
+              </a:ext>
+            </a:extLst>
+          </p:cNvPr>
+          <p:cNvSpPr txBox="1"/>
+          <p:nvPr/>
+        </p:nvSpPr>
+        <p:spPr>
+          <a:xfrm>
+            <a:off x="4004774" y="138023"/>
+            <a:ext cx="2723823" cy="646331"/>
+          </a:xfrm>
+          <a:prstGeom prst="rect">
+            <a:avLst/>
+          </a:prstGeom>
+          <a:noFill/>
+        </p:spPr>
+        <p:txBody>
+          <a:bodyPr wrap="none" rtlCol="0">
+            <a:spAutoFit/>
+          </a:bodyPr>
+          <a:lstStyle/>
+          <a:p>
+            <a:r>
+              <a:rPr lang="en-US" sz="3600" dirty="0"/>
+              <a:t>Addendum 2</a:t>
+            </a:r>
+          </a:p>
+        </p:txBody>
+      </p:sp>
+      <p:sp>
+        <p:nvSpPr>
+          <p:cNvPr id="4" name="TextBox 3">
+            <a:extLst>
+              <a:ext uri="{FF2B5EF4-FFF2-40B4-BE49-F238E27FC236}">
+                <a16:creationId xmlns:a16="http://schemas.microsoft.com/office/drawing/2014/main" id="{1005CB07-8364-D093-8466-2CA2ECAC3ADE}"/>
+              </a:ext>
+            </a:extLst>
+          </p:cNvPr>
+          <p:cNvSpPr txBox="1"/>
+          <p:nvPr/>
+        </p:nvSpPr>
+        <p:spPr>
+          <a:xfrm>
+            <a:off x="10472468" y="138023"/>
+            <a:ext cx="1494063" cy="369332"/>
+          </a:xfrm>
+          <a:prstGeom prst="rect">
+            <a:avLst/>
+          </a:prstGeom>
+          <a:noFill/>
+        </p:spPr>
+        <p:txBody>
+          <a:bodyPr wrap="none" rtlCol="0">
+            <a:spAutoFit/>
+          </a:bodyPr>
+          <a:lstStyle/>
+          <a:p>
+            <a:r>
+              <a:rPr lang="en-US" dirty="0"/>
+              <a:t>May 12, 2024</a:t>
+            </a:r>
+          </a:p>
+        </p:txBody>
+      </p:sp>
+      <p:sp>
+        <p:nvSpPr>
+          <p:cNvPr id="5" name="TextBox 4">
+            <a:extLst>
+              <a:ext uri="{FF2B5EF4-FFF2-40B4-BE49-F238E27FC236}">
+                <a16:creationId xmlns:a16="http://schemas.microsoft.com/office/drawing/2014/main" id="{BEB8DF63-4235-2FC8-A74E-569CA53C6CF0}"/>
+              </a:ext>
+            </a:extLst>
+          </p:cNvPr>
+          <p:cNvSpPr txBox="1"/>
+          <p:nvPr/>
+        </p:nvSpPr>
+        <p:spPr>
+          <a:xfrm>
+            <a:off x="5771072" y="4054415"/>
+            <a:ext cx="5947787" cy="646331"/>
+          </a:xfrm>
+          <a:prstGeom prst="rect">
+            <a:avLst/>
+          </a:prstGeom>
+          <a:noFill/>
+        </p:spPr>
+        <p:txBody>
+          <a:bodyPr wrap="square" rtlCol="0">
+            <a:spAutoFit/>
+          </a:bodyPr>
+          <a:lstStyle/>
+          <a:p>
+            <a:r>
+              <a:rPr lang="en-US" dirty="0">
+                <a:highlight>
+                  <a:srgbClr val="FFFF00"/>
+                </a:highlight>
+              </a:rPr>
+              <a:t>TODO:</a:t>
+            </a:r>
+          </a:p>
+          <a:p>
+            <a:pPr marL="285750" indent="-285750">
+              <a:buFont typeface="Arial" panose="020B0604020202020204" pitchFamily="34" charset="0"/>
+              <a:buChar char="•"/>
+            </a:pPr>
+            <a:r>
+              <a:rPr lang="en-US" dirty="0">
+                <a:highlight>
+                  <a:srgbClr val="FFFF00"/>
+                </a:highlight>
+              </a:rPr>
+              <a:t>fixed sinusoidal embedding for token and position</a:t>
+            </a:r>
+          </a:p>
+        </p:txBody>
+      </p:sp>
+    </p:spTree>
+    <p:extLst>
+      <p:ext uri="{BB962C8B-B14F-4D97-AF65-F5344CB8AC3E}">
+        <p14:creationId xmlns:p14="http://schemas.microsoft.com/office/powerpoint/2010/main" val="2413058371"/>
+      </p:ext>
+    </p:extLst>
+  </p:cSld>
+  <p:clrMapOvr>
+    <a:masterClrMapping/>
+  </p:clrMapOvr>
+</p:sld>
+</file>
+
+<file path=ppt/slides/slide25.xml><?xml version="1.0" encoding="utf-8"?>
+<p:sld xmlns:a="http://schemas.openxmlformats.org/drawingml/2006/main" xmlns:r="http://schemas.openxmlformats.org/officeDocument/2006/relationships" xmlns:p="http://schemas.openxmlformats.org/presentationml/2006/main">
+  <p:cSld>
+    <p:spTree>
+      <p:nvGrpSpPr>
+        <p:cNvPr id="1" name=""/>
+        <p:cNvGrpSpPr/>
+        <p:nvPr/>
+      </p:nvGrpSpPr>
+      <p:grpSpPr>
+        <a:xfrm>
+          <a:off x="0" y="0"/>
+          <a:ext cx="0" cy="0"/>
+          <a:chOff x="0" y="0"/>
+          <a:chExt cx="0" cy="0"/>
+        </a:xfrm>
+      </p:grpSpPr>
+      <p:sp>
+        <p:nvSpPr>
+          <p:cNvPr id="2" name="TextBox 1">
+            <a:extLst>
+              <a:ext uri="{FF2B5EF4-FFF2-40B4-BE49-F238E27FC236}">
+                <a16:creationId xmlns:a16="http://schemas.microsoft.com/office/drawing/2014/main" id="{D7B699E5-6A91-D5D4-A6B0-C71C42589BC8}"/>
+              </a:ext>
+            </a:extLst>
+          </p:cNvPr>
+          <p:cNvSpPr txBox="1"/>
+          <p:nvPr/>
+        </p:nvSpPr>
+        <p:spPr>
+          <a:xfrm>
+            <a:off x="114248" y="144344"/>
+            <a:ext cx="6089231" cy="461665"/>
+          </a:xfrm>
+          <a:prstGeom prst="rect">
+            <a:avLst/>
+          </a:prstGeom>
+          <a:noFill/>
+        </p:spPr>
+        <p:txBody>
+          <a:bodyPr wrap="none" rtlCol="0">
+            <a:spAutoFit/>
+          </a:bodyPr>
+          <a:lstStyle/>
+          <a:p>
+            <a:r>
+              <a:rPr lang="en-US" sz="2400" dirty="0"/>
+              <a:t>Transformer standard vs pre-trained versions</a:t>
+            </a:r>
+          </a:p>
+        </p:txBody>
+      </p:sp>
+      <p:graphicFrame>
+        <p:nvGraphicFramePr>
+          <p:cNvPr id="3" name="Table 2">
+            <a:extLst>
+              <a:ext uri="{FF2B5EF4-FFF2-40B4-BE49-F238E27FC236}">
+                <a16:creationId xmlns:a16="http://schemas.microsoft.com/office/drawing/2014/main" id="{06968A34-6E02-9A89-9D28-711A65FA6A49}"/>
+              </a:ext>
+            </a:extLst>
+          </p:cNvPr>
+          <p:cNvGraphicFramePr>
+            <a:graphicFrameLocks noGrp="1"/>
+          </p:cNvGraphicFramePr>
+          <p:nvPr>
+            <p:extLst>
+              <p:ext uri="{D42A27DB-BD31-4B8C-83A1-F6EECF244321}">
+                <p14:modId xmlns:p14="http://schemas.microsoft.com/office/powerpoint/2010/main" val="1566764061"/>
+              </p:ext>
+            </p:extLst>
+          </p:nvPr>
+        </p:nvGraphicFramePr>
+        <p:xfrm>
+          <a:off x="481672" y="1211917"/>
+          <a:ext cx="10267469" cy="2137247"/>
+        </p:xfrm>
+        <a:graphic>
+          <a:graphicData uri="http://schemas.openxmlformats.org/drawingml/2006/table">
+            <a:tbl>
+              <a:tblPr firstRow="1" bandRow="1">
+                <a:tableStyleId>{5C22544A-7EE6-4342-B048-85BDC9FD1C3A}</a:tableStyleId>
+              </a:tblPr>
+              <a:tblGrid>
+                <a:gridCol w="1375706">
+                  <a:extLst>
+                    <a:ext uri="{9D8B030D-6E8A-4147-A177-3AD203B41FA5}">
+                      <a16:colId xmlns:a16="http://schemas.microsoft.com/office/drawing/2014/main" val="1065848917"/>
+                    </a:ext>
+                  </a:extLst>
+                </a:gridCol>
+                <a:gridCol w="1211961">
+                  <a:extLst>
+                    <a:ext uri="{9D8B030D-6E8A-4147-A177-3AD203B41FA5}">
+                      <a16:colId xmlns:a16="http://schemas.microsoft.com/office/drawing/2014/main" val="873310604"/>
+                    </a:ext>
+                  </a:extLst>
+                </a:gridCol>
+                <a:gridCol w="1032637">
+                  <a:extLst>
+                    <a:ext uri="{9D8B030D-6E8A-4147-A177-3AD203B41FA5}">
+                      <a16:colId xmlns:a16="http://schemas.microsoft.com/office/drawing/2014/main" val="3981708244"/>
+                    </a:ext>
+                  </a:extLst>
+                </a:gridCol>
+                <a:gridCol w="894080">
+                  <a:extLst>
+                    <a:ext uri="{9D8B030D-6E8A-4147-A177-3AD203B41FA5}">
+                      <a16:colId xmlns:a16="http://schemas.microsoft.com/office/drawing/2014/main" val="1135465181"/>
+                    </a:ext>
+                  </a:extLst>
+                </a:gridCol>
+                <a:gridCol w="700450">
+                  <a:extLst>
+                    <a:ext uri="{9D8B030D-6E8A-4147-A177-3AD203B41FA5}">
+                      <a16:colId xmlns:a16="http://schemas.microsoft.com/office/drawing/2014/main" val="2228991909"/>
+                    </a:ext>
+                  </a:extLst>
+                </a:gridCol>
+                <a:gridCol w="749545">
+                  <a:extLst>
+                    <a:ext uri="{9D8B030D-6E8A-4147-A177-3AD203B41FA5}">
+                      <a16:colId xmlns:a16="http://schemas.microsoft.com/office/drawing/2014/main" val="1586729873"/>
+                    </a:ext>
+                  </a:extLst>
+                </a:gridCol>
+                <a:gridCol w="978208">
+                  <a:extLst>
+                    <a:ext uri="{9D8B030D-6E8A-4147-A177-3AD203B41FA5}">
+                      <a16:colId xmlns:a16="http://schemas.microsoft.com/office/drawing/2014/main" val="2038468716"/>
+                    </a:ext>
+                  </a:extLst>
+                </a:gridCol>
+                <a:gridCol w="953277">
+                  <a:extLst>
+                    <a:ext uri="{9D8B030D-6E8A-4147-A177-3AD203B41FA5}">
+                      <a16:colId xmlns:a16="http://schemas.microsoft.com/office/drawing/2014/main" val="1596270969"/>
+                    </a:ext>
+                  </a:extLst>
+                </a:gridCol>
+                <a:gridCol w="953277">
+                  <a:extLst>
+                    <a:ext uri="{9D8B030D-6E8A-4147-A177-3AD203B41FA5}">
+                      <a16:colId xmlns:a16="http://schemas.microsoft.com/office/drawing/2014/main" val="2430703789"/>
+                    </a:ext>
+                  </a:extLst>
+                </a:gridCol>
+                <a:gridCol w="1418328">
+                  <a:extLst>
+                    <a:ext uri="{9D8B030D-6E8A-4147-A177-3AD203B41FA5}">
+                      <a16:colId xmlns:a16="http://schemas.microsoft.com/office/drawing/2014/main" val="2256753199"/>
+                    </a:ext>
+                  </a:extLst>
+                </a:gridCol>
+              </a:tblGrid>
+              <a:tr h="430367">
+                <a:tc rowSpan="2">
+                  <a:txBody>
+                    <a:bodyPr/>
+                    <a:lstStyle/>
+                    <a:p>
+                      <a:pPr algn="ctr"/>
+                      <a:r>
+                        <a:rPr lang="en-US" dirty="0"/>
+                        <a:t>Model</a:t>
+                      </a:r>
+                      <a:endParaRPr dirty="0"/>
+                    </a:p>
+                  </a:txBody>
+                  <a:tcPr anchor="ctr"/>
+                </a:tc>
+                <a:tc rowSpan="2">
+                  <a:txBody>
+                    <a:bodyPr/>
+                    <a:lstStyle/>
+                    <a:p>
+                      <a:pPr algn="ctr"/>
+                      <a:r>
+                        <a:rPr lang="en-US" dirty="0"/>
+                        <a:t>Train loss</a:t>
+                      </a:r>
+                      <a:endParaRPr dirty="0"/>
+                    </a:p>
+                  </a:txBody>
+                  <a:tcPr anchor="ctr"/>
+                </a:tc>
+                <a:tc rowSpan="2">
+                  <a:txBody>
+                    <a:bodyPr/>
+                    <a:lstStyle/>
+                    <a:p>
+                      <a:pPr algn="ctr"/>
+                      <a:r>
+                        <a:rPr lang="en-US" dirty="0"/>
+                        <a:t>Val loss</a:t>
+                      </a:r>
+                      <a:endParaRPr dirty="0"/>
+                    </a:p>
+                  </a:txBody>
+                  <a:tcPr anchor="ctr"/>
+                </a:tc>
+                <a:tc rowSpan="2">
+                  <a:txBody>
+                    <a:bodyPr/>
+                    <a:lstStyle/>
+                    <a:p>
+                      <a:pPr algn="ctr"/>
+                      <a:r>
+                        <a:rPr lang="en-US" sz="1600" dirty="0"/>
+                        <a:t>Epochs</a:t>
+                      </a:r>
+                      <a:endParaRPr lang="en-US" sz="1600" baseline="30000" dirty="0"/>
+                    </a:p>
+                  </a:txBody>
+                  <a:tcPr anchor="ctr"/>
+                </a:tc>
+                <a:tc gridSpan="5">
+                  <a:txBody>
+                    <a:bodyPr/>
+                    <a:lstStyle/>
+                    <a:p>
+                      <a:pPr algn="ctr"/>
+                      <a:r>
+                        <a:rPr lang="en-US" sz="1600" b="1" dirty="0"/>
+                        <a:t>Test set</a:t>
+                      </a:r>
+                    </a:p>
+                  </a:txBody>
+                  <a:tcPr anchor="ctr"/>
+                </a:tc>
+                <a:tc hMerge="1">
+                  <a:txBody>
+                    <a:bodyPr/>
+                    <a:lstStyle/>
+                    <a:p>
+                      <a:pPr algn="ctr"/>
+                      <a:endParaRPr lang="en-US" sz="1600" dirty="0"/>
+                    </a:p>
+                  </a:txBody>
+                  <a:tcPr anchor="ctr"/>
+                </a:tc>
+                <a:tc hMerge="1">
+                  <a:txBody>
+                    <a:bodyPr/>
+                    <a:lstStyle/>
+                    <a:p>
+                      <a:pPr algn="ctr"/>
+                      <a:endParaRPr lang="en-US" sz="1600" baseline="30000" dirty="0"/>
+                    </a:p>
+                  </a:txBody>
+                  <a:tcPr anchor="ctr"/>
+                </a:tc>
+                <a:tc hMerge="1">
+                  <a:txBody>
+                    <a:bodyPr/>
+                    <a:lstStyle/>
+                    <a:p>
+                      <a:pPr algn="ctr"/>
+                      <a:endParaRPr lang="en-US" sz="1600" baseline="30000" dirty="0"/>
+                    </a:p>
+                  </a:txBody>
+                  <a:tcPr anchor="ctr"/>
+                </a:tc>
+                <a:tc hMerge="1">
+                  <a:txBody>
+                    <a:bodyPr/>
+                    <a:lstStyle/>
+                    <a:p>
+                      <a:pPr marL="0" marR="0" lvl="0" indent="0" algn="ctr" defTabSz="914400" rtl="0" eaLnBrk="1" fontAlgn="auto" latinLnBrk="0" hangingPunct="1">
+                        <a:lnSpc>
+                          <a:spcPct val="100000"/>
+                        </a:lnSpc>
+                        <a:spcBef>
+                          <a:spcPts val="0"/>
+                        </a:spcBef>
+                        <a:spcAft>
+                          <a:spcPts val="0"/>
+                        </a:spcAft>
+                        <a:buClrTx/>
+                        <a:buSzTx/>
+                        <a:buFontTx/>
+                        <a:buNone/>
+                        <a:tabLst/>
+                        <a:defRPr/>
+                      </a:pPr>
+                      <a:endParaRPr lang="en-US" sz="1600" baseline="30000" dirty="0"/>
+                    </a:p>
+                  </a:txBody>
+                  <a:tcPr anchor="ctr"/>
+                </a:tc>
+                <a:tc rowSpan="2">
+                  <a:txBody>
+                    <a:bodyPr/>
+                    <a:lstStyle/>
+                    <a:p>
+                      <a:pPr algn="ctr"/>
+                      <a:r>
+                        <a:rPr lang="en-US" sz="1600" dirty="0"/>
+                        <a:t>Comment</a:t>
+                      </a:r>
+                    </a:p>
+                  </a:txBody>
+                  <a:tcPr anchor="ctr"/>
+                </a:tc>
+                <a:extLst>
+                  <a:ext uri="{0D108BD9-81ED-4DB2-BD59-A6C34878D82A}">
+                    <a16:rowId xmlns:a16="http://schemas.microsoft.com/office/drawing/2014/main" val="4196566999"/>
+                  </a:ext>
+                </a:extLst>
+              </a:tr>
+              <a:tr h="457200">
+                <a:tc vMerge="1">
+                  <a:txBody>
+                    <a:bodyPr/>
+                    <a:lstStyle/>
+                    <a:p>
+                      <a:endParaRPr dirty="0"/>
+                    </a:p>
+                  </a:txBody>
+                  <a:tcPr anchor="ctr"/>
+                </a:tc>
+                <a:tc vMerge="1">
+                  <a:txBody>
+                    <a:bodyPr/>
+                    <a:lstStyle/>
+                    <a:p>
+                      <a:endParaRPr dirty="0"/>
+                    </a:p>
+                  </a:txBody>
+                  <a:tcPr anchor="ctr"/>
+                </a:tc>
+                <a:tc vMerge="1">
+                  <a:txBody>
+                    <a:bodyPr/>
+                    <a:lstStyle/>
+                    <a:p>
+                      <a:endParaRPr dirty="0"/>
+                    </a:p>
+                  </a:txBody>
+                  <a:tcPr anchor="ctr"/>
+                </a:tc>
+                <a:tc vMerge="1">
+                  <a:txBody>
+                    <a:bodyPr/>
+                    <a:lstStyle/>
+                    <a:p>
+                      <a:endParaRPr dirty="0"/>
+                    </a:p>
+                  </a:txBody>
+                  <a:tcPr anchor="ctr"/>
+                </a:tc>
+                <a:tc>
+                  <a:txBody>
+                    <a:bodyPr/>
+                    <a:lstStyle/>
+                    <a:p>
+                      <a:pPr algn="ctr"/>
+                      <a:r>
+                        <a:rPr lang="en-US" sz="1600" dirty="0"/>
+                        <a:t>MAE</a:t>
+                      </a:r>
+                    </a:p>
+                  </a:txBody>
+                  <a:tcPr anchor="ctr"/>
+                </a:tc>
+                <a:tc>
+                  <a:txBody>
+                    <a:bodyPr/>
+                    <a:lstStyle/>
+                    <a:p>
+                      <a:pPr algn="ctr"/>
+                      <a:r>
+                        <a:rPr lang="en-US" sz="1600" dirty="0"/>
+                        <a:t>MSE</a:t>
+                      </a:r>
+                    </a:p>
+                  </a:txBody>
+                  <a:tcPr anchor="ctr"/>
+                </a:tc>
+                <a:tc>
+                  <a:txBody>
+                    <a:bodyPr/>
+                    <a:lstStyle/>
+                    <a:p>
+                      <a:pPr algn="ctr"/>
+                      <a:r>
+                        <a:rPr lang="en-US" sz="1600" dirty="0"/>
+                        <a:t>MAPE </a:t>
+                      </a:r>
+                      <a:r>
+                        <a:rPr lang="en-US" sz="1600" baseline="30000" dirty="0"/>
+                        <a:t>1</a:t>
+                      </a:r>
+                    </a:p>
+                  </a:txBody>
+                  <a:tcPr anchor="ctr"/>
+                </a:tc>
+                <a:tc>
+                  <a:txBody>
+                    <a:bodyPr/>
+                    <a:lstStyle/>
+                    <a:p>
+                      <a:pPr algn="ctr"/>
+                      <a:r>
+                        <a:rPr lang="en-US" sz="1600" dirty="0"/>
+                        <a:t>PPE10 </a:t>
+                      </a:r>
+                      <a:r>
+                        <a:rPr lang="en-US" sz="1600" baseline="30000" dirty="0"/>
+                        <a:t>2</a:t>
+                      </a:r>
+                    </a:p>
+                  </a:txBody>
+                  <a:tcPr anchor="ctr"/>
+                </a:tc>
+                <a:tc>
+                  <a:txBody>
+                    <a:bodyPr/>
+                    <a:lstStyle/>
+                    <a:p>
+                      <a:pPr marL="0" marR="0" lvl="0" indent="0" algn="ctr" defTabSz="914400" rtl="0" eaLnBrk="1" fontAlgn="auto" latinLnBrk="0" hangingPunct="1">
+                        <a:lnSpc>
+                          <a:spcPct val="100000"/>
+                        </a:lnSpc>
+                        <a:spcBef>
+                          <a:spcPts val="0"/>
+                        </a:spcBef>
+                        <a:spcAft>
+                          <a:spcPts val="0"/>
+                        </a:spcAft>
+                        <a:buClrTx/>
+                        <a:buSzTx/>
+                        <a:buFontTx/>
+                        <a:buNone/>
+                        <a:tabLst/>
+                        <a:defRPr/>
+                      </a:pPr>
+                      <a:r>
+                        <a:rPr lang="en-US" sz="1600" dirty="0"/>
+                        <a:t>PPE20 </a:t>
+                      </a:r>
+                      <a:r>
+                        <a:rPr lang="en-US" sz="1600" baseline="30000" dirty="0"/>
+                        <a:t>3</a:t>
+                      </a:r>
+                    </a:p>
+                  </a:txBody>
+                  <a:tcPr anchor="ctr"/>
+                </a:tc>
+                <a:tc vMerge="1">
+                  <a:txBody>
+                    <a:bodyPr/>
+                    <a:lstStyle/>
+                    <a:p>
+                      <a:endParaRPr dirty="0"/>
+                    </a:p>
+                  </a:txBody>
+                  <a:tcPr anchor="ctr"/>
+                </a:tc>
+                <a:extLst>
+                  <a:ext uri="{0D108BD9-81ED-4DB2-BD59-A6C34878D82A}">
+                    <a16:rowId xmlns:a16="http://schemas.microsoft.com/office/drawing/2014/main" val="1617347897"/>
+                  </a:ext>
+                </a:extLst>
+              </a:tr>
+              <a:tr h="494487">
+                <a:tc>
+                  <a:txBody>
+                    <a:bodyPr/>
+                    <a:lstStyle/>
+                    <a:p>
+                      <a:pPr marL="0" marR="0" lvl="0" indent="0" algn="ctr" defTabSz="914400" rtl="0" eaLnBrk="1" fontAlgn="auto" latinLnBrk="0" hangingPunct="1">
+                        <a:lnSpc>
+                          <a:spcPct val="100000"/>
+                        </a:lnSpc>
+                        <a:spcBef>
+                          <a:spcPts val="0"/>
+                        </a:spcBef>
+                        <a:spcAft>
+                          <a:spcPts val="0"/>
+                        </a:spcAft>
+                        <a:buClrTx/>
+                        <a:buSzTx/>
+                        <a:buFontTx/>
+                        <a:buNone/>
+                        <a:tabLst/>
+                        <a:defRPr/>
+                      </a:pPr>
+                      <a:r>
+                        <a:rPr lang="en-US" sz="1600" dirty="0"/>
+                        <a:t>Transformer</a:t>
+                      </a:r>
+                      <a:endParaRPr lang="en-US" sz="1600" baseline="30000" dirty="0"/>
+                    </a:p>
+                  </a:txBody>
+                  <a:tcPr anchor="ctr"/>
+                </a:tc>
+                <a:tc>
+                  <a:txBody>
+                    <a:bodyPr/>
+                    <a:lstStyle/>
+                    <a:p>
+                      <a:pPr algn="ctr"/>
+                      <a:r>
+                        <a:rPr lang="en-US" sz="1600" dirty="0">
+                          <a:solidFill>
+                            <a:schemeClr val="tx1"/>
+                          </a:solidFill>
+                        </a:rPr>
+                        <a:t>0.09</a:t>
+                      </a:r>
+                    </a:p>
+                  </a:txBody>
+                  <a:tcPr anchor="ctr"/>
+                </a:tc>
+                <a:tc>
+                  <a:txBody>
+                    <a:bodyPr/>
+                    <a:lstStyle/>
+                    <a:p>
+                      <a:pPr algn="ctr"/>
+                      <a:r>
+                        <a:rPr lang="en-US" sz="1600" dirty="0">
+                          <a:solidFill>
+                            <a:schemeClr val="tx1"/>
+                          </a:solidFill>
+                        </a:rPr>
+                        <a:t>0.10</a:t>
+                      </a:r>
+                    </a:p>
+                  </a:txBody>
+                  <a:tcPr anchor="ctr"/>
+                </a:tc>
+                <a:tc>
+                  <a:txBody>
+                    <a:bodyPr/>
+                    <a:lstStyle/>
+                    <a:p>
+                      <a:pPr algn="ctr"/>
+                      <a:r>
+                        <a:rPr lang="en-US" sz="1600" dirty="0">
+                          <a:solidFill>
+                            <a:schemeClr val="tx1"/>
+                          </a:solidFill>
+                        </a:rPr>
+                        <a:t>135</a:t>
+                      </a:r>
+                    </a:p>
+                  </a:txBody>
+                  <a:tcPr anchor="ctr"/>
+                </a:tc>
+                <a:tc>
+                  <a:txBody>
+                    <a:bodyPr/>
+                    <a:lstStyle/>
+                    <a:p>
+                      <a:pPr algn="ctr"/>
+                      <a:r>
+                        <a:rPr lang="en-US" sz="1600" dirty="0">
+                          <a:solidFill>
+                            <a:schemeClr val="tx1"/>
+                          </a:solidFill>
+                        </a:rPr>
+                        <a:t>0.24</a:t>
+                      </a:r>
+                    </a:p>
+                  </a:txBody>
+                  <a:tcPr anchor="ctr"/>
+                </a:tc>
+                <a:tc>
+                  <a:txBody>
+                    <a:bodyPr/>
+                    <a:lstStyle/>
+                    <a:p>
+                      <a:pPr algn="ctr"/>
+                      <a:r>
+                        <a:rPr lang="en-US" sz="1600" dirty="0">
+                          <a:solidFill>
+                            <a:schemeClr val="tx1"/>
+                          </a:solidFill>
+                        </a:rPr>
+                        <a:t>0.11</a:t>
+                      </a:r>
+                    </a:p>
+                  </a:txBody>
+                  <a:tcPr anchor="ctr"/>
+                </a:tc>
+                <a:tc>
+                  <a:txBody>
+                    <a:bodyPr/>
+                    <a:lstStyle/>
+                    <a:p>
+                      <a:pPr algn="ctr"/>
+                      <a:r>
+                        <a:rPr lang="en-US" sz="1600" dirty="0">
+                          <a:solidFill>
+                            <a:schemeClr val="tx1"/>
+                          </a:solidFill>
+                        </a:rPr>
+                        <a:t>0.13</a:t>
+                      </a:r>
+                    </a:p>
+                  </a:txBody>
+                  <a:tcPr anchor="ctr"/>
+                </a:tc>
+                <a:tc>
+                  <a:txBody>
+                    <a:bodyPr/>
+                    <a:lstStyle/>
+                    <a:p>
+                      <a:pPr algn="ctr"/>
+                      <a:r>
+                        <a:rPr lang="en-US" sz="1600" dirty="0">
+                          <a:solidFill>
+                            <a:schemeClr val="tx1"/>
+                          </a:solidFill>
+                        </a:rPr>
+                        <a:t>57</a:t>
+                      </a:r>
+                    </a:p>
+                  </a:txBody>
+                  <a:tcPr anchor="ctr"/>
+                </a:tc>
+                <a:tc>
+                  <a:txBody>
+                    <a:bodyPr/>
+                    <a:lstStyle/>
+                    <a:p>
+                      <a:pPr algn="ctr"/>
+                      <a:r>
+                        <a:rPr lang="en-US" sz="1600" dirty="0">
+                          <a:solidFill>
+                            <a:schemeClr val="tx1"/>
+                          </a:solidFill>
+                        </a:rPr>
+                        <a:t>80</a:t>
+                      </a:r>
+                    </a:p>
+                  </a:txBody>
+                  <a:tcPr anchor="ctr"/>
+                </a:tc>
+                <a:tc>
+                  <a:txBody>
+                    <a:bodyPr/>
+                    <a:lstStyle/>
+                    <a:p>
+                      <a:pPr algn="ctr"/>
+                      <a:r>
+                        <a:rPr lang="en-US" sz="1400" dirty="0"/>
+                        <a:t>clean-4b dataset</a:t>
+                      </a:r>
+                    </a:p>
+                    <a:p>
+                      <a:pPr algn="ctr"/>
+                      <a:endParaRPr lang="en-US" sz="1400" dirty="0"/>
+                    </a:p>
+                  </a:txBody>
+                  <a:tcPr anchor="ctr"/>
+                </a:tc>
+                <a:extLst>
+                  <a:ext uri="{0D108BD9-81ED-4DB2-BD59-A6C34878D82A}">
+                    <a16:rowId xmlns:a16="http://schemas.microsoft.com/office/drawing/2014/main" val="3477047939"/>
+                  </a:ext>
+                </a:extLst>
+              </a:tr>
+              <a:tr h="494487">
+                <a:tc>
+                  <a:txBody>
+                    <a:bodyPr/>
+                    <a:lstStyle/>
+                    <a:p>
+                      <a:pPr marL="0" marR="0" lvl="0" indent="0" algn="ctr" defTabSz="914400" rtl="0" eaLnBrk="1" fontAlgn="auto" latinLnBrk="0" hangingPunct="1">
+                        <a:lnSpc>
+                          <a:spcPct val="100000"/>
+                        </a:lnSpc>
+                        <a:spcBef>
+                          <a:spcPts val="0"/>
+                        </a:spcBef>
+                        <a:spcAft>
+                          <a:spcPts val="0"/>
+                        </a:spcAft>
+                        <a:buClrTx/>
+                        <a:buSzTx/>
+                        <a:buFontTx/>
+                        <a:buNone/>
+                        <a:tabLst/>
+                        <a:defRPr/>
+                      </a:pPr>
+                      <a:r>
+                        <a:rPr lang="en-US" sz="1600" b="0" baseline="0" dirty="0"/>
+                        <a:t>Transformer</a:t>
+                      </a:r>
+                    </a:p>
+                  </a:txBody>
+                  <a:tcPr anchor="ctr"/>
+                </a:tc>
+                <a:tc>
+                  <a:txBody>
+                    <a:bodyPr/>
+                    <a:lstStyle/>
+                    <a:p>
+                      <a:pPr algn="ctr"/>
+                      <a:endParaRPr lang="en-US" sz="1600" b="0" dirty="0">
+                        <a:solidFill>
+                          <a:schemeClr val="tx1"/>
+                        </a:solidFill>
+                      </a:endParaRPr>
+                    </a:p>
+                  </a:txBody>
+                  <a:tcPr anchor="ctr"/>
+                </a:tc>
+                <a:tc>
+                  <a:txBody>
+                    <a:bodyPr/>
+                    <a:lstStyle/>
+                    <a:p>
+                      <a:pPr algn="ctr"/>
+                      <a:endParaRPr lang="en-US" sz="1600" b="0" dirty="0">
+                        <a:solidFill>
+                          <a:schemeClr val="tx1"/>
+                        </a:solidFill>
+                      </a:endParaRPr>
+                    </a:p>
+                  </a:txBody>
+                  <a:tcPr anchor="ctr"/>
+                </a:tc>
+                <a:tc>
+                  <a:txBody>
+                    <a:bodyPr/>
+                    <a:lstStyle/>
+                    <a:p>
+                      <a:pPr algn="ctr"/>
+                      <a:endParaRPr lang="en-US" sz="1600" b="0" dirty="0">
+                        <a:solidFill>
+                          <a:schemeClr val="tx1"/>
+                        </a:solidFill>
+                      </a:endParaRPr>
+                    </a:p>
+                  </a:txBody>
+                  <a:tcPr anchor="ctr"/>
+                </a:tc>
+                <a:tc>
+                  <a:txBody>
+                    <a:bodyPr/>
+                    <a:lstStyle/>
+                    <a:p>
+                      <a:pPr algn="ctr"/>
+                      <a:endParaRPr lang="en-US" sz="1600" b="0" dirty="0">
+                        <a:solidFill>
+                          <a:schemeClr val="tx1"/>
+                        </a:solidFill>
+                      </a:endParaRPr>
+                    </a:p>
+                  </a:txBody>
+                  <a:tcPr anchor="ctr"/>
+                </a:tc>
+                <a:tc>
+                  <a:txBody>
+                    <a:bodyPr/>
+                    <a:lstStyle/>
+                    <a:p>
+                      <a:pPr algn="ctr"/>
+                      <a:endParaRPr lang="en-US" sz="1600" b="0" dirty="0">
+                        <a:solidFill>
+                          <a:schemeClr val="tx1"/>
+                        </a:solidFill>
+                      </a:endParaRPr>
+                    </a:p>
+                  </a:txBody>
+                  <a:tcPr anchor="ctr"/>
+                </a:tc>
+                <a:tc>
+                  <a:txBody>
+                    <a:bodyPr/>
+                    <a:lstStyle/>
+                    <a:p>
+                      <a:pPr algn="ctr"/>
+                      <a:endParaRPr lang="en-US" sz="1600" b="0" dirty="0">
+                        <a:solidFill>
+                          <a:schemeClr val="tx1"/>
+                        </a:solidFill>
+                      </a:endParaRPr>
+                    </a:p>
+                  </a:txBody>
+                  <a:tcPr anchor="ctr"/>
+                </a:tc>
+                <a:tc>
+                  <a:txBody>
+                    <a:bodyPr/>
+                    <a:lstStyle/>
+                    <a:p>
+                      <a:pPr algn="ctr"/>
+                      <a:endParaRPr lang="en-US" sz="1600" b="0" dirty="0">
+                        <a:solidFill>
+                          <a:schemeClr val="tx1"/>
+                        </a:solidFill>
+                      </a:endParaRPr>
+                    </a:p>
+                  </a:txBody>
+                  <a:tcPr anchor="ctr"/>
+                </a:tc>
+                <a:tc>
+                  <a:txBody>
+                    <a:bodyPr/>
+                    <a:lstStyle/>
+                    <a:p>
+                      <a:pPr algn="ctr"/>
+                      <a:endParaRPr lang="en-US" sz="1600" b="0" dirty="0">
+                        <a:solidFill>
+                          <a:schemeClr val="tx1"/>
+                        </a:solidFill>
+                      </a:endParaRPr>
+                    </a:p>
+                  </a:txBody>
+                  <a:tcPr anchor="ctr"/>
+                </a:tc>
+                <a:tc>
+                  <a:txBody>
+                    <a:bodyPr/>
+                    <a:lstStyle/>
+                    <a:p>
+                      <a:pPr algn="ctr"/>
+                      <a:r>
+                        <a:rPr lang="en-US" sz="1400" dirty="0"/>
+                        <a:t>first pre-trained, then fine-tuned</a:t>
+                      </a:r>
+                    </a:p>
+                  </a:txBody>
+                  <a:tcPr anchor="ctr"/>
+                </a:tc>
+                <a:extLst>
+                  <a:ext uri="{0D108BD9-81ED-4DB2-BD59-A6C34878D82A}">
+                    <a16:rowId xmlns:a16="http://schemas.microsoft.com/office/drawing/2014/main" val="844879864"/>
+                  </a:ext>
+                </a:extLst>
+              </a:tr>
+            </a:tbl>
+          </a:graphicData>
+        </a:graphic>
+      </p:graphicFrame>
+      <p:sp>
+        <p:nvSpPr>
+          <p:cNvPr id="8" name="TextBox 7">
+            <a:extLst>
+              <a:ext uri="{FF2B5EF4-FFF2-40B4-BE49-F238E27FC236}">
+                <a16:creationId xmlns:a16="http://schemas.microsoft.com/office/drawing/2014/main" id="{8F40885F-7A78-2A00-FCB6-813865CA15EE}"/>
+              </a:ext>
+            </a:extLst>
+          </p:cNvPr>
+          <p:cNvSpPr txBox="1"/>
+          <p:nvPr/>
+        </p:nvSpPr>
+        <p:spPr>
+          <a:xfrm>
+            <a:off x="977787" y="4748703"/>
+            <a:ext cx="7360028" cy="738664"/>
+          </a:xfrm>
+          <a:prstGeom prst="rect">
+            <a:avLst/>
+          </a:prstGeom>
+          <a:noFill/>
+        </p:spPr>
+        <p:txBody>
+          <a:bodyPr wrap="none" rtlCol="0">
+            <a:spAutoFit/>
+          </a:bodyPr>
+          <a:lstStyle/>
+          <a:p>
+            <a:pPr marL="342900" indent="-342900">
+              <a:buAutoNum type="arabicPeriod"/>
+            </a:pPr>
+            <a:r>
+              <a:rPr lang="en-US" sz="1400" dirty="0"/>
+              <a:t>MAPE : mean absolute percentage error : mean(abs(actual-pred)/actual).  Lower is better</a:t>
+            </a:r>
+          </a:p>
+          <a:p>
+            <a:pPr marL="342900" indent="-342900">
+              <a:buAutoNum type="arabicPeriod"/>
+            </a:pPr>
+            <a:r>
+              <a:rPr lang="en-US" sz="1400" dirty="0"/>
+              <a:t>PPE10 : percentage of time prediction is within 10% of ground truth.  Higher is better</a:t>
+            </a:r>
+          </a:p>
+          <a:p>
+            <a:pPr marL="342900" indent="-342900">
+              <a:buFontTx/>
+              <a:buAutoNum type="arabicPeriod"/>
+            </a:pPr>
+            <a:r>
+              <a:rPr lang="en-US" sz="1400" dirty="0"/>
+              <a:t>PPE20 : percentage of time prediction is within 20% of ground truth.  Higher is better</a:t>
+            </a:r>
+          </a:p>
+        </p:txBody>
+      </p:sp>
+    </p:spTree>
+    <p:extLst>
+      <p:ext uri="{BB962C8B-B14F-4D97-AF65-F5344CB8AC3E}">
+        <p14:creationId xmlns:p14="http://schemas.microsoft.com/office/powerpoint/2010/main" val="661623484"/>
+      </p:ext>
+    </p:extLst>
+  </p:cSld>
+  <p:clrMapOvr>
+    <a:masterClrMapping/>
+  </p:clrMapOvr>
+</p:sld>
+</file>
+
+<file path=ppt/slides/slide26.xml><?xml version="1.0" encoding="utf-8"?>
+<p:sld xmlns:a="http://schemas.openxmlformats.org/drawingml/2006/main" xmlns:r="http://schemas.openxmlformats.org/officeDocument/2006/relationships" xmlns:p="http://schemas.openxmlformats.org/presentationml/2006/main">
+  <p:cSld>
+    <p:spTree>
+      <p:nvGrpSpPr>
+        <p:cNvPr id="1" name=""/>
+        <p:cNvGrpSpPr/>
+        <p:nvPr/>
+      </p:nvGrpSpPr>
+      <p:grpSpPr>
+        <a:xfrm>
+          <a:off x="0" y="0"/>
+          <a:ext cx="0" cy="0"/>
+          <a:chOff x="0" y="0"/>
+          <a:chExt cx="0" cy="0"/>
+        </a:xfrm>
+      </p:grpSpPr>
+    </p:spTree>
+    <p:extLst>
+      <p:ext uri="{BB962C8B-B14F-4D97-AF65-F5344CB8AC3E}">
+        <p14:creationId xmlns:p14="http://schemas.microsoft.com/office/powerpoint/2010/main" val="2655861346"/>
+      </p:ext>
+    </p:extLst>
+  </p:cSld>
+  <p:clrMapOvr>
+    <a:masterClrMapping/>
+  </p:clrMapOvr>
+</p:sld>
+</file>
+
+<file path=ppt/slides/slide27.xml><?xml version="1.0" encoding="utf-8"?>
+<p:sld xmlns:a="http://schemas.openxmlformats.org/drawingml/2006/main" xmlns:r="http://schemas.openxmlformats.org/officeDocument/2006/relationships" xmlns:p="http://schemas.openxmlformats.org/presentationml/2006/main">
+  <p:cSld>
+    <p:spTree>
+      <p:nvGrpSpPr>
+        <p:cNvPr id="1" name=""/>
+        <p:cNvGrpSpPr/>
+        <p:nvPr/>
+      </p:nvGrpSpPr>
+      <p:grpSpPr>
+        <a:xfrm>
+          <a:off x="0" y="0"/>
+          <a:ext cx="0" cy="0"/>
+          <a:chOff x="0" y="0"/>
+          <a:chExt cx="0" cy="0"/>
+        </a:xfrm>
+      </p:grpSpPr>
+    </p:spTree>
+    <p:extLst>
+      <p:ext uri="{BB962C8B-B14F-4D97-AF65-F5344CB8AC3E}">
+        <p14:creationId xmlns:p14="http://schemas.microsoft.com/office/powerpoint/2010/main" val="3810772840"/>
       </p:ext>
     </p:extLst>
   </p:cSld>

</xml_diff>

<commit_message>
oas paired heavy/light chain dataset and support classes fixed BUG in get_mask method of scFv datasets where mask was always 1 shorter than seq.
</commit_message>
<xml_diff>
--- a/Homework-aAlphaBio.pptx
+++ b/Homework-aAlphaBio.pptx
@@ -12680,7 +12680,7 @@
                   <a:srgbClr val="FFFF00"/>
                 </a:highlight>
               </a:rPr>
-              <a:t>fixed sinusoidal embedding for token and position</a:t>
+              <a:t>try fixed-sinusoidal embedding for token and position</a:t>
             </a:r>
           </a:p>
         </p:txBody>
@@ -12765,14 +12765,14 @@
           <p:nvPr>
             <p:extLst>
               <p:ext uri="{D42A27DB-BD31-4B8C-83A1-F6EECF244321}">
-                <p14:modId xmlns:p14="http://schemas.microsoft.com/office/powerpoint/2010/main" val="1566764061"/>
+                <p14:modId xmlns:p14="http://schemas.microsoft.com/office/powerpoint/2010/main" val="555122196"/>
               </p:ext>
             </p:extLst>
           </p:nvPr>
         </p:nvGraphicFramePr>
         <p:xfrm>
-          <a:off x="481672" y="1211917"/>
-          <a:ext cx="10267469" cy="2137247"/>
+          <a:off x="274638" y="970377"/>
+          <a:ext cx="11327891" cy="2865515"/>
         </p:xfrm>
         <a:graphic>
           <a:graphicData uri="http://schemas.openxmlformats.org/drawingml/2006/table">
@@ -12781,70 +12781,70 @@
                 <a:tableStyleId>{5C22544A-7EE6-4342-B048-85BDC9FD1C3A}</a:tableStyleId>
               </a:tblPr>
               <a:tblGrid>
-                <a:gridCol w="1375706">
+                <a:gridCol w="1887308">
                   <a:extLst>
                     <a:ext uri="{9D8B030D-6E8A-4147-A177-3AD203B41FA5}">
                       <a16:colId xmlns:a16="http://schemas.microsoft.com/office/drawing/2014/main" val="1065848917"/>
                     </a:ext>
                   </a:extLst>
                 </a:gridCol>
-                <a:gridCol w="1211961">
+                <a:gridCol w="976376">
+                  <a:extLst>
+                    <a:ext uri="{9D8B030D-6E8A-4147-A177-3AD203B41FA5}">
+                      <a16:colId xmlns:a16="http://schemas.microsoft.com/office/drawing/2014/main" val="649451810"/>
+                    </a:ext>
+                  </a:extLst>
+                </a:gridCol>
+                <a:gridCol w="775358">
                   <a:extLst>
                     <a:ext uri="{9D8B030D-6E8A-4147-A177-3AD203B41FA5}">
                       <a16:colId xmlns:a16="http://schemas.microsoft.com/office/drawing/2014/main" val="873310604"/>
                     </a:ext>
                   </a:extLst>
                 </a:gridCol>
-                <a:gridCol w="1032637">
+                <a:gridCol w="909371">
                   <a:extLst>
                     <a:ext uri="{9D8B030D-6E8A-4147-A177-3AD203B41FA5}">
                       <a16:colId xmlns:a16="http://schemas.microsoft.com/office/drawing/2014/main" val="3981708244"/>
                     </a:ext>
                   </a:extLst>
                 </a:gridCol>
-                <a:gridCol w="894080">
-                  <a:extLst>
-                    <a:ext uri="{9D8B030D-6E8A-4147-A177-3AD203B41FA5}">
-                      <a16:colId xmlns:a16="http://schemas.microsoft.com/office/drawing/2014/main" val="1135465181"/>
-                    </a:ext>
-                  </a:extLst>
-                </a:gridCol>
-                <a:gridCol w="700450">
+                <a:gridCol w="698779">
                   <a:extLst>
                     <a:ext uri="{9D8B030D-6E8A-4147-A177-3AD203B41FA5}">
                       <a16:colId xmlns:a16="http://schemas.microsoft.com/office/drawing/2014/main" val="2228991909"/>
                     </a:ext>
                   </a:extLst>
                 </a:gridCol>
-                <a:gridCol w="749545">
+                <a:gridCol w="765785">
                   <a:extLst>
                     <a:ext uri="{9D8B030D-6E8A-4147-A177-3AD203B41FA5}">
                       <a16:colId xmlns:a16="http://schemas.microsoft.com/office/drawing/2014/main" val="1586729873"/>
                     </a:ext>
                   </a:extLst>
                 </a:gridCol>
-                <a:gridCol w="978208">
+                <a:gridCol w="855057">
                   <a:extLst>
                     <a:ext uri="{9D8B030D-6E8A-4147-A177-3AD203B41FA5}">
                       <a16:colId xmlns:a16="http://schemas.microsoft.com/office/drawing/2014/main" val="2038468716"/>
                     </a:ext>
                   </a:extLst>
                 </a:gridCol>
-                <a:gridCol w="953277">
+                <a:gridCol w="983411">
                   <a:extLst>
                     <a:ext uri="{9D8B030D-6E8A-4147-A177-3AD203B41FA5}">
                       <a16:colId xmlns:a16="http://schemas.microsoft.com/office/drawing/2014/main" val="1596270969"/>
                     </a:ext>
                   </a:extLst>
                 </a:gridCol>
-                <a:gridCol w="953277">
+                <a:gridCol w="905774">
                   <a:extLst>
                     <a:ext uri="{9D8B030D-6E8A-4147-A177-3AD203B41FA5}">
                       <a16:colId xmlns:a16="http://schemas.microsoft.com/office/drawing/2014/main" val="2430703789"/>
                     </a:ext>
                   </a:extLst>
                 </a:gridCol>
-                <a:gridCol w="1418328">
+                <a:gridCol w="2570672">
                   <a:extLst>
                     <a:ext uri="{9D8B030D-6E8A-4147-A177-3AD203B41FA5}">
                       <a16:colId xmlns:a16="http://schemas.microsoft.com/office/drawing/2014/main" val="2256753199"/>
@@ -12861,7 +12861,29 @@
                       <a:pPr algn="ctr"/>
                       <a:r>
                         <a:rPr lang="en-US" dirty="0"/>
-                        <a:t>Model</a:t>
+                        <a:t>Pretrain</a:t>
+                      </a:r>
+                    </a:p>
+                    <a:p>
+                      <a:pPr algn="ctr"/>
+                      <a:r>
+                        <a:rPr lang="en-US" dirty="0"/>
+                        <a:t>dataset</a:t>
+                      </a:r>
+                      <a:endParaRPr dirty="0"/>
+                    </a:p>
+                  </a:txBody>
+                  <a:tcPr anchor="ctr"/>
+                </a:tc>
+                <a:tc rowSpan="2">
+                  <a:txBody>
+                    <a:bodyPr/>
+                    <a:lstStyle/>
+                    <a:p>
+                      <a:pPr algn="ctr"/>
+                      <a:r>
+                        <a:rPr lang="en-US" dirty="0"/>
+                        <a:t>Fine-tune</a:t>
                       </a:r>
                       <a:endParaRPr dirty="0"/>
                     </a:p>
@@ -12894,21 +12916,6 @@
                         <a:t>Val loss</a:t>
                       </a:r>
                       <a:endParaRPr dirty="0"/>
-                    </a:p>
-                  </a:txBody>
-                  <a:tcPr anchor="ctr"/>
-                </a:tc>
-                <a:tc rowSpan="2">
-                  <a:txBody>
-                    <a:bodyPr/>
-                    <a:lstStyle/>
-                    <a:p>
-                      <a:pPr algn="ctr"/>
-                      <a:r>
-                        <a:rPr lang="en-US" sz="1600" dirty="0"/>
-                        <a:t>Epochs</a:t>
-                      </a:r>
-                      <a:endParaRPr lang="en-US" sz="1600" baseline="30000" dirty="0"/>
                     </a:p>
                   </a:txBody>
                   <a:tcPr anchor="ctr"/>
@@ -13023,10 +13030,10 @@
                     <a:bodyPr/>
                     <a:lstStyle/>
                     <a:p>
-                      <a:endParaRPr dirty="0"/>
-                    </a:p>
-                  </a:txBody>
-                  <a:tcPr anchor="ctr"/>
+                      <a:endParaRPr lang="en-US"/>
+                    </a:p>
+                  </a:txBody>
+                  <a:tcPr/>
                 </a:tc>
                 <a:tc vMerge="1">
                   <a:txBody>
@@ -13163,7 +13170,7 @@
                 </a:extLst>
               </a:tr>
               <a:tr h="494487">
-                <a:tc>
+                <a:tc gridSpan="2">
                   <a:txBody>
                     <a:bodyPr/>
                     <a:lstStyle/>
@@ -13186,10 +13193,19 @@
                         <a:defRPr/>
                       </a:pPr>
                       <a:r>
-                        <a:rPr lang="en-US" sz="1600" dirty="0"/>
-                        <a:t>Transformer</a:t>
-                      </a:r>
-                      <a:endParaRPr lang="en-US" sz="1600" baseline="30000" dirty="0"/>
+                        <a:rPr lang="en-US" sz="1200" baseline="0" dirty="0"/>
+                        <a:t>fully-trained reference result</a:t>
+                      </a:r>
+                    </a:p>
+                  </a:txBody>
+                  <a:tcPr anchor="ctr"/>
+                </a:tc>
+                <a:tc hMerge="1">
+                  <a:txBody>
+                    <a:bodyPr/>
+                    <a:lstStyle/>
+                    <a:p>
+                      <a:endParaRPr dirty="0"/>
                     </a:p>
                   </a:txBody>
                   <a:tcPr anchor="ctr"/>
@@ -13242,24 +13258,6 @@
                             <a:schemeClr val="tx1"/>
                           </a:solidFill>
                         </a:rPr>
-                        <a:t>135</a:t>
-                      </a:r>
-                    </a:p>
-                  </a:txBody>
-                  <a:tcPr anchor="ctr"/>
-                </a:tc>
-                <a:tc>
-                  <a:txBody>
-                    <a:bodyPr/>
-                    <a:lstStyle/>
-                    <a:p>
-                      <a:pPr algn="ctr"/>
-                      <a:r>
-                        <a:rPr lang="en-US" sz="1600" dirty="0">
-                          <a:solidFill>
-                            <a:schemeClr val="tx1"/>
-                          </a:solidFill>
-                        </a:rPr>
                         <a:t>0.24</a:t>
                       </a:r>
                     </a:p>
@@ -13345,13 +13343,13 @@
                     <a:p>
                       <a:pPr algn="ctr"/>
                       <a:r>
-                        <a:rPr lang="en-US" sz="1400" dirty="0"/>
+                        <a:rPr lang="en-US" sz="1200" dirty="0"/>
                         <a:t>clean-4b dataset</a:t>
                       </a:r>
                     </a:p>
                     <a:p>
                       <a:pPr algn="ctr"/>
-                      <a:endParaRPr lang="en-US" sz="1400" dirty="0"/>
+                      <a:endParaRPr lang="en-US" sz="1200" dirty="0"/>
                     </a:p>
                   </a:txBody>
                   <a:tcPr anchor="ctr"/>
@@ -13386,9 +13384,247 @@
                         <a:defRPr/>
                       </a:pPr>
                       <a:r>
-                        <a:rPr lang="en-US" sz="1600" b="0" baseline="0" dirty="0"/>
-                        <a:t>Transformer</a:t>
-                      </a:r>
+                        <a:rPr lang="en-US" sz="1200" baseline="0" dirty="0"/>
+                        <a:t>high_q_pretrain_2</a:t>
+                      </a:r>
+                    </a:p>
+                  </a:txBody>
+                  <a:tcPr anchor="ctr"/>
+                </a:tc>
+                <a:tc>
+                  <a:txBody>
+                    <a:bodyPr/>
+                    <a:lstStyle/>
+                    <a:p>
+                      <a:pPr marL="0" marR="0" lvl="0" indent="0" algn="ctr" defTabSz="914400" rtl="0" eaLnBrk="1" fontAlgn="auto" latinLnBrk="0" hangingPunct="1">
+                        <a:lnSpc>
+                          <a:spcPct val="100000"/>
+                        </a:lnSpc>
+                        <a:spcBef>
+                          <a:spcPts val="0"/>
+                        </a:spcBef>
+                        <a:spcAft>
+                          <a:spcPts val="0"/>
+                        </a:spcAft>
+                        <a:buClrTx/>
+                        <a:buSzTx/>
+                        <a:buFontTx/>
+                        <a:buNone/>
+                        <a:tabLst/>
+                        <a:defRPr/>
+                      </a:pPr>
+                      <a:r>
+                        <a:rPr lang="en-US" sz="1200" b="0" baseline="0" dirty="0"/>
+                        <a:t>clean_4b</a:t>
+                      </a:r>
+                    </a:p>
+                  </a:txBody>
+                  <a:tcPr anchor="ctr"/>
+                </a:tc>
+                <a:tc>
+                  <a:txBody>
+                    <a:bodyPr/>
+                    <a:lstStyle/>
+                    <a:p>
+                      <a:pPr algn="ctr"/>
+                      <a:r>
+                        <a:rPr lang="en-US" sz="1600" b="0" dirty="0">
+                          <a:solidFill>
+                            <a:schemeClr val="tx1"/>
+                          </a:solidFill>
+                        </a:rPr>
+                        <a:t>0.57</a:t>
+                      </a:r>
+                    </a:p>
+                  </a:txBody>
+                  <a:tcPr anchor="ctr"/>
+                </a:tc>
+                <a:tc>
+                  <a:txBody>
+                    <a:bodyPr/>
+                    <a:lstStyle/>
+                    <a:p>
+                      <a:pPr algn="ctr"/>
+                      <a:r>
+                        <a:rPr lang="en-US" sz="1600" b="0" dirty="0">
+                          <a:solidFill>
+                            <a:schemeClr val="tx1"/>
+                          </a:solidFill>
+                        </a:rPr>
+                        <a:t>0.51</a:t>
+                      </a:r>
+                    </a:p>
+                  </a:txBody>
+                  <a:tcPr anchor="ctr"/>
+                </a:tc>
+                <a:tc>
+                  <a:txBody>
+                    <a:bodyPr/>
+                    <a:lstStyle/>
+                    <a:p>
+                      <a:pPr algn="ctr"/>
+                      <a:r>
+                        <a:rPr lang="en-US" sz="1600" b="0" dirty="0">
+                          <a:solidFill>
+                            <a:schemeClr val="tx1"/>
+                          </a:solidFill>
+                        </a:rPr>
+                        <a:t>0.59</a:t>
+                      </a:r>
+                    </a:p>
+                  </a:txBody>
+                  <a:tcPr anchor="ctr"/>
+                </a:tc>
+                <a:tc>
+                  <a:txBody>
+                    <a:bodyPr/>
+                    <a:lstStyle/>
+                    <a:p>
+                      <a:pPr algn="ctr"/>
+                      <a:r>
+                        <a:rPr lang="en-US" sz="1600" b="0" dirty="0">
+                          <a:solidFill>
+                            <a:schemeClr val="tx1"/>
+                          </a:solidFill>
+                        </a:rPr>
+                        <a:t>0.51</a:t>
+                      </a:r>
+                    </a:p>
+                  </a:txBody>
+                  <a:tcPr anchor="ctr"/>
+                </a:tc>
+                <a:tc>
+                  <a:txBody>
+                    <a:bodyPr/>
+                    <a:lstStyle/>
+                    <a:p>
+                      <a:pPr algn="ctr"/>
+                      <a:r>
+                        <a:rPr lang="en-US" sz="1600" b="0" dirty="0">
+                          <a:solidFill>
+                            <a:schemeClr val="tx1"/>
+                          </a:solidFill>
+                        </a:rPr>
+                        <a:t>0.42</a:t>
+                      </a:r>
+                    </a:p>
+                  </a:txBody>
+                  <a:tcPr anchor="ctr"/>
+                </a:tc>
+                <a:tc>
+                  <a:txBody>
+                    <a:bodyPr/>
+                    <a:lstStyle/>
+                    <a:p>
+                      <a:pPr algn="ctr"/>
+                      <a:r>
+                        <a:rPr lang="en-US" sz="1600" b="0" dirty="0">
+                          <a:solidFill>
+                            <a:schemeClr val="tx1"/>
+                          </a:solidFill>
+                        </a:rPr>
+                        <a:t>22</a:t>
+                      </a:r>
+                    </a:p>
+                  </a:txBody>
+                  <a:tcPr anchor="ctr"/>
+                </a:tc>
+                <a:tc>
+                  <a:txBody>
+                    <a:bodyPr/>
+                    <a:lstStyle/>
+                    <a:p>
+                      <a:pPr algn="ctr"/>
+                      <a:r>
+                        <a:rPr lang="en-US" sz="1600" b="0" dirty="0">
+                          <a:solidFill>
+                            <a:schemeClr val="tx1"/>
+                          </a:solidFill>
+                        </a:rPr>
+                        <a:t>49</a:t>
+                      </a:r>
+                    </a:p>
+                  </a:txBody>
+                  <a:tcPr anchor="ctr"/>
+                </a:tc>
+                <a:tc>
+                  <a:txBody>
+                    <a:bodyPr/>
+                    <a:lstStyle/>
+                    <a:p>
+                      <a:pPr algn="ctr"/>
+                      <a:r>
+                        <a:rPr lang="en-US" sz="1200" dirty="0"/>
+                        <a:t>base: frozen</a:t>
+                      </a:r>
+                    </a:p>
+                    <a:p>
+                      <a:pPr algn="ctr"/>
+                      <a:r>
+                        <a:rPr lang="en-US" sz="1200" dirty="0"/>
+                        <a:t>train MLP head only, dropout=0.4</a:t>
+                      </a:r>
+                    </a:p>
+                  </a:txBody>
+                  <a:tcPr anchor="ctr"/>
+                </a:tc>
+                <a:extLst>
+                  <a:ext uri="{0D108BD9-81ED-4DB2-BD59-A6C34878D82A}">
+                    <a16:rowId xmlns:a16="http://schemas.microsoft.com/office/drawing/2014/main" val="844879864"/>
+                  </a:ext>
+                </a:extLst>
+              </a:tr>
+              <a:tr h="494487">
+                <a:tc>
+                  <a:txBody>
+                    <a:bodyPr/>
+                    <a:lstStyle/>
+                    <a:p>
+                      <a:pPr marL="0" marR="0" lvl="0" indent="0" algn="ctr" defTabSz="914400" rtl="0" eaLnBrk="1" fontAlgn="auto" latinLnBrk="0" hangingPunct="1">
+                        <a:lnSpc>
+                          <a:spcPct val="100000"/>
+                        </a:lnSpc>
+                        <a:spcBef>
+                          <a:spcPts val="0"/>
+                        </a:spcBef>
+                        <a:spcAft>
+                          <a:spcPts val="0"/>
+                        </a:spcAft>
+                        <a:buClrTx/>
+                        <a:buSzTx/>
+                        <a:buFontTx/>
+                        <a:buNone/>
+                        <a:tabLst/>
+                        <a:defRPr/>
+                      </a:pPr>
+                      <a:endParaRPr lang="en-US" sz="1200" b="0" baseline="0" dirty="0"/>
+                    </a:p>
+                  </a:txBody>
+                  <a:tcPr anchor="ctr"/>
+                </a:tc>
+                <a:tc>
+                  <a:txBody>
+                    <a:bodyPr/>
+                    <a:lstStyle/>
+                    <a:p>
+                      <a:pPr marL="0" marR="0" lvl="0" indent="0" algn="ctr" defTabSz="914400" rtl="0" eaLnBrk="1" fontAlgn="auto" latinLnBrk="0" hangingPunct="1">
+                        <a:lnSpc>
+                          <a:spcPct val="100000"/>
+                        </a:lnSpc>
+                        <a:spcBef>
+                          <a:spcPts val="0"/>
+                        </a:spcBef>
+                        <a:spcAft>
+                          <a:spcPts val="0"/>
+                        </a:spcAft>
+                        <a:buClrTx/>
+                        <a:buSzTx/>
+                        <a:buFontTx/>
+                        <a:buNone/>
+                        <a:tabLst/>
+                        <a:defRPr/>
+                      </a:pPr>
+                      <a:endParaRPr lang="en-US" sz="1200" b="0" baseline="0" dirty="0"/>
                     </a:p>
                   </a:txBody>
                   <a:tcPr anchor="ctr"/>
@@ -13504,6 +13740,93 @@
                     <a:lstStyle/>
                     <a:p>
                       <a:pPr algn="ctr"/>
+                      <a:r>
+                        <a:rPr lang="en-US" sz="1200" dirty="0"/>
+                        <a:t>base: frozen</a:t>
+                      </a:r>
+                      <a:r>
+                        <a:rPr lang="en-US" sz="1200"/>
+                        <a:t>, unfreeze last layer</a:t>
+                      </a:r>
+                      <a:endParaRPr lang="en-US" sz="1200" dirty="0"/>
+                    </a:p>
+                    <a:p>
+                      <a:pPr algn="ctr"/>
+                      <a:r>
+                        <a:rPr lang="en-US" sz="1200" dirty="0"/>
+                        <a:t>train MLP head only, dropout=0.4</a:t>
+                      </a:r>
+                    </a:p>
+                  </a:txBody>
+                  <a:tcPr anchor="ctr"/>
+                </a:tc>
+                <a:extLst>
+                  <a:ext uri="{0D108BD9-81ED-4DB2-BD59-A6C34878D82A}">
+                    <a16:rowId xmlns:a16="http://schemas.microsoft.com/office/drawing/2014/main" val="573267343"/>
+                  </a:ext>
+                </a:extLst>
+              </a:tr>
+              <a:tr h="494487">
+                <a:tc>
+                  <a:txBody>
+                    <a:bodyPr/>
+                    <a:lstStyle/>
+                    <a:p>
+                      <a:pPr marL="0" marR="0" lvl="0" indent="0" algn="ctr" defTabSz="914400" rtl="0" eaLnBrk="1" fontAlgn="auto" latinLnBrk="0" hangingPunct="1">
+                        <a:lnSpc>
+                          <a:spcPct val="100000"/>
+                        </a:lnSpc>
+                        <a:spcBef>
+                          <a:spcPts val="0"/>
+                        </a:spcBef>
+                        <a:spcAft>
+                          <a:spcPts val="0"/>
+                        </a:spcAft>
+                        <a:buClrTx/>
+                        <a:buSzTx/>
+                        <a:buFontTx/>
+                        <a:buNone/>
+                        <a:tabLst/>
+                        <a:defRPr/>
+                      </a:pPr>
+                      <a:endParaRPr lang="en-US" sz="1200" b="0" baseline="0" dirty="0"/>
+                    </a:p>
+                  </a:txBody>
+                  <a:tcPr anchor="ctr"/>
+                </a:tc>
+                <a:tc>
+                  <a:txBody>
+                    <a:bodyPr/>
+                    <a:lstStyle/>
+                    <a:p>
+                      <a:pPr marL="0" marR="0" lvl="0" indent="0" algn="ctr" defTabSz="914400" rtl="0" eaLnBrk="1" fontAlgn="auto" latinLnBrk="0" hangingPunct="1">
+                        <a:lnSpc>
+                          <a:spcPct val="100000"/>
+                        </a:lnSpc>
+                        <a:spcBef>
+                          <a:spcPts val="0"/>
+                        </a:spcBef>
+                        <a:spcAft>
+                          <a:spcPts val="0"/>
+                        </a:spcAft>
+                        <a:buClrTx/>
+                        <a:buSzTx/>
+                        <a:buFontTx/>
+                        <a:buNone/>
+                        <a:tabLst/>
+                        <a:defRPr/>
+                      </a:pPr>
+                      <a:endParaRPr lang="en-US" sz="1200" b="0" baseline="0" dirty="0"/>
+                    </a:p>
+                  </a:txBody>
+                  <a:tcPr anchor="ctr"/>
+                </a:tc>
+                <a:tc>
+                  <a:txBody>
+                    <a:bodyPr/>
+                    <a:lstStyle/>
+                    <a:p>
+                      <a:pPr algn="ctr"/>
                       <a:endParaRPr lang="en-US" sz="1600" b="0" dirty="0">
                         <a:solidFill>
                           <a:schemeClr val="tx1"/>
@@ -13519,17 +13842,104 @@
                     <a:lstStyle/>
                     <a:p>
                       <a:pPr algn="ctr"/>
-                      <a:r>
-                        <a:rPr lang="en-US" sz="1400" dirty="0"/>
-                        <a:t>first pre-trained, then fine-tuned</a:t>
-                      </a:r>
+                      <a:endParaRPr lang="en-US" sz="1600" b="0" dirty="0">
+                        <a:solidFill>
+                          <a:schemeClr val="tx1"/>
+                        </a:solidFill>
+                      </a:endParaRPr>
+                    </a:p>
+                  </a:txBody>
+                  <a:tcPr anchor="ctr"/>
+                </a:tc>
+                <a:tc>
+                  <a:txBody>
+                    <a:bodyPr/>
+                    <a:lstStyle/>
+                    <a:p>
+                      <a:pPr algn="ctr"/>
+                      <a:endParaRPr lang="en-US" sz="1600" b="0" dirty="0">
+                        <a:solidFill>
+                          <a:schemeClr val="tx1"/>
+                        </a:solidFill>
+                      </a:endParaRPr>
+                    </a:p>
+                  </a:txBody>
+                  <a:tcPr anchor="ctr"/>
+                </a:tc>
+                <a:tc>
+                  <a:txBody>
+                    <a:bodyPr/>
+                    <a:lstStyle/>
+                    <a:p>
+                      <a:pPr algn="ctr"/>
+                      <a:endParaRPr lang="en-US" sz="1600" b="0" dirty="0">
+                        <a:solidFill>
+                          <a:schemeClr val="tx1"/>
+                        </a:solidFill>
+                      </a:endParaRPr>
+                    </a:p>
+                  </a:txBody>
+                  <a:tcPr anchor="ctr"/>
+                </a:tc>
+                <a:tc>
+                  <a:txBody>
+                    <a:bodyPr/>
+                    <a:lstStyle/>
+                    <a:p>
+                      <a:pPr algn="ctr"/>
+                      <a:endParaRPr lang="en-US" sz="1600" b="0" dirty="0">
+                        <a:solidFill>
+                          <a:schemeClr val="tx1"/>
+                        </a:solidFill>
+                      </a:endParaRPr>
+                    </a:p>
+                  </a:txBody>
+                  <a:tcPr anchor="ctr"/>
+                </a:tc>
+                <a:tc>
+                  <a:txBody>
+                    <a:bodyPr/>
+                    <a:lstStyle/>
+                    <a:p>
+                      <a:pPr algn="ctr"/>
+                      <a:endParaRPr lang="en-US" sz="1600" b="0" dirty="0">
+                        <a:solidFill>
+                          <a:schemeClr val="tx1"/>
+                        </a:solidFill>
+                      </a:endParaRPr>
+                    </a:p>
+                  </a:txBody>
+                  <a:tcPr anchor="ctr"/>
+                </a:tc>
+                <a:tc>
+                  <a:txBody>
+                    <a:bodyPr/>
+                    <a:lstStyle/>
+                    <a:p>
+                      <a:pPr algn="ctr"/>
+                      <a:endParaRPr lang="en-US" sz="1600" b="0" dirty="0">
+                        <a:solidFill>
+                          <a:schemeClr val="tx1"/>
+                        </a:solidFill>
+                      </a:endParaRPr>
+                    </a:p>
+                  </a:txBody>
+                  <a:tcPr anchor="ctr"/>
+                </a:tc>
+                <a:tc>
+                  <a:txBody>
+                    <a:bodyPr/>
+                    <a:lstStyle/>
+                    <a:p>
+                      <a:pPr algn="ctr"/>
+                      <a:endParaRPr lang="en-US" sz="1200" dirty="0"/>
                     </a:p>
                   </a:txBody>
                   <a:tcPr anchor="ctr"/>
                 </a:tc>
                 <a:extLst>
                   <a:ext uri="{0D108BD9-81ED-4DB2-BD59-A6C34878D82A}">
-                    <a16:rowId xmlns:a16="http://schemas.microsoft.com/office/drawing/2014/main" val="844879864"/>
+                    <a16:rowId xmlns:a16="http://schemas.microsoft.com/office/drawing/2014/main" val="3667402288"/>
                   </a:ext>
                 </a:extLst>
               </a:tr>
@@ -13551,7 +13961,7 @@
         </p:nvSpPr>
         <p:spPr>
           <a:xfrm>
-            <a:off x="977787" y="4748703"/>
+            <a:off x="865644" y="5723487"/>
             <a:ext cx="7360028" cy="738664"/>
           </a:xfrm>
           <a:prstGeom prst="rect">

</xml_diff>

<commit_message>
removed incorrect use of softmax from MLM tform.py created a DIY scFv dataset that creates scFv sequences from OAS heavy/light chain data misc changes
</commit_message>
<xml_diff>
--- a/Homework-aAlphaBio.pptx
+++ b/Homework-aAlphaBio.pptx
@@ -29,9 +29,10 @@
     <p:sldId id="379" r:id="rId23"/>
     <p:sldId id="377" r:id="rId24"/>
     <p:sldId id="380" r:id="rId25"/>
-    <p:sldId id="383" r:id="rId26"/>
+    <p:sldId id="384" r:id="rId26"/>
     <p:sldId id="381" r:id="rId27"/>
-    <p:sldId id="382" r:id="rId28"/>
+    <p:sldId id="383" r:id="rId28"/>
+    <p:sldId id="382" r:id="rId29"/>
   </p:sldIdLst>
   <p:sldSz cx="12192000" cy="6858000"/>
   <p:notesSz cx="6858000" cy="9144000"/>
@@ -285,7 +286,7 @@
           <a:p>
             <a:fld id="{A99D5239-F08C-4643-B440-E380AF94EFE9}" type="datetimeFigureOut">
               <a:rPr lang="en-US" smtClean="0"/>
-              <a:t>5/12/24</a:t>
+              <a:t>5/15/24</a:t>
             </a:fld>
             <a:endParaRPr lang="en-US"/>
           </a:p>
@@ -483,7 +484,7 @@
           <a:p>
             <a:fld id="{A99D5239-F08C-4643-B440-E380AF94EFE9}" type="datetimeFigureOut">
               <a:rPr lang="en-US" smtClean="0"/>
-              <a:t>5/12/24</a:t>
+              <a:t>5/15/24</a:t>
             </a:fld>
             <a:endParaRPr lang="en-US"/>
           </a:p>
@@ -691,7 +692,7 @@
           <a:p>
             <a:fld id="{A99D5239-F08C-4643-B440-E380AF94EFE9}" type="datetimeFigureOut">
               <a:rPr lang="en-US" smtClean="0"/>
-              <a:t>5/12/24</a:t>
+              <a:t>5/15/24</a:t>
             </a:fld>
             <a:endParaRPr lang="en-US"/>
           </a:p>
@@ -889,7 +890,7 @@
           <a:p>
             <a:fld id="{A99D5239-F08C-4643-B440-E380AF94EFE9}" type="datetimeFigureOut">
               <a:rPr lang="en-US" smtClean="0"/>
-              <a:t>5/12/24</a:t>
+              <a:t>5/15/24</a:t>
             </a:fld>
             <a:endParaRPr lang="en-US"/>
           </a:p>
@@ -1164,7 +1165,7 @@
           <a:p>
             <a:fld id="{A99D5239-F08C-4643-B440-E380AF94EFE9}" type="datetimeFigureOut">
               <a:rPr lang="en-US" smtClean="0"/>
-              <a:t>5/12/24</a:t>
+              <a:t>5/15/24</a:t>
             </a:fld>
             <a:endParaRPr lang="en-US"/>
           </a:p>
@@ -1429,7 +1430,7 @@
           <a:p>
             <a:fld id="{A99D5239-F08C-4643-B440-E380AF94EFE9}" type="datetimeFigureOut">
               <a:rPr lang="en-US" smtClean="0"/>
-              <a:t>5/12/24</a:t>
+              <a:t>5/15/24</a:t>
             </a:fld>
             <a:endParaRPr lang="en-US"/>
           </a:p>
@@ -1841,7 +1842,7 @@
           <a:p>
             <a:fld id="{A99D5239-F08C-4643-B440-E380AF94EFE9}" type="datetimeFigureOut">
               <a:rPr lang="en-US" smtClean="0"/>
-              <a:t>5/12/24</a:t>
+              <a:t>5/15/24</a:t>
             </a:fld>
             <a:endParaRPr lang="en-US"/>
           </a:p>
@@ -1982,7 +1983,7 @@
           <a:p>
             <a:fld id="{A99D5239-F08C-4643-B440-E380AF94EFE9}" type="datetimeFigureOut">
               <a:rPr lang="en-US" smtClean="0"/>
-              <a:t>5/12/24</a:t>
+              <a:t>5/15/24</a:t>
             </a:fld>
             <a:endParaRPr lang="en-US"/>
           </a:p>
@@ -2095,7 +2096,7 @@
           <a:p>
             <a:fld id="{A99D5239-F08C-4643-B440-E380AF94EFE9}" type="datetimeFigureOut">
               <a:rPr lang="en-US" smtClean="0"/>
-              <a:t>5/12/24</a:t>
+              <a:t>5/15/24</a:t>
             </a:fld>
             <a:endParaRPr lang="en-US"/>
           </a:p>
@@ -2406,7 +2407,7 @@
           <a:p>
             <a:fld id="{A99D5239-F08C-4643-B440-E380AF94EFE9}" type="datetimeFigureOut">
               <a:rPr lang="en-US" smtClean="0"/>
-              <a:t>5/12/24</a:t>
+              <a:t>5/15/24</a:t>
             </a:fld>
             <a:endParaRPr lang="en-US"/>
           </a:p>
@@ -2694,7 +2695,7 @@
           <a:p>
             <a:fld id="{A99D5239-F08C-4643-B440-E380AF94EFE9}" type="datetimeFigureOut">
               <a:rPr lang="en-US" smtClean="0"/>
-              <a:t>5/12/24</a:t>
+              <a:t>5/15/24</a:t>
             </a:fld>
             <a:endParaRPr lang="en-US"/>
           </a:p>
@@ -2935,7 +2936,7 @@
           <a:p>
             <a:fld id="{A99D5239-F08C-4643-B440-E380AF94EFE9}" type="datetimeFigureOut">
               <a:rPr lang="en-US" smtClean="0"/>
-              <a:t>5/12/24</a:t>
+              <a:t>5/15/24</a:t>
             </a:fld>
             <a:endParaRPr lang="en-US"/>
           </a:p>
@@ -12354,8 +12355,8 @@
         </p:nvSpPr>
         <p:spPr>
           <a:xfrm>
-            <a:off x="473141" y="1158495"/>
-            <a:ext cx="11094881" cy="4524315"/>
+            <a:off x="473141" y="1839982"/>
+            <a:ext cx="11094881" cy="4247317"/>
           </a:xfrm>
           <a:prstGeom prst="rect">
             <a:avLst/>
@@ -12397,20 +12398,6 @@
               <a:buChar char="•"/>
             </a:pPr>
             <a:r>
-              <a:rPr lang="en-US" dirty="0" err="1"/>
-              <a:t>Tform</a:t>
-            </a:r>
-            <a:r>
-              <a:rPr lang="en-US" dirty="0"/>
-              <a:t> can now be pre-trained as MLM and then fine-tuned on regression data</a:t>
-            </a:r>
-          </a:p>
-          <a:p>
-            <a:pPr marL="342900" indent="-342900">
-              <a:buFont typeface="Arial" panose="020B0604020202020204" pitchFamily="34" charset="0"/>
-              <a:buChar char="•"/>
-            </a:pPr>
-            <a:r>
               <a:rPr lang="en-US" dirty="0"/>
               <a:t>Modified </a:t>
             </a:r>
@@ -12577,7 +12564,7 @@
         <p:spPr>
           <a:xfrm>
             <a:off x="4004774" y="138023"/>
-            <a:ext cx="2723823" cy="646331"/>
+            <a:ext cx="2723823" cy="1200329"/>
           </a:xfrm>
           <a:prstGeom prst="rect">
             <a:avLst/>
@@ -12590,9 +12577,17 @@
           </a:bodyPr>
           <a:lstStyle/>
           <a:p>
+            <a:pPr algn="ctr"/>
             <a:r>
               <a:rPr lang="en-US" sz="3600" dirty="0"/>
               <a:t>Addendum 2</a:t>
+            </a:r>
+          </a:p>
+          <a:p>
+            <a:pPr algn="ctr"/>
+            <a:r>
+              <a:rPr lang="en-US" sz="3600" dirty="0"/>
+              <a:t>Pre-training</a:t>
             </a:r>
           </a:p>
         </p:txBody>
@@ -12646,7 +12641,7 @@
         </p:nvSpPr>
         <p:spPr>
           <a:xfrm>
-            <a:off x="5771072" y="4054415"/>
+            <a:off x="5900469" y="5227607"/>
             <a:ext cx="5947787" cy="646331"/>
           </a:xfrm>
           <a:prstGeom prst="rect">
@@ -12699,6 +12694,1764 @@
 </file>
 
 <file path=ppt/slides/slide25.xml><?xml version="1.0" encoding="utf-8"?>
+<p:sld xmlns:a="http://schemas.openxmlformats.org/drawingml/2006/main" xmlns:r="http://schemas.openxmlformats.org/officeDocument/2006/relationships" xmlns:p="http://schemas.openxmlformats.org/presentationml/2006/main">
+  <p:cSld>
+    <p:spTree>
+      <p:nvGrpSpPr>
+        <p:cNvPr id="1" name=""/>
+        <p:cNvGrpSpPr/>
+        <p:nvPr/>
+      </p:nvGrpSpPr>
+      <p:grpSpPr>
+        <a:xfrm>
+          <a:off x="0" y="0"/>
+          <a:ext cx="0" cy="0"/>
+          <a:chOff x="0" y="0"/>
+          <a:chExt cx="0" cy="0"/>
+        </a:xfrm>
+      </p:grpSpPr>
+      <p:sp>
+        <p:nvSpPr>
+          <p:cNvPr id="2" name="TextBox 1">
+            <a:extLst>
+              <a:ext uri="{FF2B5EF4-FFF2-40B4-BE49-F238E27FC236}">
+                <a16:creationId xmlns:a16="http://schemas.microsoft.com/office/drawing/2014/main" id="{CB000C16-40E3-9D2D-D25A-4D4F758309BE}"/>
+              </a:ext>
+            </a:extLst>
+          </p:cNvPr>
+          <p:cNvSpPr txBox="1"/>
+          <p:nvPr/>
+        </p:nvSpPr>
+        <p:spPr>
+          <a:xfrm>
+            <a:off x="345057" y="198408"/>
+            <a:ext cx="2785250" cy="461665"/>
+          </a:xfrm>
+          <a:prstGeom prst="rect">
+            <a:avLst/>
+          </a:prstGeom>
+          <a:noFill/>
+        </p:spPr>
+        <p:txBody>
+          <a:bodyPr wrap="none" rtlCol="0">
+            <a:spAutoFit/>
+          </a:bodyPr>
+          <a:lstStyle/>
+          <a:p>
+            <a:r>
+              <a:rPr lang="en-US" sz="2400" dirty="0"/>
+              <a:t>Pre-training dataset</a:t>
+            </a:r>
+          </a:p>
+        </p:txBody>
+      </p:sp>
+      <p:sp>
+        <p:nvSpPr>
+          <p:cNvPr id="6" name="TextBox 5">
+            <a:extLst>
+              <a:ext uri="{FF2B5EF4-FFF2-40B4-BE49-F238E27FC236}">
+                <a16:creationId xmlns:a16="http://schemas.microsoft.com/office/drawing/2014/main" id="{F7DAFF26-4537-0ADA-E643-F4AC771826C6}"/>
+              </a:ext>
+            </a:extLst>
+          </p:cNvPr>
+          <p:cNvSpPr txBox="1"/>
+          <p:nvPr/>
+        </p:nvSpPr>
+        <p:spPr>
+          <a:xfrm>
+            <a:off x="345057" y="5793830"/>
+            <a:ext cx="4676345" cy="523220"/>
+          </a:xfrm>
+          <a:prstGeom prst="rect">
+            <a:avLst/>
+          </a:prstGeom>
+          <a:noFill/>
+        </p:spPr>
+        <p:txBody>
+          <a:bodyPr wrap="none" rtlCol="0">
+            <a:spAutoFit/>
+          </a:bodyPr>
+          <a:lstStyle/>
+          <a:p>
+            <a:r>
+              <a:rPr lang="en-US" sz="1400" dirty="0"/>
+              <a:t>linker sequence: </a:t>
+            </a:r>
+            <a:r>
+              <a:rPr lang="en-US" sz="1400" b="0" dirty="0">
+                <a:solidFill>
+                  <a:schemeClr val="tx1"/>
+                </a:solidFill>
+                <a:effectLst/>
+              </a:rPr>
+              <a:t>SSGGGGSGGGGSGGGGSE</a:t>
+            </a:r>
+          </a:p>
+          <a:p>
+            <a:r>
+              <a:rPr lang="en-US" sz="1400" dirty="0"/>
+              <a:t>taken from </a:t>
+            </a:r>
+            <a:r>
+              <a:rPr lang="en-US" sz="1400" dirty="0" err="1"/>
+              <a:t>aAlphaBio</a:t>
+            </a:r>
+            <a:r>
+              <a:rPr lang="en-US" sz="1400" dirty="0"/>
+              <a:t> dataset as a representative example</a:t>
+            </a:r>
+            <a:endParaRPr lang="en-US" sz="1400" b="0" dirty="0">
+              <a:solidFill>
+                <a:schemeClr val="tx1"/>
+              </a:solidFill>
+              <a:effectLst/>
+            </a:endParaRPr>
+          </a:p>
+        </p:txBody>
+      </p:sp>
+      <p:grpSp>
+        <p:nvGrpSpPr>
+          <p:cNvPr id="39" name="Group 38">
+            <a:extLst>
+              <a:ext uri="{FF2B5EF4-FFF2-40B4-BE49-F238E27FC236}">
+                <a16:creationId xmlns:a16="http://schemas.microsoft.com/office/drawing/2014/main" id="{A0AEC0B9-C818-9A82-74F0-93CB2085D0A1}"/>
+              </a:ext>
+            </a:extLst>
+          </p:cNvPr>
+          <p:cNvGrpSpPr/>
+          <p:nvPr/>
+        </p:nvGrpSpPr>
+        <p:grpSpPr>
+          <a:xfrm>
+            <a:off x="5022490" y="1465858"/>
+            <a:ext cx="5614106" cy="1113979"/>
+            <a:chOff x="1314090" y="1702925"/>
+            <a:chExt cx="5614106" cy="1113979"/>
+          </a:xfrm>
+        </p:grpSpPr>
+        <p:grpSp>
+          <p:nvGrpSpPr>
+            <p:cNvPr id="27" name="Group 26">
+              <a:extLst>
+                <a:ext uri="{FF2B5EF4-FFF2-40B4-BE49-F238E27FC236}">
+                  <a16:creationId xmlns:a16="http://schemas.microsoft.com/office/drawing/2014/main" id="{8BFB0D95-4135-F061-A933-D69BBAF08F36}"/>
+                </a:ext>
+              </a:extLst>
+            </p:cNvPr>
+            <p:cNvGrpSpPr/>
+            <p:nvPr/>
+          </p:nvGrpSpPr>
+          <p:grpSpPr>
+            <a:xfrm>
+              <a:off x="1314090" y="1709947"/>
+              <a:ext cx="4781910" cy="362310"/>
+              <a:chOff x="1314090" y="1709947"/>
+              <a:chExt cx="4781910" cy="362310"/>
+            </a:xfrm>
+          </p:grpSpPr>
+          <p:sp>
+            <p:nvSpPr>
+              <p:cNvPr id="3" name="Rectangle 2">
+                <a:extLst>
+                  <a:ext uri="{FF2B5EF4-FFF2-40B4-BE49-F238E27FC236}">
+                    <a16:creationId xmlns:a16="http://schemas.microsoft.com/office/drawing/2014/main" id="{76E25C25-9305-7F06-2CF4-F705A810098B}"/>
+                  </a:ext>
+                </a:extLst>
+              </p:cNvPr>
+              <p:cNvSpPr/>
+              <p:nvPr/>
+            </p:nvSpPr>
+            <p:spPr>
+              <a:xfrm>
+                <a:off x="1314090" y="1709947"/>
+                <a:ext cx="1777041" cy="362310"/>
+              </a:xfrm>
+              <a:prstGeom prst="rect">
+                <a:avLst/>
+              </a:prstGeom>
+              <a:solidFill>
+                <a:schemeClr val="accent4">
+                  <a:alpha val="61228"/>
+                </a:schemeClr>
+              </a:solidFill>
+            </p:spPr>
+            <p:style>
+              <a:lnRef idx="2">
+                <a:schemeClr val="accent1">
+                  <a:shade val="15000"/>
+                </a:schemeClr>
+              </a:lnRef>
+              <a:fillRef idx="1">
+                <a:schemeClr val="accent1"/>
+              </a:fillRef>
+              <a:effectRef idx="0">
+                <a:schemeClr val="accent1"/>
+              </a:effectRef>
+              <a:fontRef idx="minor">
+                <a:schemeClr val="lt1"/>
+              </a:fontRef>
+            </p:style>
+            <p:txBody>
+              <a:bodyPr rtlCol="0" anchor="ctr"/>
+              <a:lstStyle/>
+              <a:p>
+                <a:pPr algn="ctr"/>
+                <a:r>
+                  <a:rPr lang="en-US" dirty="0">
+                    <a:solidFill>
+                      <a:schemeClr val="tx1"/>
+                    </a:solidFill>
+                  </a:rPr>
+                  <a:t>VL</a:t>
+                </a:r>
+              </a:p>
+            </p:txBody>
+          </p:sp>
+          <p:sp>
+            <p:nvSpPr>
+              <p:cNvPr id="4" name="Rectangle 3">
+                <a:extLst>
+                  <a:ext uri="{FF2B5EF4-FFF2-40B4-BE49-F238E27FC236}">
+                    <a16:creationId xmlns:a16="http://schemas.microsoft.com/office/drawing/2014/main" id="{E7633200-48B9-76CD-27DB-CF34E002DDE3}"/>
+                  </a:ext>
+                </a:extLst>
+              </p:cNvPr>
+              <p:cNvSpPr/>
+              <p:nvPr/>
+            </p:nvSpPr>
+            <p:spPr>
+              <a:xfrm>
+                <a:off x="4318959" y="1709947"/>
+                <a:ext cx="1777041" cy="362310"/>
+              </a:xfrm>
+              <a:prstGeom prst="rect">
+                <a:avLst/>
+              </a:prstGeom>
+              <a:solidFill>
+                <a:schemeClr val="accent2">
+                  <a:alpha val="55000"/>
+                </a:schemeClr>
+              </a:solidFill>
+            </p:spPr>
+            <p:style>
+              <a:lnRef idx="2">
+                <a:schemeClr val="accent1">
+                  <a:shade val="15000"/>
+                </a:schemeClr>
+              </a:lnRef>
+              <a:fillRef idx="1">
+                <a:schemeClr val="accent1"/>
+              </a:fillRef>
+              <a:effectRef idx="0">
+                <a:schemeClr val="accent1"/>
+              </a:effectRef>
+              <a:fontRef idx="minor">
+                <a:schemeClr val="lt1"/>
+              </a:fontRef>
+            </p:style>
+            <p:txBody>
+              <a:bodyPr rtlCol="0" anchor="ctr"/>
+              <a:lstStyle/>
+              <a:p>
+                <a:pPr algn="ctr"/>
+                <a:r>
+                  <a:rPr lang="en-US" dirty="0">
+                    <a:solidFill>
+                      <a:schemeClr val="tx1"/>
+                    </a:solidFill>
+                  </a:rPr>
+                  <a:t>VH</a:t>
+                </a:r>
+              </a:p>
+            </p:txBody>
+          </p:sp>
+          <p:sp>
+            <p:nvSpPr>
+              <p:cNvPr id="5" name="Rectangle 4">
+                <a:extLst>
+                  <a:ext uri="{FF2B5EF4-FFF2-40B4-BE49-F238E27FC236}">
+                    <a16:creationId xmlns:a16="http://schemas.microsoft.com/office/drawing/2014/main" id="{4E2DB290-A23C-BB94-B5C8-7B93930640AC}"/>
+                  </a:ext>
+                </a:extLst>
+              </p:cNvPr>
+              <p:cNvSpPr/>
+              <p:nvPr/>
+            </p:nvSpPr>
+            <p:spPr>
+              <a:xfrm>
+                <a:off x="3301041" y="1709947"/>
+                <a:ext cx="808008" cy="362310"/>
+              </a:xfrm>
+              <a:prstGeom prst="rect">
+                <a:avLst/>
+              </a:prstGeom>
+              <a:solidFill>
+                <a:schemeClr val="bg2">
+                  <a:lumMod val="25000"/>
+                  <a:alpha val="55000"/>
+                </a:schemeClr>
+              </a:solidFill>
+            </p:spPr>
+            <p:style>
+              <a:lnRef idx="2">
+                <a:schemeClr val="accent1">
+                  <a:shade val="15000"/>
+                </a:schemeClr>
+              </a:lnRef>
+              <a:fillRef idx="1">
+                <a:schemeClr val="accent1"/>
+              </a:fillRef>
+              <a:effectRef idx="0">
+                <a:schemeClr val="accent1"/>
+              </a:effectRef>
+              <a:fontRef idx="minor">
+                <a:schemeClr val="lt1"/>
+              </a:fontRef>
+            </p:style>
+            <p:txBody>
+              <a:bodyPr rtlCol="0" anchor="ctr"/>
+              <a:lstStyle/>
+              <a:p>
+                <a:pPr algn="ctr"/>
+                <a:r>
+                  <a:rPr lang="en-US" sz="1200" b="0" dirty="0">
+                    <a:solidFill>
+                      <a:schemeClr val="tx1"/>
+                    </a:solidFill>
+                    <a:effectLst/>
+                    <a:latin typeface="Menlo" panose="020B0609030804020204" pitchFamily="49" charset="0"/>
+                  </a:rPr>
+                  <a:t>Linker</a:t>
+                </a:r>
+              </a:p>
+            </p:txBody>
+          </p:sp>
+          <p:cxnSp>
+            <p:nvCxnSpPr>
+              <p:cNvPr id="8" name="Straight Connector 7">
+                <a:extLst>
+                  <a:ext uri="{FF2B5EF4-FFF2-40B4-BE49-F238E27FC236}">
+                    <a16:creationId xmlns:a16="http://schemas.microsoft.com/office/drawing/2014/main" id="{C55D92BA-EFA4-EDC4-19F1-4C7E1F87E83F}"/>
+                  </a:ext>
+                </a:extLst>
+              </p:cNvPr>
+              <p:cNvCxnSpPr>
+                <a:stCxn id="3" idx="3"/>
+                <a:endCxn id="5" idx="1"/>
+              </p:cNvCxnSpPr>
+              <p:nvPr/>
+            </p:nvCxnSpPr>
+            <p:spPr>
+              <a:xfrm>
+                <a:off x="3091131" y="1891102"/>
+                <a:ext cx="209910" cy="0"/>
+              </a:xfrm>
+              <a:prstGeom prst="line">
+                <a:avLst/>
+              </a:prstGeom>
+            </p:spPr>
+            <p:style>
+              <a:lnRef idx="2">
+                <a:schemeClr val="accent1"/>
+              </a:lnRef>
+              <a:fillRef idx="0">
+                <a:schemeClr val="accent1"/>
+              </a:fillRef>
+              <a:effectRef idx="1">
+                <a:schemeClr val="accent1"/>
+              </a:effectRef>
+              <a:fontRef idx="minor">
+                <a:schemeClr val="tx1"/>
+              </a:fontRef>
+            </p:style>
+          </p:cxnSp>
+          <p:cxnSp>
+            <p:nvCxnSpPr>
+              <p:cNvPr id="10" name="Straight Connector 9">
+                <a:extLst>
+                  <a:ext uri="{FF2B5EF4-FFF2-40B4-BE49-F238E27FC236}">
+                    <a16:creationId xmlns:a16="http://schemas.microsoft.com/office/drawing/2014/main" id="{A6C6C2F1-0FB8-0535-674E-4F9F6FBAB31D}"/>
+                  </a:ext>
+                </a:extLst>
+              </p:cNvPr>
+              <p:cNvCxnSpPr>
+                <a:stCxn id="5" idx="3"/>
+                <a:endCxn id="4" idx="1"/>
+              </p:cNvCxnSpPr>
+              <p:nvPr/>
+            </p:nvCxnSpPr>
+            <p:spPr>
+              <a:xfrm>
+                <a:off x="4109049" y="1891102"/>
+                <a:ext cx="209910" cy="0"/>
+              </a:xfrm>
+              <a:prstGeom prst="line">
+                <a:avLst/>
+              </a:prstGeom>
+            </p:spPr>
+            <p:style>
+              <a:lnRef idx="2">
+                <a:schemeClr val="accent1"/>
+              </a:lnRef>
+              <a:fillRef idx="0">
+                <a:schemeClr val="accent1"/>
+              </a:fillRef>
+              <a:effectRef idx="1">
+                <a:schemeClr val="accent1"/>
+              </a:effectRef>
+              <a:fontRef idx="minor">
+                <a:schemeClr val="tx1"/>
+              </a:fontRef>
+            </p:style>
+          </p:cxnSp>
+        </p:grpSp>
+        <p:grpSp>
+          <p:nvGrpSpPr>
+            <p:cNvPr id="28" name="Group 27">
+              <a:extLst>
+                <a:ext uri="{FF2B5EF4-FFF2-40B4-BE49-F238E27FC236}">
+                  <a16:creationId xmlns:a16="http://schemas.microsoft.com/office/drawing/2014/main" id="{1E7560C6-989D-43FF-0F15-350B9E15A03E}"/>
+                </a:ext>
+              </a:extLst>
+            </p:cNvPr>
+            <p:cNvGrpSpPr/>
+            <p:nvPr/>
+          </p:nvGrpSpPr>
+          <p:grpSpPr>
+            <a:xfrm>
+              <a:off x="1314090" y="2454158"/>
+              <a:ext cx="4781909" cy="362746"/>
+              <a:chOff x="1314090" y="2454158"/>
+              <a:chExt cx="4781909" cy="362746"/>
+            </a:xfrm>
+          </p:grpSpPr>
+          <p:sp>
+            <p:nvSpPr>
+              <p:cNvPr id="12" name="Rectangle 11">
+                <a:extLst>
+                  <a:ext uri="{FF2B5EF4-FFF2-40B4-BE49-F238E27FC236}">
+                    <a16:creationId xmlns:a16="http://schemas.microsoft.com/office/drawing/2014/main" id="{8A24D1E9-A64F-A32A-AA69-3C657CDD531A}"/>
+                  </a:ext>
+                </a:extLst>
+              </p:cNvPr>
+              <p:cNvSpPr/>
+              <p:nvPr/>
+            </p:nvSpPr>
+            <p:spPr>
+              <a:xfrm>
+                <a:off x="4318958" y="2454158"/>
+                <a:ext cx="1777041" cy="362310"/>
+              </a:xfrm>
+              <a:prstGeom prst="rect">
+                <a:avLst/>
+              </a:prstGeom>
+              <a:solidFill>
+                <a:schemeClr val="accent4">
+                  <a:alpha val="61228"/>
+                </a:schemeClr>
+              </a:solidFill>
+            </p:spPr>
+            <p:style>
+              <a:lnRef idx="2">
+                <a:schemeClr val="accent1">
+                  <a:shade val="15000"/>
+                </a:schemeClr>
+              </a:lnRef>
+              <a:fillRef idx="1">
+                <a:schemeClr val="accent1"/>
+              </a:fillRef>
+              <a:effectRef idx="0">
+                <a:schemeClr val="accent1"/>
+              </a:effectRef>
+              <a:fontRef idx="minor">
+                <a:schemeClr val="lt1"/>
+              </a:fontRef>
+            </p:style>
+            <p:txBody>
+              <a:bodyPr rtlCol="0" anchor="ctr"/>
+              <a:lstStyle/>
+              <a:p>
+                <a:pPr algn="ctr"/>
+                <a:r>
+                  <a:rPr lang="en-US" dirty="0">
+                    <a:solidFill>
+                      <a:schemeClr val="tx1"/>
+                    </a:solidFill>
+                  </a:rPr>
+                  <a:t>VL</a:t>
+                </a:r>
+              </a:p>
+            </p:txBody>
+          </p:sp>
+          <p:sp>
+            <p:nvSpPr>
+              <p:cNvPr id="13" name="Rectangle 12">
+                <a:extLst>
+                  <a:ext uri="{FF2B5EF4-FFF2-40B4-BE49-F238E27FC236}">
+                    <a16:creationId xmlns:a16="http://schemas.microsoft.com/office/drawing/2014/main" id="{CBCD5F6E-4EA9-1828-24B2-D554C71F9C8A}"/>
+                  </a:ext>
+                </a:extLst>
+              </p:cNvPr>
+              <p:cNvSpPr/>
+              <p:nvPr/>
+            </p:nvSpPr>
+            <p:spPr>
+              <a:xfrm>
+                <a:off x="1314090" y="2454594"/>
+                <a:ext cx="1777041" cy="362310"/>
+              </a:xfrm>
+              <a:prstGeom prst="rect">
+                <a:avLst/>
+              </a:prstGeom>
+              <a:solidFill>
+                <a:schemeClr val="accent2">
+                  <a:alpha val="55000"/>
+                </a:schemeClr>
+              </a:solidFill>
+            </p:spPr>
+            <p:style>
+              <a:lnRef idx="2">
+                <a:schemeClr val="accent1">
+                  <a:shade val="15000"/>
+                </a:schemeClr>
+              </a:lnRef>
+              <a:fillRef idx="1">
+                <a:schemeClr val="accent1"/>
+              </a:fillRef>
+              <a:effectRef idx="0">
+                <a:schemeClr val="accent1"/>
+              </a:effectRef>
+              <a:fontRef idx="minor">
+                <a:schemeClr val="lt1"/>
+              </a:fontRef>
+            </p:style>
+            <p:txBody>
+              <a:bodyPr rtlCol="0" anchor="ctr"/>
+              <a:lstStyle/>
+              <a:p>
+                <a:pPr algn="ctr"/>
+                <a:r>
+                  <a:rPr lang="en-US" dirty="0">
+                    <a:solidFill>
+                      <a:schemeClr val="tx1"/>
+                    </a:solidFill>
+                  </a:rPr>
+                  <a:t>VH</a:t>
+                </a:r>
+              </a:p>
+            </p:txBody>
+          </p:sp>
+          <p:sp>
+            <p:nvSpPr>
+              <p:cNvPr id="14" name="Rectangle 13">
+                <a:extLst>
+                  <a:ext uri="{FF2B5EF4-FFF2-40B4-BE49-F238E27FC236}">
+                    <a16:creationId xmlns:a16="http://schemas.microsoft.com/office/drawing/2014/main" id="{3FC69BC8-8C67-33C6-F972-820B1E5D102C}"/>
+                  </a:ext>
+                </a:extLst>
+              </p:cNvPr>
+              <p:cNvSpPr/>
+              <p:nvPr/>
+            </p:nvSpPr>
+            <p:spPr>
+              <a:xfrm>
+                <a:off x="3301041" y="2454158"/>
+                <a:ext cx="808008" cy="362310"/>
+              </a:xfrm>
+              <a:prstGeom prst="rect">
+                <a:avLst/>
+              </a:prstGeom>
+              <a:solidFill>
+                <a:schemeClr val="bg2">
+                  <a:lumMod val="25000"/>
+                  <a:alpha val="55000"/>
+                </a:schemeClr>
+              </a:solidFill>
+            </p:spPr>
+            <p:style>
+              <a:lnRef idx="2">
+                <a:schemeClr val="accent1">
+                  <a:shade val="15000"/>
+                </a:schemeClr>
+              </a:lnRef>
+              <a:fillRef idx="1">
+                <a:schemeClr val="accent1"/>
+              </a:fillRef>
+              <a:effectRef idx="0">
+                <a:schemeClr val="accent1"/>
+              </a:effectRef>
+              <a:fontRef idx="minor">
+                <a:schemeClr val="lt1"/>
+              </a:fontRef>
+            </p:style>
+            <p:txBody>
+              <a:bodyPr rtlCol="0" anchor="ctr"/>
+              <a:lstStyle/>
+              <a:p>
+                <a:pPr algn="ctr"/>
+                <a:r>
+                  <a:rPr lang="en-US" sz="1200" b="0" dirty="0">
+                    <a:solidFill>
+                      <a:schemeClr val="tx1"/>
+                    </a:solidFill>
+                    <a:effectLst/>
+                    <a:latin typeface="Menlo" panose="020B0609030804020204" pitchFamily="49" charset="0"/>
+                  </a:rPr>
+                  <a:t>Linker</a:t>
+                </a:r>
+              </a:p>
+            </p:txBody>
+          </p:sp>
+          <p:cxnSp>
+            <p:nvCxnSpPr>
+              <p:cNvPr id="15" name="Straight Connector 14">
+                <a:extLst>
+                  <a:ext uri="{FF2B5EF4-FFF2-40B4-BE49-F238E27FC236}">
+                    <a16:creationId xmlns:a16="http://schemas.microsoft.com/office/drawing/2014/main" id="{BAB3EAE3-4ADE-C38B-5865-A00824DB7F35}"/>
+                  </a:ext>
+                </a:extLst>
+              </p:cNvPr>
+              <p:cNvCxnSpPr>
+                <a:cxnSpLocks/>
+                <a:stCxn id="12" idx="1"/>
+                <a:endCxn id="14" idx="3"/>
+              </p:cNvCxnSpPr>
+              <p:nvPr/>
+            </p:nvCxnSpPr>
+            <p:spPr>
+              <a:xfrm flipH="1">
+                <a:off x="4109049" y="2635313"/>
+                <a:ext cx="209909" cy="0"/>
+              </a:xfrm>
+              <a:prstGeom prst="line">
+                <a:avLst/>
+              </a:prstGeom>
+            </p:spPr>
+            <p:style>
+              <a:lnRef idx="2">
+                <a:schemeClr val="accent1"/>
+              </a:lnRef>
+              <a:fillRef idx="0">
+                <a:schemeClr val="accent1"/>
+              </a:fillRef>
+              <a:effectRef idx="1">
+                <a:schemeClr val="accent1"/>
+              </a:effectRef>
+              <a:fontRef idx="minor">
+                <a:schemeClr val="tx1"/>
+              </a:fontRef>
+            </p:style>
+          </p:cxnSp>
+          <p:cxnSp>
+            <p:nvCxnSpPr>
+              <p:cNvPr id="16" name="Straight Connector 15">
+                <a:extLst>
+                  <a:ext uri="{FF2B5EF4-FFF2-40B4-BE49-F238E27FC236}">
+                    <a16:creationId xmlns:a16="http://schemas.microsoft.com/office/drawing/2014/main" id="{91BCEB74-C4AC-B840-62FA-508422E28F9C}"/>
+                  </a:ext>
+                </a:extLst>
+              </p:cNvPr>
+              <p:cNvCxnSpPr>
+                <a:cxnSpLocks/>
+                <a:stCxn id="14" idx="1"/>
+                <a:endCxn id="13" idx="3"/>
+              </p:cNvCxnSpPr>
+              <p:nvPr/>
+            </p:nvCxnSpPr>
+            <p:spPr>
+              <a:xfrm flipH="1">
+                <a:off x="3091131" y="2635313"/>
+                <a:ext cx="209910" cy="436"/>
+              </a:xfrm>
+              <a:prstGeom prst="line">
+                <a:avLst/>
+              </a:prstGeom>
+            </p:spPr>
+            <p:style>
+              <a:lnRef idx="2">
+                <a:schemeClr val="accent1"/>
+              </a:lnRef>
+              <a:fillRef idx="0">
+                <a:schemeClr val="accent1"/>
+              </a:fillRef>
+              <a:effectRef idx="1">
+                <a:schemeClr val="accent1"/>
+              </a:effectRef>
+              <a:fontRef idx="minor">
+                <a:schemeClr val="tx1"/>
+              </a:fontRef>
+            </p:style>
+          </p:cxnSp>
+        </p:grpSp>
+        <p:sp>
+          <p:nvSpPr>
+            <p:cNvPr id="25" name="TextBox 24">
+              <a:extLst>
+                <a:ext uri="{FF2B5EF4-FFF2-40B4-BE49-F238E27FC236}">
+                  <a16:creationId xmlns:a16="http://schemas.microsoft.com/office/drawing/2014/main" id="{D50BD169-63CA-2B16-710C-00130D8DA635}"/>
+                </a:ext>
+              </a:extLst>
+            </p:cNvPr>
+            <p:cNvSpPr txBox="1"/>
+            <p:nvPr/>
+          </p:nvSpPr>
+          <p:spPr>
+            <a:xfrm>
+              <a:off x="6305910" y="1702925"/>
+              <a:ext cx="622286" cy="369332"/>
+            </a:xfrm>
+            <a:prstGeom prst="rect">
+              <a:avLst/>
+            </a:prstGeom>
+            <a:noFill/>
+          </p:spPr>
+          <p:txBody>
+            <a:bodyPr wrap="none" rtlCol="0">
+              <a:spAutoFit/>
+            </a:bodyPr>
+            <a:lstStyle/>
+            <a:p>
+              <a:r>
+                <a:rPr lang="en-US" dirty="0"/>
+                <a:t>50%</a:t>
+              </a:r>
+            </a:p>
+          </p:txBody>
+        </p:sp>
+        <p:sp>
+          <p:nvSpPr>
+            <p:cNvPr id="26" name="TextBox 25">
+              <a:extLst>
+                <a:ext uri="{FF2B5EF4-FFF2-40B4-BE49-F238E27FC236}">
+                  <a16:creationId xmlns:a16="http://schemas.microsoft.com/office/drawing/2014/main" id="{D08FBF5A-D8DB-2192-6DD4-9BF96D47E347}"/>
+                </a:ext>
+              </a:extLst>
+            </p:cNvPr>
+            <p:cNvSpPr txBox="1"/>
+            <p:nvPr/>
+          </p:nvSpPr>
+          <p:spPr>
+            <a:xfrm>
+              <a:off x="6305908" y="2447136"/>
+              <a:ext cx="622286" cy="369332"/>
+            </a:xfrm>
+            <a:prstGeom prst="rect">
+              <a:avLst/>
+            </a:prstGeom>
+            <a:noFill/>
+          </p:spPr>
+          <p:txBody>
+            <a:bodyPr wrap="none" rtlCol="0">
+              <a:spAutoFit/>
+            </a:bodyPr>
+            <a:lstStyle/>
+            <a:p>
+              <a:r>
+                <a:rPr lang="en-US" dirty="0"/>
+                <a:t>50%</a:t>
+              </a:r>
+            </a:p>
+          </p:txBody>
+        </p:sp>
+      </p:grpSp>
+      <p:grpSp>
+        <p:nvGrpSpPr>
+          <p:cNvPr id="38" name="Group 37">
+            <a:extLst>
+              <a:ext uri="{FF2B5EF4-FFF2-40B4-BE49-F238E27FC236}">
+                <a16:creationId xmlns:a16="http://schemas.microsoft.com/office/drawing/2014/main" id="{6CEF1670-C630-B611-5484-3C702A4077BF}"/>
+              </a:ext>
+            </a:extLst>
+          </p:cNvPr>
+          <p:cNvGrpSpPr/>
+          <p:nvPr/>
+        </p:nvGrpSpPr>
+        <p:grpSpPr>
+          <a:xfrm>
+            <a:off x="4425480" y="3406090"/>
+            <a:ext cx="7427405" cy="589575"/>
+            <a:chOff x="753536" y="4052515"/>
+            <a:chExt cx="7427405" cy="589575"/>
+          </a:xfrm>
+        </p:grpSpPr>
+        <p:sp>
+          <p:nvSpPr>
+            <p:cNvPr id="11" name="Rectangle 10">
+              <a:extLst>
+                <a:ext uri="{FF2B5EF4-FFF2-40B4-BE49-F238E27FC236}">
+                  <a16:creationId xmlns:a16="http://schemas.microsoft.com/office/drawing/2014/main" id="{D8163861-B92C-F96F-5716-5C0B961258C3}"/>
+                </a:ext>
+              </a:extLst>
+            </p:cNvPr>
+            <p:cNvSpPr/>
+            <p:nvPr/>
+          </p:nvSpPr>
+          <p:spPr>
+            <a:xfrm>
+              <a:off x="753536" y="4279780"/>
+              <a:ext cx="591068" cy="362310"/>
+            </a:xfrm>
+            <a:prstGeom prst="rect">
+              <a:avLst/>
+            </a:prstGeom>
+          </p:spPr>
+          <p:style>
+            <a:lnRef idx="2">
+              <a:schemeClr val="accent1">
+                <a:shade val="15000"/>
+              </a:schemeClr>
+            </a:lnRef>
+            <a:fillRef idx="1">
+              <a:schemeClr val="accent1"/>
+            </a:fillRef>
+            <a:effectRef idx="0">
+              <a:schemeClr val="accent1"/>
+            </a:effectRef>
+            <a:fontRef idx="minor">
+              <a:schemeClr val="lt1"/>
+            </a:fontRef>
+          </p:style>
+          <p:txBody>
+            <a:bodyPr rtlCol="0" anchor="ctr"/>
+            <a:lstStyle/>
+            <a:p>
+              <a:pPr algn="ctr"/>
+              <a:r>
+                <a:rPr lang="en-US" dirty="0"/>
+                <a:t>CLS</a:t>
+              </a:r>
+            </a:p>
+          </p:txBody>
+        </p:sp>
+        <p:grpSp>
+          <p:nvGrpSpPr>
+            <p:cNvPr id="29" name="Group 28">
+              <a:extLst>
+                <a:ext uri="{FF2B5EF4-FFF2-40B4-BE49-F238E27FC236}">
+                  <a16:creationId xmlns:a16="http://schemas.microsoft.com/office/drawing/2014/main" id="{3051CB66-AE65-59B4-7410-CE99B300D9D5}"/>
+                </a:ext>
+              </a:extLst>
+            </p:cNvPr>
+            <p:cNvGrpSpPr/>
+            <p:nvPr/>
+          </p:nvGrpSpPr>
+          <p:grpSpPr>
+            <a:xfrm>
+              <a:off x="1381823" y="4276924"/>
+              <a:ext cx="4781910" cy="362310"/>
+              <a:chOff x="1314090" y="1709947"/>
+              <a:chExt cx="4781910" cy="362310"/>
+            </a:xfrm>
+          </p:grpSpPr>
+          <p:sp>
+            <p:nvSpPr>
+              <p:cNvPr id="30" name="Rectangle 29">
+                <a:extLst>
+                  <a:ext uri="{FF2B5EF4-FFF2-40B4-BE49-F238E27FC236}">
+                    <a16:creationId xmlns:a16="http://schemas.microsoft.com/office/drawing/2014/main" id="{9CED239F-4DD5-0386-43FF-A7CDA870A931}"/>
+                  </a:ext>
+                </a:extLst>
+              </p:cNvPr>
+              <p:cNvSpPr/>
+              <p:nvPr/>
+            </p:nvSpPr>
+            <p:spPr>
+              <a:xfrm>
+                <a:off x="1314090" y="1709947"/>
+                <a:ext cx="1777041" cy="362310"/>
+              </a:xfrm>
+              <a:prstGeom prst="rect">
+                <a:avLst/>
+              </a:prstGeom>
+              <a:solidFill>
+                <a:schemeClr val="accent4">
+                  <a:alpha val="61228"/>
+                </a:schemeClr>
+              </a:solidFill>
+            </p:spPr>
+            <p:style>
+              <a:lnRef idx="2">
+                <a:schemeClr val="accent1">
+                  <a:shade val="15000"/>
+                </a:schemeClr>
+              </a:lnRef>
+              <a:fillRef idx="1">
+                <a:schemeClr val="accent1"/>
+              </a:fillRef>
+              <a:effectRef idx="0">
+                <a:schemeClr val="accent1"/>
+              </a:effectRef>
+              <a:fontRef idx="minor">
+                <a:schemeClr val="lt1"/>
+              </a:fontRef>
+            </p:style>
+            <p:txBody>
+              <a:bodyPr rtlCol="0" anchor="ctr"/>
+              <a:lstStyle/>
+              <a:p>
+                <a:pPr algn="ctr"/>
+                <a:r>
+                  <a:rPr lang="en-US" dirty="0">
+                    <a:solidFill>
+                      <a:schemeClr val="tx1"/>
+                    </a:solidFill>
+                  </a:rPr>
+                  <a:t>VL</a:t>
+                </a:r>
+              </a:p>
+            </p:txBody>
+          </p:sp>
+          <p:sp>
+            <p:nvSpPr>
+              <p:cNvPr id="31" name="Rectangle 30">
+                <a:extLst>
+                  <a:ext uri="{FF2B5EF4-FFF2-40B4-BE49-F238E27FC236}">
+                    <a16:creationId xmlns:a16="http://schemas.microsoft.com/office/drawing/2014/main" id="{6C113572-0F38-AD7F-E43A-BE258B21FC8B}"/>
+                  </a:ext>
+                </a:extLst>
+              </p:cNvPr>
+              <p:cNvSpPr/>
+              <p:nvPr/>
+            </p:nvSpPr>
+            <p:spPr>
+              <a:xfrm>
+                <a:off x="4318959" y="1709947"/>
+                <a:ext cx="1777041" cy="362310"/>
+              </a:xfrm>
+              <a:prstGeom prst="rect">
+                <a:avLst/>
+              </a:prstGeom>
+              <a:solidFill>
+                <a:schemeClr val="accent2">
+                  <a:alpha val="55000"/>
+                </a:schemeClr>
+              </a:solidFill>
+            </p:spPr>
+            <p:style>
+              <a:lnRef idx="2">
+                <a:schemeClr val="accent1">
+                  <a:shade val="15000"/>
+                </a:schemeClr>
+              </a:lnRef>
+              <a:fillRef idx="1">
+                <a:schemeClr val="accent1"/>
+              </a:fillRef>
+              <a:effectRef idx="0">
+                <a:schemeClr val="accent1"/>
+              </a:effectRef>
+              <a:fontRef idx="minor">
+                <a:schemeClr val="lt1"/>
+              </a:fontRef>
+            </p:style>
+            <p:txBody>
+              <a:bodyPr rtlCol="0" anchor="ctr"/>
+              <a:lstStyle/>
+              <a:p>
+                <a:pPr algn="ctr"/>
+                <a:r>
+                  <a:rPr lang="en-US" dirty="0">
+                    <a:solidFill>
+                      <a:schemeClr val="tx1"/>
+                    </a:solidFill>
+                  </a:rPr>
+                  <a:t>VH</a:t>
+                </a:r>
+              </a:p>
+            </p:txBody>
+          </p:sp>
+          <p:sp>
+            <p:nvSpPr>
+              <p:cNvPr id="32" name="Rectangle 31">
+                <a:extLst>
+                  <a:ext uri="{FF2B5EF4-FFF2-40B4-BE49-F238E27FC236}">
+                    <a16:creationId xmlns:a16="http://schemas.microsoft.com/office/drawing/2014/main" id="{D1E0B087-7D89-2A7D-AA39-F134115DEFF2}"/>
+                  </a:ext>
+                </a:extLst>
+              </p:cNvPr>
+              <p:cNvSpPr/>
+              <p:nvPr/>
+            </p:nvSpPr>
+            <p:spPr>
+              <a:xfrm>
+                <a:off x="3301041" y="1709947"/>
+                <a:ext cx="808008" cy="362310"/>
+              </a:xfrm>
+              <a:prstGeom prst="rect">
+                <a:avLst/>
+              </a:prstGeom>
+              <a:solidFill>
+                <a:schemeClr val="bg2">
+                  <a:lumMod val="25000"/>
+                  <a:alpha val="55000"/>
+                </a:schemeClr>
+              </a:solidFill>
+            </p:spPr>
+            <p:style>
+              <a:lnRef idx="2">
+                <a:schemeClr val="accent1">
+                  <a:shade val="15000"/>
+                </a:schemeClr>
+              </a:lnRef>
+              <a:fillRef idx="1">
+                <a:schemeClr val="accent1"/>
+              </a:fillRef>
+              <a:effectRef idx="0">
+                <a:schemeClr val="accent1"/>
+              </a:effectRef>
+              <a:fontRef idx="minor">
+                <a:schemeClr val="lt1"/>
+              </a:fontRef>
+            </p:style>
+            <p:txBody>
+              <a:bodyPr rtlCol="0" anchor="ctr"/>
+              <a:lstStyle/>
+              <a:p>
+                <a:pPr algn="ctr"/>
+                <a:r>
+                  <a:rPr lang="en-US" sz="1200" b="0" dirty="0">
+                    <a:solidFill>
+                      <a:schemeClr val="tx1"/>
+                    </a:solidFill>
+                    <a:effectLst/>
+                    <a:latin typeface="Menlo" panose="020B0609030804020204" pitchFamily="49" charset="0"/>
+                  </a:rPr>
+                  <a:t>Linker</a:t>
+                </a:r>
+              </a:p>
+            </p:txBody>
+          </p:sp>
+          <p:cxnSp>
+            <p:nvCxnSpPr>
+              <p:cNvPr id="33" name="Straight Connector 32">
+                <a:extLst>
+                  <a:ext uri="{FF2B5EF4-FFF2-40B4-BE49-F238E27FC236}">
+                    <a16:creationId xmlns:a16="http://schemas.microsoft.com/office/drawing/2014/main" id="{99D66BA2-4840-E787-9A3C-8765214A44F8}"/>
+                  </a:ext>
+                </a:extLst>
+              </p:cNvPr>
+              <p:cNvCxnSpPr>
+                <a:stCxn id="30" idx="3"/>
+                <a:endCxn id="32" idx="1"/>
+              </p:cNvCxnSpPr>
+              <p:nvPr/>
+            </p:nvCxnSpPr>
+            <p:spPr>
+              <a:xfrm>
+                <a:off x="3091131" y="1891102"/>
+                <a:ext cx="209910" cy="0"/>
+              </a:xfrm>
+              <a:prstGeom prst="line">
+                <a:avLst/>
+              </a:prstGeom>
+            </p:spPr>
+            <p:style>
+              <a:lnRef idx="2">
+                <a:schemeClr val="accent1"/>
+              </a:lnRef>
+              <a:fillRef idx="0">
+                <a:schemeClr val="accent1"/>
+              </a:fillRef>
+              <a:effectRef idx="1">
+                <a:schemeClr val="accent1"/>
+              </a:effectRef>
+              <a:fontRef idx="minor">
+                <a:schemeClr val="tx1"/>
+              </a:fontRef>
+            </p:style>
+          </p:cxnSp>
+          <p:cxnSp>
+            <p:nvCxnSpPr>
+              <p:cNvPr id="34" name="Straight Connector 33">
+                <a:extLst>
+                  <a:ext uri="{FF2B5EF4-FFF2-40B4-BE49-F238E27FC236}">
+                    <a16:creationId xmlns:a16="http://schemas.microsoft.com/office/drawing/2014/main" id="{F8BDCF6F-8223-55AB-102F-8AAF2A734BD8}"/>
+                  </a:ext>
+                </a:extLst>
+              </p:cNvPr>
+              <p:cNvCxnSpPr>
+                <a:stCxn id="32" idx="3"/>
+                <a:endCxn id="31" idx="1"/>
+              </p:cNvCxnSpPr>
+              <p:nvPr/>
+            </p:nvCxnSpPr>
+            <p:spPr>
+              <a:xfrm>
+                <a:off x="4109049" y="1891102"/>
+                <a:ext cx="209910" cy="0"/>
+              </a:xfrm>
+              <a:prstGeom prst="line">
+                <a:avLst/>
+              </a:prstGeom>
+            </p:spPr>
+            <p:style>
+              <a:lnRef idx="2">
+                <a:schemeClr val="accent1"/>
+              </a:lnRef>
+              <a:fillRef idx="0">
+                <a:schemeClr val="accent1"/>
+              </a:fillRef>
+              <a:effectRef idx="1">
+                <a:schemeClr val="accent1"/>
+              </a:effectRef>
+              <a:fontRef idx="minor">
+                <a:schemeClr val="tx1"/>
+              </a:fontRef>
+            </p:style>
+          </p:cxnSp>
+        </p:grpSp>
+        <p:sp>
+          <p:nvSpPr>
+            <p:cNvPr id="35" name="Rectangle 34">
+              <a:extLst>
+                <a:ext uri="{FF2B5EF4-FFF2-40B4-BE49-F238E27FC236}">
+                  <a16:creationId xmlns:a16="http://schemas.microsoft.com/office/drawing/2014/main" id="{10FF49E2-A085-FE56-DB81-9FB44635D156}"/>
+                </a:ext>
+              </a:extLst>
+            </p:cNvPr>
+            <p:cNvSpPr/>
+            <p:nvPr/>
+          </p:nvSpPr>
+          <p:spPr>
+            <a:xfrm>
+              <a:off x="6231468" y="4276924"/>
+              <a:ext cx="696725" cy="362310"/>
+            </a:xfrm>
+            <a:prstGeom prst="rect">
+              <a:avLst/>
+            </a:prstGeom>
+          </p:spPr>
+          <p:style>
+            <a:lnRef idx="2">
+              <a:schemeClr val="accent1">
+                <a:shade val="15000"/>
+              </a:schemeClr>
+            </a:lnRef>
+            <a:fillRef idx="1">
+              <a:schemeClr val="accent1"/>
+            </a:fillRef>
+            <a:effectRef idx="0">
+              <a:schemeClr val="accent1"/>
+            </a:effectRef>
+            <a:fontRef idx="minor">
+              <a:schemeClr val="lt1"/>
+            </a:fontRef>
+          </p:style>
+          <p:txBody>
+            <a:bodyPr rtlCol="0" anchor="ctr"/>
+            <a:lstStyle/>
+            <a:p>
+              <a:pPr algn="ctr"/>
+              <a:r>
+                <a:rPr lang="en-US" dirty="0"/>
+                <a:t>PAD</a:t>
+              </a:r>
+            </a:p>
+          </p:txBody>
+        </p:sp>
+        <p:sp>
+          <p:nvSpPr>
+            <p:cNvPr id="36" name="Rectangle 35">
+              <a:extLst>
+                <a:ext uri="{FF2B5EF4-FFF2-40B4-BE49-F238E27FC236}">
+                  <a16:creationId xmlns:a16="http://schemas.microsoft.com/office/drawing/2014/main" id="{5ED1A5A9-21F2-DF80-4C58-37D9597D7A75}"/>
+                </a:ext>
+              </a:extLst>
+            </p:cNvPr>
+            <p:cNvSpPr/>
+            <p:nvPr/>
+          </p:nvSpPr>
+          <p:spPr>
+            <a:xfrm>
+              <a:off x="7023788" y="4274980"/>
+              <a:ext cx="696725" cy="362310"/>
+            </a:xfrm>
+            <a:prstGeom prst="rect">
+              <a:avLst/>
+            </a:prstGeom>
+          </p:spPr>
+          <p:style>
+            <a:lnRef idx="2">
+              <a:schemeClr val="accent1">
+                <a:shade val="15000"/>
+              </a:schemeClr>
+            </a:lnRef>
+            <a:fillRef idx="1">
+              <a:schemeClr val="accent1"/>
+            </a:fillRef>
+            <a:effectRef idx="0">
+              <a:schemeClr val="accent1"/>
+            </a:effectRef>
+            <a:fontRef idx="minor">
+              <a:schemeClr val="lt1"/>
+            </a:fontRef>
+          </p:style>
+          <p:txBody>
+            <a:bodyPr rtlCol="0" anchor="ctr"/>
+            <a:lstStyle/>
+            <a:p>
+              <a:pPr algn="ctr"/>
+              <a:r>
+                <a:rPr lang="en-US" dirty="0"/>
+                <a:t>PAD</a:t>
+              </a:r>
+            </a:p>
+          </p:txBody>
+        </p:sp>
+        <p:sp>
+          <p:nvSpPr>
+            <p:cNvPr id="37" name="TextBox 36">
+              <a:extLst>
+                <a:ext uri="{FF2B5EF4-FFF2-40B4-BE49-F238E27FC236}">
+                  <a16:creationId xmlns:a16="http://schemas.microsoft.com/office/drawing/2014/main" id="{EDBB38D4-E048-F9C8-5FC1-71950E8A068F}"/>
+                </a:ext>
+              </a:extLst>
+            </p:cNvPr>
+            <p:cNvSpPr txBox="1"/>
+            <p:nvPr/>
+          </p:nvSpPr>
+          <p:spPr>
+            <a:xfrm>
+              <a:off x="7661247" y="4052515"/>
+              <a:ext cx="519694" cy="584775"/>
+            </a:xfrm>
+            <a:prstGeom prst="rect">
+              <a:avLst/>
+            </a:prstGeom>
+            <a:noFill/>
+          </p:spPr>
+          <p:txBody>
+            <a:bodyPr wrap="none" rtlCol="0">
+              <a:spAutoFit/>
+            </a:bodyPr>
+            <a:lstStyle/>
+            <a:p>
+              <a:r>
+                <a:rPr lang="en-US" sz="3200" dirty="0"/>
+                <a:t>…</a:t>
+              </a:r>
+            </a:p>
+          </p:txBody>
+        </p:sp>
+      </p:grpSp>
+      <p:sp>
+        <p:nvSpPr>
+          <p:cNvPr id="40" name="TextBox 39">
+            <a:extLst>
+              <a:ext uri="{FF2B5EF4-FFF2-40B4-BE49-F238E27FC236}">
+                <a16:creationId xmlns:a16="http://schemas.microsoft.com/office/drawing/2014/main" id="{9D3823E7-968E-9DBB-04AD-E42F3E82F538}"/>
+              </a:ext>
+            </a:extLst>
+          </p:cNvPr>
+          <p:cNvSpPr txBox="1"/>
+          <p:nvPr/>
+        </p:nvSpPr>
+        <p:spPr>
+          <a:xfrm>
+            <a:off x="4836945" y="1012971"/>
+            <a:ext cx="2836289" cy="369332"/>
+          </a:xfrm>
+          <a:prstGeom prst="rect">
+            <a:avLst/>
+          </a:prstGeom>
+          <a:noFill/>
+        </p:spPr>
+        <p:txBody>
+          <a:bodyPr wrap="none" rtlCol="0">
+            <a:spAutoFit/>
+          </a:bodyPr>
+          <a:lstStyle/>
+          <a:p>
+            <a:r>
+              <a:rPr lang="en-US" dirty="0"/>
+              <a:t>Construct </a:t>
+            </a:r>
+            <a:r>
+              <a:rPr lang="en-US" dirty="0" err="1"/>
+              <a:t>scFv</a:t>
+            </a:r>
+            <a:r>
+              <a:rPr lang="en-US" dirty="0"/>
+              <a:t> sequences</a:t>
+            </a:r>
+          </a:p>
+        </p:txBody>
+      </p:sp>
+      <p:sp>
+        <p:nvSpPr>
+          <p:cNvPr id="41" name="TextBox 40">
+            <a:extLst>
+              <a:ext uri="{FF2B5EF4-FFF2-40B4-BE49-F238E27FC236}">
+                <a16:creationId xmlns:a16="http://schemas.microsoft.com/office/drawing/2014/main" id="{4D394BFC-1240-16D7-80D2-A67BDBE4F740}"/>
+              </a:ext>
+            </a:extLst>
+          </p:cNvPr>
+          <p:cNvSpPr txBox="1"/>
+          <p:nvPr/>
+        </p:nvSpPr>
+        <p:spPr>
+          <a:xfrm>
+            <a:off x="7501306" y="2868434"/>
+            <a:ext cx="3856120" cy="369332"/>
+          </a:xfrm>
+          <a:prstGeom prst="rect">
+            <a:avLst/>
+          </a:prstGeom>
+          <a:noFill/>
+        </p:spPr>
+        <p:txBody>
+          <a:bodyPr wrap="none" rtlCol="0">
+            <a:spAutoFit/>
+          </a:bodyPr>
+          <a:lstStyle/>
+          <a:p>
+            <a:r>
+              <a:rPr lang="en-US" dirty="0"/>
+              <a:t>Encode, prepend-CLS, PAD if needed</a:t>
+            </a:r>
+          </a:p>
+        </p:txBody>
+      </p:sp>
+      <p:cxnSp>
+        <p:nvCxnSpPr>
+          <p:cNvPr id="43" name="Straight Arrow Connector 42">
+            <a:extLst>
+              <a:ext uri="{FF2B5EF4-FFF2-40B4-BE49-F238E27FC236}">
+                <a16:creationId xmlns:a16="http://schemas.microsoft.com/office/drawing/2014/main" id="{9D2FEA68-E347-9867-D5E3-A2F7D6BBCB58}"/>
+              </a:ext>
+            </a:extLst>
+          </p:cNvPr>
+          <p:cNvCxnSpPr>
+            <a:cxnSpLocks/>
+          </p:cNvCxnSpPr>
+          <p:nvPr/>
+        </p:nvCxnSpPr>
+        <p:spPr>
+          <a:xfrm>
+            <a:off x="7433733" y="2656501"/>
+            <a:ext cx="0" cy="879706"/>
+          </a:xfrm>
+          <a:prstGeom prst="straightConnector1">
+            <a:avLst/>
+          </a:prstGeom>
+          <a:ln w="34925">
+            <a:tailEnd type="triangle"/>
+          </a:ln>
+        </p:spPr>
+        <p:style>
+          <a:lnRef idx="2">
+            <a:schemeClr val="accent1"/>
+          </a:lnRef>
+          <a:fillRef idx="0">
+            <a:schemeClr val="accent1"/>
+          </a:fillRef>
+          <a:effectRef idx="1">
+            <a:schemeClr val="accent1"/>
+          </a:effectRef>
+          <a:fontRef idx="minor">
+            <a:schemeClr val="tx1"/>
+          </a:fontRef>
+        </p:style>
+      </p:cxnSp>
+      <p:cxnSp>
+        <p:nvCxnSpPr>
+          <p:cNvPr id="45" name="Straight Arrow Connector 44">
+            <a:extLst>
+              <a:ext uri="{FF2B5EF4-FFF2-40B4-BE49-F238E27FC236}">
+                <a16:creationId xmlns:a16="http://schemas.microsoft.com/office/drawing/2014/main" id="{49C8244A-C3C7-F162-D305-07558C86BBA4}"/>
+              </a:ext>
+            </a:extLst>
+          </p:cNvPr>
+          <p:cNvCxnSpPr>
+            <a:cxnSpLocks/>
+          </p:cNvCxnSpPr>
+          <p:nvPr/>
+        </p:nvCxnSpPr>
+        <p:spPr>
+          <a:xfrm>
+            <a:off x="7433733" y="4121235"/>
+            <a:ext cx="0" cy="879706"/>
+          </a:xfrm>
+          <a:prstGeom prst="straightConnector1">
+            <a:avLst/>
+          </a:prstGeom>
+          <a:ln w="34925">
+            <a:tailEnd type="triangle"/>
+          </a:ln>
+        </p:spPr>
+        <p:style>
+          <a:lnRef idx="2">
+            <a:schemeClr val="accent1"/>
+          </a:lnRef>
+          <a:fillRef idx="0">
+            <a:schemeClr val="accent1"/>
+          </a:fillRef>
+          <a:effectRef idx="1">
+            <a:schemeClr val="accent1"/>
+          </a:effectRef>
+          <a:fontRef idx="minor">
+            <a:schemeClr val="tx1"/>
+          </a:fontRef>
+        </p:style>
+      </p:cxnSp>
+      <p:sp>
+        <p:nvSpPr>
+          <p:cNvPr id="46" name="TextBox 45">
+            <a:extLst>
+              <a:ext uri="{FF2B5EF4-FFF2-40B4-BE49-F238E27FC236}">
+                <a16:creationId xmlns:a16="http://schemas.microsoft.com/office/drawing/2014/main" id="{FBBDF53C-11D0-FCC3-6C9D-F36BA24C0918}"/>
+              </a:ext>
+            </a:extLst>
+          </p:cNvPr>
+          <p:cNvSpPr txBox="1"/>
+          <p:nvPr/>
+        </p:nvSpPr>
+        <p:spPr>
+          <a:xfrm>
+            <a:off x="7501306" y="4306674"/>
+            <a:ext cx="2730299" cy="646331"/>
+          </a:xfrm>
+          <a:prstGeom prst="rect">
+            <a:avLst/>
+          </a:prstGeom>
+          <a:noFill/>
+        </p:spPr>
+        <p:txBody>
+          <a:bodyPr wrap="none" rtlCol="0">
+            <a:spAutoFit/>
+          </a:bodyPr>
+          <a:lstStyle/>
+          <a:p>
+            <a:r>
+              <a:rPr lang="en-US" dirty="0"/>
+              <a:t>Make Mask</a:t>
+            </a:r>
+          </a:p>
+          <a:p>
+            <a:r>
+              <a:rPr lang="en-US" dirty="0"/>
+              <a:t>(only mask VL, Linker, VH)</a:t>
+            </a:r>
+          </a:p>
+        </p:txBody>
+      </p:sp>
+      <p:sp>
+        <p:nvSpPr>
+          <p:cNvPr id="47" name="TextBox 46">
+            <a:extLst>
+              <a:ext uri="{FF2B5EF4-FFF2-40B4-BE49-F238E27FC236}">
+                <a16:creationId xmlns:a16="http://schemas.microsoft.com/office/drawing/2014/main" id="{3E62AF7C-41ED-5820-BEEA-577FB6201179}"/>
+              </a:ext>
+            </a:extLst>
+          </p:cNvPr>
+          <p:cNvSpPr txBox="1"/>
+          <p:nvPr/>
+        </p:nvSpPr>
+        <p:spPr>
+          <a:xfrm>
+            <a:off x="389467" y="990600"/>
+            <a:ext cx="3789179" cy="1200329"/>
+          </a:xfrm>
+          <a:prstGeom prst="rect">
+            <a:avLst/>
+          </a:prstGeom>
+          <a:noFill/>
+        </p:spPr>
+        <p:txBody>
+          <a:bodyPr wrap="none" rtlCol="0">
+            <a:spAutoFit/>
+          </a:bodyPr>
+          <a:lstStyle/>
+          <a:p>
+            <a:r>
+              <a:rPr lang="en-US" dirty="0"/>
+              <a:t>OAS data</a:t>
+            </a:r>
+          </a:p>
+          <a:p>
+            <a:pPr marL="285750" indent="-285750">
+              <a:buFont typeface="Arial" panose="020B0604020202020204" pitchFamily="34" charset="0"/>
+              <a:buChar char="•"/>
+            </a:pPr>
+            <a:r>
+              <a:rPr lang="en-US" dirty="0"/>
+              <a:t>paired </a:t>
+            </a:r>
+            <a:r>
+              <a:rPr lang="en-US" dirty="0" err="1"/>
+              <a:t>heavy,light</a:t>
+            </a:r>
+            <a:r>
+              <a:rPr lang="en-US" dirty="0"/>
+              <a:t> data, human</a:t>
+            </a:r>
+          </a:p>
+          <a:p>
+            <a:pPr marL="285750" indent="-285750">
+              <a:buFont typeface="Arial" panose="020B0604020202020204" pitchFamily="34" charset="0"/>
+              <a:buChar char="•"/>
+            </a:pPr>
+            <a:r>
+              <a:rPr lang="en-US" dirty="0"/>
+              <a:t>95801 unique H,L sequence pairs</a:t>
+            </a:r>
+          </a:p>
+          <a:p>
+            <a:pPr marL="285750" indent="-285750">
+              <a:buFont typeface="Arial" panose="020B0604020202020204" pitchFamily="34" charset="0"/>
+              <a:buChar char="•"/>
+            </a:pPr>
+            <a:r>
+              <a:rPr lang="en-US" dirty="0"/>
+              <a:t>split 90/10 train/</a:t>
+            </a:r>
+            <a:r>
+              <a:rPr lang="en-US" dirty="0" err="1"/>
+              <a:t>val</a:t>
+            </a:r>
+            <a:endParaRPr lang="en-US" dirty="0"/>
+          </a:p>
+        </p:txBody>
+      </p:sp>
+      <p:sp>
+        <p:nvSpPr>
+          <p:cNvPr id="48" name="TextBox 47">
+            <a:extLst>
+              <a:ext uri="{FF2B5EF4-FFF2-40B4-BE49-F238E27FC236}">
+                <a16:creationId xmlns:a16="http://schemas.microsoft.com/office/drawing/2014/main" id="{19D22C9E-9B1E-426A-9858-E6B0D82DCC0D}"/>
+              </a:ext>
+            </a:extLst>
+          </p:cNvPr>
+          <p:cNvSpPr txBox="1"/>
+          <p:nvPr/>
+        </p:nvSpPr>
+        <p:spPr>
+          <a:xfrm>
+            <a:off x="7938377" y="6485303"/>
+            <a:ext cx="3688446" cy="276999"/>
+          </a:xfrm>
+          <a:prstGeom prst="rect">
+            <a:avLst/>
+          </a:prstGeom>
+          <a:noFill/>
+        </p:spPr>
+        <p:txBody>
+          <a:bodyPr wrap="none" rtlCol="0">
+            <a:spAutoFit/>
+          </a:bodyPr>
+          <a:lstStyle/>
+          <a:p>
+            <a:r>
+              <a:rPr lang="en-US" sz="1200" dirty="0">
+                <a:hlinkClick r:id="rId2"/>
+              </a:rPr>
+              <a:t>https://opig.stats.ox.ac.uk/webapps/oas/oas_paired/</a:t>
+            </a:r>
+            <a:endParaRPr lang="en-US" sz="1200" dirty="0"/>
+          </a:p>
+        </p:txBody>
+      </p:sp>
+    </p:spTree>
+    <p:extLst>
+      <p:ext uri="{BB962C8B-B14F-4D97-AF65-F5344CB8AC3E}">
+        <p14:creationId xmlns:p14="http://schemas.microsoft.com/office/powerpoint/2010/main" val="3528844763"/>
+      </p:ext>
+    </p:extLst>
+  </p:cSld>
+  <p:clrMapOvr>
+    <a:masterClrMapping/>
+  </p:clrMapOvr>
+</p:sld>
+</file>
+
+<file path=ppt/slides/slide26.xml><?xml version="1.0" encoding="utf-8"?>
+<p:sld xmlns:a="http://schemas.openxmlformats.org/drawingml/2006/main" xmlns:r="http://schemas.openxmlformats.org/officeDocument/2006/relationships" xmlns:p="http://schemas.openxmlformats.org/presentationml/2006/main">
+  <p:cSld>
+    <p:spTree>
+      <p:nvGrpSpPr>
+        <p:cNvPr id="1" name=""/>
+        <p:cNvGrpSpPr/>
+        <p:nvPr/>
+      </p:nvGrpSpPr>
+      <p:grpSpPr>
+        <a:xfrm>
+          <a:off x="0" y="0"/>
+          <a:ext cx="0" cy="0"/>
+          <a:chOff x="0" y="0"/>
+          <a:chExt cx="0" cy="0"/>
+        </a:xfrm>
+      </p:grpSpPr>
+      <p:sp>
+        <p:nvSpPr>
+          <p:cNvPr id="2" name="TextBox 1">
+            <a:extLst>
+              <a:ext uri="{FF2B5EF4-FFF2-40B4-BE49-F238E27FC236}">
+                <a16:creationId xmlns:a16="http://schemas.microsoft.com/office/drawing/2014/main" id="{EA41EC4A-E6A5-737F-7BE7-0F33C712BE8A}"/>
+              </a:ext>
+            </a:extLst>
+          </p:cNvPr>
+          <p:cNvSpPr txBox="1"/>
+          <p:nvPr/>
+        </p:nvSpPr>
+        <p:spPr>
+          <a:xfrm>
+            <a:off x="448574" y="232913"/>
+            <a:ext cx="2758319" cy="461665"/>
+          </a:xfrm>
+          <a:prstGeom prst="rect">
+            <a:avLst/>
+          </a:prstGeom>
+          <a:noFill/>
+        </p:spPr>
+        <p:txBody>
+          <a:bodyPr wrap="none" rtlCol="0">
+            <a:spAutoFit/>
+          </a:bodyPr>
+          <a:lstStyle/>
+          <a:p>
+            <a:r>
+              <a:rPr lang="en-US" sz="2400" dirty="0"/>
+              <a:t>Fine tuning strategy</a:t>
+            </a:r>
+          </a:p>
+        </p:txBody>
+      </p:sp>
+      <p:sp>
+        <p:nvSpPr>
+          <p:cNvPr id="3" name="TextBox 2">
+            <a:extLst>
+              <a:ext uri="{FF2B5EF4-FFF2-40B4-BE49-F238E27FC236}">
+                <a16:creationId xmlns:a16="http://schemas.microsoft.com/office/drawing/2014/main" id="{676F2E15-C6D3-2E9E-5D83-2CBE30322775}"/>
+              </a:ext>
+            </a:extLst>
+          </p:cNvPr>
+          <p:cNvSpPr txBox="1"/>
+          <p:nvPr/>
+        </p:nvSpPr>
+        <p:spPr>
+          <a:xfrm>
+            <a:off x="1078302" y="1086928"/>
+            <a:ext cx="8551508" cy="2585323"/>
+          </a:xfrm>
+          <a:prstGeom prst="rect">
+            <a:avLst/>
+          </a:prstGeom>
+          <a:noFill/>
+        </p:spPr>
+        <p:txBody>
+          <a:bodyPr wrap="none" rtlCol="0">
+            <a:spAutoFit/>
+          </a:bodyPr>
+          <a:lstStyle/>
+          <a:p>
+            <a:pPr marL="285750" indent="-285750">
+              <a:buFont typeface="Arial" panose="020B0604020202020204" pitchFamily="34" charset="0"/>
+              <a:buChar char="•"/>
+            </a:pPr>
+            <a:r>
+              <a:rPr lang="en-US" dirty="0"/>
+              <a:t>Freeze the base model and train just the regression head (for ~10 epochs?)</a:t>
+            </a:r>
+          </a:p>
+          <a:p>
+            <a:pPr marL="742950" lvl="1" indent="-285750">
+              <a:buFont typeface="Arial" panose="020B0604020202020204" pitchFamily="34" charset="0"/>
+              <a:buChar char="•"/>
+            </a:pPr>
+            <a:r>
+              <a:rPr lang="en-US" dirty="0"/>
+              <a:t>maybe </a:t>
+            </a:r>
+            <a:r>
+              <a:rPr lang="en-US" dirty="0" err="1"/>
+              <a:t>mlp</a:t>
+            </a:r>
+            <a:r>
+              <a:rPr lang="en-US" dirty="0"/>
+              <a:t> dropout = 0.4 for this</a:t>
+            </a:r>
+          </a:p>
+          <a:p>
+            <a:pPr marL="742950" lvl="1" indent="-285750">
+              <a:buFont typeface="Arial" panose="020B0604020202020204" pitchFamily="34" charset="0"/>
+              <a:buChar char="•"/>
+            </a:pPr>
+            <a:r>
+              <a:rPr lang="en-US" dirty="0"/>
+              <a:t>investigate MLP (3 layer) vs. residual MLP vs. </a:t>
+            </a:r>
+            <a:r>
+              <a:rPr lang="en-US"/>
+              <a:t>single Linear layer (1-layer MLP)</a:t>
+            </a:r>
+            <a:endParaRPr lang="en-US" dirty="0"/>
+          </a:p>
+          <a:p>
+            <a:pPr marL="742950" lvl="1" indent="-285750">
+              <a:buFont typeface="Arial" panose="020B0604020202020204" pitchFamily="34" charset="0"/>
+              <a:buChar char="•"/>
+            </a:pPr>
+            <a:endParaRPr lang="en-US" dirty="0"/>
+          </a:p>
+          <a:p>
+            <a:pPr marL="285750" indent="-285750">
+              <a:buFont typeface="Arial" panose="020B0604020202020204" pitchFamily="34" charset="0"/>
+              <a:buChar char="•"/>
+            </a:pPr>
+            <a:r>
+              <a:rPr lang="en-US" dirty="0"/>
+              <a:t>gradually unfreeze the transformer layers and train for a couple more epochs each</a:t>
+            </a:r>
+          </a:p>
+          <a:p>
+            <a:pPr marL="742950" lvl="1" indent="-285750">
+              <a:buFont typeface="Arial" panose="020B0604020202020204" pitchFamily="34" charset="0"/>
+              <a:buChar char="•"/>
+            </a:pPr>
+            <a:r>
+              <a:rPr lang="en-US" dirty="0"/>
+              <a:t>learning rate 0.00001</a:t>
+            </a:r>
+          </a:p>
+          <a:p>
+            <a:pPr marL="742950" lvl="1" indent="-285750">
+              <a:buFont typeface="Arial" panose="020B0604020202020204" pitchFamily="34" charset="0"/>
+              <a:buChar char="•"/>
+            </a:pPr>
+            <a:r>
+              <a:rPr lang="en-US" dirty="0"/>
+              <a:t>return dropouts 0.1, 0.1, 0.2</a:t>
+            </a:r>
+          </a:p>
+          <a:p>
+            <a:pPr marL="742950" lvl="1" indent="-285750">
+              <a:buFont typeface="Arial" panose="020B0604020202020204" pitchFamily="34" charset="0"/>
+              <a:buChar char="•"/>
+            </a:pPr>
+            <a:endParaRPr lang="en-US" dirty="0"/>
+          </a:p>
+          <a:p>
+            <a:pPr marL="285750" indent="-285750">
+              <a:buFont typeface="Arial" panose="020B0604020202020204" pitchFamily="34" charset="0"/>
+              <a:buChar char="•"/>
+            </a:pPr>
+            <a:endParaRPr lang="en-US" dirty="0"/>
+          </a:p>
+        </p:txBody>
+      </p:sp>
+    </p:spTree>
+    <p:extLst>
+      <p:ext uri="{BB962C8B-B14F-4D97-AF65-F5344CB8AC3E}">
+        <p14:creationId xmlns:p14="http://schemas.microsoft.com/office/powerpoint/2010/main" val="2655861346"/>
+      </p:ext>
+    </p:extLst>
+  </p:cSld>
+  <p:clrMapOvr>
+    <a:masterClrMapping/>
+  </p:clrMapOvr>
+</p:sld>
+</file>
+
+<file path=ppt/slides/slide27.xml><?xml version="1.0" encoding="utf-8"?>
 <p:sld xmlns:a="http://schemas.openxmlformats.org/drawingml/2006/main" xmlns:r="http://schemas.openxmlformats.org/officeDocument/2006/relationships" xmlns:p="http://schemas.openxmlformats.org/presentationml/2006/main">
   <p:cSld>
     <p:spTree>
@@ -13742,13 +15495,8 @@
                       <a:pPr algn="ctr"/>
                       <a:r>
                         <a:rPr lang="en-US" sz="1200" dirty="0"/>
-                        <a:t>base: frozen</a:t>
+                        <a:t>base: frozen, unfreeze last layer</a:t>
                       </a:r>
-                      <a:r>
-                        <a:rPr lang="en-US" sz="1200"/>
-                        <a:t>, unfreeze last layer</a:t>
-                      </a:r>
-                      <a:endParaRPr lang="en-US" sz="1200" dirty="0"/>
                     </a:p>
                     <a:p>
                       <a:pPr algn="ctr"/>
@@ -14017,37 +15765,7 @@
 </p:sld>
 </file>
 
-<file path=ppt/slides/slide26.xml><?xml version="1.0" encoding="utf-8"?>
-<p:sld xmlns:a="http://schemas.openxmlformats.org/drawingml/2006/main" xmlns:r="http://schemas.openxmlformats.org/officeDocument/2006/relationships" xmlns:p="http://schemas.openxmlformats.org/presentationml/2006/main">
-  <p:cSld>
-    <p:spTree>
-      <p:nvGrpSpPr>
-        <p:cNvPr id="1" name=""/>
-        <p:cNvGrpSpPr/>
-        <p:nvPr/>
-      </p:nvGrpSpPr>
-      <p:grpSpPr>
-        <a:xfrm>
-          <a:off x="0" y="0"/>
-          <a:ext cx="0" cy="0"/>
-          <a:chOff x="0" y="0"/>
-          <a:chExt cx="0" cy="0"/>
-        </a:xfrm>
-      </p:grpSpPr>
-    </p:spTree>
-    <p:extLst>
-      <p:ext uri="{BB962C8B-B14F-4D97-AF65-F5344CB8AC3E}">
-        <p14:creationId xmlns:p14="http://schemas.microsoft.com/office/powerpoint/2010/main" val="2655861346"/>
-      </p:ext>
-    </p:extLst>
-  </p:cSld>
-  <p:clrMapOvr>
-    <a:masterClrMapping/>
-  </p:clrMapOvr>
-</p:sld>
-</file>
-
-<file path=ppt/slides/slide27.xml><?xml version="1.0" encoding="utf-8"?>
+<file path=ppt/slides/slide28.xml><?xml version="1.0" encoding="utf-8"?>
 <p:sld xmlns:a="http://schemas.openxmlformats.org/drawingml/2006/main" xmlns:r="http://schemas.openxmlformats.org/officeDocument/2006/relationships" xmlns:p="http://schemas.openxmlformats.org/presentationml/2006/main">
   <p:cSld>
     <p:spTree>

</xml_diff>

<commit_message>
misc changes for pre-training code slide deck
</commit_message>
<xml_diff>
--- a/Homework-aAlphaBio.pptx
+++ b/Homework-aAlphaBio.pptx
@@ -12759,8 +12759,8 @@
         </p:nvSpPr>
         <p:spPr>
           <a:xfrm>
-            <a:off x="345057" y="5793830"/>
-            <a:ext cx="4676345" cy="523220"/>
+            <a:off x="345057" y="6023638"/>
+            <a:ext cx="4676345" cy="738664"/>
           </a:xfrm>
           <a:prstGeom prst="rect">
             <a:avLst/>
@@ -12775,7 +12775,7 @@
           <a:p>
             <a:r>
               <a:rPr lang="en-US" sz="1400" dirty="0"/>
-              <a:t>linker sequence: </a:t>
+              <a:t>linker sequence = </a:t>
             </a:r>
             <a:r>
               <a:rPr lang="en-US" sz="1400" b="0" dirty="0">
@@ -12800,12 +12800,30 @@
               <a:rPr lang="en-US" sz="1400" dirty="0"/>
               <a:t> dataset as a representative example</a:t>
             </a:r>
-            <a:endParaRPr lang="en-US" sz="1400" b="0" dirty="0">
-              <a:solidFill>
-                <a:schemeClr val="tx1"/>
-              </a:solidFill>
-              <a:effectLst/>
-            </a:endParaRPr>
+          </a:p>
+          <a:p>
+            <a:r>
+              <a:rPr lang="en-US" sz="1400" b="0" dirty="0">
+                <a:solidFill>
+                  <a:schemeClr val="tx1"/>
+                </a:solidFill>
+                <a:effectLst/>
+              </a:rPr>
+              <a:t>glycine</a:t>
+            </a:r>
+            <a:r>
+              <a:rPr lang="en-US" sz="1400" dirty="0"/>
+              <a:t>-</a:t>
+            </a:r>
+            <a:r>
+              <a:rPr lang="en-US" sz="1400" b="0" dirty="0">
+                <a:solidFill>
+                  <a:schemeClr val="tx1"/>
+                </a:solidFill>
+                <a:effectLst/>
+              </a:rPr>
+              <a:t>rich for flexibility with some serine for solubility</a:t>
+            </a:r>
           </a:p>
         </p:txBody>
       </p:sp>
@@ -12823,7 +12841,7 @@
         </p:nvGrpSpPr>
         <p:grpSpPr>
           <a:xfrm>
-            <a:off x="5022490" y="1465858"/>
+            <a:off x="5251091" y="1465858"/>
             <a:ext cx="5614106" cy="1113979"/>
             <a:chOff x="1314090" y="1702925"/>
             <a:chExt cx="5614106" cy="1113979"/>
@@ -13468,10 +13486,10 @@
         </p:nvGrpSpPr>
         <p:grpSpPr>
           <a:xfrm>
-            <a:off x="4425480" y="3406090"/>
-            <a:ext cx="7427405" cy="589575"/>
+            <a:off x="4654081" y="2965821"/>
+            <a:ext cx="7359669" cy="589575"/>
             <a:chOff x="753536" y="4052515"/>
-            <a:chExt cx="7427405" cy="589575"/>
+            <a:chExt cx="7359669" cy="589575"/>
           </a:xfrm>
         </p:grpSpPr>
         <p:sp>
@@ -13813,7 +13831,7 @@
           </p:nvSpPr>
           <p:spPr>
             <a:xfrm>
-              <a:off x="6231468" y="4276924"/>
+              <a:off x="6206067" y="4276924"/>
               <a:ext cx="696725" cy="362310"/>
             </a:xfrm>
             <a:prstGeom prst="rect">
@@ -13862,7 +13880,7 @@
           </p:nvSpPr>
           <p:spPr>
             <a:xfrm>
-              <a:off x="7023788" y="4274980"/>
+              <a:off x="6947585" y="4274980"/>
               <a:ext cx="696725" cy="362310"/>
             </a:xfrm>
             <a:prstGeom prst="rect">
@@ -13911,7 +13929,7 @@
           </p:nvSpPr>
           <p:spPr>
             <a:xfrm>
-              <a:off x="7661247" y="4052515"/>
+              <a:off x="7593511" y="4052515"/>
               <a:ext cx="519694" cy="584775"/>
             </a:xfrm>
             <a:prstGeom prst="rect">
@@ -13947,7 +13965,7 @@
         </p:nvSpPr>
         <p:spPr>
           <a:xfrm>
-            <a:off x="4836945" y="1012971"/>
+            <a:off x="5065546" y="1012971"/>
             <a:ext cx="2836289" cy="369332"/>
           </a:xfrm>
           <a:prstGeom prst="rect">
@@ -13990,7 +14008,7 @@
         </p:nvSpPr>
         <p:spPr>
           <a:xfrm>
-            <a:off x="7501306" y="2868434"/>
+            <a:off x="7729907" y="2732967"/>
             <a:ext cx="3856120" cy="369332"/>
           </a:xfrm>
           <a:prstGeom prst="rect">
@@ -14027,8 +14045,8 @@
         </p:nvCxnSpPr>
         <p:spPr>
           <a:xfrm>
-            <a:off x="7433733" y="2656501"/>
-            <a:ext cx="0" cy="879706"/>
+            <a:off x="7662334" y="2656501"/>
+            <a:ext cx="0" cy="501566"/>
           </a:xfrm>
           <a:prstGeom prst="straightConnector1">
             <a:avLst/>
@@ -14068,7 +14086,7 @@
         </p:nvCxnSpPr>
         <p:spPr>
           <a:xfrm>
-            <a:off x="7433733" y="4121235"/>
+            <a:off x="7662334" y="3680966"/>
             <a:ext cx="0" cy="879706"/>
           </a:xfrm>
           <a:prstGeom prst="straightConnector1">
@@ -14107,8 +14125,8 @@
         </p:nvSpPr>
         <p:spPr>
           <a:xfrm>
-            <a:off x="7501306" y="4306674"/>
-            <a:ext cx="2730299" cy="646331"/>
+            <a:off x="7729907" y="3866405"/>
+            <a:ext cx="3100592" cy="646331"/>
           </a:xfrm>
           <a:prstGeom prst="rect">
             <a:avLst/>
@@ -14129,7 +14147,7 @@
           <a:p>
             <a:r>
               <a:rPr lang="en-US" dirty="0"/>
-              <a:t>(only mask VL, Linker, VH)</a:t>
+              <a:t>(only mask the VL, Linker, VH)</a:t>
             </a:r>
           </a:p>
         </p:txBody>
@@ -14148,8 +14166,8 @@
         </p:nvSpPr>
         <p:spPr>
           <a:xfrm>
-            <a:off x="389467" y="990600"/>
-            <a:ext cx="3789179" cy="1200329"/>
+            <a:off x="133100" y="1197637"/>
+            <a:ext cx="4932446" cy="1200329"/>
           </a:xfrm>
           <a:prstGeom prst="rect">
             <a:avLst/>
@@ -14157,7 +14175,7 @@
           <a:noFill/>
         </p:spPr>
         <p:txBody>
-          <a:bodyPr wrap="none" rtlCol="0">
+          <a:bodyPr wrap="square" rtlCol="0">
             <a:spAutoFit/>
           </a:bodyPr>
           <a:lstStyle/>
@@ -14182,7 +14200,7 @@
             </a:r>
             <a:r>
               <a:rPr lang="en-US" dirty="0"/>
-              <a:t> data, human</a:t>
+              <a:t> chain data, human</a:t>
             </a:r>
           </a:p>
           <a:p>
@@ -14192,23 +14210,34 @@
             </a:pPr>
             <a:r>
               <a:rPr lang="en-US" dirty="0"/>
-              <a:t>95801 unique H,L sequence pairs</a:t>
-            </a:r>
-          </a:p>
-          <a:p>
-            <a:pPr marL="285750" indent="-285750">
+              <a:t>build </a:t>
+            </a:r>
+            <a:r>
+              <a:rPr lang="en-US" dirty="0" err="1"/>
+              <a:t>scFv</a:t>
+            </a:r>
+            <a:r>
+              <a:rPr lang="en-US" dirty="0"/>
+              <a:t> seqs 50% switch position VL &amp; VH</a:t>
+            </a:r>
+          </a:p>
+          <a:p>
+            <a:pPr marL="742950" lvl="1" indent="-285750">
               <a:buFont typeface="Arial" panose="020B0604020202020204" pitchFamily="34" charset="0"/>
               <a:buChar char="•"/>
             </a:pPr>
             <a:r>
               <a:rPr lang="en-US" dirty="0"/>
-              <a:t>split 90/10 train/</a:t>
+              <a:t>thus ~200K </a:t>
             </a:r>
             <a:r>
               <a:rPr lang="en-US" dirty="0" err="1"/>
-              <a:t>val</a:t>
-            </a:r>
-            <a:endParaRPr lang="en-US" dirty="0"/>
+              <a:t>scFv</a:t>
+            </a:r>
+            <a:r>
+              <a:rPr lang="en-US" dirty="0"/>
+              <a:t> sequences possible</a:t>
+            </a:r>
           </a:p>
         </p:txBody>
       </p:sp>
@@ -14250,6 +14279,259 @@
           </a:p>
         </p:txBody>
       </p:sp>
+      <p:graphicFrame>
+        <p:nvGraphicFramePr>
+          <p:cNvPr id="50" name="Table 49">
+            <a:extLst>
+              <a:ext uri="{FF2B5EF4-FFF2-40B4-BE49-F238E27FC236}">
+                <a16:creationId xmlns:a16="http://schemas.microsoft.com/office/drawing/2014/main" id="{CF70101B-8292-C641-B50B-A51803A1AE4A}"/>
+              </a:ext>
+            </a:extLst>
+          </p:cNvPr>
+          <p:cNvGraphicFramePr>
+            <a:graphicFrameLocks noGrp="1"/>
+          </p:cNvGraphicFramePr>
+          <p:nvPr>
+            <p:extLst>
+              <p:ext uri="{D42A27DB-BD31-4B8C-83A1-F6EECF244321}">
+                <p14:modId xmlns:p14="http://schemas.microsoft.com/office/powerpoint/2010/main" val="3233106421"/>
+              </p:ext>
+            </p:extLst>
+          </p:nvPr>
+        </p:nvGraphicFramePr>
+        <p:xfrm>
+          <a:off x="192151" y="4251808"/>
+          <a:ext cx="4461930" cy="1381760"/>
+        </p:xfrm>
+        <a:graphic>
+          <a:graphicData uri="http://schemas.openxmlformats.org/drawingml/2006/table">
+            <a:tbl>
+              <a:tblPr firstRow="1" bandRow="1">
+                <a:tableStyleId>{5C22544A-7EE6-4342-B048-85BDC9FD1C3A}</a:tableStyleId>
+              </a:tblPr>
+              <a:tblGrid>
+                <a:gridCol w="1414701">
+                  <a:extLst>
+                    <a:ext uri="{9D8B030D-6E8A-4147-A177-3AD203B41FA5}">
+                      <a16:colId xmlns:a16="http://schemas.microsoft.com/office/drawing/2014/main" val="253088106"/>
+                    </a:ext>
+                  </a:extLst>
+                </a:gridCol>
+                <a:gridCol w="1078523">
+                  <a:extLst>
+                    <a:ext uri="{9D8B030D-6E8A-4147-A177-3AD203B41FA5}">
+                      <a16:colId xmlns:a16="http://schemas.microsoft.com/office/drawing/2014/main" val="2709473595"/>
+                    </a:ext>
+                  </a:extLst>
+                </a:gridCol>
+                <a:gridCol w="961176">
+                  <a:extLst>
+                    <a:ext uri="{9D8B030D-6E8A-4147-A177-3AD203B41FA5}">
+                      <a16:colId xmlns:a16="http://schemas.microsoft.com/office/drawing/2014/main" val="257658509"/>
+                    </a:ext>
+                  </a:extLst>
+                </a:gridCol>
+                <a:gridCol w="1007530">
+                  <a:extLst>
+                    <a:ext uri="{9D8B030D-6E8A-4147-A177-3AD203B41FA5}">
+                      <a16:colId xmlns:a16="http://schemas.microsoft.com/office/drawing/2014/main" val="3182422530"/>
+                    </a:ext>
+                  </a:extLst>
+                </a:gridCol>
+              </a:tblGrid>
+              <a:tr h="370840">
+                <a:tc>
+                  <a:txBody>
+                    <a:bodyPr/>
+                    <a:lstStyle/>
+                    <a:p>
+                      <a:pPr algn="ctr"/>
+                      <a:r>
+                        <a:rPr lang="en-US" dirty="0"/>
+                        <a:t>Dataset name</a:t>
+                      </a:r>
+                    </a:p>
+                  </a:txBody>
+                  <a:tcPr anchor="ctr"/>
+                </a:tc>
+                <a:tc>
+                  <a:txBody>
+                    <a:bodyPr/>
+                    <a:lstStyle/>
+                    <a:p>
+                      <a:pPr algn="ctr"/>
+                      <a:r>
+                        <a:rPr lang="en-US" dirty="0"/>
+                        <a:t>Total rows</a:t>
+                      </a:r>
+                    </a:p>
+                  </a:txBody>
+                  <a:tcPr anchor="ctr"/>
+                </a:tc>
+                <a:tc>
+                  <a:txBody>
+                    <a:bodyPr/>
+                    <a:lstStyle/>
+                    <a:p>
+                      <a:pPr algn="ctr"/>
+                      <a:r>
+                        <a:rPr lang="en-US" dirty="0"/>
+                        <a:t>Train</a:t>
+                      </a:r>
+                    </a:p>
+                  </a:txBody>
+                  <a:tcPr anchor="ctr"/>
+                </a:tc>
+                <a:tc>
+                  <a:txBody>
+                    <a:bodyPr/>
+                    <a:lstStyle/>
+                    <a:p>
+                      <a:pPr algn="ctr"/>
+                      <a:r>
+                        <a:rPr lang="en-US" dirty="0"/>
+                        <a:t>Val</a:t>
+                      </a:r>
+                    </a:p>
+                  </a:txBody>
+                  <a:tcPr anchor="ctr"/>
+                </a:tc>
+                <a:extLst>
+                  <a:ext uri="{0D108BD9-81ED-4DB2-BD59-A6C34878D82A}">
+                    <a16:rowId xmlns:a16="http://schemas.microsoft.com/office/drawing/2014/main" val="2657403218"/>
+                  </a:ext>
+                </a:extLst>
+              </a:tr>
+              <a:tr h="370840">
+                <a:tc>
+                  <a:txBody>
+                    <a:bodyPr/>
+                    <a:lstStyle/>
+                    <a:p>
+                      <a:pPr algn="ctr"/>
+                      <a:r>
+                        <a:rPr lang="en-US" dirty="0"/>
+                        <a:t>paired_1</a:t>
+                      </a:r>
+                    </a:p>
+                  </a:txBody>
+                  <a:tcPr anchor="ctr"/>
+                </a:tc>
+                <a:tc>
+                  <a:txBody>
+                    <a:bodyPr/>
+                    <a:lstStyle/>
+                    <a:p>
+                      <a:pPr algn="ctr"/>
+                      <a:r>
+                        <a:rPr lang="en-US" dirty="0"/>
+                        <a:t>95801</a:t>
+                      </a:r>
+                    </a:p>
+                  </a:txBody>
+                  <a:tcPr anchor="ctr"/>
+                </a:tc>
+                <a:tc>
+                  <a:txBody>
+                    <a:bodyPr/>
+                    <a:lstStyle/>
+                    <a:p>
+                      <a:pPr algn="ctr"/>
+                      <a:r>
+                        <a:rPr lang="en-US" dirty="0"/>
+                        <a:t>86221</a:t>
+                      </a:r>
+                    </a:p>
+                  </a:txBody>
+                  <a:tcPr anchor="ctr"/>
+                </a:tc>
+                <a:tc>
+                  <a:txBody>
+                    <a:bodyPr/>
+                    <a:lstStyle/>
+                    <a:p>
+                      <a:pPr algn="ctr"/>
+                      <a:r>
+                        <a:rPr lang="en-US" dirty="0"/>
+                        <a:t>9580</a:t>
+                      </a:r>
+                    </a:p>
+                  </a:txBody>
+                  <a:tcPr anchor="ctr"/>
+                </a:tc>
+                <a:extLst>
+                  <a:ext uri="{0D108BD9-81ED-4DB2-BD59-A6C34878D82A}">
+                    <a16:rowId xmlns:a16="http://schemas.microsoft.com/office/drawing/2014/main" val="3049439595"/>
+                  </a:ext>
+                </a:extLst>
+              </a:tr>
+              <a:tr h="370840">
+                <a:tc>
+                  <a:txBody>
+                    <a:bodyPr/>
+                    <a:lstStyle/>
+                    <a:p>
+                      <a:pPr algn="ctr"/>
+                      <a:r>
+                        <a:rPr lang="en-US" dirty="0"/>
+                        <a:t>paired_2</a:t>
+                      </a:r>
+                    </a:p>
+                  </a:txBody>
+                  <a:tcPr anchor="ctr"/>
+                </a:tc>
+                <a:tc>
+                  <a:txBody>
+                    <a:bodyPr/>
+                    <a:lstStyle/>
+                    <a:p>
+                      <a:pPr algn="ctr"/>
+                      <a:r>
+                        <a:rPr lang="en-US" dirty="0"/>
+                        <a:t>263559</a:t>
+                      </a:r>
+                    </a:p>
+                  </a:txBody>
+                  <a:tcPr anchor="ctr"/>
+                </a:tc>
+                <a:tc>
+                  <a:txBody>
+                    <a:bodyPr/>
+                    <a:lstStyle/>
+                    <a:p>
+                      <a:pPr algn="ctr"/>
+                      <a:r>
+                        <a:rPr lang="en-US" dirty="0"/>
+                        <a:t>237203</a:t>
+                      </a:r>
+                    </a:p>
+                  </a:txBody>
+                  <a:tcPr anchor="ctr"/>
+                </a:tc>
+                <a:tc>
+                  <a:txBody>
+                    <a:bodyPr/>
+                    <a:lstStyle/>
+                    <a:p>
+                      <a:pPr algn="ctr"/>
+                      <a:r>
+                        <a:rPr lang="en-US" dirty="0"/>
+                        <a:t>26356</a:t>
+                      </a:r>
+                    </a:p>
+                  </a:txBody>
+                  <a:tcPr anchor="ctr"/>
+                </a:tc>
+                <a:extLst>
+                  <a:ext uri="{0D108BD9-81ED-4DB2-BD59-A6C34878D82A}">
+                    <a16:rowId xmlns:a16="http://schemas.microsoft.com/office/drawing/2014/main" val="1478899880"/>
+                  </a:ext>
+                </a:extLst>
+              </a:tr>
+            </a:tbl>
+          </a:graphicData>
+        </a:graphic>
+      </p:graphicFrame>
     </p:spTree>
     <p:extLst>
       <p:ext uri="{BB962C8B-B14F-4D97-AF65-F5344CB8AC3E}">

</xml_diff>

<commit_message>
slide deck and misc notebook changes
</commit_message>
<xml_diff>
--- a/Homework-aAlphaBio.pptx
+++ b/Homework-aAlphaBio.pptx
@@ -287,7 +287,7 @@
           <a:p>
             <a:fld id="{A99D5239-F08C-4643-B440-E380AF94EFE9}" type="datetimeFigureOut">
               <a:rPr lang="en-US" smtClean="0"/>
-              <a:t>5/16/24</a:t>
+              <a:t>5/17/24</a:t>
             </a:fld>
             <a:endParaRPr lang="en-US"/>
           </a:p>
@@ -485,7 +485,7 @@
           <a:p>
             <a:fld id="{A99D5239-F08C-4643-B440-E380AF94EFE9}" type="datetimeFigureOut">
               <a:rPr lang="en-US" smtClean="0"/>
-              <a:t>5/16/24</a:t>
+              <a:t>5/17/24</a:t>
             </a:fld>
             <a:endParaRPr lang="en-US"/>
           </a:p>
@@ -693,7 +693,7 @@
           <a:p>
             <a:fld id="{A99D5239-F08C-4643-B440-E380AF94EFE9}" type="datetimeFigureOut">
               <a:rPr lang="en-US" smtClean="0"/>
-              <a:t>5/16/24</a:t>
+              <a:t>5/17/24</a:t>
             </a:fld>
             <a:endParaRPr lang="en-US"/>
           </a:p>
@@ -891,7 +891,7 @@
           <a:p>
             <a:fld id="{A99D5239-F08C-4643-B440-E380AF94EFE9}" type="datetimeFigureOut">
               <a:rPr lang="en-US" smtClean="0"/>
-              <a:t>5/16/24</a:t>
+              <a:t>5/17/24</a:t>
             </a:fld>
             <a:endParaRPr lang="en-US"/>
           </a:p>
@@ -1166,7 +1166,7 @@
           <a:p>
             <a:fld id="{A99D5239-F08C-4643-B440-E380AF94EFE9}" type="datetimeFigureOut">
               <a:rPr lang="en-US" smtClean="0"/>
-              <a:t>5/16/24</a:t>
+              <a:t>5/17/24</a:t>
             </a:fld>
             <a:endParaRPr lang="en-US"/>
           </a:p>
@@ -1431,7 +1431,7 @@
           <a:p>
             <a:fld id="{A99D5239-F08C-4643-B440-E380AF94EFE9}" type="datetimeFigureOut">
               <a:rPr lang="en-US" smtClean="0"/>
-              <a:t>5/16/24</a:t>
+              <a:t>5/17/24</a:t>
             </a:fld>
             <a:endParaRPr lang="en-US"/>
           </a:p>
@@ -1843,7 +1843,7 @@
           <a:p>
             <a:fld id="{A99D5239-F08C-4643-B440-E380AF94EFE9}" type="datetimeFigureOut">
               <a:rPr lang="en-US" smtClean="0"/>
-              <a:t>5/16/24</a:t>
+              <a:t>5/17/24</a:t>
             </a:fld>
             <a:endParaRPr lang="en-US"/>
           </a:p>
@@ -1984,7 +1984,7 @@
           <a:p>
             <a:fld id="{A99D5239-F08C-4643-B440-E380AF94EFE9}" type="datetimeFigureOut">
               <a:rPr lang="en-US" smtClean="0"/>
-              <a:t>5/16/24</a:t>
+              <a:t>5/17/24</a:t>
             </a:fld>
             <a:endParaRPr lang="en-US"/>
           </a:p>
@@ -2097,7 +2097,7 @@
           <a:p>
             <a:fld id="{A99D5239-F08C-4643-B440-E380AF94EFE9}" type="datetimeFigureOut">
               <a:rPr lang="en-US" smtClean="0"/>
-              <a:t>5/16/24</a:t>
+              <a:t>5/17/24</a:t>
             </a:fld>
             <a:endParaRPr lang="en-US"/>
           </a:p>
@@ -2408,7 +2408,7 @@
           <a:p>
             <a:fld id="{A99D5239-F08C-4643-B440-E380AF94EFE9}" type="datetimeFigureOut">
               <a:rPr lang="en-US" smtClean="0"/>
-              <a:t>5/16/24</a:t>
+              <a:t>5/17/24</a:t>
             </a:fld>
             <a:endParaRPr lang="en-US"/>
           </a:p>
@@ -2696,7 +2696,7 @@
           <a:p>
             <a:fld id="{A99D5239-F08C-4643-B440-E380AF94EFE9}" type="datetimeFigureOut">
               <a:rPr lang="en-US" smtClean="0"/>
-              <a:t>5/16/24</a:t>
+              <a:t>5/17/24</a:t>
             </a:fld>
             <a:endParaRPr lang="en-US"/>
           </a:p>
@@ -2937,7 +2937,7 @@
           <a:p>
             <a:fld id="{A99D5239-F08C-4643-B440-E380AF94EFE9}" type="datetimeFigureOut">
               <a:rPr lang="en-US" smtClean="0"/>
-              <a:t>5/16/24</a:t>
+              <a:t>5/17/24</a:t>
             </a:fld>
             <a:endParaRPr lang="en-US"/>
           </a:p>
@@ -12845,7 +12845,7 @@
             </a:pPr>
             <a:r>
               <a:rPr lang="en-US" sz="1600" dirty="0"/>
-              <a:t>Inference results are moderately changed in v2</a:t>
+              <a:t>Inference results are modestly changed in v2</a:t>
             </a:r>
           </a:p>
           <a:p>
@@ -14811,15 +14811,7 @@
             </a:pPr>
             <a:r>
               <a:rPr lang="en-US" dirty="0"/>
-              <a:t>paired </a:t>
-            </a:r>
-            <a:r>
-              <a:rPr lang="en-US" dirty="0" err="1"/>
-              <a:t>heavy,light</a:t>
-            </a:r>
-            <a:r>
-              <a:rPr lang="en-US" dirty="0"/>
-              <a:t> chain data, human</a:t>
+              <a:t>paired heavy, light chain data, human</a:t>
             </a:r>
           </a:p>
           <a:p>

</xml_diff>